<commit_message>
Working map in modal
</commit_message>
<xml_diff>
--- a/Presentation1.pptx
+++ b/Presentation1.pptx
@@ -4,12 +4,16 @@
   <p:sldMasterIdLst>
     <p:sldMasterId id="2147483648" r:id="rId1"/>
   </p:sldMasterIdLst>
+  <p:notesMasterIdLst>
+    <p:notesMasterId r:id="rId8"/>
+  </p:notesMasterIdLst>
   <p:sldIdLst>
     <p:sldId id="256" r:id="rId2"/>
-    <p:sldId id="258" r:id="rId3"/>
-    <p:sldId id="259" r:id="rId4"/>
-    <p:sldId id="257" r:id="rId5"/>
-    <p:sldId id="260" r:id="rId6"/>
+    <p:sldId id="261" r:id="rId3"/>
+    <p:sldId id="258" r:id="rId4"/>
+    <p:sldId id="260" r:id="rId5"/>
+    <p:sldId id="259" r:id="rId6"/>
+    <p:sldId id="257" r:id="rId7"/>
   </p:sldIdLst>
   <p:sldSz cx="12192000" cy="6858000"/>
   <p:notesSz cx="6858000" cy="9144000"/>
@@ -108,6 +112,11 @@
       </a:defRPr>
     </a:lvl9pPr>
   </p:defaultTextStyle>
+  <p:extLst>
+    <p:ext uri="{EFAFB233-063F-42B5-8137-9DF3F51BA10A}">
+      <p15:sldGuideLst xmlns:p15="http://schemas.microsoft.com/office/powerpoint/2012/main"/>
+    </p:ext>
+  </p:extLst>
 </p:presentation>
 </file>
 
@@ -116,753 +125,6 @@
 </file>
 
 <file path=ppt/diagrams/colors1.xml><?xml version="1.0" encoding="utf-8"?>
-<dgm:colorsDef xmlns:dgm="http://schemas.openxmlformats.org/drawingml/2006/diagram" xmlns:a="http://schemas.openxmlformats.org/drawingml/2006/main" uniqueId="urn:microsoft.com/office/officeart/2005/8/colors/accent1_2">
-  <dgm:title val=""/>
-  <dgm:desc val=""/>
-  <dgm:catLst>
-    <dgm:cat type="accent1" pri="11200"/>
-  </dgm:catLst>
-  <dgm:styleLbl name="node0">
-    <dgm:fillClrLst meth="repeat">
-      <a:schemeClr val="accent1"/>
-    </dgm:fillClrLst>
-    <dgm:linClrLst meth="repeat">
-      <a:schemeClr val="lt1"/>
-    </dgm:linClrLst>
-    <dgm:effectClrLst/>
-    <dgm:txLinClrLst/>
-    <dgm:txFillClrLst/>
-    <dgm:txEffectClrLst/>
-  </dgm:styleLbl>
-  <dgm:styleLbl name="alignNode1">
-    <dgm:fillClrLst meth="repeat">
-      <a:schemeClr val="accent1"/>
-    </dgm:fillClrLst>
-    <dgm:linClrLst meth="repeat">
-      <a:schemeClr val="accent1"/>
-    </dgm:linClrLst>
-    <dgm:effectClrLst/>
-    <dgm:txLinClrLst/>
-    <dgm:txFillClrLst/>
-    <dgm:txEffectClrLst/>
-  </dgm:styleLbl>
-  <dgm:styleLbl name="node1">
-    <dgm:fillClrLst meth="repeat">
-      <a:schemeClr val="accent1"/>
-    </dgm:fillClrLst>
-    <dgm:linClrLst meth="repeat">
-      <a:schemeClr val="lt1"/>
-    </dgm:linClrLst>
-    <dgm:effectClrLst/>
-    <dgm:txLinClrLst/>
-    <dgm:txFillClrLst/>
-    <dgm:txEffectClrLst/>
-  </dgm:styleLbl>
-  <dgm:styleLbl name="lnNode1">
-    <dgm:fillClrLst meth="repeat">
-      <a:schemeClr val="accent1"/>
-    </dgm:fillClrLst>
-    <dgm:linClrLst meth="repeat">
-      <a:schemeClr val="lt1"/>
-    </dgm:linClrLst>
-    <dgm:effectClrLst/>
-    <dgm:txLinClrLst/>
-    <dgm:txFillClrLst/>
-    <dgm:txEffectClrLst/>
-  </dgm:styleLbl>
-  <dgm:styleLbl name="vennNode1">
-    <dgm:fillClrLst meth="repeat">
-      <a:schemeClr val="accent1">
-        <a:alpha val="50000"/>
-      </a:schemeClr>
-    </dgm:fillClrLst>
-    <dgm:linClrLst meth="repeat">
-      <a:schemeClr val="lt1"/>
-    </dgm:linClrLst>
-    <dgm:effectClrLst/>
-    <dgm:txLinClrLst/>
-    <dgm:txFillClrLst/>
-    <dgm:txEffectClrLst/>
-  </dgm:styleLbl>
-  <dgm:styleLbl name="node2">
-    <dgm:fillClrLst meth="repeat">
-      <a:schemeClr val="accent1"/>
-    </dgm:fillClrLst>
-    <dgm:linClrLst meth="repeat">
-      <a:schemeClr val="lt1"/>
-    </dgm:linClrLst>
-    <dgm:effectClrLst/>
-    <dgm:txLinClrLst/>
-    <dgm:txFillClrLst/>
-    <dgm:txEffectClrLst/>
-  </dgm:styleLbl>
-  <dgm:styleLbl name="node3">
-    <dgm:fillClrLst meth="repeat">
-      <a:schemeClr val="accent1"/>
-    </dgm:fillClrLst>
-    <dgm:linClrLst meth="repeat">
-      <a:schemeClr val="lt1"/>
-    </dgm:linClrLst>
-    <dgm:effectClrLst/>
-    <dgm:txLinClrLst/>
-    <dgm:txFillClrLst/>
-    <dgm:txEffectClrLst/>
-  </dgm:styleLbl>
-  <dgm:styleLbl name="node4">
-    <dgm:fillClrLst meth="repeat">
-      <a:schemeClr val="accent1"/>
-    </dgm:fillClrLst>
-    <dgm:linClrLst meth="repeat">
-      <a:schemeClr val="lt1"/>
-    </dgm:linClrLst>
-    <dgm:effectClrLst/>
-    <dgm:txLinClrLst/>
-    <dgm:txFillClrLst/>
-    <dgm:txEffectClrLst/>
-  </dgm:styleLbl>
-  <dgm:styleLbl name="fgImgPlace1">
-    <dgm:fillClrLst meth="repeat">
-      <a:schemeClr val="accent1">
-        <a:tint val="50000"/>
-      </a:schemeClr>
-    </dgm:fillClrLst>
-    <dgm:linClrLst meth="repeat">
-      <a:schemeClr val="lt1"/>
-    </dgm:linClrLst>
-    <dgm:effectClrLst/>
-    <dgm:txLinClrLst/>
-    <dgm:txFillClrLst meth="repeat">
-      <a:schemeClr val="lt1"/>
-    </dgm:txFillClrLst>
-    <dgm:txEffectClrLst/>
-  </dgm:styleLbl>
-  <dgm:styleLbl name="alignImgPlace1">
-    <dgm:fillClrLst meth="repeat">
-      <a:schemeClr val="accent1">
-        <a:tint val="50000"/>
-      </a:schemeClr>
-    </dgm:fillClrLst>
-    <dgm:linClrLst meth="repeat">
-      <a:schemeClr val="lt1"/>
-    </dgm:linClrLst>
-    <dgm:effectClrLst/>
-    <dgm:txLinClrLst/>
-    <dgm:txFillClrLst meth="repeat">
-      <a:schemeClr val="lt1"/>
-    </dgm:txFillClrLst>
-    <dgm:txEffectClrLst/>
-  </dgm:styleLbl>
-  <dgm:styleLbl name="bgImgPlace1">
-    <dgm:fillClrLst meth="repeat">
-      <a:schemeClr val="accent1">
-        <a:tint val="50000"/>
-      </a:schemeClr>
-    </dgm:fillClrLst>
-    <dgm:linClrLst meth="repeat">
-      <a:schemeClr val="lt1"/>
-    </dgm:linClrLst>
-    <dgm:effectClrLst/>
-    <dgm:txLinClrLst/>
-    <dgm:txFillClrLst meth="repeat">
-      <a:schemeClr val="lt1"/>
-    </dgm:txFillClrLst>
-    <dgm:txEffectClrLst/>
-  </dgm:styleLbl>
-  <dgm:styleLbl name="sibTrans2D1">
-    <dgm:fillClrLst meth="repeat">
-      <a:schemeClr val="accent1">
-        <a:tint val="60000"/>
-      </a:schemeClr>
-    </dgm:fillClrLst>
-    <dgm:linClrLst meth="repeat">
-      <a:schemeClr val="accent1">
-        <a:tint val="60000"/>
-      </a:schemeClr>
-    </dgm:linClrLst>
-    <dgm:effectClrLst/>
-    <dgm:txLinClrLst/>
-    <dgm:txFillClrLst/>
-    <dgm:txEffectClrLst/>
-  </dgm:styleLbl>
-  <dgm:styleLbl name="fgSibTrans2D1">
-    <dgm:fillClrLst meth="repeat">
-      <a:schemeClr val="accent1">
-        <a:tint val="60000"/>
-      </a:schemeClr>
-    </dgm:fillClrLst>
-    <dgm:linClrLst meth="repeat">
-      <a:schemeClr val="accent1">
-        <a:tint val="60000"/>
-      </a:schemeClr>
-    </dgm:linClrLst>
-    <dgm:effectClrLst/>
-    <dgm:txLinClrLst/>
-    <dgm:txFillClrLst/>
-    <dgm:txEffectClrLst/>
-  </dgm:styleLbl>
-  <dgm:styleLbl name="bgSibTrans2D1">
-    <dgm:fillClrLst meth="repeat">
-      <a:schemeClr val="accent1">
-        <a:tint val="60000"/>
-      </a:schemeClr>
-    </dgm:fillClrLst>
-    <dgm:linClrLst meth="repeat">
-      <a:schemeClr val="accent1">
-        <a:tint val="60000"/>
-      </a:schemeClr>
-    </dgm:linClrLst>
-    <dgm:effectClrLst/>
-    <dgm:txLinClrLst/>
-    <dgm:txFillClrLst/>
-    <dgm:txEffectClrLst/>
-  </dgm:styleLbl>
-  <dgm:styleLbl name="sibTrans1D1">
-    <dgm:fillClrLst meth="repeat">
-      <a:schemeClr val="accent1"/>
-    </dgm:fillClrLst>
-    <dgm:linClrLst meth="repeat">
-      <a:schemeClr val="accent1"/>
-    </dgm:linClrLst>
-    <dgm:effectClrLst/>
-    <dgm:txLinClrLst/>
-    <dgm:txFillClrLst meth="repeat">
-      <a:schemeClr val="tx1"/>
-    </dgm:txFillClrLst>
-    <dgm:txEffectClrLst/>
-  </dgm:styleLbl>
-  <dgm:styleLbl name="callout">
-    <dgm:fillClrLst meth="repeat">
-      <a:schemeClr val="accent1"/>
-    </dgm:fillClrLst>
-    <dgm:linClrLst meth="repeat">
-      <a:schemeClr val="accent1">
-        <a:tint val="50000"/>
-      </a:schemeClr>
-    </dgm:linClrLst>
-    <dgm:effectClrLst/>
-    <dgm:txLinClrLst/>
-    <dgm:txFillClrLst meth="repeat">
-      <a:schemeClr val="tx1"/>
-    </dgm:txFillClrLst>
-    <dgm:txEffectClrLst/>
-  </dgm:styleLbl>
-  <dgm:styleLbl name="asst0">
-    <dgm:fillClrLst meth="repeat">
-      <a:schemeClr val="accent1"/>
-    </dgm:fillClrLst>
-    <dgm:linClrLst meth="repeat">
-      <a:schemeClr val="lt1"/>
-    </dgm:linClrLst>
-    <dgm:effectClrLst/>
-    <dgm:txLinClrLst/>
-    <dgm:txFillClrLst/>
-    <dgm:txEffectClrLst/>
-  </dgm:styleLbl>
-  <dgm:styleLbl name="asst1">
-    <dgm:fillClrLst meth="repeat">
-      <a:schemeClr val="accent1"/>
-    </dgm:fillClrLst>
-    <dgm:linClrLst meth="repeat">
-      <a:schemeClr val="lt1"/>
-    </dgm:linClrLst>
-    <dgm:effectClrLst/>
-    <dgm:txLinClrLst/>
-    <dgm:txFillClrLst/>
-    <dgm:txEffectClrLst/>
-  </dgm:styleLbl>
-  <dgm:styleLbl name="asst2">
-    <dgm:fillClrLst meth="repeat">
-      <a:schemeClr val="accent1"/>
-    </dgm:fillClrLst>
-    <dgm:linClrLst meth="repeat">
-      <a:schemeClr val="lt1"/>
-    </dgm:linClrLst>
-    <dgm:effectClrLst/>
-    <dgm:txLinClrLst/>
-    <dgm:txFillClrLst/>
-    <dgm:txEffectClrLst/>
-  </dgm:styleLbl>
-  <dgm:styleLbl name="asst3">
-    <dgm:fillClrLst meth="repeat">
-      <a:schemeClr val="accent1"/>
-    </dgm:fillClrLst>
-    <dgm:linClrLst meth="repeat">
-      <a:schemeClr val="lt1"/>
-    </dgm:linClrLst>
-    <dgm:effectClrLst/>
-    <dgm:txLinClrLst/>
-    <dgm:txFillClrLst/>
-    <dgm:txEffectClrLst/>
-  </dgm:styleLbl>
-  <dgm:styleLbl name="asst4">
-    <dgm:fillClrLst meth="repeat">
-      <a:schemeClr val="accent1"/>
-    </dgm:fillClrLst>
-    <dgm:linClrLst meth="repeat">
-      <a:schemeClr val="lt1"/>
-    </dgm:linClrLst>
-    <dgm:effectClrLst/>
-    <dgm:txLinClrLst/>
-    <dgm:txFillClrLst/>
-    <dgm:txEffectClrLst/>
-  </dgm:styleLbl>
-  <dgm:styleLbl name="parChTrans2D1">
-    <dgm:fillClrLst meth="repeat">
-      <a:schemeClr val="accent1">
-        <a:tint val="60000"/>
-      </a:schemeClr>
-    </dgm:fillClrLst>
-    <dgm:linClrLst meth="repeat">
-      <a:schemeClr val="accent1">
-        <a:tint val="60000"/>
-      </a:schemeClr>
-    </dgm:linClrLst>
-    <dgm:effectClrLst/>
-    <dgm:txLinClrLst/>
-    <dgm:txFillClrLst meth="repeat">
-      <a:schemeClr val="lt1"/>
-    </dgm:txFillClrLst>
-    <dgm:txEffectClrLst/>
-  </dgm:styleLbl>
-  <dgm:styleLbl name="parChTrans2D2">
-    <dgm:fillClrLst meth="repeat">
-      <a:schemeClr val="accent1"/>
-    </dgm:fillClrLst>
-    <dgm:linClrLst meth="repeat">
-      <a:schemeClr val="accent1"/>
-    </dgm:linClrLst>
-    <dgm:effectClrLst/>
-    <dgm:txLinClrLst/>
-    <dgm:txFillClrLst meth="repeat">
-      <a:schemeClr val="lt1"/>
-    </dgm:txFillClrLst>
-    <dgm:txEffectClrLst/>
-  </dgm:styleLbl>
-  <dgm:styleLbl name="parChTrans2D3">
-    <dgm:fillClrLst meth="repeat">
-      <a:schemeClr val="accent1"/>
-    </dgm:fillClrLst>
-    <dgm:linClrLst meth="repeat">
-      <a:schemeClr val="accent1"/>
-    </dgm:linClrLst>
-    <dgm:effectClrLst/>
-    <dgm:txLinClrLst/>
-    <dgm:txFillClrLst meth="repeat">
-      <a:schemeClr val="lt1"/>
-    </dgm:txFillClrLst>
-    <dgm:txEffectClrLst/>
-  </dgm:styleLbl>
-  <dgm:styleLbl name="parChTrans2D4">
-    <dgm:fillClrLst meth="repeat">
-      <a:schemeClr val="accent1"/>
-    </dgm:fillClrLst>
-    <dgm:linClrLst meth="repeat">
-      <a:schemeClr val="accent1"/>
-    </dgm:linClrLst>
-    <dgm:effectClrLst/>
-    <dgm:txLinClrLst/>
-    <dgm:txFillClrLst meth="repeat">
-      <a:schemeClr val="lt1"/>
-    </dgm:txFillClrLst>
-    <dgm:txEffectClrLst/>
-  </dgm:styleLbl>
-  <dgm:styleLbl name="parChTrans1D1">
-    <dgm:fillClrLst meth="repeat">
-      <a:schemeClr val="accent1"/>
-    </dgm:fillClrLst>
-    <dgm:linClrLst meth="repeat">
-      <a:schemeClr val="accent1">
-        <a:shade val="60000"/>
-      </a:schemeClr>
-    </dgm:linClrLst>
-    <dgm:effectClrLst/>
-    <dgm:txLinClrLst/>
-    <dgm:txFillClrLst meth="repeat">
-      <a:schemeClr val="tx1"/>
-    </dgm:txFillClrLst>
-    <dgm:txEffectClrLst/>
-  </dgm:styleLbl>
-  <dgm:styleLbl name="parChTrans1D2">
-    <dgm:fillClrLst meth="repeat">
-      <a:schemeClr val="accent1"/>
-    </dgm:fillClrLst>
-    <dgm:linClrLst meth="repeat">
-      <a:schemeClr val="accent1">
-        <a:shade val="60000"/>
-      </a:schemeClr>
-    </dgm:linClrLst>
-    <dgm:effectClrLst/>
-    <dgm:txLinClrLst/>
-    <dgm:txFillClrLst meth="repeat">
-      <a:schemeClr val="tx1"/>
-    </dgm:txFillClrLst>
-    <dgm:txEffectClrLst/>
-  </dgm:styleLbl>
-  <dgm:styleLbl name="parChTrans1D3">
-    <dgm:fillClrLst meth="repeat">
-      <a:schemeClr val="accent1"/>
-    </dgm:fillClrLst>
-    <dgm:linClrLst meth="repeat">
-      <a:schemeClr val="accent1">
-        <a:shade val="80000"/>
-      </a:schemeClr>
-    </dgm:linClrLst>
-    <dgm:effectClrLst/>
-    <dgm:txLinClrLst/>
-    <dgm:txFillClrLst meth="repeat">
-      <a:schemeClr val="tx1"/>
-    </dgm:txFillClrLst>
-    <dgm:txEffectClrLst/>
-  </dgm:styleLbl>
-  <dgm:styleLbl name="parChTrans1D4">
-    <dgm:fillClrLst meth="repeat">
-      <a:schemeClr val="accent1"/>
-    </dgm:fillClrLst>
-    <dgm:linClrLst meth="repeat">
-      <a:schemeClr val="accent1">
-        <a:shade val="80000"/>
-      </a:schemeClr>
-    </dgm:linClrLst>
-    <dgm:effectClrLst/>
-    <dgm:txLinClrLst/>
-    <dgm:txFillClrLst meth="repeat">
-      <a:schemeClr val="tx1"/>
-    </dgm:txFillClrLst>
-    <dgm:txEffectClrLst/>
-  </dgm:styleLbl>
-  <dgm:styleLbl name="fgAcc1">
-    <dgm:fillClrLst meth="repeat">
-      <a:schemeClr val="lt1">
-        <a:alpha val="90000"/>
-      </a:schemeClr>
-    </dgm:fillClrLst>
-    <dgm:linClrLst meth="repeat">
-      <a:schemeClr val="accent1"/>
-    </dgm:linClrLst>
-    <dgm:effectClrLst/>
-    <dgm:txLinClrLst/>
-    <dgm:txFillClrLst meth="repeat">
-      <a:schemeClr val="dk1"/>
-    </dgm:txFillClrLst>
-    <dgm:txEffectClrLst/>
-  </dgm:styleLbl>
-  <dgm:styleLbl name="conFgAcc1">
-    <dgm:fillClrLst meth="repeat">
-      <a:schemeClr val="lt1">
-        <a:alpha val="90000"/>
-      </a:schemeClr>
-    </dgm:fillClrLst>
-    <dgm:linClrLst meth="repeat">
-      <a:schemeClr val="accent1"/>
-    </dgm:linClrLst>
-    <dgm:effectClrLst/>
-    <dgm:txLinClrLst/>
-    <dgm:txFillClrLst meth="repeat">
-      <a:schemeClr val="dk1"/>
-    </dgm:txFillClrLst>
-    <dgm:txEffectClrLst/>
-  </dgm:styleLbl>
-  <dgm:styleLbl name="alignAcc1">
-    <dgm:fillClrLst meth="repeat">
-      <a:schemeClr val="lt1">
-        <a:alpha val="90000"/>
-      </a:schemeClr>
-    </dgm:fillClrLst>
-    <dgm:linClrLst meth="repeat">
-      <a:schemeClr val="accent1"/>
-    </dgm:linClrLst>
-    <dgm:effectClrLst/>
-    <dgm:txLinClrLst/>
-    <dgm:txFillClrLst meth="repeat">
-      <a:schemeClr val="dk1"/>
-    </dgm:txFillClrLst>
-    <dgm:txEffectClrLst/>
-  </dgm:styleLbl>
-  <dgm:styleLbl name="trAlignAcc1">
-    <dgm:fillClrLst meth="repeat">
-      <a:schemeClr val="lt1">
-        <a:alpha val="40000"/>
-      </a:schemeClr>
-    </dgm:fillClrLst>
-    <dgm:linClrLst meth="repeat">
-      <a:schemeClr val="accent1"/>
-    </dgm:linClrLst>
-    <dgm:effectClrLst/>
-    <dgm:txLinClrLst/>
-    <dgm:txFillClrLst meth="repeat">
-      <a:schemeClr val="dk1"/>
-    </dgm:txFillClrLst>
-    <dgm:txEffectClrLst/>
-  </dgm:styleLbl>
-  <dgm:styleLbl name="bgAcc1">
-    <dgm:fillClrLst meth="repeat">
-      <a:schemeClr val="lt1">
-        <a:alpha val="90000"/>
-      </a:schemeClr>
-    </dgm:fillClrLst>
-    <dgm:linClrLst meth="repeat">
-      <a:schemeClr val="accent1"/>
-    </dgm:linClrLst>
-    <dgm:effectClrLst/>
-    <dgm:txLinClrLst/>
-    <dgm:txFillClrLst meth="repeat">
-      <a:schemeClr val="dk1"/>
-    </dgm:txFillClrLst>
-    <dgm:txEffectClrLst/>
-  </dgm:styleLbl>
-  <dgm:styleLbl name="solidFgAcc1">
-    <dgm:fillClrLst meth="repeat">
-      <a:schemeClr val="lt1"/>
-    </dgm:fillClrLst>
-    <dgm:linClrLst meth="repeat">
-      <a:schemeClr val="accent1"/>
-    </dgm:linClrLst>
-    <dgm:effectClrLst/>
-    <dgm:txLinClrLst/>
-    <dgm:txFillClrLst meth="repeat">
-      <a:schemeClr val="dk1"/>
-    </dgm:txFillClrLst>
-    <dgm:txEffectClrLst/>
-  </dgm:styleLbl>
-  <dgm:styleLbl name="solidAlignAcc1">
-    <dgm:fillClrLst meth="repeat">
-      <a:schemeClr val="lt1"/>
-    </dgm:fillClrLst>
-    <dgm:linClrLst meth="repeat">
-      <a:schemeClr val="accent1"/>
-    </dgm:linClrLst>
-    <dgm:effectClrLst/>
-    <dgm:txLinClrLst/>
-    <dgm:txFillClrLst meth="repeat">
-      <a:schemeClr val="dk1"/>
-    </dgm:txFillClrLst>
-    <dgm:txEffectClrLst/>
-  </dgm:styleLbl>
-  <dgm:styleLbl name="solidBgAcc1">
-    <dgm:fillClrLst meth="repeat">
-      <a:schemeClr val="lt1"/>
-    </dgm:fillClrLst>
-    <dgm:linClrLst meth="repeat">
-      <a:schemeClr val="accent1"/>
-    </dgm:linClrLst>
-    <dgm:effectClrLst/>
-    <dgm:txLinClrLst/>
-    <dgm:txFillClrLst meth="repeat">
-      <a:schemeClr val="dk1"/>
-    </dgm:txFillClrLst>
-    <dgm:txEffectClrLst/>
-  </dgm:styleLbl>
-  <dgm:styleLbl name="fgAccFollowNode1">
-    <dgm:fillClrLst meth="repeat">
-      <a:schemeClr val="accent1">
-        <a:alpha val="90000"/>
-        <a:tint val="40000"/>
-      </a:schemeClr>
-    </dgm:fillClrLst>
-    <dgm:linClrLst meth="repeat">
-      <a:schemeClr val="accent1">
-        <a:alpha val="90000"/>
-        <a:tint val="40000"/>
-      </a:schemeClr>
-    </dgm:linClrLst>
-    <dgm:effectClrLst/>
-    <dgm:txLinClrLst/>
-    <dgm:txFillClrLst meth="repeat">
-      <a:schemeClr val="dk1"/>
-    </dgm:txFillClrLst>
-    <dgm:txEffectClrLst/>
-  </dgm:styleLbl>
-  <dgm:styleLbl name="alignAccFollowNode1">
-    <dgm:fillClrLst meth="repeat">
-      <a:schemeClr val="accent1">
-        <a:alpha val="90000"/>
-        <a:tint val="40000"/>
-      </a:schemeClr>
-    </dgm:fillClrLst>
-    <dgm:linClrLst meth="repeat">
-      <a:schemeClr val="accent1">
-        <a:alpha val="90000"/>
-        <a:tint val="40000"/>
-      </a:schemeClr>
-    </dgm:linClrLst>
-    <dgm:effectClrLst/>
-    <dgm:txLinClrLst/>
-    <dgm:txFillClrLst meth="repeat">
-      <a:schemeClr val="dk1"/>
-    </dgm:txFillClrLst>
-    <dgm:txEffectClrLst/>
-  </dgm:styleLbl>
-  <dgm:styleLbl name="bgAccFollowNode1">
-    <dgm:fillClrLst meth="repeat">
-      <a:schemeClr val="accent1">
-        <a:alpha val="90000"/>
-        <a:tint val="40000"/>
-      </a:schemeClr>
-    </dgm:fillClrLst>
-    <dgm:linClrLst meth="repeat">
-      <a:schemeClr val="accent1">
-        <a:alpha val="90000"/>
-        <a:tint val="40000"/>
-      </a:schemeClr>
-    </dgm:linClrLst>
-    <dgm:effectClrLst/>
-    <dgm:txLinClrLst/>
-    <dgm:txFillClrLst meth="repeat">
-      <a:schemeClr val="dk1"/>
-    </dgm:txFillClrLst>
-    <dgm:txEffectClrLst/>
-  </dgm:styleLbl>
-  <dgm:styleLbl name="fgAcc0">
-    <dgm:fillClrLst meth="repeat">
-      <a:schemeClr val="lt1">
-        <a:alpha val="90000"/>
-      </a:schemeClr>
-    </dgm:fillClrLst>
-    <dgm:linClrLst meth="repeat">
-      <a:schemeClr val="accent1"/>
-    </dgm:linClrLst>
-    <dgm:effectClrLst/>
-    <dgm:txLinClrLst/>
-    <dgm:txFillClrLst meth="repeat">
-      <a:schemeClr val="dk1"/>
-    </dgm:txFillClrLst>
-    <dgm:txEffectClrLst/>
-  </dgm:styleLbl>
-  <dgm:styleLbl name="fgAcc2">
-    <dgm:fillClrLst meth="repeat">
-      <a:schemeClr val="lt1">
-        <a:alpha val="90000"/>
-      </a:schemeClr>
-    </dgm:fillClrLst>
-    <dgm:linClrLst meth="repeat">
-      <a:schemeClr val="accent1"/>
-    </dgm:linClrLst>
-    <dgm:effectClrLst/>
-    <dgm:txLinClrLst/>
-    <dgm:txFillClrLst meth="repeat">
-      <a:schemeClr val="dk1"/>
-    </dgm:txFillClrLst>
-    <dgm:txEffectClrLst/>
-  </dgm:styleLbl>
-  <dgm:styleLbl name="fgAcc3">
-    <dgm:fillClrLst meth="repeat">
-      <a:schemeClr val="lt1">
-        <a:alpha val="90000"/>
-      </a:schemeClr>
-    </dgm:fillClrLst>
-    <dgm:linClrLst meth="repeat">
-      <a:schemeClr val="accent1"/>
-    </dgm:linClrLst>
-    <dgm:effectClrLst/>
-    <dgm:txLinClrLst/>
-    <dgm:txFillClrLst meth="repeat">
-      <a:schemeClr val="dk1"/>
-    </dgm:txFillClrLst>
-    <dgm:txEffectClrLst/>
-  </dgm:styleLbl>
-  <dgm:styleLbl name="fgAcc4">
-    <dgm:fillClrLst meth="repeat">
-      <a:schemeClr val="lt1">
-        <a:alpha val="90000"/>
-      </a:schemeClr>
-    </dgm:fillClrLst>
-    <dgm:linClrLst meth="repeat">
-      <a:schemeClr val="accent1"/>
-    </dgm:linClrLst>
-    <dgm:effectClrLst/>
-    <dgm:txLinClrLst/>
-    <dgm:txFillClrLst meth="repeat">
-      <a:schemeClr val="dk1"/>
-    </dgm:txFillClrLst>
-    <dgm:txEffectClrLst/>
-  </dgm:styleLbl>
-  <dgm:styleLbl name="bgShp">
-    <dgm:fillClrLst meth="repeat">
-      <a:schemeClr val="accent1">
-        <a:tint val="40000"/>
-      </a:schemeClr>
-    </dgm:fillClrLst>
-    <dgm:linClrLst meth="repeat">
-      <a:schemeClr val="accent1"/>
-    </dgm:linClrLst>
-    <dgm:effectClrLst/>
-    <dgm:txLinClrLst/>
-    <dgm:txFillClrLst meth="repeat">
-      <a:schemeClr val="dk1"/>
-    </dgm:txFillClrLst>
-    <dgm:txEffectClrLst/>
-  </dgm:styleLbl>
-  <dgm:styleLbl name="dkBgShp">
-    <dgm:fillClrLst meth="repeat">
-      <a:schemeClr val="accent1">
-        <a:shade val="80000"/>
-      </a:schemeClr>
-    </dgm:fillClrLst>
-    <dgm:linClrLst meth="repeat">
-      <a:schemeClr val="accent1"/>
-    </dgm:linClrLst>
-    <dgm:effectClrLst/>
-    <dgm:txLinClrLst/>
-    <dgm:txFillClrLst meth="repeat">
-      <a:schemeClr val="lt1"/>
-    </dgm:txFillClrLst>
-    <dgm:txEffectClrLst/>
-  </dgm:styleLbl>
-  <dgm:styleLbl name="trBgShp">
-    <dgm:fillClrLst meth="repeat">
-      <a:schemeClr val="accent1">
-        <a:tint val="50000"/>
-        <a:alpha val="40000"/>
-      </a:schemeClr>
-    </dgm:fillClrLst>
-    <dgm:linClrLst meth="repeat">
-      <a:schemeClr val="accent1"/>
-    </dgm:linClrLst>
-    <dgm:effectClrLst/>
-    <dgm:txLinClrLst/>
-    <dgm:txFillClrLst meth="repeat">
-      <a:schemeClr val="lt1"/>
-    </dgm:txFillClrLst>
-    <dgm:txEffectClrLst/>
-  </dgm:styleLbl>
-  <dgm:styleLbl name="fgShp">
-    <dgm:fillClrLst meth="repeat">
-      <a:schemeClr val="accent1">
-        <a:tint val="60000"/>
-      </a:schemeClr>
-    </dgm:fillClrLst>
-    <dgm:linClrLst meth="repeat">
-      <a:schemeClr val="lt1"/>
-    </dgm:linClrLst>
-    <dgm:effectClrLst/>
-    <dgm:txLinClrLst/>
-    <dgm:txFillClrLst meth="repeat">
-      <a:schemeClr val="dk1"/>
-    </dgm:txFillClrLst>
-    <dgm:txEffectClrLst/>
-  </dgm:styleLbl>
-  <dgm:styleLbl name="revTx">
-    <dgm:fillClrLst meth="repeat">
-      <a:schemeClr val="lt1">
-        <a:alpha val="0"/>
-      </a:schemeClr>
-    </dgm:fillClrLst>
-    <dgm:linClrLst meth="repeat">
-      <a:schemeClr val="dk1">
-        <a:alpha val="0"/>
-      </a:schemeClr>
-    </dgm:linClrLst>
-    <dgm:effectClrLst/>
-    <dgm:txLinClrLst/>
-    <dgm:txFillClrLst meth="repeat">
-      <a:schemeClr val="tx1"/>
-    </dgm:txFillClrLst>
-    <dgm:txEffectClrLst/>
-  </dgm:styleLbl>
-</dgm:colorsDef>
-</file>
-
-<file path=ppt/diagrams/colors2.xml><?xml version="1.0" encoding="utf-8"?>
 <dgm:colorsDef xmlns:dgm="http://schemas.openxmlformats.org/drawingml/2006/diagram" xmlns:a="http://schemas.openxmlformats.org/drawingml/2006/main" uniqueId="urn:microsoft.com/office/officeart/2005/8/colors/accent1_2">
   <dgm:title val=""/>
   <dgm:desc val=""/>
@@ -2475,468 +1737,6 @@
     <dgm:cxn modelId="{3ACB0F2D-2028-4E8B-93BD-3913DF6C7749}" type="presParOf" srcId="{F2B9C679-E1B9-4150-B0C2-B3A41408CB60}" destId="{F60EE2F1-06F8-4D1C-AF4C-5BEB6DD46FD3}" srcOrd="2" destOrd="0" presId="urn:microsoft.com/office/officeart/2008/layout/NameandTitleOrganizationalChart"/>
     <dgm:cxn modelId="{70001C9C-E2F3-4332-A6A8-044965F617C5}" type="presParOf" srcId="{1A98C2D0-933F-4523-9BA6-FDFA3195E69E}" destId="{90BA8C5D-EE2C-499B-A845-93B32CA36DE9}" srcOrd="1" destOrd="0" presId="urn:microsoft.com/office/officeart/2008/layout/NameandTitleOrganizationalChart"/>
     <dgm:cxn modelId="{05398FE1-E3D9-47EC-8A20-671D0F9F15CE}" type="presParOf" srcId="{1A98C2D0-933F-4523-9BA6-FDFA3195E69E}" destId="{8DB54E3D-4FE1-41E1-ABD0-D21AAC6E5D85}" srcOrd="2" destOrd="0" presId="urn:microsoft.com/office/officeart/2008/layout/NameandTitleOrganizationalChart"/>
-  </dgm:cxnLst>
-  <dgm:bg/>
-  <dgm:whole/>
-  <dgm:extLst>
-    <a:ext uri="http://schemas.microsoft.com/office/drawing/2008/diagram">
-      <dsp:dataModelExt xmlns:dsp="http://schemas.microsoft.com/office/drawing/2008/diagram" relId="rId6" minVer="http://schemas.openxmlformats.org/drawingml/2006/diagram"/>
-    </a:ext>
-  </dgm:extLst>
-</dgm:dataModel>
-</file>
-
-<file path=ppt/diagrams/data2.xml><?xml version="1.0" encoding="utf-8"?>
-<dgm:dataModel xmlns:dgm="http://schemas.openxmlformats.org/drawingml/2006/diagram" xmlns:a="http://schemas.openxmlformats.org/drawingml/2006/main">
-  <dgm:ptLst>
-    <dgm:pt modelId="{BDDD5E72-9E1E-449C-9E5E-8EB513317C40}" type="doc">
-      <dgm:prSet loTypeId="urn:microsoft.com/office/officeart/2005/8/layout/hierarchy4" loCatId="list" qsTypeId="urn:microsoft.com/office/officeart/2005/8/quickstyle/simple1" qsCatId="simple" csTypeId="urn:microsoft.com/office/officeart/2005/8/colors/accent1_2" csCatId="accent1" phldr="1"/>
-      <dgm:spPr/>
-      <dgm:t>
-        <a:bodyPr/>
-        <a:lstStyle/>
-        <a:p>
-          <a:endParaRPr lang="en-US"/>
-        </a:p>
-      </dgm:t>
-    </dgm:pt>
-    <dgm:pt modelId="{49B36160-45DE-448C-86BE-D47406460EDD}">
-      <dgm:prSet phldrT="[Text]" phldr="1"/>
-      <dgm:spPr/>
-      <dgm:t>
-        <a:bodyPr/>
-        <a:lstStyle/>
-        <a:p>
-          <a:endParaRPr lang="en-US" dirty="0"/>
-        </a:p>
-      </dgm:t>
-    </dgm:pt>
-    <dgm:pt modelId="{756FB0BB-EDAB-4C95-9E1F-65B5BC2309F0}" type="parTrans" cxnId="{28DC2635-0F8B-44BD-ABC7-9483D6120820}">
-      <dgm:prSet/>
-      <dgm:spPr/>
-      <dgm:t>
-        <a:bodyPr/>
-        <a:lstStyle/>
-        <a:p>
-          <a:endParaRPr lang="en-US"/>
-        </a:p>
-      </dgm:t>
-    </dgm:pt>
-    <dgm:pt modelId="{72D20977-5916-4365-ADB3-CF752FDA4299}" type="sibTrans" cxnId="{28DC2635-0F8B-44BD-ABC7-9483D6120820}">
-      <dgm:prSet/>
-      <dgm:spPr/>
-      <dgm:t>
-        <a:bodyPr/>
-        <a:lstStyle/>
-        <a:p>
-          <a:endParaRPr lang="en-US"/>
-        </a:p>
-      </dgm:t>
-    </dgm:pt>
-    <dgm:pt modelId="{12C2C49B-9B77-4292-9117-9787F1029541}">
-      <dgm:prSet phldrT="[Text]"/>
-      <dgm:spPr/>
-      <dgm:t>
-        <a:bodyPr/>
-        <a:lstStyle/>
-        <a:p>
-          <a:r>
-            <a:rPr lang="en-US" dirty="0"/>
-            <a:t>Bootstrap</a:t>
-          </a:r>
-        </a:p>
-      </dgm:t>
-    </dgm:pt>
-    <dgm:pt modelId="{726BCE43-8538-45F0-87CA-510BB034425C}" type="parTrans" cxnId="{F7470C07-9D1A-4C59-8DC3-1FFB2929F4DF}">
-      <dgm:prSet/>
-      <dgm:spPr/>
-      <dgm:t>
-        <a:bodyPr/>
-        <a:lstStyle/>
-        <a:p>
-          <a:endParaRPr lang="en-US"/>
-        </a:p>
-      </dgm:t>
-    </dgm:pt>
-    <dgm:pt modelId="{7B7FFB8D-B9F6-4ADB-BC12-FF9820784698}" type="sibTrans" cxnId="{F7470C07-9D1A-4C59-8DC3-1FFB2929F4DF}">
-      <dgm:prSet/>
-      <dgm:spPr/>
-      <dgm:t>
-        <a:bodyPr/>
-        <a:lstStyle/>
-        <a:p>
-          <a:endParaRPr lang="en-US"/>
-        </a:p>
-      </dgm:t>
-    </dgm:pt>
-    <dgm:pt modelId="{B0145713-046B-48AF-B254-60984BBC6894}">
-      <dgm:prSet phldrT="[Text]"/>
-      <dgm:spPr/>
-      <dgm:t>
-        <a:bodyPr/>
-        <a:lstStyle/>
-        <a:p>
-          <a:r>
-            <a:rPr lang="en-US" dirty="0" err="1"/>
-            <a:t>Firbase</a:t>
-          </a:r>
-          <a:endParaRPr lang="en-US" dirty="0"/>
-        </a:p>
-      </dgm:t>
-    </dgm:pt>
-    <dgm:pt modelId="{09EEE519-217A-44A4-A091-36C83A9A5651}" type="parTrans" cxnId="{503DFDF2-6641-409B-B112-D6574B10B96D}">
-      <dgm:prSet/>
-      <dgm:spPr/>
-      <dgm:t>
-        <a:bodyPr/>
-        <a:lstStyle/>
-        <a:p>
-          <a:endParaRPr lang="en-US"/>
-        </a:p>
-      </dgm:t>
-    </dgm:pt>
-    <dgm:pt modelId="{EB91949D-542C-4EA9-B240-4DEBDD0CDA02}" type="sibTrans" cxnId="{503DFDF2-6641-409B-B112-D6574B10B96D}">
-      <dgm:prSet/>
-      <dgm:spPr/>
-      <dgm:t>
-        <a:bodyPr/>
-        <a:lstStyle/>
-        <a:p>
-          <a:endParaRPr lang="en-US"/>
-        </a:p>
-      </dgm:t>
-    </dgm:pt>
-    <dgm:pt modelId="{AF14990F-9566-4A87-8415-FE8771398D4A}">
-      <dgm:prSet phldrT="[Text]" phldr="1"/>
-      <dgm:spPr/>
-      <dgm:t>
-        <a:bodyPr/>
-        <a:lstStyle/>
-        <a:p>
-          <a:endParaRPr lang="en-US" dirty="0"/>
-        </a:p>
-      </dgm:t>
-    </dgm:pt>
-    <dgm:pt modelId="{ECAB05FB-AA63-441B-825B-F9894A34913C}" type="parTrans" cxnId="{050127F7-C887-4318-9E7D-C2BA069E0289}">
-      <dgm:prSet/>
-      <dgm:spPr/>
-      <dgm:t>
-        <a:bodyPr/>
-        <a:lstStyle/>
-        <a:p>
-          <a:endParaRPr lang="en-US"/>
-        </a:p>
-      </dgm:t>
-    </dgm:pt>
-    <dgm:pt modelId="{7AB04DD5-B28D-4FF3-917E-C6FC20B29CEC}" type="sibTrans" cxnId="{050127F7-C887-4318-9E7D-C2BA069E0289}">
-      <dgm:prSet/>
-      <dgm:spPr/>
-      <dgm:t>
-        <a:bodyPr/>
-        <a:lstStyle/>
-        <a:p>
-          <a:endParaRPr lang="en-US"/>
-        </a:p>
-      </dgm:t>
-    </dgm:pt>
-    <dgm:pt modelId="{3C132675-E859-4166-BEC7-7160FB0E6424}">
-      <dgm:prSet phldrT="[Text]"/>
-      <dgm:spPr/>
-      <dgm:t>
-        <a:bodyPr/>
-        <a:lstStyle/>
-        <a:p>
-          <a:r>
-            <a:rPr lang="en-US" dirty="0" err="1"/>
-            <a:t>Css</a:t>
-          </a:r>
-          <a:endParaRPr lang="en-US" dirty="0"/>
-        </a:p>
-      </dgm:t>
-    </dgm:pt>
-    <dgm:pt modelId="{74244006-A67A-47B7-9398-1C2376E721AA}" type="parTrans" cxnId="{07D99057-4BC7-4022-A00C-BC629CD4C230}">
-      <dgm:prSet/>
-      <dgm:spPr/>
-      <dgm:t>
-        <a:bodyPr/>
-        <a:lstStyle/>
-        <a:p>
-          <a:endParaRPr lang="en-US"/>
-        </a:p>
-      </dgm:t>
-    </dgm:pt>
-    <dgm:pt modelId="{59EEA610-F76B-4724-966C-E15DC4ECCC4D}" type="sibTrans" cxnId="{07D99057-4BC7-4022-A00C-BC629CD4C230}">
-      <dgm:prSet/>
-      <dgm:spPr/>
-      <dgm:t>
-        <a:bodyPr/>
-        <a:lstStyle/>
-        <a:p>
-          <a:endParaRPr lang="en-US"/>
-        </a:p>
-      </dgm:t>
-    </dgm:pt>
-    <dgm:pt modelId="{ED99E88B-4548-4C60-9224-0185DBF6CE00}">
-      <dgm:prSet phldrT="[Text]" phldr="1"/>
-      <dgm:spPr/>
-      <dgm:t>
-        <a:bodyPr/>
-        <a:lstStyle/>
-        <a:p>
-          <a:endParaRPr lang="en-US"/>
-        </a:p>
-      </dgm:t>
-    </dgm:pt>
-    <dgm:pt modelId="{F0460A73-1E5C-4351-A8F4-E787B602F64F}" type="parTrans" cxnId="{8E832EB9-5F6F-4F81-AE2B-55570762C0DD}">
-      <dgm:prSet/>
-      <dgm:spPr/>
-      <dgm:t>
-        <a:bodyPr/>
-        <a:lstStyle/>
-        <a:p>
-          <a:endParaRPr lang="en-US"/>
-        </a:p>
-      </dgm:t>
-    </dgm:pt>
-    <dgm:pt modelId="{9CD4F59F-5712-400E-9019-DD6D691B4B0B}" type="sibTrans" cxnId="{8E832EB9-5F6F-4F81-AE2B-55570762C0DD}">
-      <dgm:prSet/>
-      <dgm:spPr/>
-      <dgm:t>
-        <a:bodyPr/>
-        <a:lstStyle/>
-        <a:p>
-          <a:endParaRPr lang="en-US"/>
-        </a:p>
-      </dgm:t>
-    </dgm:pt>
-    <dgm:pt modelId="{DDFB77DA-A132-4BE5-BD65-9CCD7985E895}">
-      <dgm:prSet phldrT="[Text]"/>
-      <dgm:spPr/>
-      <dgm:t>
-        <a:bodyPr/>
-        <a:lstStyle/>
-        <a:p>
-          <a:r>
-            <a:rPr lang="en-US" dirty="0"/>
-            <a:t>html</a:t>
-          </a:r>
-        </a:p>
-      </dgm:t>
-    </dgm:pt>
-    <dgm:pt modelId="{146DA4A6-DA17-4B5F-9F5C-A7DF006E068E}" type="parTrans" cxnId="{9C065052-0F04-4370-95E0-97A6AF395989}">
-      <dgm:prSet/>
-      <dgm:spPr/>
-      <dgm:t>
-        <a:bodyPr/>
-        <a:lstStyle/>
-        <a:p>
-          <a:endParaRPr lang="en-US"/>
-        </a:p>
-      </dgm:t>
-    </dgm:pt>
-    <dgm:pt modelId="{C0F0FD92-0556-433D-8274-F5A4A1FF3FD3}" type="sibTrans" cxnId="{9C065052-0F04-4370-95E0-97A6AF395989}">
-      <dgm:prSet/>
-      <dgm:spPr/>
-      <dgm:t>
-        <a:bodyPr/>
-        <a:lstStyle/>
-        <a:p>
-          <a:endParaRPr lang="en-US"/>
-        </a:p>
-      </dgm:t>
-    </dgm:pt>
-    <dgm:pt modelId="{89E689FB-BA2C-4940-A051-D6C6A39D0EF0}" type="pres">
-      <dgm:prSet presAssocID="{BDDD5E72-9E1E-449C-9E5E-8EB513317C40}" presName="Name0" presStyleCnt="0">
-        <dgm:presLayoutVars>
-          <dgm:chPref val="1"/>
-          <dgm:dir/>
-          <dgm:animOne val="branch"/>
-          <dgm:animLvl val="lvl"/>
-          <dgm:resizeHandles/>
-        </dgm:presLayoutVars>
-      </dgm:prSet>
-      <dgm:spPr/>
-    </dgm:pt>
-    <dgm:pt modelId="{5FA9482F-F7E4-4448-AC2F-0A471A94DF9C}" type="pres">
-      <dgm:prSet presAssocID="{49B36160-45DE-448C-86BE-D47406460EDD}" presName="vertOne" presStyleCnt="0"/>
-      <dgm:spPr/>
-    </dgm:pt>
-    <dgm:pt modelId="{E5AEAA48-C73A-4E76-BD86-9D694D33240A}" type="pres">
-      <dgm:prSet presAssocID="{49B36160-45DE-448C-86BE-D47406460EDD}" presName="txOne" presStyleLbl="node0" presStyleIdx="0" presStyleCnt="2">
-        <dgm:presLayoutVars>
-          <dgm:chPref val="3"/>
-        </dgm:presLayoutVars>
-      </dgm:prSet>
-      <dgm:spPr/>
-    </dgm:pt>
-    <dgm:pt modelId="{27728B42-EC78-4C7A-A211-74F3CBF3A02B}" type="pres">
-      <dgm:prSet presAssocID="{49B36160-45DE-448C-86BE-D47406460EDD}" presName="parTransOne" presStyleCnt="0"/>
-      <dgm:spPr/>
-    </dgm:pt>
-    <dgm:pt modelId="{78EA22B5-B3F3-48CD-8876-5089224007A0}" type="pres">
-      <dgm:prSet presAssocID="{49B36160-45DE-448C-86BE-D47406460EDD}" presName="horzOne" presStyleCnt="0"/>
-      <dgm:spPr/>
-    </dgm:pt>
-    <dgm:pt modelId="{394E7A40-7EA8-454D-95A1-6E44219ED951}" type="pres">
-      <dgm:prSet presAssocID="{12C2C49B-9B77-4292-9117-9787F1029541}" presName="vertTwo" presStyleCnt="0"/>
-      <dgm:spPr/>
-    </dgm:pt>
-    <dgm:pt modelId="{4DF1013E-A257-48E8-B04B-09D1763DA940}" type="pres">
-      <dgm:prSet presAssocID="{12C2C49B-9B77-4292-9117-9787F1029541}" presName="txTwo" presStyleLbl="node2" presStyleIdx="0" presStyleCnt="3">
-        <dgm:presLayoutVars>
-          <dgm:chPref val="3"/>
-        </dgm:presLayoutVars>
-      </dgm:prSet>
-      <dgm:spPr/>
-    </dgm:pt>
-    <dgm:pt modelId="{3C67BE52-E707-456E-8859-6E09A8C9B397}" type="pres">
-      <dgm:prSet presAssocID="{12C2C49B-9B77-4292-9117-9787F1029541}" presName="parTransTwo" presStyleCnt="0"/>
-      <dgm:spPr/>
-    </dgm:pt>
-    <dgm:pt modelId="{1D875C1F-178C-460D-9994-8871B90D4EB5}" type="pres">
-      <dgm:prSet presAssocID="{12C2C49B-9B77-4292-9117-9787F1029541}" presName="horzTwo" presStyleCnt="0"/>
-      <dgm:spPr/>
-    </dgm:pt>
-    <dgm:pt modelId="{06CA79B1-EEED-4ED9-B5EB-66DFBD93590B}" type="pres">
-      <dgm:prSet presAssocID="{B0145713-046B-48AF-B254-60984BBC6894}" presName="vertThree" presStyleCnt="0"/>
-      <dgm:spPr/>
-    </dgm:pt>
-    <dgm:pt modelId="{B8263EEE-D184-4E1A-8B59-78FF14C552B5}" type="pres">
-      <dgm:prSet presAssocID="{B0145713-046B-48AF-B254-60984BBC6894}" presName="txThree" presStyleLbl="node3" presStyleIdx="0" presStyleCnt="2">
-        <dgm:presLayoutVars>
-          <dgm:chPref val="3"/>
-        </dgm:presLayoutVars>
-      </dgm:prSet>
-      <dgm:spPr/>
-    </dgm:pt>
-    <dgm:pt modelId="{C55E3DB2-76B6-49E9-8A79-F3CC3C4033E6}" type="pres">
-      <dgm:prSet presAssocID="{B0145713-046B-48AF-B254-60984BBC6894}" presName="horzThree" presStyleCnt="0"/>
-      <dgm:spPr/>
-    </dgm:pt>
-    <dgm:pt modelId="{1B7DF001-C804-4E33-B10E-D6072B492C90}" type="pres">
-      <dgm:prSet presAssocID="{EB91949D-542C-4EA9-B240-4DEBDD0CDA02}" presName="sibSpaceThree" presStyleCnt="0"/>
-      <dgm:spPr/>
-    </dgm:pt>
-    <dgm:pt modelId="{2EA6C64D-5D05-4DB5-9132-A66CD9FFE5DB}" type="pres">
-      <dgm:prSet presAssocID="{AF14990F-9566-4A87-8415-FE8771398D4A}" presName="vertThree" presStyleCnt="0"/>
-      <dgm:spPr/>
-    </dgm:pt>
-    <dgm:pt modelId="{C31D0FAE-13E5-4E1A-975B-AE4DEC3C711E}" type="pres">
-      <dgm:prSet presAssocID="{AF14990F-9566-4A87-8415-FE8771398D4A}" presName="txThree" presStyleLbl="node3" presStyleIdx="1" presStyleCnt="2">
-        <dgm:presLayoutVars>
-          <dgm:chPref val="3"/>
-        </dgm:presLayoutVars>
-      </dgm:prSet>
-      <dgm:spPr/>
-    </dgm:pt>
-    <dgm:pt modelId="{A70AAA34-419E-4806-AEFB-11B59D8460CF}" type="pres">
-      <dgm:prSet presAssocID="{AF14990F-9566-4A87-8415-FE8771398D4A}" presName="horzThree" presStyleCnt="0"/>
-      <dgm:spPr/>
-    </dgm:pt>
-    <dgm:pt modelId="{06191093-6E57-435F-9B60-2184367F2AB8}" type="pres">
-      <dgm:prSet presAssocID="{7B7FFB8D-B9F6-4ADB-BC12-FF9820784698}" presName="sibSpaceTwo" presStyleCnt="0"/>
-      <dgm:spPr/>
-    </dgm:pt>
-    <dgm:pt modelId="{E9C39D09-604A-481F-A706-94040596223A}" type="pres">
-      <dgm:prSet presAssocID="{3C132675-E859-4166-BEC7-7160FB0E6424}" presName="vertTwo" presStyleCnt="0"/>
-      <dgm:spPr/>
-    </dgm:pt>
-    <dgm:pt modelId="{BF5247B5-9D7D-49C4-99D6-75AB3BC27791}" type="pres">
-      <dgm:prSet presAssocID="{3C132675-E859-4166-BEC7-7160FB0E6424}" presName="txTwo" presStyleLbl="node2" presStyleIdx="1" presStyleCnt="3">
-        <dgm:presLayoutVars>
-          <dgm:chPref val="3"/>
-        </dgm:presLayoutVars>
-      </dgm:prSet>
-      <dgm:spPr/>
-    </dgm:pt>
-    <dgm:pt modelId="{85800531-EE02-4FED-96D1-A828B65E0504}" type="pres">
-      <dgm:prSet presAssocID="{3C132675-E859-4166-BEC7-7160FB0E6424}" presName="horzTwo" presStyleCnt="0"/>
-      <dgm:spPr/>
-    </dgm:pt>
-    <dgm:pt modelId="{CE5EA2C5-0154-4628-AD6E-19470D380406}" type="pres">
-      <dgm:prSet presAssocID="{72D20977-5916-4365-ADB3-CF752FDA4299}" presName="sibSpaceOne" presStyleCnt="0"/>
-      <dgm:spPr/>
-    </dgm:pt>
-    <dgm:pt modelId="{56E84394-E5BA-4866-BF55-7169370B5FA0}" type="pres">
-      <dgm:prSet presAssocID="{DDFB77DA-A132-4BE5-BD65-9CCD7985E895}" presName="vertOne" presStyleCnt="0"/>
-      <dgm:spPr/>
-    </dgm:pt>
-    <dgm:pt modelId="{4E5634D8-C44E-45C8-A49B-230D0E9AAF81}" type="pres">
-      <dgm:prSet presAssocID="{DDFB77DA-A132-4BE5-BD65-9CCD7985E895}" presName="txOne" presStyleLbl="node0" presStyleIdx="1" presStyleCnt="2">
-        <dgm:presLayoutVars>
-          <dgm:chPref val="3"/>
-        </dgm:presLayoutVars>
-      </dgm:prSet>
-      <dgm:spPr/>
-    </dgm:pt>
-    <dgm:pt modelId="{8E997510-6C66-43F1-8575-F7FB7EEF074E}" type="pres">
-      <dgm:prSet presAssocID="{DDFB77DA-A132-4BE5-BD65-9CCD7985E895}" presName="parTransOne" presStyleCnt="0"/>
-      <dgm:spPr/>
-    </dgm:pt>
-    <dgm:pt modelId="{F7B1AEB8-0F41-45F3-B66C-A43D49DB37C7}" type="pres">
-      <dgm:prSet presAssocID="{DDFB77DA-A132-4BE5-BD65-9CCD7985E895}" presName="horzOne" presStyleCnt="0"/>
-      <dgm:spPr/>
-    </dgm:pt>
-    <dgm:pt modelId="{30E5F615-7F16-45FC-904E-8D2EC6904BB3}" type="pres">
-      <dgm:prSet presAssocID="{ED99E88B-4548-4C60-9224-0185DBF6CE00}" presName="vertTwo" presStyleCnt="0"/>
-      <dgm:spPr/>
-    </dgm:pt>
-    <dgm:pt modelId="{482D1D80-1A93-421E-A775-71835672643F}" type="pres">
-      <dgm:prSet presAssocID="{ED99E88B-4548-4C60-9224-0185DBF6CE00}" presName="txTwo" presStyleLbl="node2" presStyleIdx="2" presStyleCnt="3">
-        <dgm:presLayoutVars>
-          <dgm:chPref val="3"/>
-        </dgm:presLayoutVars>
-      </dgm:prSet>
-      <dgm:spPr/>
-    </dgm:pt>
-    <dgm:pt modelId="{4AEA653B-6ADA-4B0C-8C77-27111138320F}" type="pres">
-      <dgm:prSet presAssocID="{ED99E88B-4548-4C60-9224-0185DBF6CE00}" presName="horzTwo" presStyleCnt="0"/>
-      <dgm:spPr/>
-    </dgm:pt>
-  </dgm:ptLst>
-  <dgm:cxnLst>
-    <dgm:cxn modelId="{FD1E9800-D6AC-4E78-8C71-10C2079B5775}" type="presOf" srcId="{B0145713-046B-48AF-B254-60984BBC6894}" destId="{B8263EEE-D184-4E1A-8B59-78FF14C552B5}" srcOrd="0" destOrd="0" presId="urn:microsoft.com/office/officeart/2005/8/layout/hierarchy4"/>
-    <dgm:cxn modelId="{E3E52402-73D0-4B7F-A0E6-70FE3606A834}" type="presOf" srcId="{3C132675-E859-4166-BEC7-7160FB0E6424}" destId="{BF5247B5-9D7D-49C4-99D6-75AB3BC27791}" srcOrd="0" destOrd="0" presId="urn:microsoft.com/office/officeart/2005/8/layout/hierarchy4"/>
-    <dgm:cxn modelId="{F7470C07-9D1A-4C59-8DC3-1FFB2929F4DF}" srcId="{49B36160-45DE-448C-86BE-D47406460EDD}" destId="{12C2C49B-9B77-4292-9117-9787F1029541}" srcOrd="0" destOrd="0" parTransId="{726BCE43-8538-45F0-87CA-510BB034425C}" sibTransId="{7B7FFB8D-B9F6-4ADB-BC12-FF9820784698}"/>
-    <dgm:cxn modelId="{28DC2635-0F8B-44BD-ABC7-9483D6120820}" srcId="{BDDD5E72-9E1E-449C-9E5E-8EB513317C40}" destId="{49B36160-45DE-448C-86BE-D47406460EDD}" srcOrd="0" destOrd="0" parTransId="{756FB0BB-EDAB-4C95-9E1F-65B5BC2309F0}" sibTransId="{72D20977-5916-4365-ADB3-CF752FDA4299}"/>
-    <dgm:cxn modelId="{12D7E26C-52DC-4B07-8057-FEC0B1D0D2C2}" type="presOf" srcId="{DDFB77DA-A132-4BE5-BD65-9CCD7985E895}" destId="{4E5634D8-C44E-45C8-A49B-230D0E9AAF81}" srcOrd="0" destOrd="0" presId="urn:microsoft.com/office/officeart/2005/8/layout/hierarchy4"/>
-    <dgm:cxn modelId="{9C065052-0F04-4370-95E0-97A6AF395989}" srcId="{BDDD5E72-9E1E-449C-9E5E-8EB513317C40}" destId="{DDFB77DA-A132-4BE5-BD65-9CCD7985E895}" srcOrd="1" destOrd="0" parTransId="{146DA4A6-DA17-4B5F-9F5C-A7DF006E068E}" sibTransId="{C0F0FD92-0556-433D-8274-F5A4A1FF3FD3}"/>
-    <dgm:cxn modelId="{07D99057-4BC7-4022-A00C-BC629CD4C230}" srcId="{49B36160-45DE-448C-86BE-D47406460EDD}" destId="{3C132675-E859-4166-BEC7-7160FB0E6424}" srcOrd="1" destOrd="0" parTransId="{74244006-A67A-47B7-9398-1C2376E721AA}" sibTransId="{59EEA610-F76B-4724-966C-E15DC4ECCC4D}"/>
-    <dgm:cxn modelId="{DAF66390-5B17-435E-8BB8-1018944C281A}" type="presOf" srcId="{AF14990F-9566-4A87-8415-FE8771398D4A}" destId="{C31D0FAE-13E5-4E1A-975B-AE4DEC3C711E}" srcOrd="0" destOrd="0" presId="urn:microsoft.com/office/officeart/2005/8/layout/hierarchy4"/>
-    <dgm:cxn modelId="{8E832EB9-5F6F-4F81-AE2B-55570762C0DD}" srcId="{DDFB77DA-A132-4BE5-BD65-9CCD7985E895}" destId="{ED99E88B-4548-4C60-9224-0185DBF6CE00}" srcOrd="0" destOrd="0" parTransId="{F0460A73-1E5C-4351-A8F4-E787B602F64F}" sibTransId="{9CD4F59F-5712-400E-9019-DD6D691B4B0B}"/>
-    <dgm:cxn modelId="{B5B67DCF-8265-40FA-A4E3-62054E6D2547}" type="presOf" srcId="{49B36160-45DE-448C-86BE-D47406460EDD}" destId="{E5AEAA48-C73A-4E76-BD86-9D694D33240A}" srcOrd="0" destOrd="0" presId="urn:microsoft.com/office/officeart/2005/8/layout/hierarchy4"/>
-    <dgm:cxn modelId="{BCCC85E8-DA08-4077-B9EC-495612C8E1AC}" type="presOf" srcId="{12C2C49B-9B77-4292-9117-9787F1029541}" destId="{4DF1013E-A257-48E8-B04B-09D1763DA940}" srcOrd="0" destOrd="0" presId="urn:microsoft.com/office/officeart/2005/8/layout/hierarchy4"/>
-    <dgm:cxn modelId="{5263B5F0-927E-428D-972A-ECE3E4A27210}" type="presOf" srcId="{ED99E88B-4548-4C60-9224-0185DBF6CE00}" destId="{482D1D80-1A93-421E-A775-71835672643F}" srcOrd="0" destOrd="0" presId="urn:microsoft.com/office/officeart/2005/8/layout/hierarchy4"/>
-    <dgm:cxn modelId="{503DFDF2-6641-409B-B112-D6574B10B96D}" srcId="{12C2C49B-9B77-4292-9117-9787F1029541}" destId="{B0145713-046B-48AF-B254-60984BBC6894}" srcOrd="0" destOrd="0" parTransId="{09EEE519-217A-44A4-A091-36C83A9A5651}" sibTransId="{EB91949D-542C-4EA9-B240-4DEBDD0CDA02}"/>
-    <dgm:cxn modelId="{050127F7-C887-4318-9E7D-C2BA069E0289}" srcId="{12C2C49B-9B77-4292-9117-9787F1029541}" destId="{AF14990F-9566-4A87-8415-FE8771398D4A}" srcOrd="1" destOrd="0" parTransId="{ECAB05FB-AA63-441B-825B-F9894A34913C}" sibTransId="{7AB04DD5-B28D-4FF3-917E-C6FC20B29CEC}"/>
-    <dgm:cxn modelId="{22A472F8-75BE-4A27-9BD8-BE76B40FF350}" type="presOf" srcId="{BDDD5E72-9E1E-449C-9E5E-8EB513317C40}" destId="{89E689FB-BA2C-4940-A051-D6C6A39D0EF0}" srcOrd="0" destOrd="0" presId="urn:microsoft.com/office/officeart/2005/8/layout/hierarchy4"/>
-    <dgm:cxn modelId="{EE552372-DD12-4C0E-AF53-53DCB9930F39}" type="presParOf" srcId="{89E689FB-BA2C-4940-A051-D6C6A39D0EF0}" destId="{5FA9482F-F7E4-4448-AC2F-0A471A94DF9C}" srcOrd="0" destOrd="0" presId="urn:microsoft.com/office/officeart/2005/8/layout/hierarchy4"/>
-    <dgm:cxn modelId="{9F9F4F7C-DC1C-49BA-9CDE-87152AA6B810}" type="presParOf" srcId="{5FA9482F-F7E4-4448-AC2F-0A471A94DF9C}" destId="{E5AEAA48-C73A-4E76-BD86-9D694D33240A}" srcOrd="0" destOrd="0" presId="urn:microsoft.com/office/officeart/2005/8/layout/hierarchy4"/>
-    <dgm:cxn modelId="{35F4A9B5-EF33-4B36-ABFF-71DDC8236148}" type="presParOf" srcId="{5FA9482F-F7E4-4448-AC2F-0A471A94DF9C}" destId="{27728B42-EC78-4C7A-A211-74F3CBF3A02B}" srcOrd="1" destOrd="0" presId="urn:microsoft.com/office/officeart/2005/8/layout/hierarchy4"/>
-    <dgm:cxn modelId="{5BBE8755-D30C-4C42-8F90-018C944DBFF8}" type="presParOf" srcId="{5FA9482F-F7E4-4448-AC2F-0A471A94DF9C}" destId="{78EA22B5-B3F3-48CD-8876-5089224007A0}" srcOrd="2" destOrd="0" presId="urn:microsoft.com/office/officeart/2005/8/layout/hierarchy4"/>
-    <dgm:cxn modelId="{7D9F71B7-D94C-4A0F-BAFE-1118D375086C}" type="presParOf" srcId="{78EA22B5-B3F3-48CD-8876-5089224007A0}" destId="{394E7A40-7EA8-454D-95A1-6E44219ED951}" srcOrd="0" destOrd="0" presId="urn:microsoft.com/office/officeart/2005/8/layout/hierarchy4"/>
-    <dgm:cxn modelId="{350490B0-A650-475C-9170-A2ED3CC26A0E}" type="presParOf" srcId="{394E7A40-7EA8-454D-95A1-6E44219ED951}" destId="{4DF1013E-A257-48E8-B04B-09D1763DA940}" srcOrd="0" destOrd="0" presId="urn:microsoft.com/office/officeart/2005/8/layout/hierarchy4"/>
-    <dgm:cxn modelId="{3FE27080-5676-43A2-994D-14840C250991}" type="presParOf" srcId="{394E7A40-7EA8-454D-95A1-6E44219ED951}" destId="{3C67BE52-E707-456E-8859-6E09A8C9B397}" srcOrd="1" destOrd="0" presId="urn:microsoft.com/office/officeart/2005/8/layout/hierarchy4"/>
-    <dgm:cxn modelId="{120E0789-37D8-41F9-8C53-D2BC0ADC9FC1}" type="presParOf" srcId="{394E7A40-7EA8-454D-95A1-6E44219ED951}" destId="{1D875C1F-178C-460D-9994-8871B90D4EB5}" srcOrd="2" destOrd="0" presId="urn:microsoft.com/office/officeart/2005/8/layout/hierarchy4"/>
-    <dgm:cxn modelId="{184480AF-13B8-4511-B2C7-1F01F95D964A}" type="presParOf" srcId="{1D875C1F-178C-460D-9994-8871B90D4EB5}" destId="{06CA79B1-EEED-4ED9-B5EB-66DFBD93590B}" srcOrd="0" destOrd="0" presId="urn:microsoft.com/office/officeart/2005/8/layout/hierarchy4"/>
-    <dgm:cxn modelId="{6F4704EA-64F9-4448-AA35-6DA631DE330C}" type="presParOf" srcId="{06CA79B1-EEED-4ED9-B5EB-66DFBD93590B}" destId="{B8263EEE-D184-4E1A-8B59-78FF14C552B5}" srcOrd="0" destOrd="0" presId="urn:microsoft.com/office/officeart/2005/8/layout/hierarchy4"/>
-    <dgm:cxn modelId="{11A8E774-D577-42E9-8046-6E57447C4189}" type="presParOf" srcId="{06CA79B1-EEED-4ED9-B5EB-66DFBD93590B}" destId="{C55E3DB2-76B6-49E9-8A79-F3CC3C4033E6}" srcOrd="1" destOrd="0" presId="urn:microsoft.com/office/officeart/2005/8/layout/hierarchy4"/>
-    <dgm:cxn modelId="{EDBCF315-A0AD-48A8-A76E-8EB89E2FAEFC}" type="presParOf" srcId="{1D875C1F-178C-460D-9994-8871B90D4EB5}" destId="{1B7DF001-C804-4E33-B10E-D6072B492C90}" srcOrd="1" destOrd="0" presId="urn:microsoft.com/office/officeart/2005/8/layout/hierarchy4"/>
-    <dgm:cxn modelId="{B684218C-E5DE-45AE-B801-FEE71EF97F78}" type="presParOf" srcId="{1D875C1F-178C-460D-9994-8871B90D4EB5}" destId="{2EA6C64D-5D05-4DB5-9132-A66CD9FFE5DB}" srcOrd="2" destOrd="0" presId="urn:microsoft.com/office/officeart/2005/8/layout/hierarchy4"/>
-    <dgm:cxn modelId="{F378E178-1A3A-42B4-BB5E-F0FAC4FE9068}" type="presParOf" srcId="{2EA6C64D-5D05-4DB5-9132-A66CD9FFE5DB}" destId="{C31D0FAE-13E5-4E1A-975B-AE4DEC3C711E}" srcOrd="0" destOrd="0" presId="urn:microsoft.com/office/officeart/2005/8/layout/hierarchy4"/>
-    <dgm:cxn modelId="{4310A688-1097-484F-A27F-E276D640DD27}" type="presParOf" srcId="{2EA6C64D-5D05-4DB5-9132-A66CD9FFE5DB}" destId="{A70AAA34-419E-4806-AEFB-11B59D8460CF}" srcOrd="1" destOrd="0" presId="urn:microsoft.com/office/officeart/2005/8/layout/hierarchy4"/>
-    <dgm:cxn modelId="{DEC1C844-D6C2-4FD0-A0A3-83DF981E9D37}" type="presParOf" srcId="{78EA22B5-B3F3-48CD-8876-5089224007A0}" destId="{06191093-6E57-435F-9B60-2184367F2AB8}" srcOrd="1" destOrd="0" presId="urn:microsoft.com/office/officeart/2005/8/layout/hierarchy4"/>
-    <dgm:cxn modelId="{8209D8E8-107E-421D-8B89-BDB6F2F275A4}" type="presParOf" srcId="{78EA22B5-B3F3-48CD-8876-5089224007A0}" destId="{E9C39D09-604A-481F-A706-94040596223A}" srcOrd="2" destOrd="0" presId="urn:microsoft.com/office/officeart/2005/8/layout/hierarchy4"/>
-    <dgm:cxn modelId="{6A056572-6277-48AC-98FF-D0533FB9D143}" type="presParOf" srcId="{E9C39D09-604A-481F-A706-94040596223A}" destId="{BF5247B5-9D7D-49C4-99D6-75AB3BC27791}" srcOrd="0" destOrd="0" presId="urn:microsoft.com/office/officeart/2005/8/layout/hierarchy4"/>
-    <dgm:cxn modelId="{6B931D91-CEB3-467B-AEC9-0ECB74D59835}" type="presParOf" srcId="{E9C39D09-604A-481F-A706-94040596223A}" destId="{85800531-EE02-4FED-96D1-A828B65E0504}" srcOrd="1" destOrd="0" presId="urn:microsoft.com/office/officeart/2005/8/layout/hierarchy4"/>
-    <dgm:cxn modelId="{96D5ADB7-BAD7-44F6-A432-BD2D338BF2B9}" type="presParOf" srcId="{89E689FB-BA2C-4940-A051-D6C6A39D0EF0}" destId="{CE5EA2C5-0154-4628-AD6E-19470D380406}" srcOrd="1" destOrd="0" presId="urn:microsoft.com/office/officeart/2005/8/layout/hierarchy4"/>
-    <dgm:cxn modelId="{219FB665-A202-4D5B-8486-21E880D5FB6D}" type="presParOf" srcId="{89E689FB-BA2C-4940-A051-D6C6A39D0EF0}" destId="{56E84394-E5BA-4866-BF55-7169370B5FA0}" srcOrd="2" destOrd="0" presId="urn:microsoft.com/office/officeart/2005/8/layout/hierarchy4"/>
-    <dgm:cxn modelId="{A462D317-0500-4BEB-A0D6-0CD353BB58B6}" type="presParOf" srcId="{56E84394-E5BA-4866-BF55-7169370B5FA0}" destId="{4E5634D8-C44E-45C8-A49B-230D0E9AAF81}" srcOrd="0" destOrd="0" presId="urn:microsoft.com/office/officeart/2005/8/layout/hierarchy4"/>
-    <dgm:cxn modelId="{1C45D4A0-0FEF-434D-AC9F-4F76BA26AB18}" type="presParOf" srcId="{56E84394-E5BA-4866-BF55-7169370B5FA0}" destId="{8E997510-6C66-43F1-8575-F7FB7EEF074E}" srcOrd="1" destOrd="0" presId="urn:microsoft.com/office/officeart/2005/8/layout/hierarchy4"/>
-    <dgm:cxn modelId="{9263AB69-E899-4AFB-ABC8-A2849BC17345}" type="presParOf" srcId="{56E84394-E5BA-4866-BF55-7169370B5FA0}" destId="{F7B1AEB8-0F41-45F3-B66C-A43D49DB37C7}" srcOrd="2" destOrd="0" presId="urn:microsoft.com/office/officeart/2005/8/layout/hierarchy4"/>
-    <dgm:cxn modelId="{6EC6D28E-B34D-42A6-B174-0A8307FA37B2}" type="presParOf" srcId="{F7B1AEB8-0F41-45F3-B66C-A43D49DB37C7}" destId="{30E5F615-7F16-45FC-904E-8D2EC6904BB3}" srcOrd="0" destOrd="0" presId="urn:microsoft.com/office/officeart/2005/8/layout/hierarchy4"/>
-    <dgm:cxn modelId="{6E09BCC5-0FF6-4816-B715-1898327E10E7}" type="presParOf" srcId="{30E5F615-7F16-45FC-904E-8D2EC6904BB3}" destId="{482D1D80-1A93-421E-A775-71835672643F}" srcOrd="0" destOrd="0" presId="urn:microsoft.com/office/officeart/2005/8/layout/hierarchy4"/>
-    <dgm:cxn modelId="{1F9FAF65-A978-41E2-BAE6-1E4BF85AC412}" type="presParOf" srcId="{30E5F615-7F16-45FC-904E-8D2EC6904BB3}" destId="{4AEA653B-6ADA-4B0C-8C77-27111138320F}" srcOrd="1" destOrd="0" presId="urn:microsoft.com/office/officeart/2005/8/layout/hierarchy4"/>
   </dgm:cxnLst>
   <dgm:bg/>
   <dgm:whole/>
@@ -4795,571 +3595,6 @@
 </dsp:drawing>
 </file>
 
-<file path=ppt/diagrams/drawing2.xml><?xml version="1.0" encoding="utf-8"?>
-<dsp:drawing xmlns:dgm="http://schemas.openxmlformats.org/drawingml/2006/diagram" xmlns:dsp="http://schemas.microsoft.com/office/drawing/2008/diagram" xmlns:a="http://schemas.openxmlformats.org/drawingml/2006/main">
-  <dsp:spTree>
-    <dsp:nvGrpSpPr>
-      <dsp:cNvPr id="0" name=""/>
-      <dsp:cNvGrpSpPr/>
-    </dsp:nvGrpSpPr>
-    <dsp:grpSpPr/>
-    <dsp:sp modelId="{E5AEAA48-C73A-4E76-BD86-9D694D33240A}">
-      <dsp:nvSpPr>
-        <dsp:cNvPr id="0" name=""/>
-        <dsp:cNvSpPr/>
-      </dsp:nvSpPr>
-      <dsp:spPr>
-        <a:xfrm>
-          <a:off x="4900" y="600"/>
-          <a:ext cx="7648142" cy="1330047"/>
-        </a:xfrm>
-        <a:prstGeom prst="roundRect">
-          <a:avLst>
-            <a:gd name="adj" fmla="val 10000"/>
-          </a:avLst>
-        </a:prstGeom>
-        <a:solidFill>
-          <a:schemeClr val="accent1">
-            <a:hueOff val="0"/>
-            <a:satOff val="0"/>
-            <a:lumOff val="0"/>
-            <a:alphaOff val="0"/>
-          </a:schemeClr>
-        </a:solidFill>
-        <a:ln w="12700" cap="flat" cmpd="sng" algn="ctr">
-          <a:solidFill>
-            <a:schemeClr val="lt1">
-              <a:hueOff val="0"/>
-              <a:satOff val="0"/>
-              <a:lumOff val="0"/>
-              <a:alphaOff val="0"/>
-            </a:schemeClr>
-          </a:solidFill>
-          <a:prstDash val="solid"/>
-          <a:miter lim="800000"/>
-        </a:ln>
-        <a:effectLst/>
-      </dsp:spPr>
-      <dsp:style>
-        <a:lnRef idx="2">
-          <a:scrgbClr r="0" g="0" b="0"/>
-        </a:lnRef>
-        <a:fillRef idx="1">
-          <a:scrgbClr r="0" g="0" b="0"/>
-        </a:fillRef>
-        <a:effectRef idx="0">
-          <a:scrgbClr r="0" g="0" b="0"/>
-        </a:effectRef>
-        <a:fontRef idx="minor">
-          <a:schemeClr val="lt1"/>
-        </a:fontRef>
-      </dsp:style>
-      <dsp:txBody>
-        <a:bodyPr spcFirstLastPara="0" vert="horz" wrap="square" lIns="220980" tIns="220980" rIns="220980" bIns="220980" numCol="1" spcCol="1270" anchor="ctr" anchorCtr="0">
-          <a:noAutofit/>
-        </a:bodyPr>
-        <a:lstStyle/>
-        <a:p>
-          <a:pPr marL="0" lvl="0" indent="0" algn="ctr" defTabSz="2578100">
-            <a:lnSpc>
-              <a:spcPct val="90000"/>
-            </a:lnSpc>
-            <a:spcBef>
-              <a:spcPct val="0"/>
-            </a:spcBef>
-            <a:spcAft>
-              <a:spcPct val="35000"/>
-            </a:spcAft>
-            <a:buNone/>
-          </a:pPr>
-          <a:endParaRPr lang="en-US" sz="5800" kern="1200" dirty="0"/>
-        </a:p>
-      </dsp:txBody>
-      <dsp:txXfrm>
-        <a:off x="43856" y="39556"/>
-        <a:ext cx="7570230" cy="1252135"/>
-      </dsp:txXfrm>
-    </dsp:sp>
-    <dsp:sp modelId="{4DF1013E-A257-48E8-B04B-09D1763DA940}">
-      <dsp:nvSpPr>
-        <dsp:cNvPr id="0" name=""/>
-        <dsp:cNvSpPr/>
-      </dsp:nvSpPr>
-      <dsp:spPr>
-        <a:xfrm>
-          <a:off x="4900" y="1510645"/>
-          <a:ext cx="4996003" cy="1330047"/>
-        </a:xfrm>
-        <a:prstGeom prst="roundRect">
-          <a:avLst>
-            <a:gd name="adj" fmla="val 10000"/>
-          </a:avLst>
-        </a:prstGeom>
-        <a:solidFill>
-          <a:schemeClr val="accent1">
-            <a:hueOff val="0"/>
-            <a:satOff val="0"/>
-            <a:lumOff val="0"/>
-            <a:alphaOff val="0"/>
-          </a:schemeClr>
-        </a:solidFill>
-        <a:ln w="12700" cap="flat" cmpd="sng" algn="ctr">
-          <a:solidFill>
-            <a:schemeClr val="lt1">
-              <a:hueOff val="0"/>
-              <a:satOff val="0"/>
-              <a:lumOff val="0"/>
-              <a:alphaOff val="0"/>
-            </a:schemeClr>
-          </a:solidFill>
-          <a:prstDash val="solid"/>
-          <a:miter lim="800000"/>
-        </a:ln>
-        <a:effectLst/>
-      </dsp:spPr>
-      <dsp:style>
-        <a:lnRef idx="2">
-          <a:scrgbClr r="0" g="0" b="0"/>
-        </a:lnRef>
-        <a:fillRef idx="1">
-          <a:scrgbClr r="0" g="0" b="0"/>
-        </a:fillRef>
-        <a:effectRef idx="0">
-          <a:scrgbClr r="0" g="0" b="0"/>
-        </a:effectRef>
-        <a:fontRef idx="minor">
-          <a:schemeClr val="lt1"/>
-        </a:fontRef>
-      </dsp:style>
-      <dsp:txBody>
-        <a:bodyPr spcFirstLastPara="0" vert="horz" wrap="square" lIns="220980" tIns="220980" rIns="220980" bIns="220980" numCol="1" spcCol="1270" anchor="ctr" anchorCtr="0">
-          <a:noAutofit/>
-        </a:bodyPr>
-        <a:lstStyle/>
-        <a:p>
-          <a:pPr marL="0" lvl="0" indent="0" algn="ctr" defTabSz="2578100">
-            <a:lnSpc>
-              <a:spcPct val="90000"/>
-            </a:lnSpc>
-            <a:spcBef>
-              <a:spcPct val="0"/>
-            </a:spcBef>
-            <a:spcAft>
-              <a:spcPct val="35000"/>
-            </a:spcAft>
-            <a:buNone/>
-          </a:pPr>
-          <a:r>
-            <a:rPr lang="en-US" sz="5800" kern="1200" dirty="0"/>
-            <a:t>Bootstrap</a:t>
-          </a:r>
-        </a:p>
-      </dsp:txBody>
-      <dsp:txXfrm>
-        <a:off x="43856" y="1549601"/>
-        <a:ext cx="4918091" cy="1252135"/>
-      </dsp:txXfrm>
-    </dsp:sp>
-    <dsp:sp modelId="{B8263EEE-D184-4E1A-8B59-78FF14C552B5}">
-      <dsp:nvSpPr>
-        <dsp:cNvPr id="0" name=""/>
-        <dsp:cNvSpPr/>
-      </dsp:nvSpPr>
-      <dsp:spPr>
-        <a:xfrm>
-          <a:off x="4900" y="3020690"/>
-          <a:ext cx="2446622" cy="1330047"/>
-        </a:xfrm>
-        <a:prstGeom prst="roundRect">
-          <a:avLst>
-            <a:gd name="adj" fmla="val 10000"/>
-          </a:avLst>
-        </a:prstGeom>
-        <a:solidFill>
-          <a:schemeClr val="accent1">
-            <a:hueOff val="0"/>
-            <a:satOff val="0"/>
-            <a:lumOff val="0"/>
-            <a:alphaOff val="0"/>
-          </a:schemeClr>
-        </a:solidFill>
-        <a:ln w="12700" cap="flat" cmpd="sng" algn="ctr">
-          <a:solidFill>
-            <a:schemeClr val="lt1">
-              <a:hueOff val="0"/>
-              <a:satOff val="0"/>
-              <a:lumOff val="0"/>
-              <a:alphaOff val="0"/>
-            </a:schemeClr>
-          </a:solidFill>
-          <a:prstDash val="solid"/>
-          <a:miter lim="800000"/>
-        </a:ln>
-        <a:effectLst/>
-      </dsp:spPr>
-      <dsp:style>
-        <a:lnRef idx="2">
-          <a:scrgbClr r="0" g="0" b="0"/>
-        </a:lnRef>
-        <a:fillRef idx="1">
-          <a:scrgbClr r="0" g="0" b="0"/>
-        </a:fillRef>
-        <a:effectRef idx="0">
-          <a:scrgbClr r="0" g="0" b="0"/>
-        </a:effectRef>
-        <a:fontRef idx="minor">
-          <a:schemeClr val="lt1"/>
-        </a:fontRef>
-      </dsp:style>
-      <dsp:txBody>
-        <a:bodyPr spcFirstLastPara="0" vert="horz" wrap="square" lIns="194310" tIns="194310" rIns="194310" bIns="194310" numCol="1" spcCol="1270" anchor="ctr" anchorCtr="0">
-          <a:noAutofit/>
-        </a:bodyPr>
-        <a:lstStyle/>
-        <a:p>
-          <a:pPr marL="0" lvl="0" indent="0" algn="ctr" defTabSz="2266950">
-            <a:lnSpc>
-              <a:spcPct val="90000"/>
-            </a:lnSpc>
-            <a:spcBef>
-              <a:spcPct val="0"/>
-            </a:spcBef>
-            <a:spcAft>
-              <a:spcPct val="35000"/>
-            </a:spcAft>
-            <a:buNone/>
-          </a:pPr>
-          <a:r>
-            <a:rPr lang="en-US" sz="5100" kern="1200" dirty="0" err="1"/>
-            <a:t>Firbase</a:t>
-          </a:r>
-          <a:endParaRPr lang="en-US" sz="5100" kern="1200" dirty="0"/>
-        </a:p>
-      </dsp:txBody>
-      <dsp:txXfrm>
-        <a:off x="43856" y="3059646"/>
-        <a:ext cx="2368710" cy="1252135"/>
-      </dsp:txXfrm>
-    </dsp:sp>
-    <dsp:sp modelId="{C31D0FAE-13E5-4E1A-975B-AE4DEC3C711E}">
-      <dsp:nvSpPr>
-        <dsp:cNvPr id="0" name=""/>
-        <dsp:cNvSpPr/>
-      </dsp:nvSpPr>
-      <dsp:spPr>
-        <a:xfrm>
-          <a:off x="2554281" y="3020690"/>
-          <a:ext cx="2446622" cy="1330047"/>
-        </a:xfrm>
-        <a:prstGeom prst="roundRect">
-          <a:avLst>
-            <a:gd name="adj" fmla="val 10000"/>
-          </a:avLst>
-        </a:prstGeom>
-        <a:solidFill>
-          <a:schemeClr val="accent1">
-            <a:hueOff val="0"/>
-            <a:satOff val="0"/>
-            <a:lumOff val="0"/>
-            <a:alphaOff val="0"/>
-          </a:schemeClr>
-        </a:solidFill>
-        <a:ln w="12700" cap="flat" cmpd="sng" algn="ctr">
-          <a:solidFill>
-            <a:schemeClr val="lt1">
-              <a:hueOff val="0"/>
-              <a:satOff val="0"/>
-              <a:lumOff val="0"/>
-              <a:alphaOff val="0"/>
-            </a:schemeClr>
-          </a:solidFill>
-          <a:prstDash val="solid"/>
-          <a:miter lim="800000"/>
-        </a:ln>
-        <a:effectLst/>
-      </dsp:spPr>
-      <dsp:style>
-        <a:lnRef idx="2">
-          <a:scrgbClr r="0" g="0" b="0"/>
-        </a:lnRef>
-        <a:fillRef idx="1">
-          <a:scrgbClr r="0" g="0" b="0"/>
-        </a:fillRef>
-        <a:effectRef idx="0">
-          <a:scrgbClr r="0" g="0" b="0"/>
-        </a:effectRef>
-        <a:fontRef idx="minor">
-          <a:schemeClr val="lt1"/>
-        </a:fontRef>
-      </dsp:style>
-      <dsp:txBody>
-        <a:bodyPr spcFirstLastPara="0" vert="horz" wrap="square" lIns="194310" tIns="194310" rIns="194310" bIns="194310" numCol="1" spcCol="1270" anchor="ctr" anchorCtr="0">
-          <a:noAutofit/>
-        </a:bodyPr>
-        <a:lstStyle/>
-        <a:p>
-          <a:pPr marL="0" lvl="0" indent="0" algn="ctr" defTabSz="2266950">
-            <a:lnSpc>
-              <a:spcPct val="90000"/>
-            </a:lnSpc>
-            <a:spcBef>
-              <a:spcPct val="0"/>
-            </a:spcBef>
-            <a:spcAft>
-              <a:spcPct val="35000"/>
-            </a:spcAft>
-            <a:buNone/>
-          </a:pPr>
-          <a:endParaRPr lang="en-US" sz="5100" kern="1200" dirty="0"/>
-        </a:p>
-      </dsp:txBody>
-      <dsp:txXfrm>
-        <a:off x="2593237" y="3059646"/>
-        <a:ext cx="2368710" cy="1252135"/>
-      </dsp:txXfrm>
-    </dsp:sp>
-    <dsp:sp modelId="{BF5247B5-9D7D-49C4-99D6-75AB3BC27791}">
-      <dsp:nvSpPr>
-        <dsp:cNvPr id="0" name=""/>
-        <dsp:cNvSpPr/>
-      </dsp:nvSpPr>
-      <dsp:spPr>
-        <a:xfrm>
-          <a:off x="5206420" y="1510645"/>
-          <a:ext cx="2446622" cy="1330047"/>
-        </a:xfrm>
-        <a:prstGeom prst="roundRect">
-          <a:avLst>
-            <a:gd name="adj" fmla="val 10000"/>
-          </a:avLst>
-        </a:prstGeom>
-        <a:solidFill>
-          <a:schemeClr val="accent1">
-            <a:hueOff val="0"/>
-            <a:satOff val="0"/>
-            <a:lumOff val="0"/>
-            <a:alphaOff val="0"/>
-          </a:schemeClr>
-        </a:solidFill>
-        <a:ln w="12700" cap="flat" cmpd="sng" algn="ctr">
-          <a:solidFill>
-            <a:schemeClr val="lt1">
-              <a:hueOff val="0"/>
-              <a:satOff val="0"/>
-              <a:lumOff val="0"/>
-              <a:alphaOff val="0"/>
-            </a:schemeClr>
-          </a:solidFill>
-          <a:prstDash val="solid"/>
-          <a:miter lim="800000"/>
-        </a:ln>
-        <a:effectLst/>
-      </dsp:spPr>
-      <dsp:style>
-        <a:lnRef idx="2">
-          <a:scrgbClr r="0" g="0" b="0"/>
-        </a:lnRef>
-        <a:fillRef idx="1">
-          <a:scrgbClr r="0" g="0" b="0"/>
-        </a:fillRef>
-        <a:effectRef idx="0">
-          <a:scrgbClr r="0" g="0" b="0"/>
-        </a:effectRef>
-        <a:fontRef idx="minor">
-          <a:schemeClr val="lt1"/>
-        </a:fontRef>
-      </dsp:style>
-      <dsp:txBody>
-        <a:bodyPr spcFirstLastPara="0" vert="horz" wrap="square" lIns="220980" tIns="220980" rIns="220980" bIns="220980" numCol="1" spcCol="1270" anchor="ctr" anchorCtr="0">
-          <a:noAutofit/>
-        </a:bodyPr>
-        <a:lstStyle/>
-        <a:p>
-          <a:pPr marL="0" lvl="0" indent="0" algn="ctr" defTabSz="2578100">
-            <a:lnSpc>
-              <a:spcPct val="90000"/>
-            </a:lnSpc>
-            <a:spcBef>
-              <a:spcPct val="0"/>
-            </a:spcBef>
-            <a:spcAft>
-              <a:spcPct val="35000"/>
-            </a:spcAft>
-            <a:buNone/>
-          </a:pPr>
-          <a:r>
-            <a:rPr lang="en-US" sz="5800" kern="1200" dirty="0" err="1"/>
-            <a:t>Css</a:t>
-          </a:r>
-          <a:endParaRPr lang="en-US" sz="5800" kern="1200" dirty="0"/>
-        </a:p>
-      </dsp:txBody>
-      <dsp:txXfrm>
-        <a:off x="5245376" y="1549601"/>
-        <a:ext cx="2368710" cy="1252135"/>
-      </dsp:txXfrm>
-    </dsp:sp>
-    <dsp:sp modelId="{4E5634D8-C44E-45C8-A49B-230D0E9AAF81}">
-      <dsp:nvSpPr>
-        <dsp:cNvPr id="0" name=""/>
-        <dsp:cNvSpPr/>
-      </dsp:nvSpPr>
-      <dsp:spPr>
-        <a:xfrm>
-          <a:off x="8064076" y="600"/>
-          <a:ext cx="2446622" cy="1330047"/>
-        </a:xfrm>
-        <a:prstGeom prst="roundRect">
-          <a:avLst>
-            <a:gd name="adj" fmla="val 10000"/>
-          </a:avLst>
-        </a:prstGeom>
-        <a:solidFill>
-          <a:schemeClr val="accent1">
-            <a:hueOff val="0"/>
-            <a:satOff val="0"/>
-            <a:lumOff val="0"/>
-            <a:alphaOff val="0"/>
-          </a:schemeClr>
-        </a:solidFill>
-        <a:ln w="12700" cap="flat" cmpd="sng" algn="ctr">
-          <a:solidFill>
-            <a:schemeClr val="lt1">
-              <a:hueOff val="0"/>
-              <a:satOff val="0"/>
-              <a:lumOff val="0"/>
-              <a:alphaOff val="0"/>
-            </a:schemeClr>
-          </a:solidFill>
-          <a:prstDash val="solid"/>
-          <a:miter lim="800000"/>
-        </a:ln>
-        <a:effectLst/>
-      </dsp:spPr>
-      <dsp:style>
-        <a:lnRef idx="2">
-          <a:scrgbClr r="0" g="0" b="0"/>
-        </a:lnRef>
-        <a:fillRef idx="1">
-          <a:scrgbClr r="0" g="0" b="0"/>
-        </a:fillRef>
-        <a:effectRef idx="0">
-          <a:scrgbClr r="0" g="0" b="0"/>
-        </a:effectRef>
-        <a:fontRef idx="minor">
-          <a:schemeClr val="lt1"/>
-        </a:fontRef>
-      </dsp:style>
-      <dsp:txBody>
-        <a:bodyPr spcFirstLastPara="0" vert="horz" wrap="square" lIns="220980" tIns="220980" rIns="220980" bIns="220980" numCol="1" spcCol="1270" anchor="ctr" anchorCtr="0">
-          <a:noAutofit/>
-        </a:bodyPr>
-        <a:lstStyle/>
-        <a:p>
-          <a:pPr marL="0" lvl="0" indent="0" algn="ctr" defTabSz="2578100">
-            <a:lnSpc>
-              <a:spcPct val="90000"/>
-            </a:lnSpc>
-            <a:spcBef>
-              <a:spcPct val="0"/>
-            </a:spcBef>
-            <a:spcAft>
-              <a:spcPct val="35000"/>
-            </a:spcAft>
-            <a:buNone/>
-          </a:pPr>
-          <a:r>
-            <a:rPr lang="en-US" sz="5800" kern="1200" dirty="0"/>
-            <a:t>html</a:t>
-          </a:r>
-        </a:p>
-      </dsp:txBody>
-      <dsp:txXfrm>
-        <a:off x="8103032" y="39556"/>
-        <a:ext cx="2368710" cy="1252135"/>
-      </dsp:txXfrm>
-    </dsp:sp>
-    <dsp:sp modelId="{482D1D80-1A93-421E-A775-71835672643F}">
-      <dsp:nvSpPr>
-        <dsp:cNvPr id="0" name=""/>
-        <dsp:cNvSpPr/>
-      </dsp:nvSpPr>
-      <dsp:spPr>
-        <a:xfrm>
-          <a:off x="8064076" y="1510645"/>
-          <a:ext cx="2446622" cy="1330047"/>
-        </a:xfrm>
-        <a:prstGeom prst="roundRect">
-          <a:avLst>
-            <a:gd name="adj" fmla="val 10000"/>
-          </a:avLst>
-        </a:prstGeom>
-        <a:solidFill>
-          <a:schemeClr val="accent1">
-            <a:hueOff val="0"/>
-            <a:satOff val="0"/>
-            <a:lumOff val="0"/>
-            <a:alphaOff val="0"/>
-          </a:schemeClr>
-        </a:solidFill>
-        <a:ln w="12700" cap="flat" cmpd="sng" algn="ctr">
-          <a:solidFill>
-            <a:schemeClr val="lt1">
-              <a:hueOff val="0"/>
-              <a:satOff val="0"/>
-              <a:lumOff val="0"/>
-              <a:alphaOff val="0"/>
-            </a:schemeClr>
-          </a:solidFill>
-          <a:prstDash val="solid"/>
-          <a:miter lim="800000"/>
-        </a:ln>
-        <a:effectLst/>
-      </dsp:spPr>
-      <dsp:style>
-        <a:lnRef idx="2">
-          <a:scrgbClr r="0" g="0" b="0"/>
-        </a:lnRef>
-        <a:fillRef idx="1">
-          <a:scrgbClr r="0" g="0" b="0"/>
-        </a:fillRef>
-        <a:effectRef idx="0">
-          <a:scrgbClr r="0" g="0" b="0"/>
-        </a:effectRef>
-        <a:fontRef idx="minor">
-          <a:schemeClr val="lt1"/>
-        </a:fontRef>
-      </dsp:style>
-      <dsp:txBody>
-        <a:bodyPr spcFirstLastPara="0" vert="horz" wrap="square" lIns="220980" tIns="220980" rIns="220980" bIns="220980" numCol="1" spcCol="1270" anchor="ctr" anchorCtr="0">
-          <a:noAutofit/>
-        </a:bodyPr>
-        <a:lstStyle/>
-        <a:p>
-          <a:pPr marL="0" lvl="0" indent="0" algn="ctr" defTabSz="2578100">
-            <a:lnSpc>
-              <a:spcPct val="90000"/>
-            </a:lnSpc>
-            <a:spcBef>
-              <a:spcPct val="0"/>
-            </a:spcBef>
-            <a:spcAft>
-              <a:spcPct val="35000"/>
-            </a:spcAft>
-            <a:buNone/>
-          </a:pPr>
-          <a:endParaRPr lang="en-US" sz="5800" kern="1200"/>
-        </a:p>
-      </dsp:txBody>
-      <dsp:txXfrm>
-        <a:off x="8103032" y="1549601"/>
-        <a:ext cx="2368710" cy="1252135"/>
-      </dsp:txXfrm>
-    </dsp:sp>
-  </dsp:spTree>
-</dsp:drawing>
-</file>
-
 <file path=ppt/diagrams/layout1.xml><?xml version="1.0" encoding="utf-8"?>
 <dgm:layoutDef xmlns:dgm="http://schemas.openxmlformats.org/drawingml/2006/diagram" xmlns:a="http://schemas.openxmlformats.org/drawingml/2006/main" uniqueId="urn:microsoft.com/office/officeart/2008/layout/NameandTitleOrganizationalChart">
   <dgm:title val=""/>
@@ -6541,528 +4776,6 @@
 </dgm:layoutDef>
 </file>
 
-<file path=ppt/diagrams/layout2.xml><?xml version="1.0" encoding="utf-8"?>
-<dgm:layoutDef xmlns:dgm="http://schemas.openxmlformats.org/drawingml/2006/diagram" xmlns:a="http://schemas.openxmlformats.org/drawingml/2006/main" uniqueId="urn:microsoft.com/office/officeart/2005/8/layout/hierarchy4">
-  <dgm:title val=""/>
-  <dgm:desc val=""/>
-  <dgm:catLst>
-    <dgm:cat type="hierarchy" pri="4000"/>
-    <dgm:cat type="list" pri="24000"/>
-    <dgm:cat type="relationship" pri="10000"/>
-  </dgm:catLst>
-  <dgm:sampData>
-    <dgm:dataModel>
-      <dgm:ptLst>
-        <dgm:pt modelId="0" type="doc"/>
-        <dgm:pt modelId="1">
-          <dgm:prSet phldr="1"/>
-        </dgm:pt>
-        <dgm:pt modelId="2">
-          <dgm:prSet phldr="1"/>
-        </dgm:pt>
-        <dgm:pt modelId="21">
-          <dgm:prSet phldr="1"/>
-        </dgm:pt>
-        <dgm:pt modelId="22">
-          <dgm:prSet phldr="1"/>
-        </dgm:pt>
-        <dgm:pt modelId="3">
-          <dgm:prSet phldr="1"/>
-        </dgm:pt>
-        <dgm:pt modelId="31">
-          <dgm:prSet phldr="1"/>
-        </dgm:pt>
-      </dgm:ptLst>
-      <dgm:cxnLst>
-        <dgm:cxn modelId="4" srcId="0" destId="1" srcOrd="0" destOrd="0"/>
-        <dgm:cxn modelId="5" srcId="1" destId="2" srcOrd="0" destOrd="0"/>
-        <dgm:cxn modelId="6" srcId="1" destId="3" srcOrd="1" destOrd="0"/>
-        <dgm:cxn modelId="23" srcId="2" destId="21" srcOrd="0" destOrd="0"/>
-        <dgm:cxn modelId="24" srcId="2" destId="22" srcOrd="1" destOrd="0"/>
-        <dgm:cxn modelId="33" srcId="3" destId="31" srcOrd="0" destOrd="0"/>
-      </dgm:cxnLst>
-      <dgm:bg/>
-      <dgm:whole/>
-    </dgm:dataModel>
-  </dgm:sampData>
-  <dgm:styleData>
-    <dgm:dataModel>
-      <dgm:ptLst>
-        <dgm:pt modelId="0" type="doc"/>
-        <dgm:pt modelId="1"/>
-        <dgm:pt modelId="11"/>
-        <dgm:pt modelId="12"/>
-      </dgm:ptLst>
-      <dgm:cxnLst>
-        <dgm:cxn modelId="2" srcId="0" destId="1" srcOrd="0" destOrd="0"/>
-        <dgm:cxn modelId="13" srcId="1" destId="11" srcOrd="0" destOrd="0"/>
-        <dgm:cxn modelId="14" srcId="1" destId="12" srcOrd="1" destOrd="0"/>
-      </dgm:cxnLst>
-      <dgm:bg/>
-      <dgm:whole/>
-    </dgm:dataModel>
-  </dgm:styleData>
-  <dgm:clrData>
-    <dgm:dataModel>
-      <dgm:ptLst>
-        <dgm:pt modelId="0" type="doc"/>
-        <dgm:pt modelId="1"/>
-        <dgm:pt modelId="2"/>
-        <dgm:pt modelId="21"/>
-        <dgm:pt modelId="211"/>
-        <dgm:pt modelId="3"/>
-        <dgm:pt modelId="31"/>
-        <dgm:pt modelId="311"/>
-      </dgm:ptLst>
-      <dgm:cxnLst>
-        <dgm:cxn modelId="4" srcId="0" destId="1" srcOrd="0" destOrd="0"/>
-        <dgm:cxn modelId="5" srcId="1" destId="2" srcOrd="0" destOrd="0"/>
-        <dgm:cxn modelId="6" srcId="1" destId="3" srcOrd="1" destOrd="0"/>
-        <dgm:cxn modelId="23" srcId="2" destId="21" srcOrd="0" destOrd="0"/>
-        <dgm:cxn modelId="24" srcId="21" destId="211" srcOrd="0" destOrd="0"/>
-        <dgm:cxn modelId="33" srcId="3" destId="31" srcOrd="0" destOrd="0"/>
-        <dgm:cxn modelId="34" srcId="31" destId="311" srcOrd="0" destOrd="0"/>
-      </dgm:cxnLst>
-      <dgm:bg/>
-      <dgm:whole/>
-    </dgm:dataModel>
-  </dgm:clrData>
-  <dgm:layoutNode name="Name0">
-    <dgm:varLst>
-      <dgm:chPref val="1"/>
-      <dgm:dir/>
-      <dgm:animOne val="branch"/>
-      <dgm:animLvl val="lvl"/>
-      <dgm:resizeHandles/>
-    </dgm:varLst>
-    <dgm:choose name="Name1">
-      <dgm:if name="Name2" func="var" arg="dir" op="equ" val="norm">
-        <dgm:alg type="lin">
-          <dgm:param type="linDir" val="fromL"/>
-          <dgm:param type="nodeVertAlign" val="t"/>
-        </dgm:alg>
-      </dgm:if>
-      <dgm:else name="Name3">
-        <dgm:alg type="lin">
-          <dgm:param type="linDir" val="fromR"/>
-          <dgm:param type="nodeVertAlign" val="t"/>
-        </dgm:alg>
-      </dgm:else>
-    </dgm:choose>
-    <dgm:shape xmlns:r="http://schemas.openxmlformats.org/officeDocument/2006/relationships" r:blip="">
-      <dgm:adjLst/>
-    </dgm:shape>
-    <dgm:presOf/>
-    <dgm:constrLst>
-      <dgm:constr type="w" for="ch" forName="vertOne" refType="w"/>
-      <dgm:constr type="w" for="des" forName="horzOne" refType="w"/>
-      <dgm:constr type="w" for="des" forName="txOne" refType="w"/>
-      <dgm:constr type="w" for="des" forName="vertTwo" refType="w"/>
-      <dgm:constr type="w" for="des" forName="horzTwo" refType="w"/>
-      <dgm:constr type="w" for="des" forName="txTwo" refType="w"/>
-      <dgm:constr type="w" for="des" forName="vertThree" refType="w"/>
-      <dgm:constr type="w" for="des" forName="horzThree" refType="w"/>
-      <dgm:constr type="w" for="des" forName="txThree" refType="w"/>
-      <dgm:constr type="w" for="des" forName="vertFour" refType="w"/>
-      <dgm:constr type="w" for="des" forName="horzFour" refType="w"/>
-      <dgm:constr type="w" for="des" forName="txFour" refType="w"/>
-      <dgm:constr type="h" for="des" ptType="node" op="equ"/>
-      <dgm:constr type="h" for="des" forName="txOne" refType="h"/>
-      <dgm:constr type="userH" for="des" ptType="node" refType="h" refFor="des" refForName="txOne"/>
-      <dgm:constr type="primFontSz" for="des" forName="txOne" val="65"/>
-      <dgm:constr type="primFontSz" for="des" forName="txTwo" val="65"/>
-      <dgm:constr type="primFontSz" for="des" forName="txTwo" refType="primFontSz" refFor="des" refForName="txOne" op="lte"/>
-      <dgm:constr type="primFontSz" for="des" forName="txThree" val="65"/>
-      <dgm:constr type="primFontSz" for="des" forName="txThree" refType="primFontSz" refFor="des" refForName="txOne" op="lte"/>
-      <dgm:constr type="primFontSz" for="des" forName="txThree" refType="primFontSz" refFor="des" refForName="txTwo" op="lte"/>
-      <dgm:constr type="primFontSz" for="des" forName="txFour" val="65"/>
-      <dgm:constr type="primFontSz" for="des" forName="txFour" refType="primFontSz" refFor="des" refForName="txOne" op="lte"/>
-      <dgm:constr type="primFontSz" for="des" forName="txFour" refType="primFontSz" refFor="des" refForName="txTwo" op="lte"/>
-      <dgm:constr type="primFontSz" for="des" forName="txFour" refType="primFontSz" refFor="des" refForName="txThree" op="lte"/>
-      <dgm:constr type="w" for="des" forName="sibSpaceOne" refType="w" fact="0.168"/>
-      <dgm:constr type="w" for="des" forName="sibSpaceTwo" refType="w" refFor="des" refForName="sibSpaceOne" op="equ" fact="0.5"/>
-      <dgm:constr type="w" for="des" forName="sibSpaceThree" refType="w" refFor="des" refForName="sibSpaceTwo" op="equ" fact="0.5"/>
-      <dgm:constr type="w" for="des" forName="sibSpaceFour" refType="w" refFor="des" refForName="sibSpaceThree" op="equ" fact="0.5"/>
-      <dgm:constr type="h" for="des" forName="parTransOne" refType="w" fact="0.056"/>
-      <dgm:constr type="h" for="des" forName="parTransTwo" refType="h" refFor="des" refForName="parTransOne" op="equ"/>
-      <dgm:constr type="h" for="des" forName="parTransThree" refType="h" refFor="des" refForName="parTransTwo" op="equ"/>
-      <dgm:constr type="h" for="des" forName="parTransFour" refType="h" refFor="des" refForName="parTransThree" op="equ"/>
-    </dgm:constrLst>
-    <dgm:ruleLst/>
-    <dgm:forEach name="Name4" axis="ch" ptType="node">
-      <dgm:layoutNode name="vertOne">
-        <dgm:alg type="lin">
-          <dgm:param type="linDir" val="fromT"/>
-        </dgm:alg>
-        <dgm:shape xmlns:r="http://schemas.openxmlformats.org/officeDocument/2006/relationships" r:blip="">
-          <dgm:adjLst/>
-        </dgm:shape>
-        <dgm:presOf/>
-        <dgm:constrLst>
-          <dgm:constr type="w" for="ch" forName="txOne" refType="w" refFor="ch" refForName="horzOne" op="gte"/>
-        </dgm:constrLst>
-        <dgm:ruleLst/>
-        <dgm:layoutNode name="txOne" styleLbl="node0">
-          <dgm:varLst>
-            <dgm:chPref val="3"/>
-          </dgm:varLst>
-          <dgm:alg type="tx"/>
-          <dgm:shape xmlns:r="http://schemas.openxmlformats.org/officeDocument/2006/relationships" type="roundRect" r:blip="">
-            <dgm:adjLst>
-              <dgm:adj idx="1" val="0.1"/>
-            </dgm:adjLst>
-          </dgm:shape>
-          <dgm:presOf axis="self"/>
-          <dgm:constrLst>
-            <dgm:constr type="tMarg" refType="primFontSz" fact="0.3"/>
-            <dgm:constr type="bMarg" refType="primFontSz" fact="0.3"/>
-            <dgm:constr type="lMarg" refType="primFontSz" fact="0.3"/>
-            <dgm:constr type="rMarg" refType="primFontSz" fact="0.3"/>
-          </dgm:constrLst>
-          <dgm:ruleLst>
-            <dgm:rule type="primFontSz" val="5" fact="NaN" max="NaN"/>
-          </dgm:ruleLst>
-        </dgm:layoutNode>
-        <dgm:choose name="Name5">
-          <dgm:if name="Name6" axis="des" ptType="node" func="cnt" op="gt" val="0">
-            <dgm:layoutNode name="parTransOne">
-              <dgm:alg type="sp"/>
-              <dgm:shape xmlns:r="http://schemas.openxmlformats.org/officeDocument/2006/relationships" r:blip="">
-                <dgm:adjLst/>
-              </dgm:shape>
-              <dgm:presOf/>
-              <dgm:constrLst/>
-              <dgm:ruleLst/>
-            </dgm:layoutNode>
-          </dgm:if>
-          <dgm:else name="Name7"/>
-        </dgm:choose>
-        <dgm:layoutNode name="horzOne">
-          <dgm:choose name="Name8">
-            <dgm:if name="Name9" func="var" arg="dir" op="equ" val="norm">
-              <dgm:alg type="lin">
-                <dgm:param type="linDir" val="fromL"/>
-                <dgm:param type="nodeVertAlign" val="t"/>
-              </dgm:alg>
-            </dgm:if>
-            <dgm:else name="Name10">
-              <dgm:alg type="lin">
-                <dgm:param type="linDir" val="fromR"/>
-                <dgm:param type="nodeVertAlign" val="t"/>
-              </dgm:alg>
-            </dgm:else>
-          </dgm:choose>
-          <dgm:shape xmlns:r="http://schemas.openxmlformats.org/officeDocument/2006/relationships" r:blip="">
-            <dgm:adjLst/>
-          </dgm:shape>
-          <dgm:presOf/>
-          <dgm:constrLst/>
-          <dgm:ruleLst>
-            <dgm:rule type="w" val="INF" fact="NaN" max="NaN"/>
-          </dgm:ruleLst>
-          <dgm:forEach name="Name11" axis="ch" ptType="node">
-            <dgm:layoutNode name="vertTwo">
-              <dgm:alg type="lin">
-                <dgm:param type="linDir" val="fromT"/>
-              </dgm:alg>
-              <dgm:shape xmlns:r="http://schemas.openxmlformats.org/officeDocument/2006/relationships" r:blip="">
-                <dgm:adjLst/>
-              </dgm:shape>
-              <dgm:presOf/>
-              <dgm:constrLst>
-                <dgm:constr type="w" for="ch" forName="txTwo" refType="w" refFor="ch" refForName="horzTwo" op="gte"/>
-              </dgm:constrLst>
-              <dgm:ruleLst/>
-              <dgm:layoutNode name="txTwo">
-                <dgm:varLst>
-                  <dgm:chPref val="3"/>
-                </dgm:varLst>
-                <dgm:alg type="tx"/>
-                <dgm:shape xmlns:r="http://schemas.openxmlformats.org/officeDocument/2006/relationships" type="roundRect" r:blip="">
-                  <dgm:adjLst>
-                    <dgm:adj idx="1" val="0.1"/>
-                  </dgm:adjLst>
-                </dgm:shape>
-                <dgm:presOf axis="self"/>
-                <dgm:constrLst>
-                  <dgm:constr type="userH"/>
-                  <dgm:constr type="h" refType="userH"/>
-                  <dgm:constr type="tMarg" refType="primFontSz" fact="0.3"/>
-                  <dgm:constr type="bMarg" refType="primFontSz" fact="0.3"/>
-                  <dgm:constr type="lMarg" refType="primFontSz" fact="0.3"/>
-                  <dgm:constr type="rMarg" refType="primFontSz" fact="0.3"/>
-                </dgm:constrLst>
-                <dgm:ruleLst>
-                  <dgm:rule type="primFontSz" val="5" fact="NaN" max="NaN"/>
-                </dgm:ruleLst>
-              </dgm:layoutNode>
-              <dgm:choose name="Name12">
-                <dgm:if name="Name13" axis="des" ptType="node" func="cnt" op="gt" val="0">
-                  <dgm:layoutNode name="parTransTwo">
-                    <dgm:alg type="sp"/>
-                    <dgm:shape xmlns:r="http://schemas.openxmlformats.org/officeDocument/2006/relationships" r:blip="">
-                      <dgm:adjLst/>
-                    </dgm:shape>
-                    <dgm:presOf/>
-                    <dgm:constrLst/>
-                    <dgm:ruleLst/>
-                  </dgm:layoutNode>
-                </dgm:if>
-                <dgm:else name="Name14"/>
-              </dgm:choose>
-              <dgm:layoutNode name="horzTwo">
-                <dgm:choose name="Name15">
-                  <dgm:if name="Name16" func="var" arg="dir" op="equ" val="norm">
-                    <dgm:alg type="lin">
-                      <dgm:param type="linDir" val="fromL"/>
-                      <dgm:param type="nodeVertAlign" val="t"/>
-                    </dgm:alg>
-                  </dgm:if>
-                  <dgm:else name="Name17">
-                    <dgm:alg type="lin">
-                      <dgm:param type="linDir" val="fromR"/>
-                      <dgm:param type="nodeVertAlign" val="t"/>
-                    </dgm:alg>
-                  </dgm:else>
-                </dgm:choose>
-                <dgm:shape xmlns:r="http://schemas.openxmlformats.org/officeDocument/2006/relationships" r:blip="">
-                  <dgm:adjLst/>
-                </dgm:shape>
-                <dgm:presOf/>
-                <dgm:constrLst/>
-                <dgm:ruleLst>
-                  <dgm:rule type="w" val="INF" fact="NaN" max="NaN"/>
-                </dgm:ruleLst>
-                <dgm:forEach name="Name18" axis="ch" ptType="node">
-                  <dgm:layoutNode name="vertThree">
-                    <dgm:alg type="lin">
-                      <dgm:param type="linDir" val="fromT"/>
-                    </dgm:alg>
-                    <dgm:shape xmlns:r="http://schemas.openxmlformats.org/officeDocument/2006/relationships" r:blip="">
-                      <dgm:adjLst/>
-                    </dgm:shape>
-                    <dgm:presOf/>
-                    <dgm:constrLst>
-                      <dgm:constr type="w" for="ch" forName="txThree" refType="w" refFor="ch" refForName="horzThree" op="gte"/>
-                    </dgm:constrLst>
-                    <dgm:ruleLst/>
-                    <dgm:layoutNode name="txThree">
-                      <dgm:varLst>
-                        <dgm:chPref val="3"/>
-                      </dgm:varLst>
-                      <dgm:alg type="tx"/>
-                      <dgm:shape xmlns:r="http://schemas.openxmlformats.org/officeDocument/2006/relationships" type="roundRect" r:blip="">
-                        <dgm:adjLst>
-                          <dgm:adj idx="1" val="0.1"/>
-                        </dgm:adjLst>
-                      </dgm:shape>
-                      <dgm:presOf axis="self"/>
-                      <dgm:constrLst>
-                        <dgm:constr type="userH"/>
-                        <dgm:constr type="h" refType="userH"/>
-                        <dgm:constr type="tMarg" refType="primFontSz" fact="0.3"/>
-                        <dgm:constr type="bMarg" refType="primFontSz" fact="0.3"/>
-                        <dgm:constr type="lMarg" refType="primFontSz" fact="0.3"/>
-                        <dgm:constr type="rMarg" refType="primFontSz" fact="0.3"/>
-                      </dgm:constrLst>
-                      <dgm:ruleLst>
-                        <dgm:rule type="primFontSz" val="5" fact="NaN" max="NaN"/>
-                      </dgm:ruleLst>
-                    </dgm:layoutNode>
-                    <dgm:choose name="Name19">
-                      <dgm:if name="Name20" axis="des" ptType="node" func="cnt" op="gt" val="0">
-                        <dgm:layoutNode name="parTransThree">
-                          <dgm:alg type="sp"/>
-                          <dgm:shape xmlns:r="http://schemas.openxmlformats.org/officeDocument/2006/relationships" r:blip="">
-                            <dgm:adjLst/>
-                          </dgm:shape>
-                          <dgm:presOf/>
-                          <dgm:constrLst/>
-                          <dgm:ruleLst/>
-                        </dgm:layoutNode>
-                      </dgm:if>
-                      <dgm:else name="Name21"/>
-                    </dgm:choose>
-                    <dgm:layoutNode name="horzThree">
-                      <dgm:choose name="Name22">
-                        <dgm:if name="Name23" func="var" arg="dir" op="equ" val="norm">
-                          <dgm:alg type="lin">
-                            <dgm:param type="linDir" val="fromL"/>
-                            <dgm:param type="nodeVertAlign" val="t"/>
-                          </dgm:alg>
-                        </dgm:if>
-                        <dgm:else name="Name24">
-                          <dgm:alg type="lin">
-                            <dgm:param type="linDir" val="fromR"/>
-                            <dgm:param type="nodeVertAlign" val="t"/>
-                          </dgm:alg>
-                        </dgm:else>
-                      </dgm:choose>
-                      <dgm:shape xmlns:r="http://schemas.openxmlformats.org/officeDocument/2006/relationships" r:blip="">
-                        <dgm:adjLst/>
-                      </dgm:shape>
-                      <dgm:presOf/>
-                      <dgm:constrLst/>
-                      <dgm:ruleLst>
-                        <dgm:rule type="w" val="INF" fact="NaN" max="NaN"/>
-                      </dgm:ruleLst>
-                      <dgm:forEach name="repeat" axis="ch" ptType="node">
-                        <dgm:layoutNode name="vertFour">
-                          <dgm:varLst>
-                            <dgm:chPref val="3"/>
-                          </dgm:varLst>
-                          <dgm:alg type="lin">
-                            <dgm:param type="linDir" val="fromT"/>
-                          </dgm:alg>
-                          <dgm:shape xmlns:r="http://schemas.openxmlformats.org/officeDocument/2006/relationships" r:blip="">
-                            <dgm:adjLst/>
-                          </dgm:shape>
-                          <dgm:presOf/>
-                          <dgm:constrLst>
-                            <dgm:constr type="w" for="ch" forName="txFour" refType="w" refFor="ch" refForName="horzFour" op="gte"/>
-                          </dgm:constrLst>
-                          <dgm:ruleLst/>
-                          <dgm:layoutNode name="txFour">
-                            <dgm:varLst>
-                              <dgm:chPref val="3"/>
-                            </dgm:varLst>
-                            <dgm:alg type="tx"/>
-                            <dgm:shape xmlns:r="http://schemas.openxmlformats.org/officeDocument/2006/relationships" type="roundRect" r:blip="">
-                              <dgm:adjLst>
-                                <dgm:adj idx="1" val="0.1"/>
-                              </dgm:adjLst>
-                            </dgm:shape>
-                            <dgm:presOf axis="self"/>
-                            <dgm:constrLst>
-                              <dgm:constr type="userH"/>
-                              <dgm:constr type="h" refType="userH"/>
-                              <dgm:constr type="tMarg" refType="primFontSz" fact="0.3"/>
-                              <dgm:constr type="bMarg" refType="primFontSz" fact="0.3"/>
-                              <dgm:constr type="lMarg" refType="primFontSz" fact="0.3"/>
-                              <dgm:constr type="rMarg" refType="primFontSz" fact="0.3"/>
-                            </dgm:constrLst>
-                            <dgm:ruleLst>
-                              <dgm:rule type="primFontSz" val="5" fact="NaN" max="NaN"/>
-                            </dgm:ruleLst>
-                          </dgm:layoutNode>
-                          <dgm:choose name="Name25">
-                            <dgm:if name="Name26" axis="des" ptType="node" func="cnt" op="gt" val="0">
-                              <dgm:layoutNode name="parTransFour">
-                                <dgm:alg type="sp"/>
-                                <dgm:shape xmlns:r="http://schemas.openxmlformats.org/officeDocument/2006/relationships" r:blip="">
-                                  <dgm:adjLst/>
-                                </dgm:shape>
-                                <dgm:presOf/>
-                                <dgm:constrLst/>
-                                <dgm:ruleLst/>
-                              </dgm:layoutNode>
-                            </dgm:if>
-                            <dgm:else name="Name27"/>
-                          </dgm:choose>
-                          <dgm:layoutNode name="horzFour">
-                            <dgm:choose name="Name28">
-                              <dgm:if name="Name29" func="var" arg="dir" op="equ" val="norm">
-                                <dgm:alg type="lin">
-                                  <dgm:param type="linDir" val="fromL"/>
-                                  <dgm:param type="nodeVertAlign" val="t"/>
-                                </dgm:alg>
-                              </dgm:if>
-                              <dgm:else name="Name30">
-                                <dgm:alg type="lin">
-                                  <dgm:param type="linDir" val="fromR"/>
-                                  <dgm:param type="nodeVertAlign" val="t"/>
-                                </dgm:alg>
-                              </dgm:else>
-                            </dgm:choose>
-                            <dgm:shape xmlns:r="http://schemas.openxmlformats.org/officeDocument/2006/relationships" r:blip="">
-                              <dgm:adjLst/>
-                            </dgm:shape>
-                            <dgm:presOf/>
-                            <dgm:constrLst/>
-                            <dgm:ruleLst>
-                              <dgm:rule type="w" val="INF" fact="NaN" max="NaN"/>
-                            </dgm:ruleLst>
-                            <dgm:forEach name="Name31" ref="repeat"/>
-                          </dgm:layoutNode>
-                        </dgm:layoutNode>
-                        <dgm:choose name="Name32">
-                          <dgm:if name="Name33" axis="self" ptType="node" func="revPos" op="gte" val="2">
-                            <dgm:forEach name="Name34" axis="followSib" ptType="sibTrans" cnt="1">
-                              <dgm:layoutNode name="sibSpaceFour">
-                                <dgm:alg type="sp"/>
-                                <dgm:shape xmlns:r="http://schemas.openxmlformats.org/officeDocument/2006/relationships" r:blip="">
-                                  <dgm:adjLst/>
-                                </dgm:shape>
-                                <dgm:presOf/>
-                                <dgm:constrLst/>
-                                <dgm:ruleLst/>
-                              </dgm:layoutNode>
-                            </dgm:forEach>
-                          </dgm:if>
-                          <dgm:else name="Name35"/>
-                        </dgm:choose>
-                      </dgm:forEach>
-                    </dgm:layoutNode>
-                  </dgm:layoutNode>
-                  <dgm:choose name="Name36">
-                    <dgm:if name="Name37" axis="self" ptType="node" func="revPos" op="gte" val="2">
-                      <dgm:forEach name="Name38" axis="followSib" ptType="sibTrans" cnt="1">
-                        <dgm:layoutNode name="sibSpaceThree">
-                          <dgm:alg type="sp"/>
-                          <dgm:shape xmlns:r="http://schemas.openxmlformats.org/officeDocument/2006/relationships" r:blip="">
-                            <dgm:adjLst/>
-                          </dgm:shape>
-                          <dgm:presOf/>
-                          <dgm:constrLst/>
-                          <dgm:ruleLst/>
-                        </dgm:layoutNode>
-                      </dgm:forEach>
-                    </dgm:if>
-                    <dgm:else name="Name39"/>
-                  </dgm:choose>
-                </dgm:forEach>
-              </dgm:layoutNode>
-            </dgm:layoutNode>
-            <dgm:choose name="Name40">
-              <dgm:if name="Name41" axis="self" ptType="node" func="revPos" op="gte" val="2">
-                <dgm:forEach name="Name42" axis="followSib" ptType="sibTrans" cnt="1">
-                  <dgm:layoutNode name="sibSpaceTwo">
-                    <dgm:alg type="sp"/>
-                    <dgm:shape xmlns:r="http://schemas.openxmlformats.org/officeDocument/2006/relationships" r:blip="">
-                      <dgm:adjLst/>
-                    </dgm:shape>
-                    <dgm:presOf/>
-                    <dgm:constrLst/>
-                    <dgm:ruleLst/>
-                  </dgm:layoutNode>
-                </dgm:forEach>
-              </dgm:if>
-              <dgm:else name="Name43"/>
-            </dgm:choose>
-          </dgm:forEach>
-        </dgm:layoutNode>
-      </dgm:layoutNode>
-      <dgm:choose name="Name44">
-        <dgm:if name="Name45" axis="self" ptType="node" func="revPos" op="gte" val="2">
-          <dgm:forEach name="Name46" axis="followSib" ptType="sibTrans" cnt="1">
-            <dgm:layoutNode name="sibSpaceOne">
-              <dgm:alg type="sp"/>
-              <dgm:shape xmlns:r="http://schemas.openxmlformats.org/officeDocument/2006/relationships" r:blip="">
-                <dgm:adjLst/>
-              </dgm:shape>
-              <dgm:presOf/>
-              <dgm:constrLst/>
-              <dgm:ruleLst/>
-            </dgm:layoutNode>
-          </dgm:forEach>
-        </dgm:if>
-        <dgm:else name="Name47"/>
-      </dgm:choose>
-    </dgm:forEach>
-  </dgm:layoutNode>
-</dgm:layoutDef>
-</file>
-
 <file path=ppt/diagrams/quickStyle1.xml><?xml version="1.0" encoding="utf-8"?>
 <dgm:styleDef xmlns:dgm="http://schemas.openxmlformats.org/drawingml/2006/diagram" xmlns:a="http://schemas.openxmlformats.org/drawingml/2006/main" uniqueId="urn:microsoft.com/office/officeart/2005/8/quickstyle/simple1">
   <dgm:title val=""/>
@@ -8097,1038 +5810,470 @@
 </dgm:styleDef>
 </file>
 
-<file path=ppt/diagrams/quickStyle2.xml><?xml version="1.0" encoding="utf-8"?>
-<dgm:styleDef xmlns:dgm="http://schemas.openxmlformats.org/drawingml/2006/diagram" xmlns:a="http://schemas.openxmlformats.org/drawingml/2006/main" uniqueId="urn:microsoft.com/office/officeart/2005/8/quickstyle/simple1">
-  <dgm:title val=""/>
-  <dgm:desc val=""/>
-  <dgm:catLst>
-    <dgm:cat type="simple" pri="10100"/>
-  </dgm:catLst>
-  <dgm:scene3d>
-    <a:camera prst="orthographicFront"/>
-    <a:lightRig rig="threePt" dir="t"/>
-  </dgm:scene3d>
-  <dgm:styleLbl name="node0">
-    <dgm:scene3d>
-      <a:camera prst="orthographicFront"/>
-      <a:lightRig rig="threePt" dir="t"/>
-    </dgm:scene3d>
-    <dgm:sp3d/>
-    <dgm:txPr/>
-    <dgm:style>
-      <a:lnRef idx="2">
-        <a:scrgbClr r="0" g="0" b="0"/>
-      </a:lnRef>
-      <a:fillRef idx="1">
-        <a:scrgbClr r="0" g="0" b="0"/>
-      </a:fillRef>
-      <a:effectRef idx="0">
-        <a:scrgbClr r="0" g="0" b="0"/>
-      </a:effectRef>
-      <a:fontRef idx="minor">
-        <a:schemeClr val="lt1"/>
-      </a:fontRef>
-    </dgm:style>
-  </dgm:styleLbl>
-  <dgm:styleLbl name="lnNode1">
-    <dgm:scene3d>
-      <a:camera prst="orthographicFront"/>
-      <a:lightRig rig="threePt" dir="t"/>
-    </dgm:scene3d>
-    <dgm:sp3d/>
-    <dgm:txPr/>
-    <dgm:style>
-      <a:lnRef idx="2">
-        <a:scrgbClr r="0" g="0" b="0"/>
-      </a:lnRef>
-      <a:fillRef idx="1">
-        <a:scrgbClr r="0" g="0" b="0"/>
-      </a:fillRef>
-      <a:effectRef idx="0">
-        <a:scrgbClr r="0" g="0" b="0"/>
-      </a:effectRef>
-      <a:fontRef idx="minor">
-        <a:schemeClr val="lt1"/>
-      </a:fontRef>
-    </dgm:style>
-  </dgm:styleLbl>
-  <dgm:styleLbl name="vennNode1">
-    <dgm:scene3d>
-      <a:camera prst="orthographicFront"/>
-      <a:lightRig rig="threePt" dir="t"/>
-    </dgm:scene3d>
-    <dgm:sp3d/>
-    <dgm:txPr/>
-    <dgm:style>
-      <a:lnRef idx="2">
-        <a:scrgbClr r="0" g="0" b="0"/>
-      </a:lnRef>
-      <a:fillRef idx="1">
-        <a:scrgbClr r="0" g="0" b="0"/>
-      </a:fillRef>
-      <a:effectRef idx="0">
-        <a:scrgbClr r="0" g="0" b="0"/>
-      </a:effectRef>
-      <a:fontRef idx="minor">
-        <a:schemeClr val="tx1"/>
-      </a:fontRef>
-    </dgm:style>
-  </dgm:styleLbl>
-  <dgm:styleLbl name="alignNode1">
-    <dgm:scene3d>
-      <a:camera prst="orthographicFront"/>
-      <a:lightRig rig="threePt" dir="t"/>
-    </dgm:scene3d>
-    <dgm:sp3d/>
-    <dgm:txPr/>
-    <dgm:style>
-      <a:lnRef idx="2">
-        <a:scrgbClr r="0" g="0" b="0"/>
-      </a:lnRef>
-      <a:fillRef idx="1">
-        <a:scrgbClr r="0" g="0" b="0"/>
-      </a:fillRef>
-      <a:effectRef idx="0">
-        <a:scrgbClr r="0" g="0" b="0"/>
-      </a:effectRef>
-      <a:fontRef idx="minor">
-        <a:schemeClr val="lt1"/>
-      </a:fontRef>
-    </dgm:style>
-  </dgm:styleLbl>
-  <dgm:styleLbl name="node1">
-    <dgm:scene3d>
-      <a:camera prst="orthographicFront"/>
-      <a:lightRig rig="threePt" dir="t"/>
-    </dgm:scene3d>
-    <dgm:sp3d/>
-    <dgm:txPr/>
-    <dgm:style>
-      <a:lnRef idx="2">
-        <a:scrgbClr r="0" g="0" b="0"/>
-      </a:lnRef>
-      <a:fillRef idx="1">
-        <a:scrgbClr r="0" g="0" b="0"/>
-      </a:fillRef>
-      <a:effectRef idx="0">
-        <a:scrgbClr r="0" g="0" b="0"/>
-      </a:effectRef>
-      <a:fontRef idx="minor">
-        <a:schemeClr val="lt1"/>
-      </a:fontRef>
-    </dgm:style>
-  </dgm:styleLbl>
-  <dgm:styleLbl name="node2">
-    <dgm:scene3d>
-      <a:camera prst="orthographicFront"/>
-      <a:lightRig rig="threePt" dir="t"/>
-    </dgm:scene3d>
-    <dgm:sp3d/>
-    <dgm:txPr/>
-    <dgm:style>
-      <a:lnRef idx="2">
-        <a:scrgbClr r="0" g="0" b="0"/>
-      </a:lnRef>
-      <a:fillRef idx="1">
-        <a:scrgbClr r="0" g="0" b="0"/>
-      </a:fillRef>
-      <a:effectRef idx="0">
-        <a:scrgbClr r="0" g="0" b="0"/>
-      </a:effectRef>
-      <a:fontRef idx="minor">
-        <a:schemeClr val="lt1"/>
-      </a:fontRef>
-    </dgm:style>
-  </dgm:styleLbl>
-  <dgm:styleLbl name="node3">
-    <dgm:scene3d>
-      <a:camera prst="orthographicFront"/>
-      <a:lightRig rig="threePt" dir="t"/>
-    </dgm:scene3d>
-    <dgm:sp3d/>
-    <dgm:txPr/>
-    <dgm:style>
-      <a:lnRef idx="2">
-        <a:scrgbClr r="0" g="0" b="0"/>
-      </a:lnRef>
-      <a:fillRef idx="1">
-        <a:scrgbClr r="0" g="0" b="0"/>
-      </a:fillRef>
-      <a:effectRef idx="0">
-        <a:scrgbClr r="0" g="0" b="0"/>
-      </a:effectRef>
-      <a:fontRef idx="minor">
-        <a:schemeClr val="lt1"/>
-      </a:fontRef>
-    </dgm:style>
-  </dgm:styleLbl>
-  <dgm:styleLbl name="node4">
-    <dgm:scene3d>
-      <a:camera prst="orthographicFront"/>
-      <a:lightRig rig="threePt" dir="t"/>
-    </dgm:scene3d>
-    <dgm:sp3d/>
-    <dgm:txPr/>
-    <dgm:style>
-      <a:lnRef idx="2">
-        <a:scrgbClr r="0" g="0" b="0"/>
-      </a:lnRef>
-      <a:fillRef idx="1">
-        <a:scrgbClr r="0" g="0" b="0"/>
-      </a:fillRef>
-      <a:effectRef idx="0">
-        <a:scrgbClr r="0" g="0" b="0"/>
-      </a:effectRef>
-      <a:fontRef idx="minor">
-        <a:schemeClr val="lt1"/>
-      </a:fontRef>
-    </dgm:style>
-  </dgm:styleLbl>
-  <dgm:styleLbl name="fgImgPlace1">
-    <dgm:scene3d>
-      <a:camera prst="orthographicFront"/>
-      <a:lightRig rig="threePt" dir="t"/>
-    </dgm:scene3d>
-    <dgm:sp3d/>
-    <dgm:txPr/>
-    <dgm:style>
-      <a:lnRef idx="2">
-        <a:scrgbClr r="0" g="0" b="0"/>
-      </a:lnRef>
-      <a:fillRef idx="1">
-        <a:scrgbClr r="0" g="0" b="0"/>
-      </a:fillRef>
-      <a:effectRef idx="0">
-        <a:scrgbClr r="0" g="0" b="0"/>
-      </a:effectRef>
-      <a:fontRef idx="minor"/>
-    </dgm:style>
-  </dgm:styleLbl>
-  <dgm:styleLbl name="alignImgPlace1">
-    <dgm:scene3d>
-      <a:camera prst="orthographicFront"/>
-      <a:lightRig rig="threePt" dir="t"/>
-    </dgm:scene3d>
-    <dgm:sp3d/>
-    <dgm:txPr/>
-    <dgm:style>
-      <a:lnRef idx="2">
-        <a:scrgbClr r="0" g="0" b="0"/>
-      </a:lnRef>
-      <a:fillRef idx="1">
-        <a:scrgbClr r="0" g="0" b="0"/>
-      </a:fillRef>
-      <a:effectRef idx="0">
-        <a:scrgbClr r="0" g="0" b="0"/>
-      </a:effectRef>
-      <a:fontRef idx="minor"/>
-    </dgm:style>
-  </dgm:styleLbl>
-  <dgm:styleLbl name="bgImgPlace1">
-    <dgm:scene3d>
-      <a:camera prst="orthographicFront"/>
-      <a:lightRig rig="threePt" dir="t"/>
-    </dgm:scene3d>
-    <dgm:sp3d/>
-    <dgm:txPr/>
-    <dgm:style>
-      <a:lnRef idx="2">
-        <a:scrgbClr r="0" g="0" b="0"/>
-      </a:lnRef>
-      <a:fillRef idx="1">
-        <a:scrgbClr r="0" g="0" b="0"/>
-      </a:fillRef>
-      <a:effectRef idx="0">
-        <a:scrgbClr r="0" g="0" b="0"/>
-      </a:effectRef>
-      <a:fontRef idx="minor"/>
-    </dgm:style>
-  </dgm:styleLbl>
-  <dgm:styleLbl name="sibTrans2D1">
-    <dgm:scene3d>
-      <a:camera prst="orthographicFront"/>
-      <a:lightRig rig="threePt" dir="t"/>
-    </dgm:scene3d>
-    <dgm:sp3d/>
-    <dgm:txPr/>
-    <dgm:style>
-      <a:lnRef idx="0">
-        <a:scrgbClr r="0" g="0" b="0"/>
-      </a:lnRef>
-      <a:fillRef idx="1">
-        <a:scrgbClr r="0" g="0" b="0"/>
-      </a:fillRef>
-      <a:effectRef idx="0">
-        <a:scrgbClr r="0" g="0" b="0"/>
-      </a:effectRef>
-      <a:fontRef idx="minor">
-        <a:schemeClr val="lt1"/>
-      </a:fontRef>
-    </dgm:style>
-  </dgm:styleLbl>
-  <dgm:styleLbl name="fgSibTrans2D1">
-    <dgm:scene3d>
-      <a:camera prst="orthographicFront"/>
-      <a:lightRig rig="threePt" dir="t"/>
-    </dgm:scene3d>
-    <dgm:sp3d/>
-    <dgm:txPr/>
-    <dgm:style>
-      <a:lnRef idx="0">
-        <a:scrgbClr r="0" g="0" b="0"/>
-      </a:lnRef>
-      <a:fillRef idx="1">
-        <a:scrgbClr r="0" g="0" b="0"/>
-      </a:fillRef>
-      <a:effectRef idx="0">
-        <a:scrgbClr r="0" g="0" b="0"/>
-      </a:effectRef>
-      <a:fontRef idx="minor">
-        <a:schemeClr val="lt1"/>
-      </a:fontRef>
-    </dgm:style>
-  </dgm:styleLbl>
-  <dgm:styleLbl name="bgSibTrans2D1">
-    <dgm:scene3d>
-      <a:camera prst="orthographicFront"/>
-      <a:lightRig rig="threePt" dir="t"/>
-    </dgm:scene3d>
-    <dgm:sp3d/>
-    <dgm:txPr/>
-    <dgm:style>
-      <a:lnRef idx="0">
-        <a:scrgbClr r="0" g="0" b="0"/>
-      </a:lnRef>
-      <a:fillRef idx="1">
-        <a:scrgbClr r="0" g="0" b="0"/>
-      </a:fillRef>
-      <a:effectRef idx="0">
-        <a:scrgbClr r="0" g="0" b="0"/>
-      </a:effectRef>
-      <a:fontRef idx="minor">
-        <a:schemeClr val="lt1"/>
-      </a:fontRef>
-    </dgm:style>
-  </dgm:styleLbl>
-  <dgm:styleLbl name="sibTrans1D1">
-    <dgm:scene3d>
-      <a:camera prst="orthographicFront"/>
-      <a:lightRig rig="threePt" dir="t"/>
-    </dgm:scene3d>
-    <dgm:sp3d/>
-    <dgm:txPr/>
-    <dgm:style>
-      <a:lnRef idx="1">
-        <a:scrgbClr r="0" g="0" b="0"/>
-      </a:lnRef>
-      <a:fillRef idx="0">
-        <a:scrgbClr r="0" g="0" b="0"/>
-      </a:fillRef>
-      <a:effectRef idx="0">
-        <a:scrgbClr r="0" g="0" b="0"/>
-      </a:effectRef>
-      <a:fontRef idx="minor"/>
-    </dgm:style>
-  </dgm:styleLbl>
-  <dgm:styleLbl name="callout">
-    <dgm:scene3d>
-      <a:camera prst="orthographicFront"/>
-      <a:lightRig rig="threePt" dir="t"/>
-    </dgm:scene3d>
-    <dgm:sp3d/>
-    <dgm:txPr/>
-    <dgm:style>
-      <a:lnRef idx="2">
-        <a:scrgbClr r="0" g="0" b="0"/>
-      </a:lnRef>
-      <a:fillRef idx="1">
-        <a:scrgbClr r="0" g="0" b="0"/>
-      </a:fillRef>
-      <a:effectRef idx="0">
-        <a:scrgbClr r="0" g="0" b="0"/>
-      </a:effectRef>
-      <a:fontRef idx="minor"/>
-    </dgm:style>
-  </dgm:styleLbl>
-  <dgm:styleLbl name="asst0">
-    <dgm:scene3d>
-      <a:camera prst="orthographicFront"/>
-      <a:lightRig rig="threePt" dir="t"/>
-    </dgm:scene3d>
-    <dgm:sp3d/>
-    <dgm:txPr/>
-    <dgm:style>
-      <a:lnRef idx="2">
-        <a:scrgbClr r="0" g="0" b="0"/>
-      </a:lnRef>
-      <a:fillRef idx="1">
-        <a:scrgbClr r="0" g="0" b="0"/>
-      </a:fillRef>
-      <a:effectRef idx="0">
-        <a:scrgbClr r="0" g="0" b="0"/>
-      </a:effectRef>
-      <a:fontRef idx="minor">
-        <a:schemeClr val="lt1"/>
-      </a:fontRef>
-    </dgm:style>
-  </dgm:styleLbl>
-  <dgm:styleLbl name="asst1">
-    <dgm:scene3d>
-      <a:camera prst="orthographicFront"/>
-      <a:lightRig rig="threePt" dir="t"/>
-    </dgm:scene3d>
-    <dgm:sp3d/>
-    <dgm:txPr/>
-    <dgm:style>
-      <a:lnRef idx="2">
-        <a:scrgbClr r="0" g="0" b="0"/>
-      </a:lnRef>
-      <a:fillRef idx="1">
-        <a:scrgbClr r="0" g="0" b="0"/>
-      </a:fillRef>
-      <a:effectRef idx="0">
-        <a:scrgbClr r="0" g="0" b="0"/>
-      </a:effectRef>
-      <a:fontRef idx="minor">
-        <a:schemeClr val="lt1"/>
-      </a:fontRef>
-    </dgm:style>
-  </dgm:styleLbl>
-  <dgm:styleLbl name="asst2">
-    <dgm:scene3d>
-      <a:camera prst="orthographicFront"/>
-      <a:lightRig rig="threePt" dir="t"/>
-    </dgm:scene3d>
-    <dgm:sp3d/>
-    <dgm:txPr/>
-    <dgm:style>
-      <a:lnRef idx="2">
-        <a:scrgbClr r="0" g="0" b="0"/>
-      </a:lnRef>
-      <a:fillRef idx="1">
-        <a:scrgbClr r="0" g="0" b="0"/>
-      </a:fillRef>
-      <a:effectRef idx="0">
-        <a:scrgbClr r="0" g="0" b="0"/>
-      </a:effectRef>
-      <a:fontRef idx="minor">
-        <a:schemeClr val="lt1"/>
-      </a:fontRef>
-    </dgm:style>
-  </dgm:styleLbl>
-  <dgm:styleLbl name="asst3">
-    <dgm:scene3d>
-      <a:camera prst="orthographicFront"/>
-      <a:lightRig rig="threePt" dir="t"/>
-    </dgm:scene3d>
-    <dgm:sp3d/>
-    <dgm:txPr/>
-    <dgm:style>
-      <a:lnRef idx="2">
-        <a:scrgbClr r="0" g="0" b="0"/>
-      </a:lnRef>
-      <a:fillRef idx="1">
-        <a:scrgbClr r="0" g="0" b="0"/>
-      </a:fillRef>
-      <a:effectRef idx="0">
-        <a:scrgbClr r="0" g="0" b="0"/>
-      </a:effectRef>
-      <a:fontRef idx="minor">
-        <a:schemeClr val="lt1"/>
-      </a:fontRef>
-    </dgm:style>
-  </dgm:styleLbl>
-  <dgm:styleLbl name="asst4">
-    <dgm:scene3d>
-      <a:camera prst="orthographicFront"/>
-      <a:lightRig rig="threePt" dir="t"/>
-    </dgm:scene3d>
-    <dgm:sp3d/>
-    <dgm:txPr/>
-    <dgm:style>
-      <a:lnRef idx="2">
-        <a:scrgbClr r="0" g="0" b="0"/>
-      </a:lnRef>
-      <a:fillRef idx="1">
-        <a:scrgbClr r="0" g="0" b="0"/>
-      </a:fillRef>
-      <a:effectRef idx="0">
-        <a:scrgbClr r="0" g="0" b="0"/>
-      </a:effectRef>
-      <a:fontRef idx="minor">
-        <a:schemeClr val="lt1"/>
-      </a:fontRef>
-    </dgm:style>
-  </dgm:styleLbl>
-  <dgm:styleLbl name="parChTrans2D1">
-    <dgm:scene3d>
-      <a:camera prst="orthographicFront"/>
-      <a:lightRig rig="threePt" dir="t"/>
-    </dgm:scene3d>
-    <dgm:sp3d/>
-    <dgm:txPr/>
-    <dgm:style>
-      <a:lnRef idx="2">
-        <a:scrgbClr r="0" g="0" b="0"/>
-      </a:lnRef>
-      <a:fillRef idx="1">
-        <a:scrgbClr r="0" g="0" b="0"/>
-      </a:fillRef>
-      <a:effectRef idx="0">
-        <a:scrgbClr r="0" g="0" b="0"/>
-      </a:effectRef>
-      <a:fontRef idx="minor">
-        <a:schemeClr val="lt1"/>
-      </a:fontRef>
-    </dgm:style>
-  </dgm:styleLbl>
-  <dgm:styleLbl name="parChTrans2D2">
-    <dgm:scene3d>
-      <a:camera prst="orthographicFront"/>
-      <a:lightRig rig="threePt" dir="t"/>
-    </dgm:scene3d>
-    <dgm:sp3d/>
-    <dgm:txPr/>
-    <dgm:style>
-      <a:lnRef idx="2">
-        <a:scrgbClr r="0" g="0" b="0"/>
-      </a:lnRef>
-      <a:fillRef idx="1">
-        <a:scrgbClr r="0" g="0" b="0"/>
-      </a:fillRef>
-      <a:effectRef idx="0">
-        <a:scrgbClr r="0" g="0" b="0"/>
-      </a:effectRef>
-      <a:fontRef idx="minor">
-        <a:schemeClr val="lt1"/>
-      </a:fontRef>
-    </dgm:style>
-  </dgm:styleLbl>
-  <dgm:styleLbl name="parChTrans2D3">
-    <dgm:scene3d>
-      <a:camera prst="orthographicFront"/>
-      <a:lightRig rig="threePt" dir="t"/>
-    </dgm:scene3d>
-    <dgm:sp3d/>
-    <dgm:txPr/>
-    <dgm:style>
-      <a:lnRef idx="2">
-        <a:scrgbClr r="0" g="0" b="0"/>
-      </a:lnRef>
-      <a:fillRef idx="1">
-        <a:scrgbClr r="0" g="0" b="0"/>
-      </a:fillRef>
-      <a:effectRef idx="0">
-        <a:scrgbClr r="0" g="0" b="0"/>
-      </a:effectRef>
-      <a:fontRef idx="minor">
-        <a:schemeClr val="lt1"/>
-      </a:fontRef>
-    </dgm:style>
-  </dgm:styleLbl>
-  <dgm:styleLbl name="parChTrans2D4">
-    <dgm:scene3d>
-      <a:camera prst="orthographicFront"/>
-      <a:lightRig rig="threePt" dir="t"/>
-    </dgm:scene3d>
-    <dgm:sp3d/>
-    <dgm:txPr/>
-    <dgm:style>
-      <a:lnRef idx="2">
-        <a:scrgbClr r="0" g="0" b="0"/>
-      </a:lnRef>
-      <a:fillRef idx="1">
-        <a:scrgbClr r="0" g="0" b="0"/>
-      </a:fillRef>
-      <a:effectRef idx="0">
-        <a:scrgbClr r="0" g="0" b="0"/>
-      </a:effectRef>
-      <a:fontRef idx="minor">
-        <a:schemeClr val="lt1"/>
-      </a:fontRef>
-    </dgm:style>
-  </dgm:styleLbl>
-  <dgm:styleLbl name="parChTrans1D1">
-    <dgm:scene3d>
-      <a:camera prst="orthographicFront"/>
-      <a:lightRig rig="threePt" dir="t"/>
-    </dgm:scene3d>
-    <dgm:sp3d/>
-    <dgm:txPr/>
-    <dgm:style>
-      <a:lnRef idx="2">
-        <a:scrgbClr r="0" g="0" b="0"/>
-      </a:lnRef>
-      <a:fillRef idx="0">
-        <a:scrgbClr r="0" g="0" b="0"/>
-      </a:fillRef>
-      <a:effectRef idx="0">
-        <a:scrgbClr r="0" g="0" b="0"/>
-      </a:effectRef>
-      <a:fontRef idx="minor"/>
-    </dgm:style>
-  </dgm:styleLbl>
-  <dgm:styleLbl name="parChTrans1D2">
-    <dgm:scene3d>
-      <a:camera prst="orthographicFront"/>
-      <a:lightRig rig="threePt" dir="t"/>
-    </dgm:scene3d>
-    <dgm:sp3d/>
-    <dgm:txPr/>
-    <dgm:style>
-      <a:lnRef idx="2">
-        <a:scrgbClr r="0" g="0" b="0"/>
-      </a:lnRef>
-      <a:fillRef idx="0">
-        <a:scrgbClr r="0" g="0" b="0"/>
-      </a:fillRef>
-      <a:effectRef idx="0">
-        <a:scrgbClr r="0" g="0" b="0"/>
-      </a:effectRef>
-      <a:fontRef idx="minor"/>
-    </dgm:style>
-  </dgm:styleLbl>
-  <dgm:styleLbl name="parChTrans1D3">
-    <dgm:scene3d>
-      <a:camera prst="orthographicFront"/>
-      <a:lightRig rig="threePt" dir="t"/>
-    </dgm:scene3d>
-    <dgm:sp3d/>
-    <dgm:txPr/>
-    <dgm:style>
-      <a:lnRef idx="2">
-        <a:scrgbClr r="0" g="0" b="0"/>
-      </a:lnRef>
-      <a:fillRef idx="0">
-        <a:scrgbClr r="0" g="0" b="0"/>
-      </a:fillRef>
-      <a:effectRef idx="0">
-        <a:scrgbClr r="0" g="0" b="0"/>
-      </a:effectRef>
-      <a:fontRef idx="minor"/>
-    </dgm:style>
-  </dgm:styleLbl>
-  <dgm:styleLbl name="parChTrans1D4">
-    <dgm:scene3d>
-      <a:camera prst="orthographicFront"/>
-      <a:lightRig rig="threePt" dir="t"/>
-    </dgm:scene3d>
-    <dgm:sp3d/>
-    <dgm:txPr/>
-    <dgm:style>
-      <a:lnRef idx="2">
-        <a:scrgbClr r="0" g="0" b="0"/>
-      </a:lnRef>
-      <a:fillRef idx="0">
-        <a:scrgbClr r="0" g="0" b="0"/>
-      </a:fillRef>
-      <a:effectRef idx="0">
-        <a:scrgbClr r="0" g="0" b="0"/>
-      </a:effectRef>
-      <a:fontRef idx="minor"/>
-    </dgm:style>
-  </dgm:styleLbl>
-  <dgm:styleLbl name="fgAcc1">
-    <dgm:scene3d>
-      <a:camera prst="orthographicFront"/>
-      <a:lightRig rig="threePt" dir="t"/>
-    </dgm:scene3d>
-    <dgm:sp3d/>
-    <dgm:txPr/>
-    <dgm:style>
-      <a:lnRef idx="2">
-        <a:scrgbClr r="0" g="0" b="0"/>
-      </a:lnRef>
-      <a:fillRef idx="1">
-        <a:scrgbClr r="0" g="0" b="0"/>
-      </a:fillRef>
-      <a:effectRef idx="0">
-        <a:scrgbClr r="0" g="0" b="0"/>
-      </a:effectRef>
-      <a:fontRef idx="minor"/>
-    </dgm:style>
-  </dgm:styleLbl>
-  <dgm:styleLbl name="conFgAcc1">
-    <dgm:scene3d>
-      <a:camera prst="orthographicFront"/>
-      <a:lightRig rig="threePt" dir="t"/>
-    </dgm:scene3d>
-    <dgm:sp3d/>
-    <dgm:txPr/>
-    <dgm:style>
-      <a:lnRef idx="2">
-        <a:scrgbClr r="0" g="0" b="0"/>
-      </a:lnRef>
-      <a:fillRef idx="1">
-        <a:scrgbClr r="0" g="0" b="0"/>
-      </a:fillRef>
-      <a:effectRef idx="0">
-        <a:scrgbClr r="0" g="0" b="0"/>
-      </a:effectRef>
-      <a:fontRef idx="minor"/>
-    </dgm:style>
-  </dgm:styleLbl>
-  <dgm:styleLbl name="alignAcc1">
-    <dgm:scene3d>
-      <a:camera prst="orthographicFront"/>
-      <a:lightRig rig="threePt" dir="t"/>
-    </dgm:scene3d>
-    <dgm:sp3d/>
-    <dgm:txPr/>
-    <dgm:style>
-      <a:lnRef idx="2">
-        <a:scrgbClr r="0" g="0" b="0"/>
-      </a:lnRef>
-      <a:fillRef idx="1">
-        <a:scrgbClr r="0" g="0" b="0"/>
-      </a:fillRef>
-      <a:effectRef idx="0">
-        <a:scrgbClr r="0" g="0" b="0"/>
-      </a:effectRef>
-      <a:fontRef idx="minor"/>
-    </dgm:style>
-  </dgm:styleLbl>
-  <dgm:styleLbl name="trAlignAcc1">
-    <dgm:scene3d>
-      <a:camera prst="orthographicFront"/>
-      <a:lightRig rig="threePt" dir="t"/>
-    </dgm:scene3d>
-    <dgm:sp3d/>
-    <dgm:txPr/>
-    <dgm:style>
-      <a:lnRef idx="1">
-        <a:scrgbClr r="0" g="0" b="0"/>
-      </a:lnRef>
-      <a:fillRef idx="1">
-        <a:scrgbClr r="0" g="0" b="0"/>
-      </a:fillRef>
-      <a:effectRef idx="0">
-        <a:scrgbClr r="0" g="0" b="0"/>
-      </a:effectRef>
-      <a:fontRef idx="minor"/>
-    </dgm:style>
-  </dgm:styleLbl>
-  <dgm:styleLbl name="bgAcc1">
-    <dgm:scene3d>
-      <a:camera prst="orthographicFront"/>
-      <a:lightRig rig="threePt" dir="t"/>
-    </dgm:scene3d>
-    <dgm:sp3d/>
-    <dgm:txPr/>
-    <dgm:style>
-      <a:lnRef idx="2">
-        <a:scrgbClr r="0" g="0" b="0"/>
-      </a:lnRef>
-      <a:fillRef idx="1">
-        <a:scrgbClr r="0" g="0" b="0"/>
-      </a:fillRef>
-      <a:effectRef idx="0">
-        <a:scrgbClr r="0" g="0" b="0"/>
-      </a:effectRef>
-      <a:fontRef idx="minor"/>
-    </dgm:style>
-  </dgm:styleLbl>
-  <dgm:styleLbl name="solidFgAcc1">
-    <dgm:scene3d>
-      <a:camera prst="orthographicFront"/>
-      <a:lightRig rig="threePt" dir="t"/>
-    </dgm:scene3d>
-    <dgm:sp3d/>
-    <dgm:txPr/>
-    <dgm:style>
-      <a:lnRef idx="2">
-        <a:scrgbClr r="0" g="0" b="0"/>
-      </a:lnRef>
-      <a:fillRef idx="1">
-        <a:scrgbClr r="0" g="0" b="0"/>
-      </a:fillRef>
-      <a:effectRef idx="0">
-        <a:scrgbClr r="0" g="0" b="0"/>
-      </a:effectRef>
-      <a:fontRef idx="minor"/>
-    </dgm:style>
-  </dgm:styleLbl>
-  <dgm:styleLbl name="solidAlignAcc1">
-    <dgm:scene3d>
-      <a:camera prst="orthographicFront"/>
-      <a:lightRig rig="threePt" dir="t"/>
-    </dgm:scene3d>
-    <dgm:sp3d/>
-    <dgm:txPr/>
-    <dgm:style>
-      <a:lnRef idx="2">
-        <a:scrgbClr r="0" g="0" b="0"/>
-      </a:lnRef>
-      <a:fillRef idx="1">
-        <a:scrgbClr r="0" g="0" b="0"/>
-      </a:fillRef>
-      <a:effectRef idx="0">
-        <a:scrgbClr r="0" g="0" b="0"/>
-      </a:effectRef>
-      <a:fontRef idx="minor"/>
-    </dgm:style>
-  </dgm:styleLbl>
-  <dgm:styleLbl name="solidBgAcc1">
-    <dgm:scene3d>
-      <a:camera prst="orthographicFront"/>
-      <a:lightRig rig="threePt" dir="t"/>
-    </dgm:scene3d>
-    <dgm:sp3d/>
-    <dgm:txPr/>
-    <dgm:style>
-      <a:lnRef idx="2">
-        <a:scrgbClr r="0" g="0" b="0"/>
-      </a:lnRef>
-      <a:fillRef idx="1">
-        <a:scrgbClr r="0" g="0" b="0"/>
-      </a:fillRef>
-      <a:effectRef idx="0">
-        <a:scrgbClr r="0" g="0" b="0"/>
-      </a:effectRef>
-      <a:fontRef idx="minor"/>
-    </dgm:style>
-  </dgm:styleLbl>
-  <dgm:styleLbl name="fgAccFollowNode1">
-    <dgm:scene3d>
-      <a:camera prst="orthographicFront"/>
-      <a:lightRig rig="threePt" dir="t"/>
-    </dgm:scene3d>
-    <dgm:sp3d/>
-    <dgm:txPr/>
-    <dgm:style>
-      <a:lnRef idx="2">
-        <a:scrgbClr r="0" g="0" b="0"/>
-      </a:lnRef>
-      <a:fillRef idx="1">
-        <a:scrgbClr r="0" g="0" b="0"/>
-      </a:fillRef>
-      <a:effectRef idx="0">
-        <a:scrgbClr r="0" g="0" b="0"/>
-      </a:effectRef>
-      <a:fontRef idx="minor"/>
-    </dgm:style>
-  </dgm:styleLbl>
-  <dgm:styleLbl name="alignAccFollowNode1">
-    <dgm:scene3d>
-      <a:camera prst="orthographicFront"/>
-      <a:lightRig rig="threePt" dir="t"/>
-    </dgm:scene3d>
-    <dgm:sp3d/>
-    <dgm:txPr/>
-    <dgm:style>
-      <a:lnRef idx="2">
-        <a:scrgbClr r="0" g="0" b="0"/>
-      </a:lnRef>
-      <a:fillRef idx="1">
-        <a:scrgbClr r="0" g="0" b="0"/>
-      </a:fillRef>
-      <a:effectRef idx="0">
-        <a:scrgbClr r="0" g="0" b="0"/>
-      </a:effectRef>
-      <a:fontRef idx="minor"/>
-    </dgm:style>
-  </dgm:styleLbl>
-  <dgm:styleLbl name="bgAccFollowNode1">
-    <dgm:scene3d>
-      <a:camera prst="orthographicFront"/>
-      <a:lightRig rig="threePt" dir="t"/>
-    </dgm:scene3d>
-    <dgm:sp3d/>
-    <dgm:txPr/>
-    <dgm:style>
-      <a:lnRef idx="2">
-        <a:scrgbClr r="0" g="0" b="0"/>
-      </a:lnRef>
-      <a:fillRef idx="1">
-        <a:scrgbClr r="0" g="0" b="0"/>
-      </a:fillRef>
-      <a:effectRef idx="0">
-        <a:scrgbClr r="0" g="0" b="0"/>
-      </a:effectRef>
-      <a:fontRef idx="minor"/>
-    </dgm:style>
-  </dgm:styleLbl>
-  <dgm:styleLbl name="fgAcc0">
-    <dgm:scene3d>
-      <a:camera prst="orthographicFront"/>
-      <a:lightRig rig="threePt" dir="t"/>
-    </dgm:scene3d>
-    <dgm:sp3d/>
-    <dgm:txPr/>
-    <dgm:style>
-      <a:lnRef idx="2">
-        <a:scrgbClr r="0" g="0" b="0"/>
-      </a:lnRef>
-      <a:fillRef idx="1">
-        <a:scrgbClr r="0" g="0" b="0"/>
-      </a:fillRef>
-      <a:effectRef idx="0">
-        <a:scrgbClr r="0" g="0" b="0"/>
-      </a:effectRef>
-      <a:fontRef idx="minor"/>
-    </dgm:style>
-  </dgm:styleLbl>
-  <dgm:styleLbl name="fgAcc2">
-    <dgm:scene3d>
-      <a:camera prst="orthographicFront"/>
-      <a:lightRig rig="threePt" dir="t"/>
-    </dgm:scene3d>
-    <dgm:sp3d/>
-    <dgm:txPr/>
-    <dgm:style>
-      <a:lnRef idx="2">
-        <a:scrgbClr r="0" g="0" b="0"/>
-      </a:lnRef>
-      <a:fillRef idx="1">
-        <a:scrgbClr r="0" g="0" b="0"/>
-      </a:fillRef>
-      <a:effectRef idx="0">
-        <a:scrgbClr r="0" g="0" b="0"/>
-      </a:effectRef>
-      <a:fontRef idx="minor"/>
-    </dgm:style>
-  </dgm:styleLbl>
-  <dgm:styleLbl name="fgAcc3">
-    <dgm:scene3d>
-      <a:camera prst="orthographicFront"/>
-      <a:lightRig rig="threePt" dir="t"/>
-    </dgm:scene3d>
-    <dgm:sp3d/>
-    <dgm:txPr/>
-    <dgm:style>
-      <a:lnRef idx="2">
-        <a:scrgbClr r="0" g="0" b="0"/>
-      </a:lnRef>
-      <a:fillRef idx="1">
-        <a:scrgbClr r="0" g="0" b="0"/>
-      </a:fillRef>
-      <a:effectRef idx="0">
-        <a:scrgbClr r="0" g="0" b="0"/>
-      </a:effectRef>
-      <a:fontRef idx="minor"/>
-    </dgm:style>
-  </dgm:styleLbl>
-  <dgm:styleLbl name="fgAcc4">
-    <dgm:scene3d>
-      <a:camera prst="orthographicFront"/>
-      <a:lightRig rig="threePt" dir="t"/>
-    </dgm:scene3d>
-    <dgm:sp3d/>
-    <dgm:txPr/>
-    <dgm:style>
-      <a:lnRef idx="2">
-        <a:scrgbClr r="0" g="0" b="0"/>
-      </a:lnRef>
-      <a:fillRef idx="1">
-        <a:scrgbClr r="0" g="0" b="0"/>
-      </a:fillRef>
-      <a:effectRef idx="0">
-        <a:scrgbClr r="0" g="0" b="0"/>
-      </a:effectRef>
-      <a:fontRef idx="minor"/>
-    </dgm:style>
-  </dgm:styleLbl>
-  <dgm:styleLbl name="bgShp">
-    <dgm:scene3d>
-      <a:camera prst="orthographicFront"/>
-      <a:lightRig rig="threePt" dir="t"/>
-    </dgm:scene3d>
-    <dgm:sp3d/>
-    <dgm:txPr/>
-    <dgm:style>
-      <a:lnRef idx="0">
-        <a:scrgbClr r="0" g="0" b="0"/>
-      </a:lnRef>
-      <a:fillRef idx="1">
-        <a:scrgbClr r="0" g="0" b="0"/>
-      </a:fillRef>
-      <a:effectRef idx="0">
-        <a:scrgbClr r="0" g="0" b="0"/>
-      </a:effectRef>
-      <a:fontRef idx="minor"/>
-    </dgm:style>
-  </dgm:styleLbl>
-  <dgm:styleLbl name="dkBgShp">
-    <dgm:scene3d>
-      <a:camera prst="orthographicFront"/>
-      <a:lightRig rig="threePt" dir="t"/>
-    </dgm:scene3d>
-    <dgm:sp3d/>
-    <dgm:txPr/>
-    <dgm:style>
-      <a:lnRef idx="0">
-        <a:scrgbClr r="0" g="0" b="0"/>
-      </a:lnRef>
-      <a:fillRef idx="1">
-        <a:scrgbClr r="0" g="0" b="0"/>
-      </a:fillRef>
-      <a:effectRef idx="0">
-        <a:scrgbClr r="0" g="0" b="0"/>
-      </a:effectRef>
-      <a:fontRef idx="minor"/>
-    </dgm:style>
-  </dgm:styleLbl>
-  <dgm:styleLbl name="trBgShp">
-    <dgm:scene3d>
-      <a:camera prst="orthographicFront"/>
-      <a:lightRig rig="threePt" dir="t"/>
-    </dgm:scene3d>
-    <dgm:sp3d/>
-    <dgm:txPr/>
-    <dgm:style>
-      <a:lnRef idx="0">
-        <a:scrgbClr r="0" g="0" b="0"/>
-      </a:lnRef>
-      <a:fillRef idx="1">
-        <a:scrgbClr r="0" g="0" b="0"/>
-      </a:fillRef>
-      <a:effectRef idx="0">
-        <a:scrgbClr r="0" g="0" b="0"/>
-      </a:effectRef>
-      <a:fontRef idx="minor"/>
-    </dgm:style>
-  </dgm:styleLbl>
-  <dgm:styleLbl name="fgShp">
-    <dgm:scene3d>
-      <a:camera prst="orthographicFront"/>
-      <a:lightRig rig="threePt" dir="t"/>
-    </dgm:scene3d>
-    <dgm:sp3d/>
-    <dgm:txPr/>
-    <dgm:style>
-      <a:lnRef idx="2">
-        <a:scrgbClr r="0" g="0" b="0"/>
-      </a:lnRef>
-      <a:fillRef idx="1">
-        <a:scrgbClr r="0" g="0" b="0"/>
-      </a:fillRef>
-      <a:effectRef idx="0">
-        <a:scrgbClr r="0" g="0" b="0"/>
-      </a:effectRef>
-      <a:fontRef idx="minor"/>
-    </dgm:style>
-  </dgm:styleLbl>
-  <dgm:styleLbl name="revTx">
-    <dgm:scene3d>
-      <a:camera prst="orthographicFront"/>
-      <a:lightRig rig="threePt" dir="t"/>
-    </dgm:scene3d>
-    <dgm:sp3d/>
-    <dgm:txPr/>
-    <dgm:style>
-      <a:lnRef idx="0">
-        <a:scrgbClr r="0" g="0" b="0"/>
-      </a:lnRef>
-      <a:fillRef idx="0">
-        <a:scrgbClr r="0" g="0" b="0"/>
-      </a:fillRef>
-      <a:effectRef idx="0">
-        <a:scrgbClr r="0" g="0" b="0"/>
-      </a:effectRef>
-      <a:fontRef idx="minor"/>
-    </dgm:style>
-  </dgm:styleLbl>
-</dgm:styleDef>
+<file path=ppt/notesMasters/notesMaster1.xml><?xml version="1.0" encoding="utf-8"?>
+<p:notesMaster xmlns:a="http://schemas.openxmlformats.org/drawingml/2006/main" xmlns:r="http://schemas.openxmlformats.org/officeDocument/2006/relationships" xmlns:p="http://schemas.openxmlformats.org/presentationml/2006/main">
+  <p:cSld>
+    <p:bg>
+      <p:bgRef idx="1001">
+        <a:schemeClr val="bg1"/>
+      </p:bgRef>
+    </p:bg>
+    <p:spTree>
+      <p:nvGrpSpPr>
+        <p:cNvPr id="1" name=""/>
+        <p:cNvGrpSpPr/>
+        <p:nvPr/>
+      </p:nvGrpSpPr>
+      <p:grpSpPr>
+        <a:xfrm>
+          <a:off x="0" y="0"/>
+          <a:ext cx="0" cy="0"/>
+          <a:chOff x="0" y="0"/>
+          <a:chExt cx="0" cy="0"/>
+        </a:xfrm>
+      </p:grpSpPr>
+      <p:sp>
+        <p:nvSpPr>
+          <p:cNvPr id="2" name="Header Placeholder 1"/>
+          <p:cNvSpPr>
+            <a:spLocks noGrp="1"/>
+          </p:cNvSpPr>
+          <p:nvPr>
+            <p:ph type="hdr" sz="quarter"/>
+          </p:nvPr>
+        </p:nvSpPr>
+        <p:spPr>
+          <a:xfrm>
+            <a:off x="0" y="0"/>
+            <a:ext cx="2971800" cy="458788"/>
+          </a:xfrm>
+          <a:prstGeom prst="rect">
+            <a:avLst/>
+          </a:prstGeom>
+        </p:spPr>
+        <p:txBody>
+          <a:bodyPr vert="horz" lIns="91440" tIns="45720" rIns="91440" bIns="45720" rtlCol="0"/>
+          <a:lstStyle>
+            <a:lvl1pPr algn="l">
+              <a:defRPr sz="1200"/>
+            </a:lvl1pPr>
+          </a:lstStyle>
+          <a:p>
+            <a:endParaRPr lang="en-US"/>
+          </a:p>
+        </p:txBody>
+      </p:sp>
+      <p:sp>
+        <p:nvSpPr>
+          <p:cNvPr id="3" name="Date Placeholder 2"/>
+          <p:cNvSpPr>
+            <a:spLocks noGrp="1"/>
+          </p:cNvSpPr>
+          <p:nvPr>
+            <p:ph type="dt" idx="1"/>
+          </p:nvPr>
+        </p:nvSpPr>
+        <p:spPr>
+          <a:xfrm>
+            <a:off x="3884613" y="0"/>
+            <a:ext cx="2971800" cy="458788"/>
+          </a:xfrm>
+          <a:prstGeom prst="rect">
+            <a:avLst/>
+          </a:prstGeom>
+        </p:spPr>
+        <p:txBody>
+          <a:bodyPr vert="horz" lIns="91440" tIns="45720" rIns="91440" bIns="45720" rtlCol="0"/>
+          <a:lstStyle>
+            <a:lvl1pPr algn="r">
+              <a:defRPr sz="1200"/>
+            </a:lvl1pPr>
+          </a:lstStyle>
+          <a:p>
+            <a:fld id="{C2847E39-3363-4701-A48C-E1ED25F21718}" type="datetimeFigureOut">
+              <a:rPr lang="en-US" smtClean="0"/>
+              <a:t>7/2/2017</a:t>
+            </a:fld>
+            <a:endParaRPr lang="en-US"/>
+          </a:p>
+        </p:txBody>
+      </p:sp>
+      <p:sp>
+        <p:nvSpPr>
+          <p:cNvPr id="4" name="Slide Image Placeholder 3"/>
+          <p:cNvSpPr>
+            <a:spLocks noGrp="1" noRot="1" noChangeAspect="1"/>
+          </p:cNvSpPr>
+          <p:nvPr>
+            <p:ph type="sldImg" idx="2"/>
+          </p:nvPr>
+        </p:nvSpPr>
+        <p:spPr>
+          <a:xfrm>
+            <a:off x="685800" y="1143000"/>
+            <a:ext cx="5486400" cy="3086100"/>
+          </a:xfrm>
+          <a:prstGeom prst="rect">
+            <a:avLst/>
+          </a:prstGeom>
+          <a:noFill/>
+          <a:ln w="12700">
+            <a:solidFill>
+              <a:prstClr val="black"/>
+            </a:solidFill>
+          </a:ln>
+        </p:spPr>
+        <p:txBody>
+          <a:bodyPr vert="horz" lIns="91440" tIns="45720" rIns="91440" bIns="45720" rtlCol="0" anchor="ctr"/>
+          <a:lstStyle/>
+          <a:p>
+            <a:endParaRPr lang="en-US"/>
+          </a:p>
+        </p:txBody>
+      </p:sp>
+      <p:sp>
+        <p:nvSpPr>
+          <p:cNvPr id="5" name="Notes Placeholder 4"/>
+          <p:cNvSpPr>
+            <a:spLocks noGrp="1"/>
+          </p:cNvSpPr>
+          <p:nvPr>
+            <p:ph type="body" sz="quarter" idx="3"/>
+          </p:nvPr>
+        </p:nvSpPr>
+        <p:spPr>
+          <a:xfrm>
+            <a:off x="685800" y="4400550"/>
+            <a:ext cx="5486400" cy="3600450"/>
+          </a:xfrm>
+          <a:prstGeom prst="rect">
+            <a:avLst/>
+          </a:prstGeom>
+        </p:spPr>
+        <p:txBody>
+          <a:bodyPr vert="horz" lIns="91440" tIns="45720" rIns="91440" bIns="45720" rtlCol="0"/>
+          <a:lstStyle/>
+          <a:p>
+            <a:pPr lvl="0"/>
+            <a:r>
+              <a:rPr lang="en-US"/>
+              <a:t>Edit Master text styles</a:t>
+            </a:r>
+          </a:p>
+          <a:p>
+            <a:pPr lvl="1"/>
+            <a:r>
+              <a:rPr lang="en-US"/>
+              <a:t>Second level</a:t>
+            </a:r>
+          </a:p>
+          <a:p>
+            <a:pPr lvl="2"/>
+            <a:r>
+              <a:rPr lang="en-US"/>
+              <a:t>Third level</a:t>
+            </a:r>
+          </a:p>
+          <a:p>
+            <a:pPr lvl="3"/>
+            <a:r>
+              <a:rPr lang="en-US"/>
+              <a:t>Fourth level</a:t>
+            </a:r>
+          </a:p>
+          <a:p>
+            <a:pPr lvl="4"/>
+            <a:r>
+              <a:rPr lang="en-US"/>
+              <a:t>Fifth level</a:t>
+            </a:r>
+          </a:p>
+        </p:txBody>
+      </p:sp>
+      <p:sp>
+        <p:nvSpPr>
+          <p:cNvPr id="6" name="Footer Placeholder 5"/>
+          <p:cNvSpPr>
+            <a:spLocks noGrp="1"/>
+          </p:cNvSpPr>
+          <p:nvPr>
+            <p:ph type="ftr" sz="quarter" idx="4"/>
+          </p:nvPr>
+        </p:nvSpPr>
+        <p:spPr>
+          <a:xfrm>
+            <a:off x="0" y="8685213"/>
+            <a:ext cx="2971800" cy="458787"/>
+          </a:xfrm>
+          <a:prstGeom prst="rect">
+            <a:avLst/>
+          </a:prstGeom>
+        </p:spPr>
+        <p:txBody>
+          <a:bodyPr vert="horz" lIns="91440" tIns="45720" rIns="91440" bIns="45720" rtlCol="0" anchor="b"/>
+          <a:lstStyle>
+            <a:lvl1pPr algn="l">
+              <a:defRPr sz="1200"/>
+            </a:lvl1pPr>
+          </a:lstStyle>
+          <a:p>
+            <a:endParaRPr lang="en-US"/>
+          </a:p>
+        </p:txBody>
+      </p:sp>
+      <p:sp>
+        <p:nvSpPr>
+          <p:cNvPr id="7" name="Slide Number Placeholder 6"/>
+          <p:cNvSpPr>
+            <a:spLocks noGrp="1"/>
+          </p:cNvSpPr>
+          <p:nvPr>
+            <p:ph type="sldNum" sz="quarter" idx="5"/>
+          </p:nvPr>
+        </p:nvSpPr>
+        <p:spPr>
+          <a:xfrm>
+            <a:off x="3884613" y="8685213"/>
+            <a:ext cx="2971800" cy="458787"/>
+          </a:xfrm>
+          <a:prstGeom prst="rect">
+            <a:avLst/>
+          </a:prstGeom>
+        </p:spPr>
+        <p:txBody>
+          <a:bodyPr vert="horz" lIns="91440" tIns="45720" rIns="91440" bIns="45720" rtlCol="0" anchor="b"/>
+          <a:lstStyle>
+            <a:lvl1pPr algn="r">
+              <a:defRPr sz="1200"/>
+            </a:lvl1pPr>
+          </a:lstStyle>
+          <a:p>
+            <a:fld id="{030FE3AD-C7C3-4D95-882C-36B067B4059F}" type="slidenum">
+              <a:rPr lang="en-US" smtClean="0"/>
+              <a:t>‹#›</a:t>
+            </a:fld>
+            <a:endParaRPr lang="en-US"/>
+          </a:p>
+        </p:txBody>
+      </p:sp>
+    </p:spTree>
+    <p:extLst>
+      <p:ext uri="{BB962C8B-B14F-4D97-AF65-F5344CB8AC3E}">
+        <p14:creationId xmlns:p14="http://schemas.microsoft.com/office/powerpoint/2010/main" val="3489847216"/>
+      </p:ext>
+    </p:extLst>
+  </p:cSld>
+  <p:clrMap bg1="lt1" tx1="dk1" bg2="lt2" tx2="dk2" accent1="accent1" accent2="accent2" accent3="accent3" accent4="accent4" accent5="accent5" accent6="accent6" hlink="hlink" folHlink="folHlink"/>
+  <p:notesStyle>
+    <a:lvl1pPr marL="0" algn="l" defTabSz="914400" rtl="0" eaLnBrk="1" latinLnBrk="0" hangingPunct="1">
+      <a:defRPr sz="1200" kern="1200">
+        <a:solidFill>
+          <a:schemeClr val="tx1"/>
+        </a:solidFill>
+        <a:latin typeface="+mn-lt"/>
+        <a:ea typeface="+mn-ea"/>
+        <a:cs typeface="+mn-cs"/>
+      </a:defRPr>
+    </a:lvl1pPr>
+    <a:lvl2pPr marL="457200" algn="l" defTabSz="914400" rtl="0" eaLnBrk="1" latinLnBrk="0" hangingPunct="1">
+      <a:defRPr sz="1200" kern="1200">
+        <a:solidFill>
+          <a:schemeClr val="tx1"/>
+        </a:solidFill>
+        <a:latin typeface="+mn-lt"/>
+        <a:ea typeface="+mn-ea"/>
+        <a:cs typeface="+mn-cs"/>
+      </a:defRPr>
+    </a:lvl2pPr>
+    <a:lvl3pPr marL="914400" algn="l" defTabSz="914400" rtl="0" eaLnBrk="1" latinLnBrk="0" hangingPunct="1">
+      <a:defRPr sz="1200" kern="1200">
+        <a:solidFill>
+          <a:schemeClr val="tx1"/>
+        </a:solidFill>
+        <a:latin typeface="+mn-lt"/>
+        <a:ea typeface="+mn-ea"/>
+        <a:cs typeface="+mn-cs"/>
+      </a:defRPr>
+    </a:lvl3pPr>
+    <a:lvl4pPr marL="1371600" algn="l" defTabSz="914400" rtl="0" eaLnBrk="1" latinLnBrk="0" hangingPunct="1">
+      <a:defRPr sz="1200" kern="1200">
+        <a:solidFill>
+          <a:schemeClr val="tx1"/>
+        </a:solidFill>
+        <a:latin typeface="+mn-lt"/>
+        <a:ea typeface="+mn-ea"/>
+        <a:cs typeface="+mn-cs"/>
+      </a:defRPr>
+    </a:lvl4pPr>
+    <a:lvl5pPr marL="1828800" algn="l" defTabSz="914400" rtl="0" eaLnBrk="1" latinLnBrk="0" hangingPunct="1">
+      <a:defRPr sz="1200" kern="1200">
+        <a:solidFill>
+          <a:schemeClr val="tx1"/>
+        </a:solidFill>
+        <a:latin typeface="+mn-lt"/>
+        <a:ea typeface="+mn-ea"/>
+        <a:cs typeface="+mn-cs"/>
+      </a:defRPr>
+    </a:lvl5pPr>
+    <a:lvl6pPr marL="2286000" algn="l" defTabSz="914400" rtl="0" eaLnBrk="1" latinLnBrk="0" hangingPunct="1">
+      <a:defRPr sz="1200" kern="1200">
+        <a:solidFill>
+          <a:schemeClr val="tx1"/>
+        </a:solidFill>
+        <a:latin typeface="+mn-lt"/>
+        <a:ea typeface="+mn-ea"/>
+        <a:cs typeface="+mn-cs"/>
+      </a:defRPr>
+    </a:lvl6pPr>
+    <a:lvl7pPr marL="2743200" algn="l" defTabSz="914400" rtl="0" eaLnBrk="1" latinLnBrk="0" hangingPunct="1">
+      <a:defRPr sz="1200" kern="1200">
+        <a:solidFill>
+          <a:schemeClr val="tx1"/>
+        </a:solidFill>
+        <a:latin typeface="+mn-lt"/>
+        <a:ea typeface="+mn-ea"/>
+        <a:cs typeface="+mn-cs"/>
+      </a:defRPr>
+    </a:lvl7pPr>
+    <a:lvl8pPr marL="3200400" algn="l" defTabSz="914400" rtl="0" eaLnBrk="1" latinLnBrk="0" hangingPunct="1">
+      <a:defRPr sz="1200" kern="1200">
+        <a:solidFill>
+          <a:schemeClr val="tx1"/>
+        </a:solidFill>
+        <a:latin typeface="+mn-lt"/>
+        <a:ea typeface="+mn-ea"/>
+        <a:cs typeface="+mn-cs"/>
+      </a:defRPr>
+    </a:lvl8pPr>
+    <a:lvl9pPr marL="3657600" algn="l" defTabSz="914400" rtl="0" eaLnBrk="1" latinLnBrk="0" hangingPunct="1">
+      <a:defRPr sz="1200" kern="1200">
+        <a:solidFill>
+          <a:schemeClr val="tx1"/>
+        </a:solidFill>
+        <a:latin typeface="+mn-lt"/>
+        <a:ea typeface="+mn-ea"/>
+        <a:cs typeface="+mn-cs"/>
+      </a:defRPr>
+    </a:lvl9pPr>
+  </p:notesStyle>
+</p:notesMaster>
+</file>
+
+<file path=ppt/notesSlides/notesSlide1.xml><?xml version="1.0" encoding="utf-8"?>
+<p:notes xmlns:a="http://schemas.openxmlformats.org/drawingml/2006/main" xmlns:r="http://schemas.openxmlformats.org/officeDocument/2006/relationships" xmlns:p="http://schemas.openxmlformats.org/presentationml/2006/main">
+  <p:cSld>
+    <p:spTree>
+      <p:nvGrpSpPr>
+        <p:cNvPr id="1" name=""/>
+        <p:cNvGrpSpPr/>
+        <p:nvPr/>
+      </p:nvGrpSpPr>
+      <p:grpSpPr>
+        <a:xfrm>
+          <a:off x="0" y="0"/>
+          <a:ext cx="0" cy="0"/>
+          <a:chOff x="0" y="0"/>
+          <a:chExt cx="0" cy="0"/>
+        </a:xfrm>
+      </p:grpSpPr>
+      <p:sp>
+        <p:nvSpPr>
+          <p:cNvPr id="2" name="Slide Image Placeholder 1"/>
+          <p:cNvSpPr>
+            <a:spLocks noGrp="1" noRot="1" noChangeAspect="1"/>
+          </p:cNvSpPr>
+          <p:nvPr>
+            <p:ph type="sldImg"/>
+          </p:nvPr>
+        </p:nvSpPr>
+        <p:spPr/>
+      </p:sp>
+      <p:sp>
+        <p:nvSpPr>
+          <p:cNvPr id="3" name="Notes Placeholder 2"/>
+          <p:cNvSpPr>
+            <a:spLocks noGrp="1"/>
+          </p:cNvSpPr>
+          <p:nvPr>
+            <p:ph type="body" idx="1"/>
+          </p:nvPr>
+        </p:nvSpPr>
+        <p:spPr/>
+        <p:txBody>
+          <a:bodyPr/>
+          <a:lstStyle/>
+          <a:p>
+            <a:pPr marL="171450" indent="-171450">
+              <a:buFont typeface="Arial" panose="020B0604020202020204" pitchFamily="34" charset="0"/>
+              <a:buChar char="•"/>
+            </a:pPr>
+            <a:r>
+              <a:rPr lang="en-US" dirty="0"/>
+              <a:t>Becoming a parent can be exiting and terrifying at the same time.  One of the best ways to navigate this experience is to find other new moms that you can share ideas, challenges, and allow your children to interact. </a:t>
+            </a:r>
+          </a:p>
+          <a:p>
+            <a:pPr marL="171450" marR="0" lvl="0" indent="-171450" algn="l" defTabSz="914400" rtl="0" eaLnBrk="1" fontAlgn="auto" latinLnBrk="0" hangingPunct="1">
+              <a:lnSpc>
+                <a:spcPct val="100000"/>
+              </a:lnSpc>
+              <a:spcBef>
+                <a:spcPts val="0"/>
+              </a:spcBef>
+              <a:spcAft>
+                <a:spcPts val="0"/>
+              </a:spcAft>
+              <a:buClrTx/>
+              <a:buSzTx/>
+              <a:buFont typeface="Arial" panose="020B0604020202020204" pitchFamily="34" charset="0"/>
+              <a:buChar char="•"/>
+              <a:tabLst/>
+              <a:defRPr/>
+            </a:pPr>
+            <a:r>
+              <a:rPr lang="en-US" dirty="0"/>
+              <a:t>Time is the one thing that is of short supply when you are a new parent.  This site will allow you to connect with others that are close to you so that logistics are kept simple.</a:t>
+            </a:r>
+          </a:p>
+          <a:p>
+            <a:endParaRPr lang="en-US" dirty="0"/>
+          </a:p>
+        </p:txBody>
+      </p:sp>
+      <p:sp>
+        <p:nvSpPr>
+          <p:cNvPr id="4" name="Slide Number Placeholder 3"/>
+          <p:cNvSpPr>
+            <a:spLocks noGrp="1"/>
+          </p:cNvSpPr>
+          <p:nvPr>
+            <p:ph type="sldNum" sz="quarter" idx="10"/>
+          </p:nvPr>
+        </p:nvSpPr>
+        <p:spPr/>
+        <p:txBody>
+          <a:bodyPr/>
+          <a:lstStyle/>
+          <a:p>
+            <a:fld id="{030FE3AD-C7C3-4D95-882C-36B067B4059F}" type="slidenum">
+              <a:rPr lang="en-US" smtClean="0"/>
+              <a:t>3</a:t>
+            </a:fld>
+            <a:endParaRPr lang="en-US"/>
+          </a:p>
+        </p:txBody>
+      </p:sp>
+    </p:spTree>
+    <p:extLst>
+      <p:ext uri="{BB962C8B-B14F-4D97-AF65-F5344CB8AC3E}">
+        <p14:creationId xmlns:p14="http://schemas.microsoft.com/office/powerpoint/2010/main" val="413943299"/>
+      </p:ext>
+    </p:extLst>
+  </p:cSld>
+  <p:clrMapOvr>
+    <a:masterClrMapping/>
+  </p:clrMapOvr>
+</p:notes>
 </file>
 
 <file path=ppt/slideLayouts/slideLayout1.xml><?xml version="1.0" encoding="utf-8"?>
@@ -9278,7 +6423,7 @@
           <a:p>
             <a:fld id="{58DD293B-D8D0-431A-BBD3-F7FF1DD91784}" type="datetimeFigureOut">
               <a:rPr lang="en-US" smtClean="0"/>
-              <a:t>6/24/2017</a:t>
+              <a:t>7/2/2017</a:t>
             </a:fld>
             <a:endParaRPr lang="en-US"/>
           </a:p>
@@ -9476,7 +6621,7 @@
           <a:p>
             <a:fld id="{58DD293B-D8D0-431A-BBD3-F7FF1DD91784}" type="datetimeFigureOut">
               <a:rPr lang="en-US" smtClean="0"/>
-              <a:t>6/24/2017</a:t>
+              <a:t>7/2/2017</a:t>
             </a:fld>
             <a:endParaRPr lang="en-US"/>
           </a:p>
@@ -9684,7 +6829,7 @@
           <a:p>
             <a:fld id="{58DD293B-D8D0-431A-BBD3-F7FF1DD91784}" type="datetimeFigureOut">
               <a:rPr lang="en-US" smtClean="0"/>
-              <a:t>6/24/2017</a:t>
+              <a:t>7/2/2017</a:t>
             </a:fld>
             <a:endParaRPr lang="en-US"/>
           </a:p>
@@ -9882,7 +7027,7 @@
           <a:p>
             <a:fld id="{58DD293B-D8D0-431A-BBD3-F7FF1DD91784}" type="datetimeFigureOut">
               <a:rPr lang="en-US" smtClean="0"/>
-              <a:t>6/24/2017</a:t>
+              <a:t>7/2/2017</a:t>
             </a:fld>
             <a:endParaRPr lang="en-US"/>
           </a:p>
@@ -10157,7 +7302,7 @@
           <a:p>
             <a:fld id="{58DD293B-D8D0-431A-BBD3-F7FF1DD91784}" type="datetimeFigureOut">
               <a:rPr lang="en-US" smtClean="0"/>
-              <a:t>6/24/2017</a:t>
+              <a:t>7/2/2017</a:t>
             </a:fld>
             <a:endParaRPr lang="en-US"/>
           </a:p>
@@ -10422,7 +7567,7 @@
           <a:p>
             <a:fld id="{58DD293B-D8D0-431A-BBD3-F7FF1DD91784}" type="datetimeFigureOut">
               <a:rPr lang="en-US" smtClean="0"/>
-              <a:t>6/24/2017</a:t>
+              <a:t>7/2/2017</a:t>
             </a:fld>
             <a:endParaRPr lang="en-US"/>
           </a:p>
@@ -10834,7 +7979,7 @@
           <a:p>
             <a:fld id="{58DD293B-D8D0-431A-BBD3-F7FF1DD91784}" type="datetimeFigureOut">
               <a:rPr lang="en-US" smtClean="0"/>
-              <a:t>6/24/2017</a:t>
+              <a:t>7/2/2017</a:t>
             </a:fld>
             <a:endParaRPr lang="en-US"/>
           </a:p>
@@ -10975,7 +8120,7 @@
           <a:p>
             <a:fld id="{58DD293B-D8D0-431A-BBD3-F7FF1DD91784}" type="datetimeFigureOut">
               <a:rPr lang="en-US" smtClean="0"/>
-              <a:t>6/24/2017</a:t>
+              <a:t>7/2/2017</a:t>
             </a:fld>
             <a:endParaRPr lang="en-US"/>
           </a:p>
@@ -11088,7 +8233,7 @@
           <a:p>
             <a:fld id="{58DD293B-D8D0-431A-BBD3-F7FF1DD91784}" type="datetimeFigureOut">
               <a:rPr lang="en-US" smtClean="0"/>
-              <a:t>6/24/2017</a:t>
+              <a:t>7/2/2017</a:t>
             </a:fld>
             <a:endParaRPr lang="en-US"/>
           </a:p>
@@ -11399,7 +8544,7 @@
           <a:p>
             <a:fld id="{58DD293B-D8D0-431A-BBD3-F7FF1DD91784}" type="datetimeFigureOut">
               <a:rPr lang="en-US" smtClean="0"/>
-              <a:t>6/24/2017</a:t>
+              <a:t>7/2/2017</a:t>
             </a:fld>
             <a:endParaRPr lang="en-US"/>
           </a:p>
@@ -11687,7 +8832,7 @@
           <a:p>
             <a:fld id="{58DD293B-D8D0-431A-BBD3-F7FF1DD91784}" type="datetimeFigureOut">
               <a:rPr lang="en-US" smtClean="0"/>
-              <a:t>6/24/2017</a:t>
+              <a:t>7/2/2017</a:t>
             </a:fld>
             <a:endParaRPr lang="en-US"/>
           </a:p>
@@ -11928,7 +9073,7 @@
           <a:p>
             <a:fld id="{58DD293B-D8D0-431A-BBD3-F7FF1DD91784}" type="datetimeFigureOut">
               <a:rPr lang="en-US" smtClean="0"/>
-              <a:t>6/24/2017</a:t>
+              <a:t>7/2/2017</a:t>
             </a:fld>
             <a:endParaRPr lang="en-US"/>
           </a:p>
@@ -12366,7 +9511,7 @@
           <a:bodyPr/>
           <a:lstStyle/>
           <a:p>
-            <a:endParaRPr lang="en-US"/>
+            <a:endParaRPr lang="en-US" dirty="0"/>
           </a:p>
         </p:txBody>
       </p:sp>
@@ -12430,6 +9575,109 @@
           <p:cNvPr id="2" name="Title 1">
             <a:extLst>
               <a:ext uri="{FF2B5EF4-FFF2-40B4-BE49-F238E27FC236}">
+                <a16:creationId xmlns:a16="http://schemas.microsoft.com/office/drawing/2014/main" id="{8261FB1A-C0AB-48E3-9776-78FBEBFA3279}"/>
+              </a:ext>
+            </a:extLst>
+          </p:cNvPr>
+          <p:cNvSpPr>
+            <a:spLocks noGrp="1"/>
+          </p:cNvSpPr>
+          <p:nvPr>
+            <p:ph type="title"/>
+          </p:nvPr>
+        </p:nvSpPr>
+        <p:spPr/>
+        <p:txBody>
+          <a:bodyPr/>
+          <a:lstStyle/>
+          <a:p>
+            <a:r>
+              <a:rPr lang="en-US" dirty="0"/>
+              <a:t>Team 4 Members</a:t>
+            </a:r>
+          </a:p>
+        </p:txBody>
+      </p:sp>
+      <p:sp>
+        <p:nvSpPr>
+          <p:cNvPr id="3" name="Content Placeholder 2">
+            <a:extLst>
+              <a:ext uri="{FF2B5EF4-FFF2-40B4-BE49-F238E27FC236}">
+                <a16:creationId xmlns:a16="http://schemas.microsoft.com/office/drawing/2014/main" id="{972DF7F2-6300-4BD8-95EB-692BD23F91B4}"/>
+              </a:ext>
+            </a:extLst>
+          </p:cNvPr>
+          <p:cNvSpPr>
+            <a:spLocks noGrp="1"/>
+          </p:cNvSpPr>
+          <p:nvPr>
+            <p:ph idx="1"/>
+          </p:nvPr>
+        </p:nvSpPr>
+        <p:spPr/>
+        <p:txBody>
+          <a:bodyPr/>
+          <a:lstStyle/>
+          <a:p>
+            <a:r>
+              <a:rPr lang="en-US" dirty="0"/>
+              <a:t>Morgan Chastain</a:t>
+            </a:r>
+          </a:p>
+          <a:p>
+            <a:r>
+              <a:rPr lang="en-US" dirty="0"/>
+              <a:t>Michael </a:t>
+            </a:r>
+            <a:r>
+              <a:rPr lang="en-US" dirty="0" err="1"/>
+              <a:t>Megarbane</a:t>
+            </a:r>
+            <a:endParaRPr lang="en-US" dirty="0"/>
+          </a:p>
+          <a:p>
+            <a:r>
+              <a:rPr lang="en-US" dirty="0"/>
+              <a:t>Jason Henry</a:t>
+            </a:r>
+          </a:p>
+        </p:txBody>
+      </p:sp>
+    </p:spTree>
+    <p:extLst>
+      <p:ext uri="{BB962C8B-B14F-4D97-AF65-F5344CB8AC3E}">
+        <p14:creationId xmlns:p14="http://schemas.microsoft.com/office/powerpoint/2010/main" val="554176624"/>
+      </p:ext>
+    </p:extLst>
+  </p:cSld>
+  <p:clrMapOvr>
+    <a:masterClrMapping/>
+  </p:clrMapOvr>
+</p:sld>
+</file>
+
+<file path=ppt/slides/slide3.xml><?xml version="1.0" encoding="utf-8"?>
+<p:sld xmlns:a="http://schemas.openxmlformats.org/drawingml/2006/main" xmlns:r="http://schemas.openxmlformats.org/officeDocument/2006/relationships" xmlns:p="http://schemas.openxmlformats.org/presentationml/2006/main">
+  <p:cSld>
+    <p:spTree>
+      <p:nvGrpSpPr>
+        <p:cNvPr id="1" name=""/>
+        <p:cNvGrpSpPr/>
+        <p:nvPr/>
+      </p:nvGrpSpPr>
+      <p:grpSpPr>
+        <a:xfrm>
+          <a:off x="0" y="0"/>
+          <a:ext cx="0" cy="0"/>
+          <a:chOff x="0" y="0"/>
+          <a:chExt cx="0" cy="0"/>
+        </a:xfrm>
+      </p:grpSpPr>
+      <p:sp>
+        <p:nvSpPr>
+          <p:cNvPr id="2" name="Title 1">
+            <a:extLst>
+              <a:ext uri="{FF2B5EF4-FFF2-40B4-BE49-F238E27FC236}">
                 <a16:creationId xmlns:a16="http://schemas.microsoft.com/office/drawing/2014/main" id="{9DAEA62E-0AA8-4F10-8C64-F554B39D7A84}"/>
               </a:ext>
             </a:extLst>
@@ -12448,7 +9696,7 @@
           <a:p>
             <a:r>
               <a:rPr lang="en-US" dirty="0"/>
-              <a:t>Site Idea/Purpose</a:t>
+              <a:t>Site Concept/Scope</a:t>
             </a:r>
           </a:p>
         </p:txBody>
@@ -12474,7 +9722,37 @@
           <a:bodyPr/>
           <a:lstStyle/>
           <a:p>
-            <a:endParaRPr lang="en-US"/>
+            <a:pPr marL="0" indent="0">
+              <a:buNone/>
+            </a:pPr>
+            <a:r>
+              <a:rPr lang="en-US" dirty="0"/>
+              <a:t>Concept</a:t>
+            </a:r>
+          </a:p>
+          <a:p>
+            <a:r>
+              <a:rPr lang="en-US" dirty="0"/>
+              <a:t>To address a problem many new mothers have….. finding other new moms to connect with.  </a:t>
+            </a:r>
+          </a:p>
+          <a:p>
+            <a:pPr marL="0" indent="0">
+              <a:buNone/>
+            </a:pPr>
+            <a:r>
+              <a:rPr lang="en-US" dirty="0"/>
+              <a:t>Scope</a:t>
+            </a:r>
+          </a:p>
+          <a:p>
+            <a:r>
+              <a:rPr lang="en-US" dirty="0"/>
+              <a:t>The first version of the site will be limited to the Loudoun County, VA region.</a:t>
+            </a:r>
+          </a:p>
+          <a:p>
+            <a:endParaRPr lang="en-US" dirty="0"/>
           </a:p>
         </p:txBody>
       </p:sp>
@@ -12491,7 +9769,169 @@
 </p:sld>
 </file>
 
-<file path=ppt/slides/slide3.xml><?xml version="1.0" encoding="utf-8"?>
+<file path=ppt/slides/slide4.xml><?xml version="1.0" encoding="utf-8"?>
+<p:sld xmlns:a="http://schemas.openxmlformats.org/drawingml/2006/main" xmlns:r="http://schemas.openxmlformats.org/officeDocument/2006/relationships" xmlns:p="http://schemas.openxmlformats.org/presentationml/2006/main">
+  <p:cSld>
+    <p:spTree>
+      <p:nvGrpSpPr>
+        <p:cNvPr id="1" name=""/>
+        <p:cNvGrpSpPr/>
+        <p:nvPr/>
+      </p:nvGrpSpPr>
+      <p:grpSpPr>
+        <a:xfrm>
+          <a:off x="0" y="0"/>
+          <a:ext cx="0" cy="0"/>
+          <a:chOff x="0" y="0"/>
+          <a:chExt cx="0" cy="0"/>
+        </a:xfrm>
+      </p:grpSpPr>
+      <p:sp>
+        <p:nvSpPr>
+          <p:cNvPr id="2" name="Title 1">
+            <a:extLst>
+              <a:ext uri="{FF2B5EF4-FFF2-40B4-BE49-F238E27FC236}">
+                <a16:creationId xmlns:a16="http://schemas.microsoft.com/office/drawing/2014/main" id="{64D1E44F-F2CF-4583-80B8-284F5EF4044F}"/>
+              </a:ext>
+            </a:extLst>
+          </p:cNvPr>
+          <p:cNvSpPr>
+            <a:spLocks noGrp="1"/>
+          </p:cNvSpPr>
+          <p:nvPr>
+            <p:ph type="title"/>
+          </p:nvPr>
+        </p:nvSpPr>
+        <p:spPr/>
+        <p:txBody>
+          <a:bodyPr/>
+          <a:lstStyle/>
+          <a:p>
+            <a:r>
+              <a:rPr lang="en-US" dirty="0"/>
+              <a:t>Technology Stack</a:t>
+            </a:r>
+          </a:p>
+        </p:txBody>
+      </p:sp>
+      <p:sp>
+        <p:nvSpPr>
+          <p:cNvPr id="3" name="Content Placeholder 2">
+            <a:extLst>
+              <a:ext uri="{FF2B5EF4-FFF2-40B4-BE49-F238E27FC236}">
+                <a16:creationId xmlns:a16="http://schemas.microsoft.com/office/drawing/2014/main" id="{70BD9D51-78E8-4100-A50D-2369B8F2C276}"/>
+              </a:ext>
+            </a:extLst>
+          </p:cNvPr>
+          <p:cNvSpPr>
+            <a:spLocks noGrp="1"/>
+          </p:cNvSpPr>
+          <p:nvPr>
+            <p:ph idx="1"/>
+          </p:nvPr>
+        </p:nvSpPr>
+        <p:spPr/>
+        <p:txBody>
+          <a:bodyPr>
+            <a:normAutofit fontScale="92500" lnSpcReduction="10000"/>
+          </a:bodyPr>
+          <a:lstStyle/>
+          <a:p>
+            <a:r>
+              <a:rPr lang="en-US" dirty="0"/>
+              <a:t>Html</a:t>
+            </a:r>
+          </a:p>
+          <a:p>
+            <a:r>
+              <a:rPr lang="en-US" dirty="0" err="1"/>
+              <a:t>Css</a:t>
+            </a:r>
+            <a:endParaRPr lang="en-US" dirty="0"/>
+          </a:p>
+          <a:p>
+            <a:r>
+              <a:rPr lang="en-US" dirty="0"/>
+              <a:t>Bootstrap</a:t>
+            </a:r>
+          </a:p>
+          <a:p>
+            <a:r>
+              <a:rPr lang="en-US" dirty="0" err="1"/>
+              <a:t>Javascript</a:t>
+            </a:r>
+            <a:endParaRPr lang="en-US" dirty="0"/>
+          </a:p>
+          <a:p>
+            <a:r>
+              <a:rPr lang="en-US" dirty="0" err="1"/>
+              <a:t>Jquery</a:t>
+            </a:r>
+            <a:endParaRPr lang="en-US" dirty="0"/>
+          </a:p>
+          <a:p>
+            <a:r>
+              <a:rPr lang="en-US" dirty="0"/>
+              <a:t>Google maps – Geocoding and </a:t>
+            </a:r>
+            <a:r>
+              <a:rPr lang="en-US" dirty="0" err="1"/>
+              <a:t>realtime</a:t>
+            </a:r>
+            <a:r>
+              <a:rPr lang="en-US" dirty="0"/>
+              <a:t> mapping APIs</a:t>
+            </a:r>
+          </a:p>
+          <a:p>
+            <a:r>
+              <a:rPr lang="en-US" dirty="0"/>
+              <a:t>Event site – some text about what this is</a:t>
+            </a:r>
+          </a:p>
+          <a:p>
+            <a:r>
+              <a:rPr lang="en-US" dirty="0"/>
+              <a:t>Firebase – NoSQL Database service</a:t>
+            </a:r>
+          </a:p>
+          <a:p>
+            <a:r>
+              <a:rPr lang="en-US" dirty="0"/>
+              <a:t>Collaboration</a:t>
+            </a:r>
+          </a:p>
+          <a:p>
+            <a:pPr lvl="1"/>
+            <a:r>
+              <a:rPr lang="en-US" dirty="0" err="1"/>
+              <a:t>Github</a:t>
+            </a:r>
+            <a:r>
+              <a:rPr lang="en-US" dirty="0"/>
+              <a:t> – Source code control/repo</a:t>
+            </a:r>
+          </a:p>
+          <a:p>
+            <a:pPr lvl="1"/>
+            <a:endParaRPr lang="en-US" dirty="0"/>
+          </a:p>
+        </p:txBody>
+      </p:sp>
+    </p:spTree>
+    <p:extLst>
+      <p:ext uri="{BB962C8B-B14F-4D97-AF65-F5344CB8AC3E}">
+        <p14:creationId xmlns:p14="http://schemas.microsoft.com/office/powerpoint/2010/main" val="1242047116"/>
+      </p:ext>
+    </p:extLst>
+  </p:cSld>
+  <p:clrMapOvr>
+    <a:masterClrMapping/>
+  </p:clrMapOvr>
+</p:sld>
+</file>
+
+<file path=ppt/slides/slide5.xml><?xml version="1.0" encoding="utf-8"?>
 <p:sld xmlns:a="http://schemas.openxmlformats.org/drawingml/2006/main" xmlns:r="http://schemas.openxmlformats.org/officeDocument/2006/relationships" xmlns:p="http://schemas.openxmlformats.org/presentationml/2006/main">
   <p:cSld>
     <p:spTree>
@@ -12531,7 +9971,7 @@
           <a:p>
             <a:r>
               <a:rPr lang="en-US" dirty="0"/>
-              <a:t>Features and APIs</a:t>
+              <a:t>Features</a:t>
             </a:r>
           </a:p>
         </p:txBody>
@@ -12554,10 +9994,89 @@
         </p:nvSpPr>
         <p:spPr/>
         <p:txBody>
-          <a:bodyPr/>
+          <a:bodyPr>
+            <a:normAutofit fontScale="92500" lnSpcReduction="10000"/>
+          </a:bodyPr>
           <a:lstStyle/>
           <a:p>
-            <a:endParaRPr lang="en-US"/>
+            <a:r>
+              <a:rPr lang="en-US" dirty="0"/>
+              <a:t>User Login</a:t>
+            </a:r>
+          </a:p>
+          <a:p>
+            <a:pPr lvl="1"/>
+            <a:r>
+              <a:rPr lang="en-US" dirty="0"/>
+              <a:t>Validates user information from Firebase data source</a:t>
+            </a:r>
+          </a:p>
+          <a:p>
+            <a:r>
+              <a:rPr lang="en-US" dirty="0"/>
+              <a:t>User Registration</a:t>
+            </a:r>
+          </a:p>
+          <a:p>
+            <a:pPr lvl="1"/>
+            <a:r>
+              <a:rPr lang="en-US" dirty="0"/>
+              <a:t>Validates and saves new member information to Firebase data source</a:t>
+            </a:r>
+          </a:p>
+          <a:p>
+            <a:r>
+              <a:rPr lang="en-US" dirty="0"/>
+              <a:t>View Members</a:t>
+            </a:r>
+          </a:p>
+          <a:p>
+            <a:pPr lvl="1"/>
+            <a:r>
+              <a:rPr lang="en-US" dirty="0"/>
+              <a:t>Pulls Mom’s connect members from </a:t>
+            </a:r>
+            <a:r>
+              <a:rPr lang="en-US" dirty="0" err="1"/>
+              <a:t>Fiebase</a:t>
+            </a:r>
+            <a:r>
+              <a:rPr lang="en-US" dirty="0"/>
+              <a:t> for review</a:t>
+            </a:r>
+          </a:p>
+          <a:p>
+            <a:r>
+              <a:rPr lang="en-US" dirty="0"/>
+              <a:t>Parks listing</a:t>
+            </a:r>
+          </a:p>
+          <a:p>
+            <a:pPr lvl="1"/>
+            <a:r>
+              <a:rPr lang="en-US" dirty="0"/>
+              <a:t>Pulls park information from Firebase</a:t>
+            </a:r>
+          </a:p>
+          <a:p>
+            <a:pPr lvl="1"/>
+            <a:r>
+              <a:rPr lang="en-US" dirty="0"/>
+              <a:t>Calls google maps API to show location based on geocode reference data</a:t>
+            </a:r>
+          </a:p>
+          <a:p>
+            <a:r>
+              <a:rPr lang="en-US" dirty="0"/>
+              <a:t>Local Active Groups</a:t>
+            </a:r>
+          </a:p>
+          <a:p>
+            <a:pPr lvl="1"/>
+            <a:r>
+              <a:rPr lang="en-US" dirty="0"/>
+              <a:t>Pulls local group information from API call to XXXXX</a:t>
+            </a:r>
           </a:p>
         </p:txBody>
       </p:sp>
@@ -12574,7 +10093,7 @@
 </p:sld>
 </file>
 
-<file path=ppt/slides/slide4.xml><?xml version="1.0" encoding="utf-8"?>
+<file path=ppt/slides/slide6.xml><?xml version="1.0" encoding="utf-8"?>
 <p:sld xmlns:a="http://schemas.openxmlformats.org/drawingml/2006/main" xmlns:r="http://schemas.openxmlformats.org/officeDocument/2006/relationships" xmlns:p="http://schemas.openxmlformats.org/presentationml/2006/main">
   <p:cSld>
     <p:spTree>
@@ -12654,95 +10173,6 @@
     <p:extLst>
       <p:ext uri="{BB962C8B-B14F-4D97-AF65-F5344CB8AC3E}">
         <p14:creationId xmlns:p14="http://schemas.microsoft.com/office/powerpoint/2010/main" val="314109675"/>
-      </p:ext>
-    </p:extLst>
-  </p:cSld>
-  <p:clrMapOvr>
-    <a:masterClrMapping/>
-  </p:clrMapOvr>
-</p:sld>
-</file>
-
-<file path=ppt/slides/slide5.xml><?xml version="1.0" encoding="utf-8"?>
-<p:sld xmlns:a="http://schemas.openxmlformats.org/drawingml/2006/main" xmlns:r="http://schemas.openxmlformats.org/officeDocument/2006/relationships" xmlns:p="http://schemas.openxmlformats.org/presentationml/2006/main">
-  <p:cSld>
-    <p:spTree>
-      <p:nvGrpSpPr>
-        <p:cNvPr id="1" name=""/>
-        <p:cNvGrpSpPr/>
-        <p:nvPr/>
-      </p:nvGrpSpPr>
-      <p:grpSpPr>
-        <a:xfrm>
-          <a:off x="0" y="0"/>
-          <a:ext cx="0" cy="0"/>
-          <a:chOff x="0" y="0"/>
-          <a:chExt cx="0" cy="0"/>
-        </a:xfrm>
-      </p:grpSpPr>
-      <p:sp>
-        <p:nvSpPr>
-          <p:cNvPr id="2" name="Title 1">
-            <a:extLst>
-              <a:ext uri="{FF2B5EF4-FFF2-40B4-BE49-F238E27FC236}">
-                <a16:creationId xmlns:a16="http://schemas.microsoft.com/office/drawing/2014/main" id="{64D1E44F-F2CF-4583-80B8-284F5EF4044F}"/>
-              </a:ext>
-            </a:extLst>
-          </p:cNvPr>
-          <p:cNvSpPr>
-            <a:spLocks noGrp="1"/>
-          </p:cNvSpPr>
-          <p:nvPr>
-            <p:ph type="title"/>
-          </p:nvPr>
-        </p:nvSpPr>
-        <p:spPr/>
-        <p:txBody>
-          <a:bodyPr/>
-          <a:lstStyle/>
-          <a:p>
-            <a:r>
-              <a:rPr lang="en-US" dirty="0"/>
-              <a:t>Technology Stack</a:t>
-            </a:r>
-          </a:p>
-        </p:txBody>
-      </p:sp>
-      <p:graphicFrame>
-        <p:nvGraphicFramePr>
-          <p:cNvPr id="4" name="Content Placeholder 3">
-            <a:extLst>
-              <a:ext uri="{FF2B5EF4-FFF2-40B4-BE49-F238E27FC236}">
-                <a16:creationId xmlns:a16="http://schemas.microsoft.com/office/drawing/2014/main" id="{BDB2C774-1B62-4F0B-8F2C-4491DF354858}"/>
-              </a:ext>
-            </a:extLst>
-          </p:cNvPr>
-          <p:cNvGraphicFramePr>
-            <a:graphicFrameLocks noGrp="1"/>
-          </p:cNvGraphicFramePr>
-          <p:nvPr>
-            <p:ph idx="1"/>
-            <p:extLst>
-              <p:ext uri="{D42A27DB-BD31-4B8C-83A1-F6EECF244321}">
-                <p14:modId xmlns:p14="http://schemas.microsoft.com/office/powerpoint/2010/main" val="3847911186"/>
-              </p:ext>
-            </p:extLst>
-          </p:nvPr>
-        </p:nvGraphicFramePr>
-        <p:xfrm>
-          <a:off x="838200" y="1825625"/>
-          <a:ext cx="10515600" cy="4351338"/>
-        </p:xfrm>
-        <a:graphic>
-          <a:graphicData uri="http://schemas.openxmlformats.org/drawingml/2006/diagram">
-            <dgm:relIds xmlns:dgm="http://schemas.openxmlformats.org/drawingml/2006/diagram" xmlns:r="http://schemas.openxmlformats.org/officeDocument/2006/relationships" r:dm="rId2" r:lo="rId3" r:qs="rId4" r:cs="rId5"/>
-          </a:graphicData>
-        </a:graphic>
-      </p:graphicFrame>
-    </p:spTree>
-    <p:extLst>
-      <p:ext uri="{BB962C8B-B14F-4D97-AF65-F5344CB8AC3E}">
-        <p14:creationId xmlns:p14="http://schemas.microsoft.com/office/powerpoint/2010/main" val="1242047116"/>
       </p:ext>
     </p:extLst>
   </p:cSld>
@@ -13045,4 +10475,299 @@
     </a:ext>
   </a:extLst>
 </a:theme>
+</file>
+
+<file path=ppt/theme/theme2.xml><?xml version="1.0" encoding="utf-8"?>
+<a:theme xmlns:a="http://schemas.openxmlformats.org/drawingml/2006/main" name="Office Theme">
+  <a:themeElements>
+    <a:clrScheme name="Office">
+      <a:dk1>
+        <a:sysClr val="windowText" lastClr="000000"/>
+      </a:dk1>
+      <a:lt1>
+        <a:sysClr val="window" lastClr="FFFFFF"/>
+      </a:lt1>
+      <a:dk2>
+        <a:srgbClr val="44546A"/>
+      </a:dk2>
+      <a:lt2>
+        <a:srgbClr val="E7E6E6"/>
+      </a:lt2>
+      <a:accent1>
+        <a:srgbClr val="4472C4"/>
+      </a:accent1>
+      <a:accent2>
+        <a:srgbClr val="ED7D31"/>
+      </a:accent2>
+      <a:accent3>
+        <a:srgbClr val="A5A5A5"/>
+      </a:accent3>
+      <a:accent4>
+        <a:srgbClr val="FFC000"/>
+      </a:accent4>
+      <a:accent5>
+        <a:srgbClr val="5B9BD5"/>
+      </a:accent5>
+      <a:accent6>
+        <a:srgbClr val="70AD47"/>
+      </a:accent6>
+      <a:hlink>
+        <a:srgbClr val="0563C1"/>
+      </a:hlink>
+      <a:folHlink>
+        <a:srgbClr val="954F72"/>
+      </a:folHlink>
+    </a:clrScheme>
+    <a:fontScheme name="Office">
+      <a:majorFont>
+        <a:latin typeface="Calibri Light" panose="020F0302020204030204"/>
+        <a:ea typeface=""/>
+        <a:cs typeface=""/>
+        <a:font script="Jpan" typeface="游ゴシック Light"/>
+        <a:font script="Hang" typeface="맑은 고딕"/>
+        <a:font script="Hans" typeface="等线 Light"/>
+        <a:font script="Hant" typeface="新細明體"/>
+        <a:font script="Arab" typeface="Times New Roman"/>
+        <a:font script="Hebr" typeface="Times New Roman"/>
+        <a:font script="Thai" typeface="Angsana New"/>
+        <a:font script="Ethi" typeface="Nyala"/>
+        <a:font script="Beng" typeface="Vrinda"/>
+        <a:font script="Gujr" typeface="Shruti"/>
+        <a:font script="Khmr" typeface="MoolBoran"/>
+        <a:font script="Knda" typeface="Tunga"/>
+        <a:font script="Guru" typeface="Raavi"/>
+        <a:font script="Cans" typeface="Euphemia"/>
+        <a:font script="Cher" typeface="Plantagenet Cherokee"/>
+        <a:font script="Yiii" typeface="Microsoft Yi Baiti"/>
+        <a:font script="Tibt" typeface="Microsoft Himalaya"/>
+        <a:font script="Thaa" typeface="MV Boli"/>
+        <a:font script="Deva" typeface="Mangal"/>
+        <a:font script="Telu" typeface="Gautami"/>
+        <a:font script="Taml" typeface="Latha"/>
+        <a:font script="Syrc" typeface="Estrangelo Edessa"/>
+        <a:font script="Orya" typeface="Kalinga"/>
+        <a:font script="Mlym" typeface="Kartika"/>
+        <a:font script="Laoo" typeface="DokChampa"/>
+        <a:font script="Sinh" typeface="Iskoola Pota"/>
+        <a:font script="Mong" typeface="Mongolian Baiti"/>
+        <a:font script="Viet" typeface="Times New Roman"/>
+        <a:font script="Uigh" typeface="Microsoft Uighur"/>
+        <a:font script="Geor" typeface="Sylfaen"/>
+        <a:font script="Armn" typeface="Arial"/>
+        <a:font script="Bugi" typeface="Leelawadee UI"/>
+        <a:font script="Bopo" typeface="Microsoft JhengHei"/>
+        <a:font script="Java" typeface="Javanese Text"/>
+        <a:font script="Lisu" typeface="Segoe UI"/>
+        <a:font script="Mymr" typeface="Myanmar Text"/>
+        <a:font script="Nkoo" typeface="Ebrima"/>
+        <a:font script="Olck" typeface="Nirmala UI"/>
+        <a:font script="Osma" typeface="Ebrima"/>
+        <a:font script="Phag" typeface="Phagspa"/>
+        <a:font script="Syrn" typeface="Estrangelo Edessa"/>
+        <a:font script="Syrj" typeface="Estrangelo Edessa"/>
+        <a:font script="Syre" typeface="Estrangelo Edessa"/>
+        <a:font script="Sora" typeface="Nirmala UI"/>
+        <a:font script="Tale" typeface="Microsoft Tai Le"/>
+        <a:font script="Talu" typeface="Microsoft New Tai Lue"/>
+        <a:font script="Tfng" typeface="Ebrima"/>
+      </a:majorFont>
+      <a:minorFont>
+        <a:latin typeface="Calibri" panose="020F0502020204030204"/>
+        <a:ea typeface=""/>
+        <a:cs typeface=""/>
+        <a:font script="Jpan" typeface="游ゴシック"/>
+        <a:font script="Hang" typeface="맑은 고딕"/>
+        <a:font script="Hans" typeface="等线"/>
+        <a:font script="Hant" typeface="新細明體"/>
+        <a:font script="Arab" typeface="Arial"/>
+        <a:font script="Hebr" typeface="Arial"/>
+        <a:font script="Thai" typeface="Cordia New"/>
+        <a:font script="Ethi" typeface="Nyala"/>
+        <a:font script="Beng" typeface="Vrinda"/>
+        <a:font script="Gujr" typeface="Shruti"/>
+        <a:font script="Khmr" typeface="DaunPenh"/>
+        <a:font script="Knda" typeface="Tunga"/>
+        <a:font script="Guru" typeface="Raavi"/>
+        <a:font script="Cans" typeface="Euphemia"/>
+        <a:font script="Cher" typeface="Plantagenet Cherokee"/>
+        <a:font script="Yiii" typeface="Microsoft Yi Baiti"/>
+        <a:font script="Tibt" typeface="Microsoft Himalaya"/>
+        <a:font script="Thaa" typeface="MV Boli"/>
+        <a:font script="Deva" typeface="Mangal"/>
+        <a:font script="Telu" typeface="Gautami"/>
+        <a:font script="Taml" typeface="Latha"/>
+        <a:font script="Syrc" typeface="Estrangelo Edessa"/>
+        <a:font script="Orya" typeface="Kalinga"/>
+        <a:font script="Mlym" typeface="Kartika"/>
+        <a:font script="Laoo" typeface="DokChampa"/>
+        <a:font script="Sinh" typeface="Iskoola Pota"/>
+        <a:font script="Mong" typeface="Mongolian Baiti"/>
+        <a:font script="Viet" typeface="Arial"/>
+        <a:font script="Uigh" typeface="Microsoft Uighur"/>
+        <a:font script="Geor" typeface="Sylfaen"/>
+        <a:font script="Armn" typeface="Arial"/>
+        <a:font script="Bugi" typeface="Leelawadee UI"/>
+        <a:font script="Bopo" typeface="Microsoft JhengHei"/>
+        <a:font script="Java" typeface="Javanese Text"/>
+        <a:font script="Lisu" typeface="Segoe UI"/>
+        <a:font script="Mymr" typeface="Myanmar Text"/>
+        <a:font script="Nkoo" typeface="Ebrima"/>
+        <a:font script="Olck" typeface="Nirmala UI"/>
+        <a:font script="Osma" typeface="Ebrima"/>
+        <a:font script="Phag" typeface="Phagspa"/>
+        <a:font script="Syrn" typeface="Estrangelo Edessa"/>
+        <a:font script="Syrj" typeface="Estrangelo Edessa"/>
+        <a:font script="Syre" typeface="Estrangelo Edessa"/>
+        <a:font script="Sora" typeface="Nirmala UI"/>
+        <a:font script="Tale" typeface="Microsoft Tai Le"/>
+        <a:font script="Talu" typeface="Microsoft New Tai Lue"/>
+        <a:font script="Tfng" typeface="Ebrima"/>
+      </a:minorFont>
+    </a:fontScheme>
+    <a:fmtScheme name="Office">
+      <a:fillStyleLst>
+        <a:solidFill>
+          <a:schemeClr val="phClr"/>
+        </a:solidFill>
+        <a:gradFill rotWithShape="1">
+          <a:gsLst>
+            <a:gs pos="0">
+              <a:schemeClr val="phClr">
+                <a:lumMod val="110000"/>
+                <a:satMod val="105000"/>
+                <a:tint val="67000"/>
+              </a:schemeClr>
+            </a:gs>
+            <a:gs pos="50000">
+              <a:schemeClr val="phClr">
+                <a:lumMod val="105000"/>
+                <a:satMod val="103000"/>
+                <a:tint val="73000"/>
+              </a:schemeClr>
+            </a:gs>
+            <a:gs pos="100000">
+              <a:schemeClr val="phClr">
+                <a:lumMod val="105000"/>
+                <a:satMod val="109000"/>
+                <a:tint val="81000"/>
+              </a:schemeClr>
+            </a:gs>
+          </a:gsLst>
+          <a:lin ang="5400000" scaled="0"/>
+        </a:gradFill>
+        <a:gradFill rotWithShape="1">
+          <a:gsLst>
+            <a:gs pos="0">
+              <a:schemeClr val="phClr">
+                <a:satMod val="103000"/>
+                <a:lumMod val="102000"/>
+                <a:tint val="94000"/>
+              </a:schemeClr>
+            </a:gs>
+            <a:gs pos="50000">
+              <a:schemeClr val="phClr">
+                <a:satMod val="110000"/>
+                <a:lumMod val="100000"/>
+                <a:shade val="100000"/>
+              </a:schemeClr>
+            </a:gs>
+            <a:gs pos="100000">
+              <a:schemeClr val="phClr">
+                <a:lumMod val="99000"/>
+                <a:satMod val="120000"/>
+                <a:shade val="78000"/>
+              </a:schemeClr>
+            </a:gs>
+          </a:gsLst>
+          <a:lin ang="5400000" scaled="0"/>
+        </a:gradFill>
+      </a:fillStyleLst>
+      <a:lnStyleLst>
+        <a:ln w="6350" cap="flat" cmpd="sng" algn="ctr">
+          <a:solidFill>
+            <a:schemeClr val="phClr"/>
+          </a:solidFill>
+          <a:prstDash val="solid"/>
+          <a:miter lim="800000"/>
+        </a:ln>
+        <a:ln w="12700" cap="flat" cmpd="sng" algn="ctr">
+          <a:solidFill>
+            <a:schemeClr val="phClr"/>
+          </a:solidFill>
+          <a:prstDash val="solid"/>
+          <a:miter lim="800000"/>
+        </a:ln>
+        <a:ln w="19050" cap="flat" cmpd="sng" algn="ctr">
+          <a:solidFill>
+            <a:schemeClr val="phClr"/>
+          </a:solidFill>
+          <a:prstDash val="solid"/>
+          <a:miter lim="800000"/>
+        </a:ln>
+      </a:lnStyleLst>
+      <a:effectStyleLst>
+        <a:effectStyle>
+          <a:effectLst/>
+        </a:effectStyle>
+        <a:effectStyle>
+          <a:effectLst/>
+        </a:effectStyle>
+        <a:effectStyle>
+          <a:effectLst>
+            <a:outerShdw blurRad="57150" dist="19050" dir="5400000" algn="ctr" rotWithShape="0">
+              <a:srgbClr val="000000">
+                <a:alpha val="63000"/>
+              </a:srgbClr>
+            </a:outerShdw>
+          </a:effectLst>
+        </a:effectStyle>
+      </a:effectStyleLst>
+      <a:bgFillStyleLst>
+        <a:solidFill>
+          <a:schemeClr val="phClr"/>
+        </a:solidFill>
+        <a:solidFill>
+          <a:schemeClr val="phClr">
+            <a:tint val="95000"/>
+            <a:satMod val="170000"/>
+          </a:schemeClr>
+        </a:solidFill>
+        <a:gradFill rotWithShape="1">
+          <a:gsLst>
+            <a:gs pos="0">
+              <a:schemeClr val="phClr">
+                <a:tint val="93000"/>
+                <a:satMod val="150000"/>
+                <a:shade val="98000"/>
+                <a:lumMod val="102000"/>
+              </a:schemeClr>
+            </a:gs>
+            <a:gs pos="50000">
+              <a:schemeClr val="phClr">
+                <a:tint val="98000"/>
+                <a:satMod val="130000"/>
+                <a:shade val="90000"/>
+                <a:lumMod val="103000"/>
+              </a:schemeClr>
+            </a:gs>
+            <a:gs pos="100000">
+              <a:schemeClr val="phClr">
+                <a:shade val="63000"/>
+                <a:satMod val="120000"/>
+              </a:schemeClr>
+            </a:gs>
+          </a:gsLst>
+          <a:lin ang="5400000" scaled="0"/>
+        </a:gradFill>
+      </a:bgFillStyleLst>
+    </a:fmtScheme>
+  </a:themeElements>
+  <a:objectDefaults/>
+  <a:extraClrSchemeLst/>
+  <a:extLst>
+    <a:ext uri="{05A4C25C-085E-4340-85A3-A5531E510DB2}">
+      <thm15:themeFamily xmlns:thm15="http://schemas.microsoft.com/office/thememl/2012/main" name="Office Theme" id="{62F939B6-93AF-4DB8-9C6B-D6C7DFDC589F}" vid="{4A3C46E8-61CC-4603-A589-7422A47A8E4A}"/>
+    </a:ext>
+  </a:extLst>
+</a:theme>
 </file>
</xml_diff>

<commit_message>
updated contact images social media
</commit_message>
<xml_diff>
--- a/Presentation1.pptx
+++ b/Presentation1.pptx
@@ -116,6 +116,9 @@
     <p:ext uri="{EFAFB233-063F-42B5-8137-9DF3F51BA10A}">
       <p15:sldGuideLst xmlns:p15="http://schemas.microsoft.com/office/powerpoint/2012/main"/>
     </p:ext>
+    <p:ext uri="{2D200454-40CA-4A62-9FC3-DE9A4176ACB9}">
+      <p15:notesGuideLst xmlns:p15="http://schemas.microsoft.com/office/powerpoint/2012/main"/>
+    </p:ext>
   </p:extLst>
 </p:presentation>
 </file>
@@ -875,7 +878,7 @@
 <dgm:dataModel xmlns:dgm="http://schemas.openxmlformats.org/drawingml/2006/diagram" xmlns:a="http://schemas.openxmlformats.org/drawingml/2006/main">
   <dgm:ptLst>
     <dgm:pt modelId="{1D935358-EA2F-4BB5-B672-F3901DA6C92F}" type="doc">
-      <dgm:prSet loTypeId="urn:microsoft.com/office/officeart/2008/layout/NameandTitleOrganizationalChart" loCatId="hierarchy" qsTypeId="urn:microsoft.com/office/officeart/2005/8/quickstyle/simple1" qsCatId="simple" csTypeId="urn:microsoft.com/office/officeart/2005/8/colors/accent1_2" csCatId="accent1" phldr="1"/>
+      <dgm:prSet loTypeId="urn:microsoft.com/office/officeart/2005/8/layout/hierarchy6" loCatId="hierarchy" qsTypeId="urn:microsoft.com/office/officeart/2005/8/quickstyle/simple1" qsCatId="simple" csTypeId="urn:microsoft.com/office/officeart/2005/8/colors/accent1_2" csCatId="accent1" phldr="1"/>
       <dgm:spPr/>
       <dgm:t>
         <a:bodyPr/>
@@ -911,178 +914,6 @@
       </dgm:t>
     </dgm:pt>
     <dgm:pt modelId="{3C4F18BB-FF2A-4D58-A1C7-ED4E3AAFC1FB}" type="sibTrans" cxnId="{E2CF52D3-1858-4FB1-A9FC-4295CC43F5C4}">
-      <dgm:prSet/>
-      <dgm:spPr/>
-      <dgm:t>
-        <a:bodyPr/>
-        <a:lstStyle/>
-        <a:p>
-          <a:endParaRPr lang="en-US"/>
-        </a:p>
-      </dgm:t>
-    </dgm:pt>
-    <dgm:pt modelId="{5BC05B46-0C29-4999-A747-2413AA95AA1E}" type="asst">
-      <dgm:prSet phldrT="[Text]"/>
-      <dgm:spPr/>
-      <dgm:t>
-        <a:bodyPr/>
-        <a:lstStyle/>
-        <a:p>
-          <a:r>
-            <a:rPr lang="en-US" dirty="0"/>
-            <a:t>Events</a:t>
-          </a:r>
-        </a:p>
-      </dgm:t>
-    </dgm:pt>
-    <dgm:pt modelId="{5C2C8788-6EDB-4B1C-8D92-0157F2241CAB}" type="parTrans" cxnId="{1B424579-96D4-4F44-A567-7797C9683C5A}">
-      <dgm:prSet/>
-      <dgm:spPr/>
-      <dgm:t>
-        <a:bodyPr/>
-        <a:lstStyle/>
-        <a:p>
-          <a:endParaRPr lang="en-US"/>
-        </a:p>
-      </dgm:t>
-    </dgm:pt>
-    <dgm:pt modelId="{6C47FC16-E08D-47D4-ACD0-95004A46C094}" type="sibTrans" cxnId="{1B424579-96D4-4F44-A567-7797C9683C5A}">
-      <dgm:prSet/>
-      <dgm:spPr/>
-      <dgm:t>
-        <a:bodyPr/>
-        <a:lstStyle/>
-        <a:p>
-          <a:endParaRPr lang="en-US"/>
-        </a:p>
-      </dgm:t>
-    </dgm:pt>
-    <dgm:pt modelId="{B3DD6697-12CA-4F69-9ECA-30450B8C8F87}">
-      <dgm:prSet phldrT="[Text]" phldr="1"/>
-      <dgm:spPr/>
-      <dgm:t>
-        <a:bodyPr/>
-        <a:lstStyle/>
-        <a:p>
-          <a:endParaRPr lang="en-US" dirty="0"/>
-        </a:p>
-      </dgm:t>
-    </dgm:pt>
-    <dgm:pt modelId="{2BACDB74-68BC-46B0-9082-4870D3EEDDF7}" type="parTrans" cxnId="{DE9C649D-09F2-4A10-82A4-7979AA366A0D}">
-      <dgm:prSet/>
-      <dgm:spPr/>
-      <dgm:t>
-        <a:bodyPr/>
-        <a:lstStyle/>
-        <a:p>
-          <a:endParaRPr lang="en-US"/>
-        </a:p>
-      </dgm:t>
-    </dgm:pt>
-    <dgm:pt modelId="{A2758F12-CFA1-4AF9-8C0F-F37075F04D02}" type="sibTrans" cxnId="{DE9C649D-09F2-4A10-82A4-7979AA366A0D}">
-      <dgm:prSet/>
-      <dgm:spPr/>
-      <dgm:t>
-        <a:bodyPr/>
-        <a:lstStyle/>
-        <a:p>
-          <a:endParaRPr lang="en-US"/>
-        </a:p>
-      </dgm:t>
-    </dgm:pt>
-    <dgm:pt modelId="{AF04E6C3-481B-4261-BA90-9DFF6F7188D3}">
-      <dgm:prSet phldrT="[Text]" phldr="1"/>
-      <dgm:spPr/>
-      <dgm:t>
-        <a:bodyPr/>
-        <a:lstStyle/>
-        <a:p>
-          <a:endParaRPr lang="en-US"/>
-        </a:p>
-      </dgm:t>
-    </dgm:pt>
-    <dgm:pt modelId="{9F9F8C06-D272-4539-AEF8-30C633A1CCDB}" type="parTrans" cxnId="{DAC0CABD-AA07-4865-B7FF-88F5F729BC02}">
-      <dgm:prSet/>
-      <dgm:spPr/>
-      <dgm:t>
-        <a:bodyPr/>
-        <a:lstStyle/>
-        <a:p>
-          <a:endParaRPr lang="en-US"/>
-        </a:p>
-      </dgm:t>
-    </dgm:pt>
-    <dgm:pt modelId="{E6019557-29F8-4A36-AAD3-06C8D7DCD97A}" type="sibTrans" cxnId="{DAC0CABD-AA07-4865-B7FF-88F5F729BC02}">
-      <dgm:prSet/>
-      <dgm:spPr/>
-      <dgm:t>
-        <a:bodyPr/>
-        <a:lstStyle/>
-        <a:p>
-          <a:endParaRPr lang="en-US"/>
-        </a:p>
-      </dgm:t>
-    </dgm:pt>
-    <dgm:pt modelId="{27F0FE99-366C-41D5-9669-5E0F5BD96B42}">
-      <dgm:prSet phldrT="[Text]" phldr="1"/>
-      <dgm:spPr/>
-      <dgm:t>
-        <a:bodyPr/>
-        <a:lstStyle/>
-        <a:p>
-          <a:endParaRPr lang="en-US"/>
-        </a:p>
-      </dgm:t>
-    </dgm:pt>
-    <dgm:pt modelId="{5F5112E3-A378-4DB5-ACBE-AAF947BD9DF1}" type="parTrans" cxnId="{69129C70-2734-44D5-9A0D-8D58255E1808}">
-      <dgm:prSet/>
-      <dgm:spPr/>
-      <dgm:t>
-        <a:bodyPr/>
-        <a:lstStyle/>
-        <a:p>
-          <a:endParaRPr lang="en-US"/>
-        </a:p>
-      </dgm:t>
-    </dgm:pt>
-    <dgm:pt modelId="{1D45301E-AFFA-41A0-A3BC-E9198A860029}" type="sibTrans" cxnId="{69129C70-2734-44D5-9A0D-8D58255E1808}">
-      <dgm:prSet/>
-      <dgm:spPr/>
-      <dgm:t>
-        <a:bodyPr/>
-        <a:lstStyle/>
-        <a:p>
-          <a:endParaRPr lang="en-US"/>
-        </a:p>
-      </dgm:t>
-    </dgm:pt>
-    <dgm:pt modelId="{3786B665-C0D1-4818-A187-73C0466DDAF0}" type="asst">
-      <dgm:prSet phldrT="[Text]"/>
-      <dgm:spPr/>
-      <dgm:t>
-        <a:bodyPr/>
-        <a:lstStyle/>
-        <a:p>
-          <a:r>
-            <a:rPr lang="en-US" dirty="0" err="1"/>
-            <a:t>MeetUps</a:t>
-          </a:r>
-          <a:endParaRPr lang="en-US" dirty="0"/>
-        </a:p>
-      </dgm:t>
-    </dgm:pt>
-    <dgm:pt modelId="{FFDC85F9-33F6-41B1-9FAE-563F101C4C0A}" type="parTrans" cxnId="{20DB19CE-44FE-43C2-87E5-E2A1BA849874}">
-      <dgm:prSet/>
-      <dgm:spPr/>
-      <dgm:t>
-        <a:bodyPr/>
-        <a:lstStyle/>
-        <a:p>
-          <a:endParaRPr lang="en-US"/>
-        </a:p>
-      </dgm:t>
-    </dgm:pt>
-    <dgm:pt modelId="{2B2FD583-5434-4E03-8D3C-74676C96DC8E}" type="sibTrans" cxnId="{20DB19CE-44FE-43C2-87E5-E2A1BA849874}">
       <dgm:prSet/>
       <dgm:spPr/>
       <dgm:t>
@@ -1129,42 +960,6 @@
         </a:p>
       </dgm:t>
     </dgm:pt>
-    <dgm:pt modelId="{D0B9E4B9-24FD-4BF3-A877-34012B7178F9}" type="asst">
-      <dgm:prSet phldrT="[Text]"/>
-      <dgm:spPr/>
-      <dgm:t>
-        <a:bodyPr/>
-        <a:lstStyle/>
-        <a:p>
-          <a:r>
-            <a:rPr lang="en-US" dirty="0"/>
-            <a:t>Playground Locations</a:t>
-          </a:r>
-        </a:p>
-      </dgm:t>
-    </dgm:pt>
-    <dgm:pt modelId="{4D8DFFA5-D8F1-4364-85A5-855E10B65E61}" type="parTrans" cxnId="{C4CA0DDB-AC9D-40A2-9630-0D0047754310}">
-      <dgm:prSet/>
-      <dgm:spPr/>
-      <dgm:t>
-        <a:bodyPr/>
-        <a:lstStyle/>
-        <a:p>
-          <a:endParaRPr lang="en-US"/>
-        </a:p>
-      </dgm:t>
-    </dgm:pt>
-    <dgm:pt modelId="{94076EB5-61DF-418D-98B4-8247E5F4A0C2}" type="sibTrans" cxnId="{C4CA0DDB-AC9D-40A2-9630-0D0047754310}">
-      <dgm:prSet/>
-      <dgm:spPr/>
-      <dgm:t>
-        <a:bodyPr/>
-        <a:lstStyle/>
-        <a:p>
-          <a:endParaRPr lang="en-US"/>
-        </a:p>
-      </dgm:t>
-    </dgm:pt>
     <dgm:pt modelId="{BE0CB87B-5EA2-4B65-978F-1F3F2606237B}" type="asst">
       <dgm:prSet phldrT="[Text]"/>
       <dgm:spPr/>
@@ -1174,7 +969,7 @@
         <a:p>
           <a:r>
             <a:rPr lang="en-US" dirty="0"/>
-            <a:t>Member Search</a:t>
+            <a:t>Resources</a:t>
           </a:r>
         </a:p>
       </dgm:t>
@@ -1201,542 +996,476 @@
         </a:p>
       </dgm:t>
     </dgm:pt>
-    <dgm:pt modelId="{CA7EC028-924C-4884-A5D8-BC856AC98A33}" type="pres">
-      <dgm:prSet presAssocID="{1D935358-EA2F-4BB5-B672-F3901DA6C92F}" presName="hierChild1" presStyleCnt="0">
+    <dgm:pt modelId="{C24A352F-8489-45E0-9455-7579655FBFBF}">
+      <dgm:prSet/>
+      <dgm:spPr/>
+      <dgm:t>
+        <a:bodyPr/>
+        <a:lstStyle/>
+        <a:p>
+          <a:r>
+            <a:rPr lang="en-US" dirty="0"/>
+            <a:t>View Members</a:t>
+          </a:r>
+        </a:p>
+      </dgm:t>
+    </dgm:pt>
+    <dgm:pt modelId="{3264C905-E5C1-4A9B-9D01-0D70265F6246}" type="parTrans" cxnId="{C2A042B5-EB4B-494A-AD77-F52FA24AF0FC}">
+      <dgm:prSet/>
+      <dgm:spPr/>
+      <dgm:t>
+        <a:bodyPr/>
+        <a:lstStyle/>
+        <a:p>
+          <a:endParaRPr lang="en-US"/>
+        </a:p>
+      </dgm:t>
+    </dgm:pt>
+    <dgm:pt modelId="{DC42C2FF-5A95-42E0-A5E3-4662119E05EF}" type="sibTrans" cxnId="{C2A042B5-EB4B-494A-AD77-F52FA24AF0FC}">
+      <dgm:prSet/>
+      <dgm:spPr/>
+      <dgm:t>
+        <a:bodyPr/>
+        <a:lstStyle/>
+        <a:p>
+          <a:endParaRPr lang="en-US"/>
+        </a:p>
+      </dgm:t>
+    </dgm:pt>
+    <dgm:pt modelId="{AA86BBFB-9BC5-43B5-A534-F28A38AF2423}">
+      <dgm:prSet/>
+      <dgm:spPr/>
+      <dgm:t>
+        <a:bodyPr/>
+        <a:lstStyle/>
+        <a:p>
+          <a:r>
+            <a:rPr lang="en-US" dirty="0"/>
+            <a:t>Local Groups</a:t>
+          </a:r>
+        </a:p>
+      </dgm:t>
+    </dgm:pt>
+    <dgm:pt modelId="{F3D51A4D-6FB5-4504-BFD6-59296C2B7E6D}" type="parTrans" cxnId="{BC493340-6864-411D-8227-C190776E3E9F}">
+      <dgm:prSet/>
+      <dgm:spPr/>
+      <dgm:t>
+        <a:bodyPr/>
+        <a:lstStyle/>
+        <a:p>
+          <a:endParaRPr lang="en-US"/>
+        </a:p>
+      </dgm:t>
+    </dgm:pt>
+    <dgm:pt modelId="{53C3E8FB-F970-4853-8D1A-CDC8D0C5BE7C}" type="sibTrans" cxnId="{BC493340-6864-411D-8227-C190776E3E9F}">
+      <dgm:prSet/>
+      <dgm:spPr/>
+      <dgm:t>
+        <a:bodyPr/>
+        <a:lstStyle/>
+        <a:p>
+          <a:endParaRPr lang="en-US"/>
+        </a:p>
+      </dgm:t>
+    </dgm:pt>
+    <dgm:pt modelId="{FA316560-31BF-4DED-9BC6-EFCB1644CA41}">
+      <dgm:prSet/>
+      <dgm:spPr/>
+      <dgm:t>
+        <a:bodyPr/>
+        <a:lstStyle/>
+        <a:p>
+          <a:r>
+            <a:rPr lang="en-US" dirty="0"/>
+            <a:t>Top Rated Parks</a:t>
+          </a:r>
+        </a:p>
+      </dgm:t>
+    </dgm:pt>
+    <dgm:pt modelId="{BDE52E20-D3F8-4295-96AD-8A7DBDD6926D}" type="parTrans" cxnId="{C36479B7-EB3A-419D-846C-237C675D4630}">
+      <dgm:prSet/>
+      <dgm:spPr/>
+      <dgm:t>
+        <a:bodyPr/>
+        <a:lstStyle/>
+        <a:p>
+          <a:endParaRPr lang="en-US"/>
+        </a:p>
+      </dgm:t>
+    </dgm:pt>
+    <dgm:pt modelId="{B8A35A65-E544-4543-AEE7-183B806A4EA2}" type="sibTrans" cxnId="{C36479B7-EB3A-419D-846C-237C675D4630}">
+      <dgm:prSet/>
+      <dgm:spPr/>
+      <dgm:t>
+        <a:bodyPr/>
+        <a:lstStyle/>
+        <a:p>
+          <a:endParaRPr lang="en-US"/>
+        </a:p>
+      </dgm:t>
+    </dgm:pt>
+    <dgm:pt modelId="{7B45A5DC-3748-4AC5-9C5B-1DB8428C64B3}">
+      <dgm:prSet/>
+      <dgm:spPr/>
+      <dgm:t>
+        <a:bodyPr/>
+        <a:lstStyle/>
+        <a:p>
+          <a:endParaRPr lang="en-US"/>
+        </a:p>
+      </dgm:t>
+    </dgm:pt>
+    <dgm:pt modelId="{ECFBC88A-F10A-42F7-B7F4-E22ED5B24379}" type="parTrans" cxnId="{EC09A6EF-E873-4EF8-A521-0C24448B36C0}">
+      <dgm:prSet/>
+      <dgm:spPr/>
+      <dgm:t>
+        <a:bodyPr/>
+        <a:lstStyle/>
+        <a:p>
+          <a:endParaRPr lang="en-US"/>
+        </a:p>
+      </dgm:t>
+    </dgm:pt>
+    <dgm:pt modelId="{F93320EE-1089-4A34-9E10-249E7BE134E8}" type="sibTrans" cxnId="{EC09A6EF-E873-4EF8-A521-0C24448B36C0}">
+      <dgm:prSet/>
+      <dgm:spPr/>
+      <dgm:t>
+        <a:bodyPr/>
+        <a:lstStyle/>
+        <a:p>
+          <a:endParaRPr lang="en-US"/>
+        </a:p>
+      </dgm:t>
+    </dgm:pt>
+    <dgm:pt modelId="{9F7517E5-072C-41BC-8A7B-78B40CCFE20F}">
+      <dgm:prSet/>
+      <dgm:spPr/>
+      <dgm:t>
+        <a:bodyPr/>
+        <a:lstStyle/>
+        <a:p>
+          <a:endParaRPr lang="en-US"/>
+        </a:p>
+      </dgm:t>
+    </dgm:pt>
+    <dgm:pt modelId="{7E7E0A64-7EE5-4848-B079-72A7FFF4676A}" type="parTrans" cxnId="{CF738F4C-9D59-4FBB-8EF3-CAE92D5C1349}">
+      <dgm:prSet/>
+      <dgm:spPr/>
+      <dgm:t>
+        <a:bodyPr/>
+        <a:lstStyle/>
+        <a:p>
+          <a:endParaRPr lang="en-US"/>
+        </a:p>
+      </dgm:t>
+    </dgm:pt>
+    <dgm:pt modelId="{C6D449B0-2239-4A8F-9C56-A23B1C1DEDB9}" type="sibTrans" cxnId="{CF738F4C-9D59-4FBB-8EF3-CAE92D5C1349}">
+      <dgm:prSet/>
+      <dgm:spPr/>
+      <dgm:t>
+        <a:bodyPr/>
+        <a:lstStyle/>
+        <a:p>
+          <a:endParaRPr lang="en-US"/>
+        </a:p>
+      </dgm:t>
+    </dgm:pt>
+    <dgm:pt modelId="{03072DBA-B260-46EF-B2F9-80BEEF029960}">
+      <dgm:prSet/>
+      <dgm:spPr/>
+      <dgm:t>
+        <a:bodyPr/>
+        <a:lstStyle/>
+        <a:p>
+          <a:endParaRPr lang="en-US"/>
+        </a:p>
+      </dgm:t>
+    </dgm:pt>
+    <dgm:pt modelId="{07BDC7C2-376D-4007-A4FD-90ECE6003A94}" type="parTrans" cxnId="{B432405B-C9B2-417F-9D05-8994D3A37275}">
+      <dgm:prSet/>
+      <dgm:spPr/>
+      <dgm:t>
+        <a:bodyPr/>
+        <a:lstStyle/>
+        <a:p>
+          <a:endParaRPr lang="en-US"/>
+        </a:p>
+      </dgm:t>
+    </dgm:pt>
+    <dgm:pt modelId="{99FE2F72-32AB-4121-91AD-4A924373C561}" type="sibTrans" cxnId="{B432405B-C9B2-417F-9D05-8994D3A37275}">
+      <dgm:prSet/>
+      <dgm:spPr/>
+      <dgm:t>
+        <a:bodyPr/>
+        <a:lstStyle/>
+        <a:p>
+          <a:endParaRPr lang="en-US"/>
+        </a:p>
+      </dgm:t>
+    </dgm:pt>
+    <dgm:pt modelId="{5B3FA25E-7636-40FF-8B40-FDD6A271C5F6}" type="pres">
+      <dgm:prSet presAssocID="{1D935358-EA2F-4BB5-B672-F3901DA6C92F}" presName="mainComposite" presStyleCnt="0">
         <dgm:presLayoutVars>
-          <dgm:orgChart val="1"/>
           <dgm:chPref val="1"/>
           <dgm:dir/>
           <dgm:animOne val="branch"/>
           <dgm:animLvl val="lvl"/>
-          <dgm:resizeHandles/>
+          <dgm:resizeHandles val="exact"/>
         </dgm:presLayoutVars>
       </dgm:prSet>
       <dgm:spPr/>
     </dgm:pt>
-    <dgm:pt modelId="{FBBE2CC4-173D-4362-ADD9-519407899388}" type="pres">
-      <dgm:prSet presAssocID="{6DCAEAD0-0997-4792-B08F-5B64CFA15D64}" presName="hierRoot1" presStyleCnt="0">
+    <dgm:pt modelId="{D3522506-AA8F-46C8-AAD6-D95C2E038575}" type="pres">
+      <dgm:prSet presAssocID="{1D935358-EA2F-4BB5-B672-F3901DA6C92F}" presName="hierFlow" presStyleCnt="0"/>
+      <dgm:spPr/>
+    </dgm:pt>
+    <dgm:pt modelId="{6A4B2638-C3F9-4E7B-8330-F595B38A8AEE}" type="pres">
+      <dgm:prSet presAssocID="{1D935358-EA2F-4BB5-B672-F3901DA6C92F}" presName="firstBuf" presStyleCnt="0"/>
+      <dgm:spPr/>
+    </dgm:pt>
+    <dgm:pt modelId="{9B8B4DBD-B8EE-41EC-ACE5-20B9A0EB70A6}" type="pres">
+      <dgm:prSet presAssocID="{1D935358-EA2F-4BB5-B672-F3901DA6C92F}" presName="hierChild1" presStyleCnt="0">
         <dgm:presLayoutVars>
-          <dgm:hierBranch val="init"/>
+          <dgm:chPref val="1"/>
+          <dgm:animOne val="branch"/>
+          <dgm:animLvl val="lvl"/>
         </dgm:presLayoutVars>
       </dgm:prSet>
       <dgm:spPr/>
     </dgm:pt>
-    <dgm:pt modelId="{A9C13C0C-DF1F-4D90-B820-AE0E39B5BBAF}" type="pres">
-      <dgm:prSet presAssocID="{6DCAEAD0-0997-4792-B08F-5B64CFA15D64}" presName="rootComposite1" presStyleCnt="0"/>
+    <dgm:pt modelId="{C483D252-9426-43E0-8FAB-6712C5B52991}" type="pres">
+      <dgm:prSet presAssocID="{6DCAEAD0-0997-4792-B08F-5B64CFA15D64}" presName="Name14" presStyleCnt="0"/>
       <dgm:spPr/>
     </dgm:pt>
-    <dgm:pt modelId="{0E2F0851-4C4D-4530-93D1-F0F47B358084}" type="pres">
-      <dgm:prSet presAssocID="{6DCAEAD0-0997-4792-B08F-5B64CFA15D64}" presName="rootText1" presStyleLbl="node0" presStyleIdx="0" presStyleCnt="1">
-        <dgm:presLayoutVars>
-          <dgm:chMax/>
-          <dgm:chPref val="3"/>
-        </dgm:presLayoutVars>
-      </dgm:prSet>
-      <dgm:spPr/>
-    </dgm:pt>
-    <dgm:pt modelId="{45F2E63E-3EB4-4AA6-9262-2D4E07AB612D}" type="pres">
-      <dgm:prSet presAssocID="{6DCAEAD0-0997-4792-B08F-5B64CFA15D64}" presName="titleText1" presStyleLbl="fgAcc0" presStyleIdx="0" presStyleCnt="1">
-        <dgm:presLayoutVars>
-          <dgm:chMax val="0"/>
-          <dgm:chPref val="0"/>
-        </dgm:presLayoutVars>
-      </dgm:prSet>
-      <dgm:spPr/>
-    </dgm:pt>
-    <dgm:pt modelId="{D6F87856-DB89-4B07-8E36-FBCCD2682A58}" type="pres">
-      <dgm:prSet presAssocID="{6DCAEAD0-0997-4792-B08F-5B64CFA15D64}" presName="rootConnector1" presStyleLbl="node1" presStyleIdx="0" presStyleCnt="3"/>
-      <dgm:spPr/>
-    </dgm:pt>
-    <dgm:pt modelId="{7CE13014-780E-4A2A-9056-F7B514DFFC56}" type="pres">
-      <dgm:prSet presAssocID="{6DCAEAD0-0997-4792-B08F-5B64CFA15D64}" presName="hierChild2" presStyleCnt="0"/>
-      <dgm:spPr/>
-    </dgm:pt>
-    <dgm:pt modelId="{E1454AD8-92A9-4D75-B1F9-D25FFF23CF55}" type="pres">
-      <dgm:prSet presAssocID="{2BACDB74-68BC-46B0-9082-4870D3EEDDF7}" presName="Name37" presStyleLbl="parChTrans1D2" presStyleIdx="0" presStyleCnt="8"/>
-      <dgm:spPr/>
-    </dgm:pt>
-    <dgm:pt modelId="{6CAE6F28-8153-4065-A7CE-2F677AF38552}" type="pres">
-      <dgm:prSet presAssocID="{B3DD6697-12CA-4F69-9ECA-30450B8C8F87}" presName="hierRoot2" presStyleCnt="0">
-        <dgm:presLayoutVars>
-          <dgm:hierBranch val="init"/>
-        </dgm:presLayoutVars>
-      </dgm:prSet>
-      <dgm:spPr/>
-    </dgm:pt>
-    <dgm:pt modelId="{D3C2FAA7-65F1-4FA2-A30E-716E46016A59}" type="pres">
-      <dgm:prSet presAssocID="{B3DD6697-12CA-4F69-9ECA-30450B8C8F87}" presName="rootComposite" presStyleCnt="0"/>
-      <dgm:spPr/>
-    </dgm:pt>
-    <dgm:pt modelId="{CA178424-5890-4242-A103-23C325743DDD}" type="pres">
-      <dgm:prSet presAssocID="{B3DD6697-12CA-4F69-9ECA-30450B8C8F87}" presName="rootText" presStyleLbl="node1" presStyleIdx="0" presStyleCnt="3">
-        <dgm:presLayoutVars>
-          <dgm:chMax/>
-          <dgm:chPref val="3"/>
-        </dgm:presLayoutVars>
-      </dgm:prSet>
-      <dgm:spPr/>
-    </dgm:pt>
-    <dgm:pt modelId="{D1C69FA8-DF74-4F4B-9D7C-F958FB699CDF}" type="pres">
-      <dgm:prSet presAssocID="{B3DD6697-12CA-4F69-9ECA-30450B8C8F87}" presName="titleText2" presStyleLbl="fgAcc1" presStyleIdx="0" presStyleCnt="3">
-        <dgm:presLayoutVars>
-          <dgm:chMax val="0"/>
-          <dgm:chPref val="0"/>
-        </dgm:presLayoutVars>
-      </dgm:prSet>
-      <dgm:spPr/>
-    </dgm:pt>
-    <dgm:pt modelId="{FF2D7759-F361-4E1C-8453-7D5907060ADA}" type="pres">
-      <dgm:prSet presAssocID="{B3DD6697-12CA-4F69-9ECA-30450B8C8F87}" presName="rootConnector" presStyleLbl="node2" presStyleIdx="0" presStyleCnt="0"/>
-      <dgm:spPr/>
-    </dgm:pt>
-    <dgm:pt modelId="{3F72EC58-F818-4246-B4EE-FD4563900503}" type="pres">
-      <dgm:prSet presAssocID="{B3DD6697-12CA-4F69-9ECA-30450B8C8F87}" presName="hierChild4" presStyleCnt="0"/>
-      <dgm:spPr/>
-    </dgm:pt>
-    <dgm:pt modelId="{4F689891-3550-4C0A-9944-9B6ADA6AA53C}" type="pres">
-      <dgm:prSet presAssocID="{B3DD6697-12CA-4F69-9ECA-30450B8C8F87}" presName="hierChild5" presStyleCnt="0"/>
-      <dgm:spPr/>
-    </dgm:pt>
-    <dgm:pt modelId="{B9DF72DF-4A7C-4757-B5C6-CE8BD368E8DF}" type="pres">
-      <dgm:prSet presAssocID="{9F9F8C06-D272-4539-AEF8-30C633A1CCDB}" presName="Name37" presStyleLbl="parChTrans1D2" presStyleIdx="1" presStyleCnt="8"/>
-      <dgm:spPr/>
-    </dgm:pt>
-    <dgm:pt modelId="{18FB92B0-452E-4988-BA72-08CF5F3624A0}" type="pres">
-      <dgm:prSet presAssocID="{AF04E6C3-481B-4261-BA90-9DFF6F7188D3}" presName="hierRoot2" presStyleCnt="0">
-        <dgm:presLayoutVars>
-          <dgm:hierBranch val="init"/>
-        </dgm:presLayoutVars>
-      </dgm:prSet>
-      <dgm:spPr/>
-    </dgm:pt>
-    <dgm:pt modelId="{0253AC07-40F4-4826-A0CF-B39563808A93}" type="pres">
-      <dgm:prSet presAssocID="{AF04E6C3-481B-4261-BA90-9DFF6F7188D3}" presName="rootComposite" presStyleCnt="0"/>
-      <dgm:spPr/>
-    </dgm:pt>
-    <dgm:pt modelId="{4CB25805-913C-467F-83C6-B08F3AFCFA0F}" type="pres">
-      <dgm:prSet presAssocID="{AF04E6C3-481B-4261-BA90-9DFF6F7188D3}" presName="rootText" presStyleLbl="node1" presStyleIdx="1" presStyleCnt="3">
-        <dgm:presLayoutVars>
-          <dgm:chMax/>
-          <dgm:chPref val="3"/>
-        </dgm:presLayoutVars>
-      </dgm:prSet>
-      <dgm:spPr/>
-    </dgm:pt>
-    <dgm:pt modelId="{261948D4-2FA7-4063-B7A1-EDC8AF65CE54}" type="pres">
-      <dgm:prSet presAssocID="{AF04E6C3-481B-4261-BA90-9DFF6F7188D3}" presName="titleText2" presStyleLbl="fgAcc1" presStyleIdx="1" presStyleCnt="3">
-        <dgm:presLayoutVars>
-          <dgm:chMax val="0"/>
-          <dgm:chPref val="0"/>
-        </dgm:presLayoutVars>
-      </dgm:prSet>
-      <dgm:spPr/>
-    </dgm:pt>
-    <dgm:pt modelId="{CDCA7A2C-026D-4A0C-9E83-8C0BBBB62503}" type="pres">
-      <dgm:prSet presAssocID="{AF04E6C3-481B-4261-BA90-9DFF6F7188D3}" presName="rootConnector" presStyleLbl="node2" presStyleIdx="0" presStyleCnt="0"/>
-      <dgm:spPr/>
-    </dgm:pt>
-    <dgm:pt modelId="{A083279B-47F7-4C45-984A-4A6DC83D2D4E}" type="pres">
-      <dgm:prSet presAssocID="{AF04E6C3-481B-4261-BA90-9DFF6F7188D3}" presName="hierChild4" presStyleCnt="0"/>
-      <dgm:spPr/>
-    </dgm:pt>
-    <dgm:pt modelId="{A3B1AB49-D71F-4472-B580-CB73AD3044F2}" type="pres">
-      <dgm:prSet presAssocID="{AF04E6C3-481B-4261-BA90-9DFF6F7188D3}" presName="hierChild5" presStyleCnt="0"/>
-      <dgm:spPr/>
-    </dgm:pt>
-    <dgm:pt modelId="{F3830243-C9A1-4DF7-8669-B314549186C1}" type="pres">
-      <dgm:prSet presAssocID="{5F5112E3-A378-4DB5-ACBE-AAF947BD9DF1}" presName="Name37" presStyleLbl="parChTrans1D2" presStyleIdx="2" presStyleCnt="8"/>
-      <dgm:spPr/>
-    </dgm:pt>
-    <dgm:pt modelId="{22AD43E7-667A-4BFA-9AF9-A6F7B329E10E}" type="pres">
-      <dgm:prSet presAssocID="{27F0FE99-366C-41D5-9669-5E0F5BD96B42}" presName="hierRoot2" presStyleCnt="0">
-        <dgm:presLayoutVars>
-          <dgm:hierBranch val="init"/>
-        </dgm:presLayoutVars>
-      </dgm:prSet>
-      <dgm:spPr/>
-    </dgm:pt>
-    <dgm:pt modelId="{EA4D9F20-D58A-4A1F-B067-7D911573A3E9}" type="pres">
-      <dgm:prSet presAssocID="{27F0FE99-366C-41D5-9669-5E0F5BD96B42}" presName="rootComposite" presStyleCnt="0"/>
-      <dgm:spPr/>
-    </dgm:pt>
-    <dgm:pt modelId="{9B35FC8C-9186-49B8-A053-DD687917697F}" type="pres">
-      <dgm:prSet presAssocID="{27F0FE99-366C-41D5-9669-5E0F5BD96B42}" presName="rootText" presStyleLbl="node1" presStyleIdx="2" presStyleCnt="3">
-        <dgm:presLayoutVars>
-          <dgm:chMax/>
-          <dgm:chPref val="3"/>
-        </dgm:presLayoutVars>
-      </dgm:prSet>
-      <dgm:spPr/>
-    </dgm:pt>
-    <dgm:pt modelId="{79B36821-8B5C-4E25-9CAE-29F66DCC0474}" type="pres">
-      <dgm:prSet presAssocID="{27F0FE99-366C-41D5-9669-5E0F5BD96B42}" presName="titleText2" presStyleLbl="fgAcc1" presStyleIdx="2" presStyleCnt="3">
-        <dgm:presLayoutVars>
-          <dgm:chMax val="0"/>
-          <dgm:chPref val="0"/>
-        </dgm:presLayoutVars>
-      </dgm:prSet>
-      <dgm:spPr/>
-    </dgm:pt>
-    <dgm:pt modelId="{7F440B4E-5F7D-455A-B718-6B7FA6B4E517}" type="pres">
-      <dgm:prSet presAssocID="{27F0FE99-366C-41D5-9669-5E0F5BD96B42}" presName="rootConnector" presStyleLbl="node2" presStyleIdx="0" presStyleCnt="0"/>
-      <dgm:spPr/>
-    </dgm:pt>
-    <dgm:pt modelId="{D5B530F9-2973-4A54-9ED0-EEB2550C541B}" type="pres">
-      <dgm:prSet presAssocID="{27F0FE99-366C-41D5-9669-5E0F5BD96B42}" presName="hierChild4" presStyleCnt="0"/>
-      <dgm:spPr/>
-    </dgm:pt>
-    <dgm:pt modelId="{E43F2A15-CFC1-4423-9FCC-879CCCB125A4}" type="pres">
-      <dgm:prSet presAssocID="{27F0FE99-366C-41D5-9669-5E0F5BD96B42}" presName="hierChild5" presStyleCnt="0"/>
-      <dgm:spPr/>
-    </dgm:pt>
-    <dgm:pt modelId="{72548364-48B9-48B0-BA21-208469BDEFBF}" type="pres">
-      <dgm:prSet presAssocID="{6DCAEAD0-0997-4792-B08F-5B64CFA15D64}" presName="hierChild3" presStyleCnt="0"/>
-      <dgm:spPr/>
-    </dgm:pt>
-    <dgm:pt modelId="{F7B374D2-923B-4157-A1F7-83B6513409E4}" type="pres">
-      <dgm:prSet presAssocID="{5C2C8788-6EDB-4B1C-8D92-0157F2241CAB}" presName="Name96" presStyleLbl="parChTrans1D2" presStyleIdx="3" presStyleCnt="8"/>
-      <dgm:spPr/>
-    </dgm:pt>
-    <dgm:pt modelId="{63E55325-CA80-4AA4-925E-9743BAB7D383}" type="pres">
-      <dgm:prSet presAssocID="{5BC05B46-0C29-4999-A747-2413AA95AA1E}" presName="hierRoot3" presStyleCnt="0">
-        <dgm:presLayoutVars>
-          <dgm:hierBranch val="init"/>
-        </dgm:presLayoutVars>
-      </dgm:prSet>
-      <dgm:spPr/>
-    </dgm:pt>
-    <dgm:pt modelId="{29F5A972-804D-49D0-B31B-05A1A5F96A5D}" type="pres">
-      <dgm:prSet presAssocID="{5BC05B46-0C29-4999-A747-2413AA95AA1E}" presName="rootComposite3" presStyleCnt="0"/>
-      <dgm:spPr/>
-    </dgm:pt>
-    <dgm:pt modelId="{6241BE42-6B83-43C5-9E4C-7A66D6D9EFA4}" type="pres">
-      <dgm:prSet presAssocID="{5BC05B46-0C29-4999-A747-2413AA95AA1E}" presName="rootText3" presStyleLbl="asst1" presStyleIdx="0" presStyleCnt="5">
+    <dgm:pt modelId="{106846B4-C57C-4B4A-8BDC-EA3A01B8B95F}" type="pres">
+      <dgm:prSet presAssocID="{6DCAEAD0-0997-4792-B08F-5B64CFA15D64}" presName="level1Shape" presStyleLbl="node0" presStyleIdx="0" presStyleCnt="1">
         <dgm:presLayoutVars>
           <dgm:chPref val="3"/>
         </dgm:presLayoutVars>
       </dgm:prSet>
       <dgm:spPr/>
     </dgm:pt>
-    <dgm:pt modelId="{093426B6-CB37-4BFB-A245-2C41D01495F2}" type="pres">
-      <dgm:prSet presAssocID="{5BC05B46-0C29-4999-A747-2413AA95AA1E}" presName="titleText3" presStyleLbl="fgAcc2" presStyleIdx="0" presStyleCnt="5">
+    <dgm:pt modelId="{3079D60D-FF7B-45A3-A68B-3000601A6A14}" type="pres">
+      <dgm:prSet presAssocID="{6DCAEAD0-0997-4792-B08F-5B64CFA15D64}" presName="hierChild2" presStyleCnt="0"/>
+      <dgm:spPr/>
+    </dgm:pt>
+    <dgm:pt modelId="{AFA13D1E-B68F-4E1C-A8A5-C8CBFB686937}" type="pres">
+      <dgm:prSet presAssocID="{B3E0E86C-62E8-4813-BA77-F566ABF5644E}" presName="Name19" presStyleLbl="parChTrans1D2" presStyleIdx="0" presStyleCnt="2"/>
+      <dgm:spPr/>
+    </dgm:pt>
+    <dgm:pt modelId="{DDDE2EF1-5382-4BAD-A8EC-50740DC23D26}" type="pres">
+      <dgm:prSet presAssocID="{975A07FC-54AE-434F-BB42-FF025D12E00D}" presName="Name21" presStyleCnt="0"/>
+      <dgm:spPr/>
+    </dgm:pt>
+    <dgm:pt modelId="{21353F14-EF15-4F1A-AD9C-52082FDC1EDE}" type="pres">
+      <dgm:prSet presAssocID="{975A07FC-54AE-434F-BB42-FF025D12E00D}" presName="level2Shape" presStyleLbl="asst1" presStyleIdx="0" presStyleCnt="2"/>
+      <dgm:spPr/>
+    </dgm:pt>
+    <dgm:pt modelId="{A923347D-2DDF-416C-B9F8-CF7C4B904821}" type="pres">
+      <dgm:prSet presAssocID="{975A07FC-54AE-434F-BB42-FF025D12E00D}" presName="hierChild3" presStyleCnt="0"/>
+      <dgm:spPr/>
+    </dgm:pt>
+    <dgm:pt modelId="{4B4C13B4-BD1C-43B8-96A8-3016EDC34C57}" type="pres">
+      <dgm:prSet presAssocID="{E8F559E0-E518-4C2A-B2F8-4627280A09F4}" presName="Name19" presStyleLbl="parChTrans1D2" presStyleIdx="1" presStyleCnt="2"/>
+      <dgm:spPr/>
+    </dgm:pt>
+    <dgm:pt modelId="{07083BC4-89E6-41D9-B3C6-6249227DD585}" type="pres">
+      <dgm:prSet presAssocID="{BE0CB87B-5EA2-4B65-978F-1F3F2606237B}" presName="Name21" presStyleCnt="0"/>
+      <dgm:spPr/>
+    </dgm:pt>
+    <dgm:pt modelId="{8A4DBA3A-9F9F-428E-A158-D57E8800853A}" type="pres">
+      <dgm:prSet presAssocID="{BE0CB87B-5EA2-4B65-978F-1F3F2606237B}" presName="level2Shape" presStyleLbl="asst1" presStyleIdx="1" presStyleCnt="2"/>
+      <dgm:spPr/>
+    </dgm:pt>
+    <dgm:pt modelId="{AFA980AE-46F6-4705-99D3-BD2F6F19448D}" type="pres">
+      <dgm:prSet presAssocID="{BE0CB87B-5EA2-4B65-978F-1F3F2606237B}" presName="hierChild3" presStyleCnt="0"/>
+      <dgm:spPr/>
+    </dgm:pt>
+    <dgm:pt modelId="{5532AA10-5880-4269-902B-3B7CF5C0D400}" type="pres">
+      <dgm:prSet presAssocID="{3264C905-E5C1-4A9B-9D01-0D70265F6246}" presName="Name19" presStyleLbl="parChTrans1D3" presStyleIdx="0" presStyleCnt="3"/>
+      <dgm:spPr/>
+    </dgm:pt>
+    <dgm:pt modelId="{EECD7F31-5CCC-4501-8E7E-489DDA92DE9D}" type="pres">
+      <dgm:prSet presAssocID="{C24A352F-8489-45E0-9455-7579655FBFBF}" presName="Name21" presStyleCnt="0"/>
+      <dgm:spPr/>
+    </dgm:pt>
+    <dgm:pt modelId="{2C1BBD02-149D-4AEF-8B7C-071D427D6796}" type="pres">
+      <dgm:prSet presAssocID="{C24A352F-8489-45E0-9455-7579655FBFBF}" presName="level2Shape" presStyleLbl="node3" presStyleIdx="0" presStyleCnt="3"/>
+      <dgm:spPr/>
+    </dgm:pt>
+    <dgm:pt modelId="{E194991C-CCA4-43EB-AF06-AC04D062EA54}" type="pres">
+      <dgm:prSet presAssocID="{C24A352F-8489-45E0-9455-7579655FBFBF}" presName="hierChild3" presStyleCnt="0"/>
+      <dgm:spPr/>
+    </dgm:pt>
+    <dgm:pt modelId="{75BA6FCF-B20C-4695-AD33-1AC04E6188EF}" type="pres">
+      <dgm:prSet presAssocID="{F3D51A4D-6FB5-4504-BFD6-59296C2B7E6D}" presName="Name19" presStyleLbl="parChTrans1D3" presStyleIdx="1" presStyleCnt="3"/>
+      <dgm:spPr/>
+    </dgm:pt>
+    <dgm:pt modelId="{A97EAC25-02B1-417B-9BBA-61951002933A}" type="pres">
+      <dgm:prSet presAssocID="{AA86BBFB-9BC5-43B5-A534-F28A38AF2423}" presName="Name21" presStyleCnt="0"/>
+      <dgm:spPr/>
+    </dgm:pt>
+    <dgm:pt modelId="{D8B091A3-A137-49C1-BBB3-FD15C0D8621B}" type="pres">
+      <dgm:prSet presAssocID="{AA86BBFB-9BC5-43B5-A534-F28A38AF2423}" presName="level2Shape" presStyleLbl="node3" presStyleIdx="1" presStyleCnt="3"/>
+      <dgm:spPr/>
+    </dgm:pt>
+    <dgm:pt modelId="{FFD66E22-B15E-4A5E-901C-1B87A3459F36}" type="pres">
+      <dgm:prSet presAssocID="{AA86BBFB-9BC5-43B5-A534-F28A38AF2423}" presName="hierChild3" presStyleCnt="0"/>
+      <dgm:spPr/>
+    </dgm:pt>
+    <dgm:pt modelId="{20187EFF-9F54-440A-8907-93C3BB961C65}" type="pres">
+      <dgm:prSet presAssocID="{BDE52E20-D3F8-4295-96AD-8A7DBDD6926D}" presName="Name19" presStyleLbl="parChTrans1D3" presStyleIdx="2" presStyleCnt="3"/>
+      <dgm:spPr/>
+    </dgm:pt>
+    <dgm:pt modelId="{D751619F-D147-4F00-A707-30FE0EC70839}" type="pres">
+      <dgm:prSet presAssocID="{FA316560-31BF-4DED-9BC6-EFCB1644CA41}" presName="Name21" presStyleCnt="0"/>
+      <dgm:spPr/>
+    </dgm:pt>
+    <dgm:pt modelId="{4037397F-5207-48DC-BDDE-62634F8E7BCC}" type="pres">
+      <dgm:prSet presAssocID="{FA316560-31BF-4DED-9BC6-EFCB1644CA41}" presName="level2Shape" presStyleLbl="node3" presStyleIdx="2" presStyleCnt="3"/>
+      <dgm:spPr/>
+    </dgm:pt>
+    <dgm:pt modelId="{C028401B-73EC-4845-9EE0-542223408AF9}" type="pres">
+      <dgm:prSet presAssocID="{FA316560-31BF-4DED-9BC6-EFCB1644CA41}" presName="hierChild3" presStyleCnt="0"/>
+      <dgm:spPr/>
+    </dgm:pt>
+    <dgm:pt modelId="{C2C2CF53-A957-4B11-9772-199A0BD321DC}" type="pres">
+      <dgm:prSet presAssocID="{1D935358-EA2F-4BB5-B672-F3901DA6C92F}" presName="bgShapesFlow" presStyleCnt="0"/>
+      <dgm:spPr/>
+    </dgm:pt>
+    <dgm:pt modelId="{5E96D95E-94AE-48E2-8736-5E6E8DDB3D36}" type="pres">
+      <dgm:prSet presAssocID="{03072DBA-B260-46EF-B2F9-80BEEF029960}" presName="rectComp" presStyleCnt="0"/>
+      <dgm:spPr/>
+    </dgm:pt>
+    <dgm:pt modelId="{00013FE3-9E03-4ABD-8634-95136BD9B976}" type="pres">
+      <dgm:prSet presAssocID="{03072DBA-B260-46EF-B2F9-80BEEF029960}" presName="bgRect" presStyleLbl="bgShp" presStyleIdx="0" presStyleCnt="3"/>
+      <dgm:spPr/>
+    </dgm:pt>
+    <dgm:pt modelId="{A359CB32-FD74-4851-9450-2FA85503D79A}" type="pres">
+      <dgm:prSet presAssocID="{03072DBA-B260-46EF-B2F9-80BEEF029960}" presName="bgRectTx" presStyleLbl="bgShp" presStyleIdx="0" presStyleCnt="3">
         <dgm:presLayoutVars>
-          <dgm:chMax val="0"/>
-          <dgm:chPref val="0"/>
+          <dgm:bulletEnabled val="1"/>
         </dgm:presLayoutVars>
       </dgm:prSet>
       <dgm:spPr/>
     </dgm:pt>
-    <dgm:pt modelId="{2B5C7799-873D-42EB-A9F8-2A4A5CF12AF9}" type="pres">
-      <dgm:prSet presAssocID="{5BC05B46-0C29-4999-A747-2413AA95AA1E}" presName="rootConnector3" presStyleLbl="asst1" presStyleIdx="0" presStyleCnt="5"/>
+    <dgm:pt modelId="{D278C6F4-0529-4113-B0AF-B779FE828202}" type="pres">
+      <dgm:prSet presAssocID="{03072DBA-B260-46EF-B2F9-80BEEF029960}" presName="spComp" presStyleCnt="0"/>
       <dgm:spPr/>
     </dgm:pt>
-    <dgm:pt modelId="{9184B546-2593-468F-A7D4-BC1490D56B89}" type="pres">
-      <dgm:prSet presAssocID="{5BC05B46-0C29-4999-A747-2413AA95AA1E}" presName="hierChild6" presStyleCnt="0"/>
+    <dgm:pt modelId="{A742DB86-D1C6-4DE1-999C-A77F54CCEF1B}" type="pres">
+      <dgm:prSet presAssocID="{03072DBA-B260-46EF-B2F9-80BEEF029960}" presName="vSp" presStyleCnt="0"/>
       <dgm:spPr/>
     </dgm:pt>
-    <dgm:pt modelId="{E294FB3C-EB78-405E-AA86-748CF26C9F98}" type="pres">
-      <dgm:prSet presAssocID="{5BC05B46-0C29-4999-A747-2413AA95AA1E}" presName="hierChild7" presStyleCnt="0"/>
+    <dgm:pt modelId="{0B10D0FD-0B23-4A63-886B-194C7B76352C}" type="pres">
+      <dgm:prSet presAssocID="{9F7517E5-072C-41BC-8A7B-78B40CCFE20F}" presName="rectComp" presStyleCnt="0"/>
       <dgm:spPr/>
     </dgm:pt>
-    <dgm:pt modelId="{879708FF-C94E-4BC2-B60E-736C0D75B913}" type="pres">
-      <dgm:prSet presAssocID="{FFDC85F9-33F6-41B1-9FAE-563F101C4C0A}" presName="Name96" presStyleLbl="parChTrans1D2" presStyleIdx="4" presStyleCnt="8"/>
+    <dgm:pt modelId="{C61F606F-B47E-4079-B576-6BB6204940A6}" type="pres">
+      <dgm:prSet presAssocID="{9F7517E5-072C-41BC-8A7B-78B40CCFE20F}" presName="bgRect" presStyleLbl="bgShp" presStyleIdx="1" presStyleCnt="3"/>
       <dgm:spPr/>
     </dgm:pt>
-    <dgm:pt modelId="{FDA2DC43-0C30-4992-BD42-DDD769D5A706}" type="pres">
-      <dgm:prSet presAssocID="{3786B665-C0D1-4818-A187-73C0466DDAF0}" presName="hierRoot3" presStyleCnt="0">
+    <dgm:pt modelId="{CF4E21CA-CC73-4165-995C-F0D194F310B6}" type="pres">
+      <dgm:prSet presAssocID="{9F7517E5-072C-41BC-8A7B-78B40CCFE20F}" presName="bgRectTx" presStyleLbl="bgShp" presStyleIdx="1" presStyleCnt="3">
         <dgm:presLayoutVars>
-          <dgm:hierBranch val="init"/>
+          <dgm:bulletEnabled val="1"/>
         </dgm:presLayoutVars>
       </dgm:prSet>
       <dgm:spPr/>
     </dgm:pt>
-    <dgm:pt modelId="{06D11D0A-F4B6-449A-B346-78D4B79D7EEF}" type="pres">
-      <dgm:prSet presAssocID="{3786B665-C0D1-4818-A187-73C0466DDAF0}" presName="rootComposite3" presStyleCnt="0"/>
+    <dgm:pt modelId="{5FD0EB76-D35D-4135-B4C7-B36E65BD82B9}" type="pres">
+      <dgm:prSet presAssocID="{9F7517E5-072C-41BC-8A7B-78B40CCFE20F}" presName="spComp" presStyleCnt="0"/>
       <dgm:spPr/>
     </dgm:pt>
-    <dgm:pt modelId="{00B9D14D-0388-44E4-BC78-EBCAD0B6979C}" type="pres">
-      <dgm:prSet presAssocID="{3786B665-C0D1-4818-A187-73C0466DDAF0}" presName="rootText3" presStyleLbl="asst1" presStyleIdx="1" presStyleCnt="5">
+    <dgm:pt modelId="{5BB3E744-E96A-495C-A6F0-AD1E8D27F6A1}" type="pres">
+      <dgm:prSet presAssocID="{9F7517E5-072C-41BC-8A7B-78B40CCFE20F}" presName="vSp" presStyleCnt="0"/>
+      <dgm:spPr/>
+    </dgm:pt>
+    <dgm:pt modelId="{D1006DEC-B547-4894-9E89-13106678C3BC}" type="pres">
+      <dgm:prSet presAssocID="{7B45A5DC-3748-4AC5-9C5B-1DB8428C64B3}" presName="rectComp" presStyleCnt="0"/>
+      <dgm:spPr/>
+    </dgm:pt>
+    <dgm:pt modelId="{4845A9D5-6564-4487-914B-D1485D7DDD63}" type="pres">
+      <dgm:prSet presAssocID="{7B45A5DC-3748-4AC5-9C5B-1DB8428C64B3}" presName="bgRect" presStyleLbl="bgShp" presStyleIdx="2" presStyleCnt="3"/>
+      <dgm:spPr/>
+    </dgm:pt>
+    <dgm:pt modelId="{33C0EE81-5720-4FA0-ACAD-B89C78FCB4C0}" type="pres">
+      <dgm:prSet presAssocID="{7B45A5DC-3748-4AC5-9C5B-1DB8428C64B3}" presName="bgRectTx" presStyleLbl="bgShp" presStyleIdx="2" presStyleCnt="3">
         <dgm:presLayoutVars>
-          <dgm:chPref val="3"/>
+          <dgm:bulletEnabled val="1"/>
         </dgm:presLayoutVars>
       </dgm:prSet>
       <dgm:spPr/>
     </dgm:pt>
-    <dgm:pt modelId="{CC557E83-DF62-40AD-8846-5E84F3421AB0}" type="pres">
-      <dgm:prSet presAssocID="{3786B665-C0D1-4818-A187-73C0466DDAF0}" presName="titleText3" presStyleLbl="fgAcc2" presStyleIdx="1" presStyleCnt="5">
-        <dgm:presLayoutVars>
-          <dgm:chMax val="0"/>
-          <dgm:chPref val="0"/>
-        </dgm:presLayoutVars>
-      </dgm:prSet>
-      <dgm:spPr/>
-    </dgm:pt>
-    <dgm:pt modelId="{64D84924-42BA-4257-BD89-84914B8CD867}" type="pres">
-      <dgm:prSet presAssocID="{3786B665-C0D1-4818-A187-73C0466DDAF0}" presName="rootConnector3" presStyleLbl="asst1" presStyleIdx="1" presStyleCnt="5"/>
-      <dgm:spPr/>
-    </dgm:pt>
-    <dgm:pt modelId="{9015364E-5286-4807-B97A-53C5495DDDD9}" type="pres">
-      <dgm:prSet presAssocID="{3786B665-C0D1-4818-A187-73C0466DDAF0}" presName="hierChild6" presStyleCnt="0"/>
-      <dgm:spPr/>
-    </dgm:pt>
-    <dgm:pt modelId="{10B49292-CA38-45E8-AC21-51963B450521}" type="pres">
-      <dgm:prSet presAssocID="{3786B665-C0D1-4818-A187-73C0466DDAF0}" presName="hierChild7" presStyleCnt="0"/>
-      <dgm:spPr/>
-    </dgm:pt>
-    <dgm:pt modelId="{C08D4BA8-B80B-44C7-BC19-57306DF9A87F}" type="pres">
-      <dgm:prSet presAssocID="{B3E0E86C-62E8-4813-BA77-F566ABF5644E}" presName="Name96" presStyleLbl="parChTrans1D2" presStyleIdx="5" presStyleCnt="8"/>
-      <dgm:spPr/>
-    </dgm:pt>
-    <dgm:pt modelId="{85F958D1-87F7-41D9-80EB-3A1A5891DAB8}" type="pres">
-      <dgm:prSet presAssocID="{975A07FC-54AE-434F-BB42-FF025D12E00D}" presName="hierRoot3" presStyleCnt="0">
-        <dgm:presLayoutVars>
-          <dgm:hierBranch val="init"/>
-        </dgm:presLayoutVars>
-      </dgm:prSet>
-      <dgm:spPr/>
-    </dgm:pt>
-    <dgm:pt modelId="{23F1C90A-8722-4B26-B37B-E10088B1F37E}" type="pres">
-      <dgm:prSet presAssocID="{975A07FC-54AE-434F-BB42-FF025D12E00D}" presName="rootComposite3" presStyleCnt="0"/>
-      <dgm:spPr/>
-    </dgm:pt>
-    <dgm:pt modelId="{101E76A2-4743-4286-A350-ED12787CB775}" type="pres">
-      <dgm:prSet presAssocID="{975A07FC-54AE-434F-BB42-FF025D12E00D}" presName="rootText3" presStyleLbl="asst1" presStyleIdx="2" presStyleCnt="5">
-        <dgm:presLayoutVars>
-          <dgm:chPref val="3"/>
-        </dgm:presLayoutVars>
-      </dgm:prSet>
-      <dgm:spPr/>
-    </dgm:pt>
-    <dgm:pt modelId="{AB3EC8CC-7AD0-4ADD-8E48-F1FFC2E107B9}" type="pres">
-      <dgm:prSet presAssocID="{975A07FC-54AE-434F-BB42-FF025D12E00D}" presName="titleText3" presStyleLbl="fgAcc2" presStyleIdx="2" presStyleCnt="5">
-        <dgm:presLayoutVars>
-          <dgm:chMax val="0"/>
-          <dgm:chPref val="0"/>
-        </dgm:presLayoutVars>
-      </dgm:prSet>
-      <dgm:spPr/>
-    </dgm:pt>
-    <dgm:pt modelId="{4ECAD660-942D-4104-A853-1C810DA1F24E}" type="pres">
-      <dgm:prSet presAssocID="{975A07FC-54AE-434F-BB42-FF025D12E00D}" presName="rootConnector3" presStyleLbl="asst1" presStyleIdx="2" presStyleCnt="5"/>
-      <dgm:spPr/>
-    </dgm:pt>
-    <dgm:pt modelId="{E714FEB5-3C7A-4E0B-833E-8EA8A7842F88}" type="pres">
-      <dgm:prSet presAssocID="{975A07FC-54AE-434F-BB42-FF025D12E00D}" presName="hierChild6" presStyleCnt="0"/>
-      <dgm:spPr/>
-    </dgm:pt>
-    <dgm:pt modelId="{6970C7AC-54CF-4981-B20A-9C85649C7F22}" type="pres">
-      <dgm:prSet presAssocID="{975A07FC-54AE-434F-BB42-FF025D12E00D}" presName="hierChild7" presStyleCnt="0"/>
-      <dgm:spPr/>
-    </dgm:pt>
-    <dgm:pt modelId="{CF29FFD7-FA45-4B44-B920-5739BBD8395F}" type="pres">
-      <dgm:prSet presAssocID="{E8F559E0-E518-4C2A-B2F8-4627280A09F4}" presName="Name96" presStyleLbl="parChTrans1D2" presStyleIdx="6" presStyleCnt="8"/>
-      <dgm:spPr/>
-    </dgm:pt>
-    <dgm:pt modelId="{F06B246F-9106-4958-8B48-8A5464E6989F}" type="pres">
-      <dgm:prSet presAssocID="{BE0CB87B-5EA2-4B65-978F-1F3F2606237B}" presName="hierRoot3" presStyleCnt="0">
-        <dgm:presLayoutVars>
-          <dgm:hierBranch val="init"/>
-        </dgm:presLayoutVars>
-      </dgm:prSet>
-      <dgm:spPr/>
-    </dgm:pt>
-    <dgm:pt modelId="{8E99FBDF-7CFF-4C88-B35A-E18D6AC93CB9}" type="pres">
-      <dgm:prSet presAssocID="{BE0CB87B-5EA2-4B65-978F-1F3F2606237B}" presName="rootComposite3" presStyleCnt="0"/>
-      <dgm:spPr/>
-    </dgm:pt>
-    <dgm:pt modelId="{B3283E1E-2057-4690-A212-3D2DAFA652BD}" type="pres">
-      <dgm:prSet presAssocID="{BE0CB87B-5EA2-4B65-978F-1F3F2606237B}" presName="rootText3" presStyleLbl="asst1" presStyleIdx="3" presStyleCnt="5">
-        <dgm:presLayoutVars>
-          <dgm:chPref val="3"/>
-        </dgm:presLayoutVars>
-      </dgm:prSet>
-      <dgm:spPr/>
-    </dgm:pt>
-    <dgm:pt modelId="{A0AD7242-ED6A-474D-B059-FB0D1C171505}" type="pres">
-      <dgm:prSet presAssocID="{BE0CB87B-5EA2-4B65-978F-1F3F2606237B}" presName="titleText3" presStyleLbl="fgAcc2" presStyleIdx="3" presStyleCnt="5">
-        <dgm:presLayoutVars>
-          <dgm:chMax val="0"/>
-          <dgm:chPref val="0"/>
-        </dgm:presLayoutVars>
-      </dgm:prSet>
-      <dgm:spPr/>
-    </dgm:pt>
-    <dgm:pt modelId="{1A764CF8-A43E-49B0-A5E6-86652167097B}" type="pres">
-      <dgm:prSet presAssocID="{BE0CB87B-5EA2-4B65-978F-1F3F2606237B}" presName="rootConnector3" presStyleLbl="asst1" presStyleIdx="3" presStyleCnt="5"/>
-      <dgm:spPr/>
-    </dgm:pt>
-    <dgm:pt modelId="{59D76E33-23D8-4DD6-9B87-C3AB72CB9838}" type="pres">
-      <dgm:prSet presAssocID="{BE0CB87B-5EA2-4B65-978F-1F3F2606237B}" presName="hierChild6" presStyleCnt="0"/>
-      <dgm:spPr/>
-    </dgm:pt>
-    <dgm:pt modelId="{FE2B5AAE-CF76-490A-8915-809E55F58895}" type="pres">
-      <dgm:prSet presAssocID="{BE0CB87B-5EA2-4B65-978F-1F3F2606237B}" presName="hierChild7" presStyleCnt="0"/>
-      <dgm:spPr/>
-    </dgm:pt>
-    <dgm:pt modelId="{0A15230D-CEAD-44AB-A9D8-4F1795C0EDC5}" type="pres">
-      <dgm:prSet presAssocID="{4D8DFFA5-D8F1-4364-85A5-855E10B65E61}" presName="Name96" presStyleLbl="parChTrans1D2" presStyleIdx="7" presStyleCnt="8"/>
-      <dgm:spPr/>
-    </dgm:pt>
-    <dgm:pt modelId="{1A98C2D0-933F-4523-9BA6-FDFA3195E69E}" type="pres">
-      <dgm:prSet presAssocID="{D0B9E4B9-24FD-4BF3-A877-34012B7178F9}" presName="hierRoot3" presStyleCnt="0">
-        <dgm:presLayoutVars>
-          <dgm:hierBranch val="init"/>
-        </dgm:presLayoutVars>
-      </dgm:prSet>
-      <dgm:spPr/>
-    </dgm:pt>
-    <dgm:pt modelId="{F2B9C679-E1B9-4150-B0C2-B3A41408CB60}" type="pres">
-      <dgm:prSet presAssocID="{D0B9E4B9-24FD-4BF3-A877-34012B7178F9}" presName="rootComposite3" presStyleCnt="0"/>
-      <dgm:spPr/>
-    </dgm:pt>
-    <dgm:pt modelId="{51DB92DD-B79E-4851-B428-2D6647EE4E80}" type="pres">
-      <dgm:prSet presAssocID="{D0B9E4B9-24FD-4BF3-A877-34012B7178F9}" presName="rootText3" presStyleLbl="asst1" presStyleIdx="4" presStyleCnt="5">
-        <dgm:presLayoutVars>
-          <dgm:chPref val="3"/>
-        </dgm:presLayoutVars>
-      </dgm:prSet>
-      <dgm:spPr/>
-    </dgm:pt>
-    <dgm:pt modelId="{B07D686E-F7BD-47F3-8C9D-E3F4BF1B6336}" type="pres">
-      <dgm:prSet presAssocID="{D0B9E4B9-24FD-4BF3-A877-34012B7178F9}" presName="titleText3" presStyleLbl="fgAcc2" presStyleIdx="4" presStyleCnt="5">
-        <dgm:presLayoutVars>
-          <dgm:chMax val="0"/>
-          <dgm:chPref val="0"/>
-        </dgm:presLayoutVars>
-      </dgm:prSet>
-      <dgm:spPr/>
-    </dgm:pt>
-    <dgm:pt modelId="{F60EE2F1-06F8-4D1C-AF4C-5BEB6DD46FD3}" type="pres">
-      <dgm:prSet presAssocID="{D0B9E4B9-24FD-4BF3-A877-34012B7178F9}" presName="rootConnector3" presStyleLbl="asst1" presStyleIdx="4" presStyleCnt="5"/>
-      <dgm:spPr/>
-    </dgm:pt>
-    <dgm:pt modelId="{90BA8C5D-EE2C-499B-A845-93B32CA36DE9}" type="pres">
-      <dgm:prSet presAssocID="{D0B9E4B9-24FD-4BF3-A877-34012B7178F9}" presName="hierChild6" presStyleCnt="0"/>
-      <dgm:spPr/>
-    </dgm:pt>
-    <dgm:pt modelId="{8DB54E3D-4FE1-41E1-ABD0-D21AAC6E5D85}" type="pres">
-      <dgm:prSet presAssocID="{D0B9E4B9-24FD-4BF3-A877-34012B7178F9}" presName="hierChild7" presStyleCnt="0"/>
-      <dgm:spPr/>
-    </dgm:pt>
   </dgm:ptLst>
   <dgm:cxnLst>
-    <dgm:cxn modelId="{07B30A01-A1BE-4200-90CB-00843D8F6C92}" type="presOf" srcId="{975A07FC-54AE-434F-BB42-FF025D12E00D}" destId="{101E76A2-4743-4286-A350-ED12787CB775}" srcOrd="0" destOrd="0" presId="urn:microsoft.com/office/officeart/2008/layout/NameandTitleOrganizationalChart"/>
-    <dgm:cxn modelId="{4925BE04-01D1-4DBD-8576-D14A0A06D622}" type="presOf" srcId="{2BACDB74-68BC-46B0-9082-4870D3EEDDF7}" destId="{E1454AD8-92A9-4D75-B1F9-D25FFF23CF55}" srcOrd="0" destOrd="0" presId="urn:microsoft.com/office/officeart/2008/layout/NameandTitleOrganizationalChart"/>
-    <dgm:cxn modelId="{806AE408-E0BA-4978-AF8F-290213615660}" type="presOf" srcId="{1D45301E-AFFA-41A0-A3BC-E9198A860029}" destId="{79B36821-8B5C-4E25-9CAE-29F66DCC0474}" srcOrd="0" destOrd="0" presId="urn:microsoft.com/office/officeart/2008/layout/NameandTitleOrganizationalChart"/>
-    <dgm:cxn modelId="{AF16F00D-5B8C-4797-9E50-0D04FA44611E}" type="presOf" srcId="{94076EB5-61DF-418D-98B4-8247E5F4A0C2}" destId="{B07D686E-F7BD-47F3-8C9D-E3F4BF1B6336}" srcOrd="0" destOrd="0" presId="urn:microsoft.com/office/officeart/2008/layout/NameandTitleOrganizationalChart"/>
-    <dgm:cxn modelId="{B7FB9E17-CD97-4023-A78E-28C510CCC442}" type="presOf" srcId="{5C2C8788-6EDB-4B1C-8D92-0157F2241CAB}" destId="{F7B374D2-923B-4157-A1F7-83B6513409E4}" srcOrd="0" destOrd="0" presId="urn:microsoft.com/office/officeart/2008/layout/NameandTitleOrganizationalChart"/>
-    <dgm:cxn modelId="{BD317A1A-1321-41CB-9403-35ED99A7164A}" type="presOf" srcId="{78EA64E7-EC81-4CB2-A6CF-38BA52D353F7}" destId="{A0AD7242-ED6A-474D-B059-FB0D1C171505}" srcOrd="0" destOrd="0" presId="urn:microsoft.com/office/officeart/2008/layout/NameandTitleOrganizationalChart"/>
-    <dgm:cxn modelId="{C2383F20-19E9-4F9A-9E38-0D60BAB94EF5}" type="presOf" srcId="{4D8DFFA5-D8F1-4364-85A5-855E10B65E61}" destId="{0A15230D-CEAD-44AB-A9D8-4F1795C0EDC5}" srcOrd="0" destOrd="0" presId="urn:microsoft.com/office/officeart/2008/layout/NameandTitleOrganizationalChart"/>
-    <dgm:cxn modelId="{01760628-2256-417B-B0A5-0C10FB7D0037}" type="presOf" srcId="{9F9F8C06-D272-4539-AEF8-30C633A1CCDB}" destId="{B9DF72DF-4A7C-4757-B5C6-CE8BD368E8DF}" srcOrd="0" destOrd="0" presId="urn:microsoft.com/office/officeart/2008/layout/NameandTitleOrganizationalChart"/>
-    <dgm:cxn modelId="{BCBAAB2F-B083-4C02-A54B-D2FE5D825D34}" type="presOf" srcId="{FFDC85F9-33F6-41B1-9FAE-563F101C4C0A}" destId="{879708FF-C94E-4BC2-B60E-736C0D75B913}" srcOrd="0" destOrd="0" presId="urn:microsoft.com/office/officeart/2008/layout/NameandTitleOrganizationalChart"/>
-    <dgm:cxn modelId="{E0277230-7F10-41E1-BE7B-0FB699F9EA52}" type="presOf" srcId="{BE0CB87B-5EA2-4B65-978F-1F3F2606237B}" destId="{B3283E1E-2057-4690-A212-3D2DAFA652BD}" srcOrd="0" destOrd="0" presId="urn:microsoft.com/office/officeart/2008/layout/NameandTitleOrganizationalChart"/>
-    <dgm:cxn modelId="{2D669731-758F-4210-8AAD-189C94578138}" type="presOf" srcId="{3C4F18BB-FF2A-4D58-A1C7-ED4E3AAFC1FB}" destId="{45F2E63E-3EB4-4AA6-9262-2D4E07AB612D}" srcOrd="0" destOrd="0" presId="urn:microsoft.com/office/officeart/2008/layout/NameandTitleOrganizationalChart"/>
-    <dgm:cxn modelId="{D77C4E63-E868-4D5F-8877-2A6CEE566B23}" type="presOf" srcId="{B3DD6697-12CA-4F69-9ECA-30450B8C8F87}" destId="{FF2D7759-F361-4E1C-8453-7D5907060ADA}" srcOrd="1" destOrd="0" presId="urn:microsoft.com/office/officeart/2008/layout/NameandTitleOrganizationalChart"/>
-    <dgm:cxn modelId="{DB384F64-E4C8-4899-9B09-B7F58217419F}" type="presOf" srcId="{4AEBD848-8434-4FC9-8569-2AE14B5ACF53}" destId="{AB3EC8CC-7AD0-4ADD-8E48-F1FFC2E107B9}" srcOrd="0" destOrd="0" presId="urn:microsoft.com/office/officeart/2008/layout/NameandTitleOrganizationalChart"/>
-    <dgm:cxn modelId="{0A465F65-E204-4029-B346-78AEED638414}" srcId="{6DCAEAD0-0997-4792-B08F-5B64CFA15D64}" destId="{BE0CB87B-5EA2-4B65-978F-1F3F2606237B}" srcOrd="3" destOrd="0" parTransId="{E8F559E0-E518-4C2A-B2F8-4627280A09F4}" sibTransId="{78EA64E7-EC81-4CB2-A6CF-38BA52D353F7}"/>
-    <dgm:cxn modelId="{F2638165-0790-4C1A-B2C7-5A0C6768D7E0}" type="presOf" srcId="{B3DD6697-12CA-4F69-9ECA-30450B8C8F87}" destId="{CA178424-5890-4242-A103-23C325743DDD}" srcOrd="0" destOrd="0" presId="urn:microsoft.com/office/officeart/2008/layout/NameandTitleOrganizationalChart"/>
-    <dgm:cxn modelId="{7DC71E48-C54F-4409-B274-2A0A224CEF64}" type="presOf" srcId="{6DCAEAD0-0997-4792-B08F-5B64CFA15D64}" destId="{D6F87856-DB89-4B07-8E36-FBCCD2682A58}" srcOrd="1" destOrd="0" presId="urn:microsoft.com/office/officeart/2008/layout/NameandTitleOrganizationalChart"/>
-    <dgm:cxn modelId="{503EF66C-1AEB-4A12-A311-1DAD9D0E1755}" type="presOf" srcId="{6DCAEAD0-0997-4792-B08F-5B64CFA15D64}" destId="{0E2F0851-4C4D-4530-93D1-F0F47B358084}" srcOrd="0" destOrd="0" presId="urn:microsoft.com/office/officeart/2008/layout/NameandTitleOrganizationalChart"/>
-    <dgm:cxn modelId="{10D4AD4E-DE4C-4A31-B891-2FB14972ADAF}" type="presOf" srcId="{5F5112E3-A378-4DB5-ACBE-AAF947BD9DF1}" destId="{F3830243-C9A1-4DF7-8669-B314549186C1}" srcOrd="0" destOrd="0" presId="urn:microsoft.com/office/officeart/2008/layout/NameandTitleOrganizationalChart"/>
-    <dgm:cxn modelId="{69129C70-2734-44D5-9A0D-8D58255E1808}" srcId="{6DCAEAD0-0997-4792-B08F-5B64CFA15D64}" destId="{27F0FE99-366C-41D5-9669-5E0F5BD96B42}" srcOrd="7" destOrd="0" parTransId="{5F5112E3-A378-4DB5-ACBE-AAF947BD9DF1}" sibTransId="{1D45301E-AFFA-41A0-A3BC-E9198A860029}"/>
-    <dgm:cxn modelId="{6A2F6C71-E2D7-48D2-B417-79CB618383D8}" type="presOf" srcId="{D0B9E4B9-24FD-4BF3-A877-34012B7178F9}" destId="{51DB92DD-B79E-4851-B428-2D6647EE4E80}" srcOrd="0" destOrd="0" presId="urn:microsoft.com/office/officeart/2008/layout/NameandTitleOrganizationalChart"/>
-    <dgm:cxn modelId="{CB01E653-7F88-46A2-B228-1502835FB092}" type="presOf" srcId="{E6019557-29F8-4A36-AAD3-06C8D7DCD97A}" destId="{261948D4-2FA7-4063-B7A1-EDC8AF65CE54}" srcOrd="0" destOrd="0" presId="urn:microsoft.com/office/officeart/2008/layout/NameandTitleOrganizationalChart"/>
-    <dgm:cxn modelId="{1B424579-96D4-4F44-A567-7797C9683C5A}" srcId="{6DCAEAD0-0997-4792-B08F-5B64CFA15D64}" destId="{5BC05B46-0C29-4999-A747-2413AA95AA1E}" srcOrd="0" destOrd="0" parTransId="{5C2C8788-6EDB-4B1C-8D92-0157F2241CAB}" sibTransId="{6C47FC16-E08D-47D4-ACD0-95004A46C094}"/>
-    <dgm:cxn modelId="{EA21D781-FFD4-4D44-9134-20BE58BD4308}" type="presOf" srcId="{3786B665-C0D1-4818-A187-73C0466DDAF0}" destId="{64D84924-42BA-4257-BD89-84914B8CD867}" srcOrd="1" destOrd="0" presId="urn:microsoft.com/office/officeart/2008/layout/NameandTitleOrganizationalChart"/>
-    <dgm:cxn modelId="{9D013A8E-BFB0-4B65-9DA8-BA4172DC9C87}" type="presOf" srcId="{2B2FD583-5434-4E03-8D3C-74676C96DC8E}" destId="{CC557E83-DF62-40AD-8846-5E84F3421AB0}" srcOrd="0" destOrd="0" presId="urn:microsoft.com/office/officeart/2008/layout/NameandTitleOrganizationalChart"/>
-    <dgm:cxn modelId="{B8253597-2D57-4988-8AAC-C1701222C5FE}" type="presOf" srcId="{975A07FC-54AE-434F-BB42-FF025D12E00D}" destId="{4ECAD660-942D-4104-A853-1C810DA1F24E}" srcOrd="1" destOrd="0" presId="urn:microsoft.com/office/officeart/2008/layout/NameandTitleOrganizationalChart"/>
-    <dgm:cxn modelId="{7115CA98-ABB5-4EC3-A800-FD3016B0F0AE}" type="presOf" srcId="{AF04E6C3-481B-4261-BA90-9DFF6F7188D3}" destId="{4CB25805-913C-467F-83C6-B08F3AFCFA0F}" srcOrd="0" destOrd="0" presId="urn:microsoft.com/office/officeart/2008/layout/NameandTitleOrganizationalChart"/>
-    <dgm:cxn modelId="{DE9C649D-09F2-4A10-82A4-7979AA366A0D}" srcId="{6DCAEAD0-0997-4792-B08F-5B64CFA15D64}" destId="{B3DD6697-12CA-4F69-9ECA-30450B8C8F87}" srcOrd="5" destOrd="0" parTransId="{2BACDB74-68BC-46B0-9082-4870D3EEDDF7}" sibTransId="{A2758F12-CFA1-4AF9-8C0F-F37075F04D02}"/>
-    <dgm:cxn modelId="{E139CBA0-8705-4959-BBBC-4AF880E70129}" type="presOf" srcId="{B3E0E86C-62E8-4813-BA77-F566ABF5644E}" destId="{C08D4BA8-B80B-44C7-BC19-57306DF9A87F}" srcOrd="0" destOrd="0" presId="urn:microsoft.com/office/officeart/2008/layout/NameandTitleOrganizationalChart"/>
-    <dgm:cxn modelId="{4AF564A2-155C-450C-B45E-258021A3D98B}" type="presOf" srcId="{5BC05B46-0C29-4999-A747-2413AA95AA1E}" destId="{2B5C7799-873D-42EB-A9F8-2A4A5CF12AF9}" srcOrd="1" destOrd="0" presId="urn:microsoft.com/office/officeart/2008/layout/NameandTitleOrganizationalChart"/>
-    <dgm:cxn modelId="{20934AAA-60DB-4D20-9230-6AF7D401FB5A}" type="presOf" srcId="{27F0FE99-366C-41D5-9669-5E0F5BD96B42}" destId="{7F440B4E-5F7D-455A-B718-6B7FA6B4E517}" srcOrd="1" destOrd="0" presId="urn:microsoft.com/office/officeart/2008/layout/NameandTitleOrganizationalChart"/>
-    <dgm:cxn modelId="{61308FAB-75D3-4102-893C-302CBFD70128}" type="presOf" srcId="{27F0FE99-366C-41D5-9669-5E0F5BD96B42}" destId="{9B35FC8C-9186-49B8-A053-DD687917697F}" srcOrd="0" destOrd="0" presId="urn:microsoft.com/office/officeart/2008/layout/NameandTitleOrganizationalChart"/>
-    <dgm:cxn modelId="{D469DCAF-4EC6-43CB-B294-0DA5BB79A9D7}" type="presOf" srcId="{D0B9E4B9-24FD-4BF3-A877-34012B7178F9}" destId="{F60EE2F1-06F8-4D1C-AF4C-5BEB6DD46FD3}" srcOrd="1" destOrd="0" presId="urn:microsoft.com/office/officeart/2008/layout/NameandTitleOrganizationalChart"/>
-    <dgm:cxn modelId="{DAC0CABD-AA07-4865-B7FF-88F5F729BC02}" srcId="{6DCAEAD0-0997-4792-B08F-5B64CFA15D64}" destId="{AF04E6C3-481B-4261-BA90-9DFF6F7188D3}" srcOrd="6" destOrd="0" parTransId="{9F9F8C06-D272-4539-AEF8-30C633A1CCDB}" sibTransId="{E6019557-29F8-4A36-AAD3-06C8D7DCD97A}"/>
-    <dgm:cxn modelId="{0344FDBD-166A-4F47-BA42-B8701B9E2D92}" type="presOf" srcId="{AF04E6C3-481B-4261-BA90-9DFF6F7188D3}" destId="{CDCA7A2C-026D-4A0C-9E83-8C0BBBB62503}" srcOrd="1" destOrd="0" presId="urn:microsoft.com/office/officeart/2008/layout/NameandTitleOrganizationalChart"/>
-    <dgm:cxn modelId="{8FB4B0C7-D5AE-43E9-BFAB-09A28F9AD5D4}" type="presOf" srcId="{3786B665-C0D1-4818-A187-73C0466DDAF0}" destId="{00B9D14D-0388-44E4-BC78-EBCAD0B6979C}" srcOrd="0" destOrd="0" presId="urn:microsoft.com/office/officeart/2008/layout/NameandTitleOrganizationalChart"/>
-    <dgm:cxn modelId="{49596CC8-7C80-42E4-8174-3CB9C8E035FF}" type="presOf" srcId="{1D935358-EA2F-4BB5-B672-F3901DA6C92F}" destId="{CA7EC028-924C-4884-A5D8-BC856AC98A33}" srcOrd="0" destOrd="0" presId="urn:microsoft.com/office/officeart/2008/layout/NameandTitleOrganizationalChart"/>
-    <dgm:cxn modelId="{5FD503CE-E755-4BE3-986B-679717F4EADA}" type="presOf" srcId="{E8F559E0-E518-4C2A-B2F8-4627280A09F4}" destId="{CF29FFD7-FA45-4B44-B920-5739BBD8395F}" srcOrd="0" destOrd="0" presId="urn:microsoft.com/office/officeart/2008/layout/NameandTitleOrganizationalChart"/>
-    <dgm:cxn modelId="{20DB19CE-44FE-43C2-87E5-E2A1BA849874}" srcId="{6DCAEAD0-0997-4792-B08F-5B64CFA15D64}" destId="{3786B665-C0D1-4818-A187-73C0466DDAF0}" srcOrd="1" destOrd="0" parTransId="{FFDC85F9-33F6-41B1-9FAE-563F101C4C0A}" sibTransId="{2B2FD583-5434-4E03-8D3C-74676C96DC8E}"/>
-    <dgm:cxn modelId="{25D48DD0-9FF5-45C1-B5BA-AA6E504D6B41}" srcId="{6DCAEAD0-0997-4792-B08F-5B64CFA15D64}" destId="{975A07FC-54AE-434F-BB42-FF025D12E00D}" srcOrd="2" destOrd="0" parTransId="{B3E0E86C-62E8-4813-BA77-F566ABF5644E}" sibTransId="{4AEBD848-8434-4FC9-8569-2AE14B5ACF53}"/>
+    <dgm:cxn modelId="{5D03C308-97F0-4B37-91E9-306B5DDFC54D}" type="presOf" srcId="{B3E0E86C-62E8-4813-BA77-F566ABF5644E}" destId="{AFA13D1E-B68F-4E1C-A8A5-C8CBFB686937}" srcOrd="0" destOrd="0" presId="urn:microsoft.com/office/officeart/2005/8/layout/hierarchy6"/>
+    <dgm:cxn modelId="{D00FF41E-6F4C-4D9C-B252-B233D667FF7E}" type="presOf" srcId="{03072DBA-B260-46EF-B2F9-80BEEF029960}" destId="{00013FE3-9E03-4ABD-8634-95136BD9B976}" srcOrd="0" destOrd="0" presId="urn:microsoft.com/office/officeart/2005/8/layout/hierarchy6"/>
+    <dgm:cxn modelId="{893DA832-6613-4ECA-B5CD-D6B296081DB4}" type="presOf" srcId="{7B45A5DC-3748-4AC5-9C5B-1DB8428C64B3}" destId="{33C0EE81-5720-4FA0-ACAD-B89C78FCB4C0}" srcOrd="1" destOrd="0" presId="urn:microsoft.com/office/officeart/2005/8/layout/hierarchy6"/>
+    <dgm:cxn modelId="{2FB91933-0D9C-4FCB-A93C-A763A245E23D}" type="presOf" srcId="{F3D51A4D-6FB5-4504-BFD6-59296C2B7E6D}" destId="{75BA6FCF-B20C-4695-AD33-1AC04E6188EF}" srcOrd="0" destOrd="0" presId="urn:microsoft.com/office/officeart/2005/8/layout/hierarchy6"/>
+    <dgm:cxn modelId="{2A380937-9846-4E5D-A97A-6DA395F520A5}" type="presOf" srcId="{1D935358-EA2F-4BB5-B672-F3901DA6C92F}" destId="{5B3FA25E-7636-40FF-8B40-FDD6A271C5F6}" srcOrd="0" destOrd="0" presId="urn:microsoft.com/office/officeart/2005/8/layout/hierarchy6"/>
+    <dgm:cxn modelId="{7C20E43C-D84D-41B0-8E42-E2ED703CFEB2}" type="presOf" srcId="{C24A352F-8489-45E0-9455-7579655FBFBF}" destId="{2C1BBD02-149D-4AEF-8B7C-071D427D6796}" srcOrd="0" destOrd="0" presId="urn:microsoft.com/office/officeart/2005/8/layout/hierarchy6"/>
+    <dgm:cxn modelId="{BC493340-6864-411D-8227-C190776E3E9F}" srcId="{BE0CB87B-5EA2-4B65-978F-1F3F2606237B}" destId="{AA86BBFB-9BC5-43B5-A534-F28A38AF2423}" srcOrd="1" destOrd="0" parTransId="{F3D51A4D-6FB5-4504-BFD6-59296C2B7E6D}" sibTransId="{53C3E8FB-F970-4853-8D1A-CDC8D0C5BE7C}"/>
+    <dgm:cxn modelId="{B432405B-C9B2-417F-9D05-8994D3A37275}" srcId="{1D935358-EA2F-4BB5-B672-F3901DA6C92F}" destId="{03072DBA-B260-46EF-B2F9-80BEEF029960}" srcOrd="1" destOrd="0" parTransId="{07BDC7C2-376D-4007-A4FD-90ECE6003A94}" sibTransId="{99FE2F72-32AB-4121-91AD-4A924373C561}"/>
+    <dgm:cxn modelId="{9A622561-C38B-4DB6-83A0-260923FFD54B}" type="presOf" srcId="{6DCAEAD0-0997-4792-B08F-5B64CFA15D64}" destId="{106846B4-C57C-4B4A-8BDC-EA3A01B8B95F}" srcOrd="0" destOrd="0" presId="urn:microsoft.com/office/officeart/2005/8/layout/hierarchy6"/>
+    <dgm:cxn modelId="{BD6A4543-A51A-4BC1-9A52-E4FE6609056F}" type="presOf" srcId="{AA86BBFB-9BC5-43B5-A534-F28A38AF2423}" destId="{D8B091A3-A137-49C1-BBB3-FD15C0D8621B}" srcOrd="0" destOrd="0" presId="urn:microsoft.com/office/officeart/2005/8/layout/hierarchy6"/>
+    <dgm:cxn modelId="{0A465F65-E204-4029-B346-78AEED638414}" srcId="{6DCAEAD0-0997-4792-B08F-5B64CFA15D64}" destId="{BE0CB87B-5EA2-4B65-978F-1F3F2606237B}" srcOrd="1" destOrd="0" parTransId="{E8F559E0-E518-4C2A-B2F8-4627280A09F4}" sibTransId="{78EA64E7-EC81-4CB2-A6CF-38BA52D353F7}"/>
+    <dgm:cxn modelId="{99EDC148-4438-46D8-9E8D-CF14B021EE10}" type="presOf" srcId="{9F7517E5-072C-41BC-8A7B-78B40CCFE20F}" destId="{CF4E21CA-CC73-4165-995C-F0D194F310B6}" srcOrd="1" destOrd="0" presId="urn:microsoft.com/office/officeart/2005/8/layout/hierarchy6"/>
+    <dgm:cxn modelId="{925BAC4A-C8BC-4616-A094-9390B2B0C117}" type="presOf" srcId="{E8F559E0-E518-4C2A-B2F8-4627280A09F4}" destId="{4B4C13B4-BD1C-43B8-96A8-3016EDC34C57}" srcOrd="0" destOrd="0" presId="urn:microsoft.com/office/officeart/2005/8/layout/hierarchy6"/>
+    <dgm:cxn modelId="{CF738F4C-9D59-4FBB-8EF3-CAE92D5C1349}" srcId="{1D935358-EA2F-4BB5-B672-F3901DA6C92F}" destId="{9F7517E5-072C-41BC-8A7B-78B40CCFE20F}" srcOrd="2" destOrd="0" parTransId="{7E7E0A64-7EE5-4848-B079-72A7FFF4676A}" sibTransId="{C6D449B0-2239-4A8F-9C56-A23B1C1DEDB9}"/>
+    <dgm:cxn modelId="{6EB3928B-146B-4B5C-ADCB-28F277EAD921}" type="presOf" srcId="{975A07FC-54AE-434F-BB42-FF025D12E00D}" destId="{21353F14-EF15-4F1A-AD9C-52082FDC1EDE}" srcOrd="0" destOrd="0" presId="urn:microsoft.com/office/officeart/2005/8/layout/hierarchy6"/>
+    <dgm:cxn modelId="{28EEF68C-B21D-4B06-8EAD-7D95EA0698BD}" type="presOf" srcId="{FA316560-31BF-4DED-9BC6-EFCB1644CA41}" destId="{4037397F-5207-48DC-BDDE-62634F8E7BCC}" srcOrd="0" destOrd="0" presId="urn:microsoft.com/office/officeart/2005/8/layout/hierarchy6"/>
+    <dgm:cxn modelId="{19F5218D-C020-4254-A9D4-14B82EC1F640}" type="presOf" srcId="{9F7517E5-072C-41BC-8A7B-78B40CCFE20F}" destId="{C61F606F-B47E-4079-B576-6BB6204940A6}" srcOrd="0" destOrd="0" presId="urn:microsoft.com/office/officeart/2005/8/layout/hierarchy6"/>
+    <dgm:cxn modelId="{BA37788E-2528-48EE-91CD-3DCA0BCEE4EA}" type="presOf" srcId="{BE0CB87B-5EA2-4B65-978F-1F3F2606237B}" destId="{8A4DBA3A-9F9F-428E-A158-D57E8800853A}" srcOrd="0" destOrd="0" presId="urn:microsoft.com/office/officeart/2005/8/layout/hierarchy6"/>
+    <dgm:cxn modelId="{D598088F-5AC3-4EFE-99DC-F1529DD80D76}" type="presOf" srcId="{03072DBA-B260-46EF-B2F9-80BEEF029960}" destId="{A359CB32-FD74-4851-9450-2FA85503D79A}" srcOrd="1" destOrd="0" presId="urn:microsoft.com/office/officeart/2005/8/layout/hierarchy6"/>
+    <dgm:cxn modelId="{F10D4FA5-987D-4BA3-9D14-C36EA1D4B865}" type="presOf" srcId="{7B45A5DC-3748-4AC5-9C5B-1DB8428C64B3}" destId="{4845A9D5-6564-4487-914B-D1485D7DDD63}" srcOrd="0" destOrd="0" presId="urn:microsoft.com/office/officeart/2005/8/layout/hierarchy6"/>
+    <dgm:cxn modelId="{C2A042B5-EB4B-494A-AD77-F52FA24AF0FC}" srcId="{BE0CB87B-5EA2-4B65-978F-1F3F2606237B}" destId="{C24A352F-8489-45E0-9455-7579655FBFBF}" srcOrd="0" destOrd="0" parTransId="{3264C905-E5C1-4A9B-9D01-0D70265F6246}" sibTransId="{DC42C2FF-5A95-42E0-A5E3-4662119E05EF}"/>
+    <dgm:cxn modelId="{C36479B7-EB3A-419D-846C-237C675D4630}" srcId="{BE0CB87B-5EA2-4B65-978F-1F3F2606237B}" destId="{FA316560-31BF-4DED-9BC6-EFCB1644CA41}" srcOrd="2" destOrd="0" parTransId="{BDE52E20-D3F8-4295-96AD-8A7DBDD6926D}" sibTransId="{B8A35A65-E544-4543-AEE7-183B806A4EA2}"/>
+    <dgm:cxn modelId="{ACFC96BC-F382-4055-AC53-2EFD3D3D4BE2}" type="presOf" srcId="{BDE52E20-D3F8-4295-96AD-8A7DBDD6926D}" destId="{20187EFF-9F54-440A-8907-93C3BB961C65}" srcOrd="0" destOrd="0" presId="urn:microsoft.com/office/officeart/2005/8/layout/hierarchy6"/>
+    <dgm:cxn modelId="{12B180C9-6957-4659-84A0-32C0315178A4}" type="presOf" srcId="{3264C905-E5C1-4A9B-9D01-0D70265F6246}" destId="{5532AA10-5880-4269-902B-3B7CF5C0D400}" srcOrd="0" destOrd="0" presId="urn:microsoft.com/office/officeart/2005/8/layout/hierarchy6"/>
+    <dgm:cxn modelId="{25D48DD0-9FF5-45C1-B5BA-AA6E504D6B41}" srcId="{6DCAEAD0-0997-4792-B08F-5B64CFA15D64}" destId="{975A07FC-54AE-434F-BB42-FF025D12E00D}" srcOrd="0" destOrd="0" parTransId="{B3E0E86C-62E8-4813-BA77-F566ABF5644E}" sibTransId="{4AEBD848-8434-4FC9-8569-2AE14B5ACF53}"/>
     <dgm:cxn modelId="{E2CF52D3-1858-4FB1-A9FC-4295CC43F5C4}" srcId="{1D935358-EA2F-4BB5-B672-F3901DA6C92F}" destId="{6DCAEAD0-0997-4792-B08F-5B64CFA15D64}" srcOrd="0" destOrd="0" parTransId="{D4471057-C71F-476B-AB7A-BB3B514E6833}" sibTransId="{3C4F18BB-FF2A-4D58-A1C7-ED4E3AAFC1FB}"/>
-    <dgm:cxn modelId="{C4CA0DDB-AC9D-40A2-9630-0D0047754310}" srcId="{6DCAEAD0-0997-4792-B08F-5B64CFA15D64}" destId="{D0B9E4B9-24FD-4BF3-A877-34012B7178F9}" srcOrd="4" destOrd="0" parTransId="{4D8DFFA5-D8F1-4364-85A5-855E10B65E61}" sibTransId="{94076EB5-61DF-418D-98B4-8247E5F4A0C2}"/>
-    <dgm:cxn modelId="{26BEC4E9-C78E-4E29-BA16-AC709EE709C6}" type="presOf" srcId="{5BC05B46-0C29-4999-A747-2413AA95AA1E}" destId="{6241BE42-6B83-43C5-9E4C-7A66D6D9EFA4}" srcOrd="0" destOrd="0" presId="urn:microsoft.com/office/officeart/2008/layout/NameandTitleOrganizationalChart"/>
-    <dgm:cxn modelId="{A36984F1-1170-42C3-AD31-BC197ABF0A93}" type="presOf" srcId="{BE0CB87B-5EA2-4B65-978F-1F3F2606237B}" destId="{1A764CF8-A43E-49B0-A5E6-86652167097B}" srcOrd="1" destOrd="0" presId="urn:microsoft.com/office/officeart/2008/layout/NameandTitleOrganizationalChart"/>
-    <dgm:cxn modelId="{A737D0F4-4A5B-48B4-91F4-E37C9EC83439}" type="presOf" srcId="{A2758F12-CFA1-4AF9-8C0F-F37075F04D02}" destId="{D1C69FA8-DF74-4F4B-9D7C-F958FB699CDF}" srcOrd="0" destOrd="0" presId="urn:microsoft.com/office/officeart/2008/layout/NameandTitleOrganizationalChart"/>
-    <dgm:cxn modelId="{7F8D32F9-B147-41C1-A6E3-B3D646E421F5}" type="presOf" srcId="{6C47FC16-E08D-47D4-ACD0-95004A46C094}" destId="{093426B6-CB37-4BFB-A245-2C41D01495F2}" srcOrd="0" destOrd="0" presId="urn:microsoft.com/office/officeart/2008/layout/NameandTitleOrganizationalChart"/>
-    <dgm:cxn modelId="{1E642EC2-D00C-483E-AB47-BE8D4FC2192E}" type="presParOf" srcId="{CA7EC028-924C-4884-A5D8-BC856AC98A33}" destId="{FBBE2CC4-173D-4362-ADD9-519407899388}" srcOrd="0" destOrd="0" presId="urn:microsoft.com/office/officeart/2008/layout/NameandTitleOrganizationalChart"/>
-    <dgm:cxn modelId="{BAF74E09-CCC6-443C-BC19-8942534C8CF5}" type="presParOf" srcId="{FBBE2CC4-173D-4362-ADD9-519407899388}" destId="{A9C13C0C-DF1F-4D90-B820-AE0E39B5BBAF}" srcOrd="0" destOrd="0" presId="urn:microsoft.com/office/officeart/2008/layout/NameandTitleOrganizationalChart"/>
-    <dgm:cxn modelId="{9A94820C-9B79-42BE-A483-3CED7D776C2A}" type="presParOf" srcId="{A9C13C0C-DF1F-4D90-B820-AE0E39B5BBAF}" destId="{0E2F0851-4C4D-4530-93D1-F0F47B358084}" srcOrd="0" destOrd="0" presId="urn:microsoft.com/office/officeart/2008/layout/NameandTitleOrganizationalChart"/>
-    <dgm:cxn modelId="{6C5B7693-A104-4482-A432-AC3016793744}" type="presParOf" srcId="{A9C13C0C-DF1F-4D90-B820-AE0E39B5BBAF}" destId="{45F2E63E-3EB4-4AA6-9262-2D4E07AB612D}" srcOrd="1" destOrd="0" presId="urn:microsoft.com/office/officeart/2008/layout/NameandTitleOrganizationalChart"/>
-    <dgm:cxn modelId="{F098D43D-EED6-4410-9F76-BF3AC73D5F4C}" type="presParOf" srcId="{A9C13C0C-DF1F-4D90-B820-AE0E39B5BBAF}" destId="{D6F87856-DB89-4B07-8E36-FBCCD2682A58}" srcOrd="2" destOrd="0" presId="urn:microsoft.com/office/officeart/2008/layout/NameandTitleOrganizationalChart"/>
-    <dgm:cxn modelId="{97E2656D-8C28-4B96-86E7-008B6D673D58}" type="presParOf" srcId="{FBBE2CC4-173D-4362-ADD9-519407899388}" destId="{7CE13014-780E-4A2A-9056-F7B514DFFC56}" srcOrd="1" destOrd="0" presId="urn:microsoft.com/office/officeart/2008/layout/NameandTitleOrganizationalChart"/>
-    <dgm:cxn modelId="{A35CAAD4-B452-468C-98D6-B7D70DA213DF}" type="presParOf" srcId="{7CE13014-780E-4A2A-9056-F7B514DFFC56}" destId="{E1454AD8-92A9-4D75-B1F9-D25FFF23CF55}" srcOrd="0" destOrd="0" presId="urn:microsoft.com/office/officeart/2008/layout/NameandTitleOrganizationalChart"/>
-    <dgm:cxn modelId="{17BF5C69-E49B-47E0-B5CD-0934EE5FFAC8}" type="presParOf" srcId="{7CE13014-780E-4A2A-9056-F7B514DFFC56}" destId="{6CAE6F28-8153-4065-A7CE-2F677AF38552}" srcOrd="1" destOrd="0" presId="urn:microsoft.com/office/officeart/2008/layout/NameandTitleOrganizationalChart"/>
-    <dgm:cxn modelId="{B764E743-7B2D-4CCB-81FF-947C27A0FB74}" type="presParOf" srcId="{6CAE6F28-8153-4065-A7CE-2F677AF38552}" destId="{D3C2FAA7-65F1-4FA2-A30E-716E46016A59}" srcOrd="0" destOrd="0" presId="urn:microsoft.com/office/officeart/2008/layout/NameandTitleOrganizationalChart"/>
-    <dgm:cxn modelId="{2E2E3F74-564A-4C68-A7A6-6C35F07488E0}" type="presParOf" srcId="{D3C2FAA7-65F1-4FA2-A30E-716E46016A59}" destId="{CA178424-5890-4242-A103-23C325743DDD}" srcOrd="0" destOrd="0" presId="urn:microsoft.com/office/officeart/2008/layout/NameandTitleOrganizationalChart"/>
-    <dgm:cxn modelId="{3193CD7C-C3C7-46EE-ABB9-CB2EF24BC759}" type="presParOf" srcId="{D3C2FAA7-65F1-4FA2-A30E-716E46016A59}" destId="{D1C69FA8-DF74-4F4B-9D7C-F958FB699CDF}" srcOrd="1" destOrd="0" presId="urn:microsoft.com/office/officeart/2008/layout/NameandTitleOrganizationalChart"/>
-    <dgm:cxn modelId="{83230BB0-F580-47A0-AD98-1371DDA9FE82}" type="presParOf" srcId="{D3C2FAA7-65F1-4FA2-A30E-716E46016A59}" destId="{FF2D7759-F361-4E1C-8453-7D5907060ADA}" srcOrd="2" destOrd="0" presId="urn:microsoft.com/office/officeart/2008/layout/NameandTitleOrganizationalChart"/>
-    <dgm:cxn modelId="{6C8F3F08-90FC-44D5-A507-85534E368C77}" type="presParOf" srcId="{6CAE6F28-8153-4065-A7CE-2F677AF38552}" destId="{3F72EC58-F818-4246-B4EE-FD4563900503}" srcOrd="1" destOrd="0" presId="urn:microsoft.com/office/officeart/2008/layout/NameandTitleOrganizationalChart"/>
-    <dgm:cxn modelId="{2963FF5C-3106-4193-BD2C-3761DBD2D53F}" type="presParOf" srcId="{6CAE6F28-8153-4065-A7CE-2F677AF38552}" destId="{4F689891-3550-4C0A-9944-9B6ADA6AA53C}" srcOrd="2" destOrd="0" presId="urn:microsoft.com/office/officeart/2008/layout/NameandTitleOrganizationalChart"/>
-    <dgm:cxn modelId="{F52BFD31-5CD9-4472-8DB4-94CBE0DB8B6E}" type="presParOf" srcId="{7CE13014-780E-4A2A-9056-F7B514DFFC56}" destId="{B9DF72DF-4A7C-4757-B5C6-CE8BD368E8DF}" srcOrd="2" destOrd="0" presId="urn:microsoft.com/office/officeart/2008/layout/NameandTitleOrganizationalChart"/>
-    <dgm:cxn modelId="{7960C17B-7659-42DA-87E8-C5CC0D57DA3B}" type="presParOf" srcId="{7CE13014-780E-4A2A-9056-F7B514DFFC56}" destId="{18FB92B0-452E-4988-BA72-08CF5F3624A0}" srcOrd="3" destOrd="0" presId="urn:microsoft.com/office/officeart/2008/layout/NameandTitleOrganizationalChart"/>
-    <dgm:cxn modelId="{590D36B0-8275-48C2-AB0F-02F8DFAF57A0}" type="presParOf" srcId="{18FB92B0-452E-4988-BA72-08CF5F3624A0}" destId="{0253AC07-40F4-4826-A0CF-B39563808A93}" srcOrd="0" destOrd="0" presId="urn:microsoft.com/office/officeart/2008/layout/NameandTitleOrganizationalChart"/>
-    <dgm:cxn modelId="{30359FCA-C486-4A4A-A548-57CBA42FF802}" type="presParOf" srcId="{0253AC07-40F4-4826-A0CF-B39563808A93}" destId="{4CB25805-913C-467F-83C6-B08F3AFCFA0F}" srcOrd="0" destOrd="0" presId="urn:microsoft.com/office/officeart/2008/layout/NameandTitleOrganizationalChart"/>
-    <dgm:cxn modelId="{9A6A04A6-CFAE-4A41-9DB7-B555EEE6980B}" type="presParOf" srcId="{0253AC07-40F4-4826-A0CF-B39563808A93}" destId="{261948D4-2FA7-4063-B7A1-EDC8AF65CE54}" srcOrd="1" destOrd="0" presId="urn:microsoft.com/office/officeart/2008/layout/NameandTitleOrganizationalChart"/>
-    <dgm:cxn modelId="{9948769B-E4EE-405E-BA94-DFF75DADA49C}" type="presParOf" srcId="{0253AC07-40F4-4826-A0CF-B39563808A93}" destId="{CDCA7A2C-026D-4A0C-9E83-8C0BBBB62503}" srcOrd="2" destOrd="0" presId="urn:microsoft.com/office/officeart/2008/layout/NameandTitleOrganizationalChart"/>
-    <dgm:cxn modelId="{7126E9AA-B548-408C-BE5F-CDB1A23DBF8A}" type="presParOf" srcId="{18FB92B0-452E-4988-BA72-08CF5F3624A0}" destId="{A083279B-47F7-4C45-984A-4A6DC83D2D4E}" srcOrd="1" destOrd="0" presId="urn:microsoft.com/office/officeart/2008/layout/NameandTitleOrganizationalChart"/>
-    <dgm:cxn modelId="{0C063160-492E-4609-8B46-9DC1C5D492C8}" type="presParOf" srcId="{18FB92B0-452E-4988-BA72-08CF5F3624A0}" destId="{A3B1AB49-D71F-4472-B580-CB73AD3044F2}" srcOrd="2" destOrd="0" presId="urn:microsoft.com/office/officeart/2008/layout/NameandTitleOrganizationalChart"/>
-    <dgm:cxn modelId="{9AC8EC92-BE71-4888-8503-97AD52597CF9}" type="presParOf" srcId="{7CE13014-780E-4A2A-9056-F7B514DFFC56}" destId="{F3830243-C9A1-4DF7-8669-B314549186C1}" srcOrd="4" destOrd="0" presId="urn:microsoft.com/office/officeart/2008/layout/NameandTitleOrganizationalChart"/>
-    <dgm:cxn modelId="{4EF2FF23-3478-49BC-B452-F2D359B6542F}" type="presParOf" srcId="{7CE13014-780E-4A2A-9056-F7B514DFFC56}" destId="{22AD43E7-667A-4BFA-9AF9-A6F7B329E10E}" srcOrd="5" destOrd="0" presId="urn:microsoft.com/office/officeart/2008/layout/NameandTitleOrganizationalChart"/>
-    <dgm:cxn modelId="{2E3B93E5-798C-4F5C-8BF2-265071D6C7F1}" type="presParOf" srcId="{22AD43E7-667A-4BFA-9AF9-A6F7B329E10E}" destId="{EA4D9F20-D58A-4A1F-B067-7D911573A3E9}" srcOrd="0" destOrd="0" presId="urn:microsoft.com/office/officeart/2008/layout/NameandTitleOrganizationalChart"/>
-    <dgm:cxn modelId="{0B2896B2-946C-428C-A430-5C9793EEA72F}" type="presParOf" srcId="{EA4D9F20-D58A-4A1F-B067-7D911573A3E9}" destId="{9B35FC8C-9186-49B8-A053-DD687917697F}" srcOrd="0" destOrd="0" presId="urn:microsoft.com/office/officeart/2008/layout/NameandTitleOrganizationalChart"/>
-    <dgm:cxn modelId="{78F08FA5-2FBB-4322-8179-0FDFE6AAA107}" type="presParOf" srcId="{EA4D9F20-D58A-4A1F-B067-7D911573A3E9}" destId="{79B36821-8B5C-4E25-9CAE-29F66DCC0474}" srcOrd="1" destOrd="0" presId="urn:microsoft.com/office/officeart/2008/layout/NameandTitleOrganizationalChart"/>
-    <dgm:cxn modelId="{8C1C39D9-A0AD-4674-81F9-4D5FE3ABA988}" type="presParOf" srcId="{EA4D9F20-D58A-4A1F-B067-7D911573A3E9}" destId="{7F440B4E-5F7D-455A-B718-6B7FA6B4E517}" srcOrd="2" destOrd="0" presId="urn:microsoft.com/office/officeart/2008/layout/NameandTitleOrganizationalChart"/>
-    <dgm:cxn modelId="{48EAD98A-DA66-473E-87C5-291111271AAD}" type="presParOf" srcId="{22AD43E7-667A-4BFA-9AF9-A6F7B329E10E}" destId="{D5B530F9-2973-4A54-9ED0-EEB2550C541B}" srcOrd="1" destOrd="0" presId="urn:microsoft.com/office/officeart/2008/layout/NameandTitleOrganizationalChart"/>
-    <dgm:cxn modelId="{69BB16FA-6AB5-4633-AF56-3D13F3E56B69}" type="presParOf" srcId="{22AD43E7-667A-4BFA-9AF9-A6F7B329E10E}" destId="{E43F2A15-CFC1-4423-9FCC-879CCCB125A4}" srcOrd="2" destOrd="0" presId="urn:microsoft.com/office/officeart/2008/layout/NameandTitleOrganizationalChart"/>
-    <dgm:cxn modelId="{7DFE89DE-A600-4ECB-AE5F-BF3EAAE2BD90}" type="presParOf" srcId="{FBBE2CC4-173D-4362-ADD9-519407899388}" destId="{72548364-48B9-48B0-BA21-208469BDEFBF}" srcOrd="2" destOrd="0" presId="urn:microsoft.com/office/officeart/2008/layout/NameandTitleOrganizationalChart"/>
-    <dgm:cxn modelId="{E4F493BD-9AEE-4AA1-A5E2-8775D4079976}" type="presParOf" srcId="{72548364-48B9-48B0-BA21-208469BDEFBF}" destId="{F7B374D2-923B-4157-A1F7-83B6513409E4}" srcOrd="0" destOrd="0" presId="urn:microsoft.com/office/officeart/2008/layout/NameandTitleOrganizationalChart"/>
-    <dgm:cxn modelId="{72F8A817-709B-4F9E-A55D-A12ED1FE423C}" type="presParOf" srcId="{72548364-48B9-48B0-BA21-208469BDEFBF}" destId="{63E55325-CA80-4AA4-925E-9743BAB7D383}" srcOrd="1" destOrd="0" presId="urn:microsoft.com/office/officeart/2008/layout/NameandTitleOrganizationalChart"/>
-    <dgm:cxn modelId="{1C65CD99-AE27-4949-BF9F-D53EADBC7D6F}" type="presParOf" srcId="{63E55325-CA80-4AA4-925E-9743BAB7D383}" destId="{29F5A972-804D-49D0-B31B-05A1A5F96A5D}" srcOrd="0" destOrd="0" presId="urn:microsoft.com/office/officeart/2008/layout/NameandTitleOrganizationalChart"/>
-    <dgm:cxn modelId="{C538802F-C572-41CE-96F7-0C69E7EF8E98}" type="presParOf" srcId="{29F5A972-804D-49D0-B31B-05A1A5F96A5D}" destId="{6241BE42-6B83-43C5-9E4C-7A66D6D9EFA4}" srcOrd="0" destOrd="0" presId="urn:microsoft.com/office/officeart/2008/layout/NameandTitleOrganizationalChart"/>
-    <dgm:cxn modelId="{89B9466C-B4E1-426C-8DDE-441900BE13E5}" type="presParOf" srcId="{29F5A972-804D-49D0-B31B-05A1A5F96A5D}" destId="{093426B6-CB37-4BFB-A245-2C41D01495F2}" srcOrd="1" destOrd="0" presId="urn:microsoft.com/office/officeart/2008/layout/NameandTitleOrganizationalChart"/>
-    <dgm:cxn modelId="{C1C02E0C-2795-4C76-8A8B-B0D173311198}" type="presParOf" srcId="{29F5A972-804D-49D0-B31B-05A1A5F96A5D}" destId="{2B5C7799-873D-42EB-A9F8-2A4A5CF12AF9}" srcOrd="2" destOrd="0" presId="urn:microsoft.com/office/officeart/2008/layout/NameandTitleOrganizationalChart"/>
-    <dgm:cxn modelId="{68719870-42CB-4AE8-A7B2-607309FF861C}" type="presParOf" srcId="{63E55325-CA80-4AA4-925E-9743BAB7D383}" destId="{9184B546-2593-468F-A7D4-BC1490D56B89}" srcOrd="1" destOrd="0" presId="urn:microsoft.com/office/officeart/2008/layout/NameandTitleOrganizationalChart"/>
-    <dgm:cxn modelId="{CC8C953E-39BF-4DEF-BF0B-71C8A64E9C8A}" type="presParOf" srcId="{63E55325-CA80-4AA4-925E-9743BAB7D383}" destId="{E294FB3C-EB78-405E-AA86-748CF26C9F98}" srcOrd="2" destOrd="0" presId="urn:microsoft.com/office/officeart/2008/layout/NameandTitleOrganizationalChart"/>
-    <dgm:cxn modelId="{E62E7FAE-9FBA-4DA1-9882-6C802BC4CB2F}" type="presParOf" srcId="{72548364-48B9-48B0-BA21-208469BDEFBF}" destId="{879708FF-C94E-4BC2-B60E-736C0D75B913}" srcOrd="2" destOrd="0" presId="urn:microsoft.com/office/officeart/2008/layout/NameandTitleOrganizationalChart"/>
-    <dgm:cxn modelId="{03238798-4BB9-498F-851C-3BEC76BDA065}" type="presParOf" srcId="{72548364-48B9-48B0-BA21-208469BDEFBF}" destId="{FDA2DC43-0C30-4992-BD42-DDD769D5A706}" srcOrd="3" destOrd="0" presId="urn:microsoft.com/office/officeart/2008/layout/NameandTitleOrganizationalChart"/>
-    <dgm:cxn modelId="{CBCFE2A2-9961-418A-9D57-283583C6281C}" type="presParOf" srcId="{FDA2DC43-0C30-4992-BD42-DDD769D5A706}" destId="{06D11D0A-F4B6-449A-B346-78D4B79D7EEF}" srcOrd="0" destOrd="0" presId="urn:microsoft.com/office/officeart/2008/layout/NameandTitleOrganizationalChart"/>
-    <dgm:cxn modelId="{0129E0EA-A7FE-488F-8188-E7B1FB2F55B9}" type="presParOf" srcId="{06D11D0A-F4B6-449A-B346-78D4B79D7EEF}" destId="{00B9D14D-0388-44E4-BC78-EBCAD0B6979C}" srcOrd="0" destOrd="0" presId="urn:microsoft.com/office/officeart/2008/layout/NameandTitleOrganizationalChart"/>
-    <dgm:cxn modelId="{DD7F034B-9221-4A31-A8E7-03F0BA96E0FE}" type="presParOf" srcId="{06D11D0A-F4B6-449A-B346-78D4B79D7EEF}" destId="{CC557E83-DF62-40AD-8846-5E84F3421AB0}" srcOrd="1" destOrd="0" presId="urn:microsoft.com/office/officeart/2008/layout/NameandTitleOrganizationalChart"/>
-    <dgm:cxn modelId="{6A3F2029-E5D9-48D6-8C68-F61612B00632}" type="presParOf" srcId="{06D11D0A-F4B6-449A-B346-78D4B79D7EEF}" destId="{64D84924-42BA-4257-BD89-84914B8CD867}" srcOrd="2" destOrd="0" presId="urn:microsoft.com/office/officeart/2008/layout/NameandTitleOrganizationalChart"/>
-    <dgm:cxn modelId="{1901A802-8D64-466F-9BF8-FFE63B3D73EA}" type="presParOf" srcId="{FDA2DC43-0C30-4992-BD42-DDD769D5A706}" destId="{9015364E-5286-4807-B97A-53C5495DDDD9}" srcOrd="1" destOrd="0" presId="urn:microsoft.com/office/officeart/2008/layout/NameandTitleOrganizationalChart"/>
-    <dgm:cxn modelId="{FC30D20B-4FA2-495B-AA9F-EB3AB57A660B}" type="presParOf" srcId="{FDA2DC43-0C30-4992-BD42-DDD769D5A706}" destId="{10B49292-CA38-45E8-AC21-51963B450521}" srcOrd="2" destOrd="0" presId="urn:microsoft.com/office/officeart/2008/layout/NameandTitleOrganizationalChart"/>
-    <dgm:cxn modelId="{F21AA8DA-D9D2-4F67-9DE5-07EDFAF3A207}" type="presParOf" srcId="{72548364-48B9-48B0-BA21-208469BDEFBF}" destId="{C08D4BA8-B80B-44C7-BC19-57306DF9A87F}" srcOrd="4" destOrd="0" presId="urn:microsoft.com/office/officeart/2008/layout/NameandTitleOrganizationalChart"/>
-    <dgm:cxn modelId="{BF300B41-B2C3-4E65-9242-842CD2E347E2}" type="presParOf" srcId="{72548364-48B9-48B0-BA21-208469BDEFBF}" destId="{85F958D1-87F7-41D9-80EB-3A1A5891DAB8}" srcOrd="5" destOrd="0" presId="urn:microsoft.com/office/officeart/2008/layout/NameandTitleOrganizationalChart"/>
-    <dgm:cxn modelId="{DC91EB0D-8A22-4CAE-BEF1-9659AC9446F2}" type="presParOf" srcId="{85F958D1-87F7-41D9-80EB-3A1A5891DAB8}" destId="{23F1C90A-8722-4B26-B37B-E10088B1F37E}" srcOrd="0" destOrd="0" presId="urn:microsoft.com/office/officeart/2008/layout/NameandTitleOrganizationalChart"/>
-    <dgm:cxn modelId="{F35450E0-34A1-4781-8F5E-2DC57333D22D}" type="presParOf" srcId="{23F1C90A-8722-4B26-B37B-E10088B1F37E}" destId="{101E76A2-4743-4286-A350-ED12787CB775}" srcOrd="0" destOrd="0" presId="urn:microsoft.com/office/officeart/2008/layout/NameandTitleOrganizationalChart"/>
-    <dgm:cxn modelId="{12F3ABC1-BDE5-4BBA-BF31-6F1A8D7ECAD6}" type="presParOf" srcId="{23F1C90A-8722-4B26-B37B-E10088B1F37E}" destId="{AB3EC8CC-7AD0-4ADD-8E48-F1FFC2E107B9}" srcOrd="1" destOrd="0" presId="urn:microsoft.com/office/officeart/2008/layout/NameandTitleOrganizationalChart"/>
-    <dgm:cxn modelId="{1742F8CA-F164-49F6-AA54-E9B5E23C3053}" type="presParOf" srcId="{23F1C90A-8722-4B26-B37B-E10088B1F37E}" destId="{4ECAD660-942D-4104-A853-1C810DA1F24E}" srcOrd="2" destOrd="0" presId="urn:microsoft.com/office/officeart/2008/layout/NameandTitleOrganizationalChart"/>
-    <dgm:cxn modelId="{8A85A3D7-F75A-4EDB-87CD-D9D1248D5721}" type="presParOf" srcId="{85F958D1-87F7-41D9-80EB-3A1A5891DAB8}" destId="{E714FEB5-3C7A-4E0B-833E-8EA8A7842F88}" srcOrd="1" destOrd="0" presId="urn:microsoft.com/office/officeart/2008/layout/NameandTitleOrganizationalChart"/>
-    <dgm:cxn modelId="{A6F740D6-3FA3-4739-B781-7FEAD1262E21}" type="presParOf" srcId="{85F958D1-87F7-41D9-80EB-3A1A5891DAB8}" destId="{6970C7AC-54CF-4981-B20A-9C85649C7F22}" srcOrd="2" destOrd="0" presId="urn:microsoft.com/office/officeart/2008/layout/NameandTitleOrganizationalChart"/>
-    <dgm:cxn modelId="{2183D8C5-B5D7-4ED6-A581-5242EBC97A5C}" type="presParOf" srcId="{72548364-48B9-48B0-BA21-208469BDEFBF}" destId="{CF29FFD7-FA45-4B44-B920-5739BBD8395F}" srcOrd="6" destOrd="0" presId="urn:microsoft.com/office/officeart/2008/layout/NameandTitleOrganizationalChart"/>
-    <dgm:cxn modelId="{480BFD89-CFF8-48DB-AE20-724D44ED5EA9}" type="presParOf" srcId="{72548364-48B9-48B0-BA21-208469BDEFBF}" destId="{F06B246F-9106-4958-8B48-8A5464E6989F}" srcOrd="7" destOrd="0" presId="urn:microsoft.com/office/officeart/2008/layout/NameandTitleOrganizationalChart"/>
-    <dgm:cxn modelId="{679F1821-2321-43D5-9D7A-69530BDB0392}" type="presParOf" srcId="{F06B246F-9106-4958-8B48-8A5464E6989F}" destId="{8E99FBDF-7CFF-4C88-B35A-E18D6AC93CB9}" srcOrd="0" destOrd="0" presId="urn:microsoft.com/office/officeart/2008/layout/NameandTitleOrganizationalChart"/>
-    <dgm:cxn modelId="{C3F818F4-B913-47E9-8CEB-FBF09FF0F013}" type="presParOf" srcId="{8E99FBDF-7CFF-4C88-B35A-E18D6AC93CB9}" destId="{B3283E1E-2057-4690-A212-3D2DAFA652BD}" srcOrd="0" destOrd="0" presId="urn:microsoft.com/office/officeart/2008/layout/NameandTitleOrganizationalChart"/>
-    <dgm:cxn modelId="{38619D92-8C81-4BC1-A484-A45512A22C0C}" type="presParOf" srcId="{8E99FBDF-7CFF-4C88-B35A-E18D6AC93CB9}" destId="{A0AD7242-ED6A-474D-B059-FB0D1C171505}" srcOrd="1" destOrd="0" presId="urn:microsoft.com/office/officeart/2008/layout/NameandTitleOrganizationalChart"/>
-    <dgm:cxn modelId="{C5F6DF49-0AB6-4DD3-AC10-D495AA1807CB}" type="presParOf" srcId="{8E99FBDF-7CFF-4C88-B35A-E18D6AC93CB9}" destId="{1A764CF8-A43E-49B0-A5E6-86652167097B}" srcOrd="2" destOrd="0" presId="urn:microsoft.com/office/officeart/2008/layout/NameandTitleOrganizationalChart"/>
-    <dgm:cxn modelId="{07C28506-D357-431B-831A-6B29C3761216}" type="presParOf" srcId="{F06B246F-9106-4958-8B48-8A5464E6989F}" destId="{59D76E33-23D8-4DD6-9B87-C3AB72CB9838}" srcOrd="1" destOrd="0" presId="urn:microsoft.com/office/officeart/2008/layout/NameandTitleOrganizationalChart"/>
-    <dgm:cxn modelId="{C0A5CC3C-F382-4E5E-847B-21C9DE5A31BC}" type="presParOf" srcId="{F06B246F-9106-4958-8B48-8A5464E6989F}" destId="{FE2B5AAE-CF76-490A-8915-809E55F58895}" srcOrd="2" destOrd="0" presId="urn:microsoft.com/office/officeart/2008/layout/NameandTitleOrganizationalChart"/>
-    <dgm:cxn modelId="{01BE1110-92CC-4EBC-8732-6FC12D12A89C}" type="presParOf" srcId="{72548364-48B9-48B0-BA21-208469BDEFBF}" destId="{0A15230D-CEAD-44AB-A9D8-4F1795C0EDC5}" srcOrd="8" destOrd="0" presId="urn:microsoft.com/office/officeart/2008/layout/NameandTitleOrganizationalChart"/>
-    <dgm:cxn modelId="{6E5DA8C6-BA64-419D-A668-0FBA540CAF7C}" type="presParOf" srcId="{72548364-48B9-48B0-BA21-208469BDEFBF}" destId="{1A98C2D0-933F-4523-9BA6-FDFA3195E69E}" srcOrd="9" destOrd="0" presId="urn:microsoft.com/office/officeart/2008/layout/NameandTitleOrganizationalChart"/>
-    <dgm:cxn modelId="{5536CC93-D6B1-49BD-9061-8BD2FAC1FCB3}" type="presParOf" srcId="{1A98C2D0-933F-4523-9BA6-FDFA3195E69E}" destId="{F2B9C679-E1B9-4150-B0C2-B3A41408CB60}" srcOrd="0" destOrd="0" presId="urn:microsoft.com/office/officeart/2008/layout/NameandTitleOrganizationalChart"/>
-    <dgm:cxn modelId="{845EF4C9-49DA-476F-AA63-FF83AE03F1EA}" type="presParOf" srcId="{F2B9C679-E1B9-4150-B0C2-B3A41408CB60}" destId="{51DB92DD-B79E-4851-B428-2D6647EE4E80}" srcOrd="0" destOrd="0" presId="urn:microsoft.com/office/officeart/2008/layout/NameandTitleOrganizationalChart"/>
-    <dgm:cxn modelId="{D03D5281-302C-41B3-9F44-95A9E0163E36}" type="presParOf" srcId="{F2B9C679-E1B9-4150-B0C2-B3A41408CB60}" destId="{B07D686E-F7BD-47F3-8C9D-E3F4BF1B6336}" srcOrd="1" destOrd="0" presId="urn:microsoft.com/office/officeart/2008/layout/NameandTitleOrganizationalChart"/>
-    <dgm:cxn modelId="{3ACB0F2D-2028-4E8B-93BD-3913DF6C7749}" type="presParOf" srcId="{F2B9C679-E1B9-4150-B0C2-B3A41408CB60}" destId="{F60EE2F1-06F8-4D1C-AF4C-5BEB6DD46FD3}" srcOrd="2" destOrd="0" presId="urn:microsoft.com/office/officeart/2008/layout/NameandTitleOrganizationalChart"/>
-    <dgm:cxn modelId="{70001C9C-E2F3-4332-A6A8-044965F617C5}" type="presParOf" srcId="{1A98C2D0-933F-4523-9BA6-FDFA3195E69E}" destId="{90BA8C5D-EE2C-499B-A845-93B32CA36DE9}" srcOrd="1" destOrd="0" presId="urn:microsoft.com/office/officeart/2008/layout/NameandTitleOrganizationalChart"/>
-    <dgm:cxn modelId="{05398FE1-E3D9-47EC-8A20-671D0F9F15CE}" type="presParOf" srcId="{1A98C2D0-933F-4523-9BA6-FDFA3195E69E}" destId="{8DB54E3D-4FE1-41E1-ABD0-D21AAC6E5D85}" srcOrd="2" destOrd="0" presId="urn:microsoft.com/office/officeart/2008/layout/NameandTitleOrganizationalChart"/>
+    <dgm:cxn modelId="{EC09A6EF-E873-4EF8-A521-0C24448B36C0}" srcId="{1D935358-EA2F-4BB5-B672-F3901DA6C92F}" destId="{7B45A5DC-3748-4AC5-9C5B-1DB8428C64B3}" srcOrd="3" destOrd="0" parTransId="{ECFBC88A-F10A-42F7-B7F4-E22ED5B24379}" sibTransId="{F93320EE-1089-4A34-9E10-249E7BE134E8}"/>
+    <dgm:cxn modelId="{06637C96-F155-4CA0-9CAE-81553BAA447D}" type="presParOf" srcId="{5B3FA25E-7636-40FF-8B40-FDD6A271C5F6}" destId="{D3522506-AA8F-46C8-AAD6-D95C2E038575}" srcOrd="0" destOrd="0" presId="urn:microsoft.com/office/officeart/2005/8/layout/hierarchy6"/>
+    <dgm:cxn modelId="{150D3B6A-3D8A-4061-BA21-CC425F07D7C6}" type="presParOf" srcId="{D3522506-AA8F-46C8-AAD6-D95C2E038575}" destId="{6A4B2638-C3F9-4E7B-8330-F595B38A8AEE}" srcOrd="0" destOrd="0" presId="urn:microsoft.com/office/officeart/2005/8/layout/hierarchy6"/>
+    <dgm:cxn modelId="{04937285-B651-4C65-9CB0-1E09C985BF1B}" type="presParOf" srcId="{D3522506-AA8F-46C8-AAD6-D95C2E038575}" destId="{9B8B4DBD-B8EE-41EC-ACE5-20B9A0EB70A6}" srcOrd="1" destOrd="0" presId="urn:microsoft.com/office/officeart/2005/8/layout/hierarchy6"/>
+    <dgm:cxn modelId="{4BBBF24F-7D30-4062-AD58-DCE0EF3E0D97}" type="presParOf" srcId="{9B8B4DBD-B8EE-41EC-ACE5-20B9A0EB70A6}" destId="{C483D252-9426-43E0-8FAB-6712C5B52991}" srcOrd="0" destOrd="0" presId="urn:microsoft.com/office/officeart/2005/8/layout/hierarchy6"/>
+    <dgm:cxn modelId="{065335A6-E931-4F6D-BE18-E9B57B062E0F}" type="presParOf" srcId="{C483D252-9426-43E0-8FAB-6712C5B52991}" destId="{106846B4-C57C-4B4A-8BDC-EA3A01B8B95F}" srcOrd="0" destOrd="0" presId="urn:microsoft.com/office/officeart/2005/8/layout/hierarchy6"/>
+    <dgm:cxn modelId="{818BC83D-9A5A-445E-AF20-4880287CAE4F}" type="presParOf" srcId="{C483D252-9426-43E0-8FAB-6712C5B52991}" destId="{3079D60D-FF7B-45A3-A68B-3000601A6A14}" srcOrd="1" destOrd="0" presId="urn:microsoft.com/office/officeart/2005/8/layout/hierarchy6"/>
+    <dgm:cxn modelId="{E2F74606-226D-458C-86A1-4BA03932A8B8}" type="presParOf" srcId="{3079D60D-FF7B-45A3-A68B-3000601A6A14}" destId="{AFA13D1E-B68F-4E1C-A8A5-C8CBFB686937}" srcOrd="0" destOrd="0" presId="urn:microsoft.com/office/officeart/2005/8/layout/hierarchy6"/>
+    <dgm:cxn modelId="{ACB3A5BD-0759-497E-A82C-4B80BB26B054}" type="presParOf" srcId="{3079D60D-FF7B-45A3-A68B-3000601A6A14}" destId="{DDDE2EF1-5382-4BAD-A8EC-50740DC23D26}" srcOrd="1" destOrd="0" presId="urn:microsoft.com/office/officeart/2005/8/layout/hierarchy6"/>
+    <dgm:cxn modelId="{4DB6076A-4249-4FAF-B53A-68A02B90D347}" type="presParOf" srcId="{DDDE2EF1-5382-4BAD-A8EC-50740DC23D26}" destId="{21353F14-EF15-4F1A-AD9C-52082FDC1EDE}" srcOrd="0" destOrd="0" presId="urn:microsoft.com/office/officeart/2005/8/layout/hierarchy6"/>
+    <dgm:cxn modelId="{83969186-2D11-49AA-A6BE-DE9F2A884514}" type="presParOf" srcId="{DDDE2EF1-5382-4BAD-A8EC-50740DC23D26}" destId="{A923347D-2DDF-416C-B9F8-CF7C4B904821}" srcOrd="1" destOrd="0" presId="urn:microsoft.com/office/officeart/2005/8/layout/hierarchy6"/>
+    <dgm:cxn modelId="{07A20E23-57D4-4F13-BB32-AA20657FA78C}" type="presParOf" srcId="{3079D60D-FF7B-45A3-A68B-3000601A6A14}" destId="{4B4C13B4-BD1C-43B8-96A8-3016EDC34C57}" srcOrd="2" destOrd="0" presId="urn:microsoft.com/office/officeart/2005/8/layout/hierarchy6"/>
+    <dgm:cxn modelId="{3822AE35-3564-463E-8DE4-E4E1D8D9E592}" type="presParOf" srcId="{3079D60D-FF7B-45A3-A68B-3000601A6A14}" destId="{07083BC4-89E6-41D9-B3C6-6249227DD585}" srcOrd="3" destOrd="0" presId="urn:microsoft.com/office/officeart/2005/8/layout/hierarchy6"/>
+    <dgm:cxn modelId="{F90331A4-D9B4-47C2-A483-86CE0336D80C}" type="presParOf" srcId="{07083BC4-89E6-41D9-B3C6-6249227DD585}" destId="{8A4DBA3A-9F9F-428E-A158-D57E8800853A}" srcOrd="0" destOrd="0" presId="urn:microsoft.com/office/officeart/2005/8/layout/hierarchy6"/>
+    <dgm:cxn modelId="{4BEB4941-C556-4D72-A825-89C9333BD2E5}" type="presParOf" srcId="{07083BC4-89E6-41D9-B3C6-6249227DD585}" destId="{AFA980AE-46F6-4705-99D3-BD2F6F19448D}" srcOrd="1" destOrd="0" presId="urn:microsoft.com/office/officeart/2005/8/layout/hierarchy6"/>
+    <dgm:cxn modelId="{FFC70A2C-D96D-4F36-8C81-74F5606AAF17}" type="presParOf" srcId="{AFA980AE-46F6-4705-99D3-BD2F6F19448D}" destId="{5532AA10-5880-4269-902B-3B7CF5C0D400}" srcOrd="0" destOrd="0" presId="urn:microsoft.com/office/officeart/2005/8/layout/hierarchy6"/>
+    <dgm:cxn modelId="{31D7FE8F-E7F1-474F-B527-1543BB31B04E}" type="presParOf" srcId="{AFA980AE-46F6-4705-99D3-BD2F6F19448D}" destId="{EECD7F31-5CCC-4501-8E7E-489DDA92DE9D}" srcOrd="1" destOrd="0" presId="urn:microsoft.com/office/officeart/2005/8/layout/hierarchy6"/>
+    <dgm:cxn modelId="{AE970BCF-307F-4561-A638-0858F315E35D}" type="presParOf" srcId="{EECD7F31-5CCC-4501-8E7E-489DDA92DE9D}" destId="{2C1BBD02-149D-4AEF-8B7C-071D427D6796}" srcOrd="0" destOrd="0" presId="urn:microsoft.com/office/officeart/2005/8/layout/hierarchy6"/>
+    <dgm:cxn modelId="{5249F5BA-3D79-484D-8BF0-D5CB17C0A2F1}" type="presParOf" srcId="{EECD7F31-5CCC-4501-8E7E-489DDA92DE9D}" destId="{E194991C-CCA4-43EB-AF06-AC04D062EA54}" srcOrd="1" destOrd="0" presId="urn:microsoft.com/office/officeart/2005/8/layout/hierarchy6"/>
+    <dgm:cxn modelId="{51CCAF0C-6047-4944-ACA8-1060DBFFF5FD}" type="presParOf" srcId="{AFA980AE-46F6-4705-99D3-BD2F6F19448D}" destId="{75BA6FCF-B20C-4695-AD33-1AC04E6188EF}" srcOrd="2" destOrd="0" presId="urn:microsoft.com/office/officeart/2005/8/layout/hierarchy6"/>
+    <dgm:cxn modelId="{049181E5-D8A8-4464-B844-9BB1D1BF84DE}" type="presParOf" srcId="{AFA980AE-46F6-4705-99D3-BD2F6F19448D}" destId="{A97EAC25-02B1-417B-9BBA-61951002933A}" srcOrd="3" destOrd="0" presId="urn:microsoft.com/office/officeart/2005/8/layout/hierarchy6"/>
+    <dgm:cxn modelId="{34CE6508-75B9-4274-AA55-B61A45647FD4}" type="presParOf" srcId="{A97EAC25-02B1-417B-9BBA-61951002933A}" destId="{D8B091A3-A137-49C1-BBB3-FD15C0D8621B}" srcOrd="0" destOrd="0" presId="urn:microsoft.com/office/officeart/2005/8/layout/hierarchy6"/>
+    <dgm:cxn modelId="{17F0EE53-DF4D-4C19-A1F3-6C9CD44630B3}" type="presParOf" srcId="{A97EAC25-02B1-417B-9BBA-61951002933A}" destId="{FFD66E22-B15E-4A5E-901C-1B87A3459F36}" srcOrd="1" destOrd="0" presId="urn:microsoft.com/office/officeart/2005/8/layout/hierarchy6"/>
+    <dgm:cxn modelId="{CF85EF48-C975-485C-AEC1-95925E53E429}" type="presParOf" srcId="{AFA980AE-46F6-4705-99D3-BD2F6F19448D}" destId="{20187EFF-9F54-440A-8907-93C3BB961C65}" srcOrd="4" destOrd="0" presId="urn:microsoft.com/office/officeart/2005/8/layout/hierarchy6"/>
+    <dgm:cxn modelId="{886035A9-0B47-4DFC-9C10-C4A91E43999E}" type="presParOf" srcId="{AFA980AE-46F6-4705-99D3-BD2F6F19448D}" destId="{D751619F-D147-4F00-A707-30FE0EC70839}" srcOrd="5" destOrd="0" presId="urn:microsoft.com/office/officeart/2005/8/layout/hierarchy6"/>
+    <dgm:cxn modelId="{3F0F3E6E-477E-4620-AA8C-738215036007}" type="presParOf" srcId="{D751619F-D147-4F00-A707-30FE0EC70839}" destId="{4037397F-5207-48DC-BDDE-62634F8E7BCC}" srcOrd="0" destOrd="0" presId="urn:microsoft.com/office/officeart/2005/8/layout/hierarchy6"/>
+    <dgm:cxn modelId="{F15A9EFF-BA73-4B76-9DDE-CC8C98B231DC}" type="presParOf" srcId="{D751619F-D147-4F00-A707-30FE0EC70839}" destId="{C028401B-73EC-4845-9EE0-542223408AF9}" srcOrd="1" destOrd="0" presId="urn:microsoft.com/office/officeart/2005/8/layout/hierarchy6"/>
+    <dgm:cxn modelId="{932F9749-6887-44CD-8FCE-DC81AE00F5FA}" type="presParOf" srcId="{5B3FA25E-7636-40FF-8B40-FDD6A271C5F6}" destId="{C2C2CF53-A957-4B11-9772-199A0BD321DC}" srcOrd="1" destOrd="0" presId="urn:microsoft.com/office/officeart/2005/8/layout/hierarchy6"/>
+    <dgm:cxn modelId="{E242D5D8-B395-46A5-92AB-616C319E1B9E}" type="presParOf" srcId="{C2C2CF53-A957-4B11-9772-199A0BD321DC}" destId="{5E96D95E-94AE-48E2-8736-5E6E8DDB3D36}" srcOrd="0" destOrd="0" presId="urn:microsoft.com/office/officeart/2005/8/layout/hierarchy6"/>
+    <dgm:cxn modelId="{180314F2-CF45-44D1-9A8B-B8A34B91D910}" type="presParOf" srcId="{5E96D95E-94AE-48E2-8736-5E6E8DDB3D36}" destId="{00013FE3-9E03-4ABD-8634-95136BD9B976}" srcOrd="0" destOrd="0" presId="urn:microsoft.com/office/officeart/2005/8/layout/hierarchy6"/>
+    <dgm:cxn modelId="{46D00993-9257-4A6F-98DC-AEBC816109A0}" type="presParOf" srcId="{5E96D95E-94AE-48E2-8736-5E6E8DDB3D36}" destId="{A359CB32-FD74-4851-9450-2FA85503D79A}" srcOrd="1" destOrd="0" presId="urn:microsoft.com/office/officeart/2005/8/layout/hierarchy6"/>
+    <dgm:cxn modelId="{7A92ECE5-7D86-4252-B104-736608CE958F}" type="presParOf" srcId="{C2C2CF53-A957-4B11-9772-199A0BD321DC}" destId="{D278C6F4-0529-4113-B0AF-B779FE828202}" srcOrd="1" destOrd="0" presId="urn:microsoft.com/office/officeart/2005/8/layout/hierarchy6"/>
+    <dgm:cxn modelId="{625B3FED-4DE5-4DD6-A5C6-C18DDD937BBD}" type="presParOf" srcId="{D278C6F4-0529-4113-B0AF-B779FE828202}" destId="{A742DB86-D1C6-4DE1-999C-A77F54CCEF1B}" srcOrd="0" destOrd="0" presId="urn:microsoft.com/office/officeart/2005/8/layout/hierarchy6"/>
+    <dgm:cxn modelId="{DF201419-5540-42A9-896D-6DA0882D6FE9}" type="presParOf" srcId="{C2C2CF53-A957-4B11-9772-199A0BD321DC}" destId="{0B10D0FD-0B23-4A63-886B-194C7B76352C}" srcOrd="2" destOrd="0" presId="urn:microsoft.com/office/officeart/2005/8/layout/hierarchy6"/>
+    <dgm:cxn modelId="{A0E6C563-DF5F-41B6-B1EB-1F98F380BD46}" type="presParOf" srcId="{0B10D0FD-0B23-4A63-886B-194C7B76352C}" destId="{C61F606F-B47E-4079-B576-6BB6204940A6}" srcOrd="0" destOrd="0" presId="urn:microsoft.com/office/officeart/2005/8/layout/hierarchy6"/>
+    <dgm:cxn modelId="{B98D69A4-829F-43EA-A083-28FEBBD73D8D}" type="presParOf" srcId="{0B10D0FD-0B23-4A63-886B-194C7B76352C}" destId="{CF4E21CA-CC73-4165-995C-F0D194F310B6}" srcOrd="1" destOrd="0" presId="urn:microsoft.com/office/officeart/2005/8/layout/hierarchy6"/>
+    <dgm:cxn modelId="{431A38C3-A79B-4472-9252-9CF065A27CE5}" type="presParOf" srcId="{C2C2CF53-A957-4B11-9772-199A0BD321DC}" destId="{5FD0EB76-D35D-4135-B4C7-B36E65BD82B9}" srcOrd="3" destOrd="0" presId="urn:microsoft.com/office/officeart/2005/8/layout/hierarchy6"/>
+    <dgm:cxn modelId="{6DECD1EF-5171-4128-84E3-30B448B5DF5D}" type="presParOf" srcId="{5FD0EB76-D35D-4135-B4C7-B36E65BD82B9}" destId="{5BB3E744-E96A-495C-A6F0-AD1E8D27F6A1}" srcOrd="0" destOrd="0" presId="urn:microsoft.com/office/officeart/2005/8/layout/hierarchy6"/>
+    <dgm:cxn modelId="{40457547-0EEE-4674-9E71-FE2A691B5000}" type="presParOf" srcId="{C2C2CF53-A957-4B11-9772-199A0BD321DC}" destId="{D1006DEC-B547-4894-9E89-13106678C3BC}" srcOrd="4" destOrd="0" presId="urn:microsoft.com/office/officeart/2005/8/layout/hierarchy6"/>
+    <dgm:cxn modelId="{0293843A-D5A8-4682-AC35-986695F6AF3F}" type="presParOf" srcId="{D1006DEC-B547-4894-9E89-13106678C3BC}" destId="{4845A9D5-6564-4487-914B-D1485D7DDD63}" srcOrd="0" destOrd="0" presId="urn:microsoft.com/office/officeart/2005/8/layout/hierarchy6"/>
+    <dgm:cxn modelId="{AA41E015-8878-4F50-8273-49A6AB98B914}" type="presParOf" srcId="{D1006DEC-B547-4894-9E89-13106678C3BC}" destId="{33C0EE81-5720-4FA0-ACAD-B89C78FCB4C0}" srcOrd="1" destOrd="0" presId="urn:microsoft.com/office/officeart/2005/8/layout/hierarchy6"/>
   </dgm:cxnLst>
   <dgm:bg/>
   <dgm:whole/>
@@ -1756,57 +1485,40 @@
       <dsp:cNvGrpSpPr/>
     </dsp:nvGrpSpPr>
     <dsp:grpSpPr/>
-    <dsp:sp modelId="{0A15230D-CEAD-44AB-A9D8-4F1795C0EDC5}">
+    <dsp:sp modelId="{4845A9D5-6564-4487-914B-D1485D7DDD63}">
       <dsp:nvSpPr>
         <dsp:cNvPr id="0" name=""/>
         <dsp:cNvSpPr/>
       </dsp:nvSpPr>
       <dsp:spPr>
         <a:xfrm>
-          <a:off x="5008064" y="588091"/>
-          <a:ext cx="193185" cy="2478962"/>
+          <a:off x="0" y="3046033"/>
+          <a:ext cx="10515600" cy="1303949"/>
         </a:xfrm>
-        <a:custGeom>
-          <a:avLst/>
-          <a:gdLst/>
-          <a:ahLst/>
-          <a:cxnLst/>
-          <a:rect l="0" t="0" r="0" b="0"/>
-          <a:pathLst>
-            <a:path>
-              <a:moveTo>
-                <a:pt x="193185" y="0"/>
-              </a:moveTo>
-              <a:lnTo>
-                <a:pt x="193185" y="2478962"/>
-              </a:lnTo>
-              <a:lnTo>
-                <a:pt x="0" y="2478962"/>
-              </a:lnTo>
-            </a:path>
-          </a:pathLst>
-        </a:custGeom>
-        <a:noFill/>
-        <a:ln w="12700" cap="flat" cmpd="sng" algn="ctr">
-          <a:solidFill>
-            <a:schemeClr val="accent1">
-              <a:shade val="60000"/>
-              <a:hueOff val="0"/>
-              <a:satOff val="0"/>
-              <a:lumOff val="0"/>
-              <a:alphaOff val="0"/>
-            </a:schemeClr>
-          </a:solidFill>
-          <a:prstDash val="solid"/>
-          <a:miter lim="800000"/>
+        <a:prstGeom prst="roundRect">
+          <a:avLst>
+            <a:gd name="adj" fmla="val 10000"/>
+          </a:avLst>
+        </a:prstGeom>
+        <a:solidFill>
+          <a:schemeClr val="accent1">
+            <a:tint val="40000"/>
+            <a:hueOff val="0"/>
+            <a:satOff val="0"/>
+            <a:lumOff val="0"/>
+            <a:alphaOff val="0"/>
+          </a:schemeClr>
+        </a:solidFill>
+        <a:ln>
+          <a:noFill/>
         </a:ln>
         <a:effectLst/>
       </dsp:spPr>
       <dsp:style>
-        <a:lnRef idx="2">
+        <a:lnRef idx="0">
           <a:scrgbClr r="0" g="0" b="0"/>
         </a:lnRef>
-        <a:fillRef idx="0">
+        <a:fillRef idx="1">
           <a:scrgbClr r="0" g="0" b="0"/>
         </a:fillRef>
         <a:effectRef idx="0">
@@ -1814,58 +1526,66 @@
         </a:effectRef>
         <a:fontRef idx="minor"/>
       </dsp:style>
+      <dsp:txBody>
+        <a:bodyPr spcFirstLastPara="0" vert="horz" wrap="square" lIns="327152" tIns="327152" rIns="327152" bIns="327152" numCol="1" spcCol="1270" anchor="ctr" anchorCtr="0">
+          <a:noAutofit/>
+        </a:bodyPr>
+        <a:lstStyle/>
+        <a:p>
+          <a:pPr marL="0" lvl="0" indent="0" algn="ctr" defTabSz="2044700">
+            <a:lnSpc>
+              <a:spcPct val="90000"/>
+            </a:lnSpc>
+            <a:spcBef>
+              <a:spcPct val="0"/>
+            </a:spcBef>
+            <a:spcAft>
+              <a:spcPct val="35000"/>
+            </a:spcAft>
+            <a:buNone/>
+          </a:pPr>
+          <a:endParaRPr lang="en-US" sz="4600" kern="1200"/>
+        </a:p>
+      </dsp:txBody>
+      <dsp:txXfrm>
+        <a:off x="0" y="3046033"/>
+        <a:ext cx="3154680" cy="1303949"/>
+      </dsp:txXfrm>
     </dsp:sp>
-    <dsp:sp modelId="{CF29FFD7-FA45-4B44-B920-5739BBD8395F}">
+    <dsp:sp modelId="{C61F606F-B47E-4079-B576-6BB6204940A6}">
       <dsp:nvSpPr>
         <dsp:cNvPr id="0" name=""/>
         <dsp:cNvSpPr/>
       </dsp:nvSpPr>
       <dsp:spPr>
         <a:xfrm>
-          <a:off x="5201249" y="588091"/>
-          <a:ext cx="193185" cy="1555044"/>
+          <a:off x="0" y="1523694"/>
+          <a:ext cx="10515600" cy="1303949"/>
         </a:xfrm>
-        <a:custGeom>
-          <a:avLst/>
-          <a:gdLst/>
-          <a:ahLst/>
-          <a:cxnLst/>
-          <a:rect l="0" t="0" r="0" b="0"/>
-          <a:pathLst>
-            <a:path>
-              <a:moveTo>
-                <a:pt x="0" y="0"/>
-              </a:moveTo>
-              <a:lnTo>
-                <a:pt x="0" y="1555044"/>
-              </a:lnTo>
-              <a:lnTo>
-                <a:pt x="193185" y="1555044"/>
-              </a:lnTo>
-            </a:path>
-          </a:pathLst>
-        </a:custGeom>
-        <a:noFill/>
-        <a:ln w="12700" cap="flat" cmpd="sng" algn="ctr">
-          <a:solidFill>
-            <a:schemeClr val="accent1">
-              <a:shade val="60000"/>
-              <a:hueOff val="0"/>
-              <a:satOff val="0"/>
-              <a:lumOff val="0"/>
-              <a:alphaOff val="0"/>
-            </a:schemeClr>
-          </a:solidFill>
-          <a:prstDash val="solid"/>
-          <a:miter lim="800000"/>
+        <a:prstGeom prst="roundRect">
+          <a:avLst>
+            <a:gd name="adj" fmla="val 10000"/>
+          </a:avLst>
+        </a:prstGeom>
+        <a:solidFill>
+          <a:schemeClr val="accent1">
+            <a:tint val="40000"/>
+            <a:hueOff val="0"/>
+            <a:satOff val="0"/>
+            <a:lumOff val="0"/>
+            <a:alphaOff val="0"/>
+          </a:schemeClr>
+        </a:solidFill>
+        <a:ln>
+          <a:noFill/>
         </a:ln>
         <a:effectLst/>
       </dsp:spPr>
       <dsp:style>
-        <a:lnRef idx="2">
+        <a:lnRef idx="0">
           <a:scrgbClr r="0" g="0" b="0"/>
         </a:lnRef>
-        <a:fillRef idx="0">
+        <a:fillRef idx="1">
           <a:scrgbClr r="0" g="0" b="0"/>
         </a:fillRef>
         <a:effectRef idx="0">
@@ -1873,58 +1593,66 @@
         </a:effectRef>
         <a:fontRef idx="minor"/>
       </dsp:style>
+      <dsp:txBody>
+        <a:bodyPr spcFirstLastPara="0" vert="horz" wrap="square" lIns="327152" tIns="327152" rIns="327152" bIns="327152" numCol="1" spcCol="1270" anchor="ctr" anchorCtr="0">
+          <a:noAutofit/>
+        </a:bodyPr>
+        <a:lstStyle/>
+        <a:p>
+          <a:pPr marL="0" lvl="0" indent="0" algn="ctr" defTabSz="2044700">
+            <a:lnSpc>
+              <a:spcPct val="90000"/>
+            </a:lnSpc>
+            <a:spcBef>
+              <a:spcPct val="0"/>
+            </a:spcBef>
+            <a:spcAft>
+              <a:spcPct val="35000"/>
+            </a:spcAft>
+            <a:buNone/>
+          </a:pPr>
+          <a:endParaRPr lang="en-US" sz="4600" kern="1200"/>
+        </a:p>
+      </dsp:txBody>
+      <dsp:txXfrm>
+        <a:off x="0" y="1523694"/>
+        <a:ext cx="3154680" cy="1303949"/>
+      </dsp:txXfrm>
     </dsp:sp>
-    <dsp:sp modelId="{C08D4BA8-B80B-44C7-BC19-57306DF9A87F}">
+    <dsp:sp modelId="{00013FE3-9E03-4ABD-8634-95136BD9B976}">
       <dsp:nvSpPr>
         <dsp:cNvPr id="0" name=""/>
         <dsp:cNvSpPr/>
       </dsp:nvSpPr>
       <dsp:spPr>
         <a:xfrm>
-          <a:off x="5008064" y="588091"/>
-          <a:ext cx="193185" cy="1555044"/>
+          <a:off x="0" y="1354"/>
+          <a:ext cx="10515600" cy="1303949"/>
         </a:xfrm>
-        <a:custGeom>
-          <a:avLst/>
-          <a:gdLst/>
-          <a:ahLst/>
-          <a:cxnLst/>
-          <a:rect l="0" t="0" r="0" b="0"/>
-          <a:pathLst>
-            <a:path>
-              <a:moveTo>
-                <a:pt x="193185" y="0"/>
-              </a:moveTo>
-              <a:lnTo>
-                <a:pt x="193185" y="1555044"/>
-              </a:lnTo>
-              <a:lnTo>
-                <a:pt x="0" y="1555044"/>
-              </a:lnTo>
-            </a:path>
-          </a:pathLst>
-        </a:custGeom>
-        <a:noFill/>
-        <a:ln w="12700" cap="flat" cmpd="sng" algn="ctr">
-          <a:solidFill>
-            <a:schemeClr val="accent1">
-              <a:shade val="60000"/>
-              <a:hueOff val="0"/>
-              <a:satOff val="0"/>
-              <a:lumOff val="0"/>
-              <a:alphaOff val="0"/>
-            </a:schemeClr>
-          </a:solidFill>
-          <a:prstDash val="solid"/>
-          <a:miter lim="800000"/>
+        <a:prstGeom prst="roundRect">
+          <a:avLst>
+            <a:gd name="adj" fmla="val 10000"/>
+          </a:avLst>
+        </a:prstGeom>
+        <a:solidFill>
+          <a:schemeClr val="accent1">
+            <a:tint val="40000"/>
+            <a:hueOff val="0"/>
+            <a:satOff val="0"/>
+            <a:lumOff val="0"/>
+            <a:alphaOff val="0"/>
+          </a:schemeClr>
+        </a:solidFill>
+        <a:ln>
+          <a:noFill/>
         </a:ln>
         <a:effectLst/>
       </dsp:spPr>
       <dsp:style>
-        <a:lnRef idx="2">
+        <a:lnRef idx="0">
           <a:scrgbClr r="0" g="0" b="0"/>
         </a:lnRef>
-        <a:fillRef idx="0">
+        <a:fillRef idx="1">
           <a:scrgbClr r="0" g="0" b="0"/>
         </a:fillRef>
         <a:effectRef idx="0">
@@ -1932,317 +1660,46 @@
         </a:effectRef>
         <a:fontRef idx="minor"/>
       </dsp:style>
+      <dsp:txBody>
+        <a:bodyPr spcFirstLastPara="0" vert="horz" wrap="square" lIns="327152" tIns="327152" rIns="327152" bIns="327152" numCol="1" spcCol="1270" anchor="ctr" anchorCtr="0">
+          <a:noAutofit/>
+        </a:bodyPr>
+        <a:lstStyle/>
+        <a:p>
+          <a:pPr marL="0" lvl="0" indent="0" algn="ctr" defTabSz="2044700">
+            <a:lnSpc>
+              <a:spcPct val="90000"/>
+            </a:lnSpc>
+            <a:spcBef>
+              <a:spcPct val="0"/>
+            </a:spcBef>
+            <a:spcAft>
+              <a:spcPct val="35000"/>
+            </a:spcAft>
+            <a:buNone/>
+          </a:pPr>
+          <a:endParaRPr lang="en-US" sz="4600" kern="1200"/>
+        </a:p>
+      </dsp:txBody>
+      <dsp:txXfrm>
+        <a:off x="0" y="1354"/>
+        <a:ext cx="3154680" cy="1303949"/>
+      </dsp:txXfrm>
     </dsp:sp>
-    <dsp:sp modelId="{879708FF-C94E-4BC2-B60E-736C0D75B913}">
+    <dsp:sp modelId="{106846B4-C57C-4B4A-8BDC-EA3A01B8B95F}">
       <dsp:nvSpPr>
         <dsp:cNvPr id="0" name=""/>
         <dsp:cNvSpPr/>
       </dsp:nvSpPr>
       <dsp:spPr>
         <a:xfrm>
-          <a:off x="5201249" y="588091"/>
-          <a:ext cx="193185" cy="631126"/>
+          <a:off x="4846366" y="110550"/>
+          <a:ext cx="1637927" cy="1091951"/>
         </a:xfrm>
-        <a:custGeom>
-          <a:avLst/>
-          <a:gdLst/>
-          <a:ahLst/>
-          <a:cxnLst/>
-          <a:rect l="0" t="0" r="0" b="0"/>
-          <a:pathLst>
-            <a:path>
-              <a:moveTo>
-                <a:pt x="0" y="0"/>
-              </a:moveTo>
-              <a:lnTo>
-                <a:pt x="0" y="631126"/>
-              </a:lnTo>
-              <a:lnTo>
-                <a:pt x="193185" y="631126"/>
-              </a:lnTo>
-            </a:path>
-          </a:pathLst>
-        </a:custGeom>
-        <a:noFill/>
-        <a:ln w="12700" cap="flat" cmpd="sng" algn="ctr">
-          <a:solidFill>
-            <a:schemeClr val="accent1">
-              <a:shade val="60000"/>
-              <a:hueOff val="0"/>
-              <a:satOff val="0"/>
-              <a:lumOff val="0"/>
-              <a:alphaOff val="0"/>
-            </a:schemeClr>
-          </a:solidFill>
-          <a:prstDash val="solid"/>
-          <a:miter lim="800000"/>
-        </a:ln>
-        <a:effectLst/>
-      </dsp:spPr>
-      <dsp:style>
-        <a:lnRef idx="2">
-          <a:scrgbClr r="0" g="0" b="0"/>
-        </a:lnRef>
-        <a:fillRef idx="0">
-          <a:scrgbClr r="0" g="0" b="0"/>
-        </a:fillRef>
-        <a:effectRef idx="0">
-          <a:scrgbClr r="0" g="0" b="0"/>
-        </a:effectRef>
-        <a:fontRef idx="minor"/>
-      </dsp:style>
-    </dsp:sp>
-    <dsp:sp modelId="{F7B374D2-923B-4157-A1F7-83B6513409E4}">
-      <dsp:nvSpPr>
-        <dsp:cNvPr id="0" name=""/>
-        <dsp:cNvSpPr/>
-      </dsp:nvSpPr>
-      <dsp:spPr>
-        <a:xfrm>
-          <a:off x="5008064" y="588091"/>
-          <a:ext cx="193185" cy="631126"/>
-        </a:xfrm>
-        <a:custGeom>
-          <a:avLst/>
-          <a:gdLst/>
-          <a:ahLst/>
-          <a:cxnLst/>
-          <a:rect l="0" t="0" r="0" b="0"/>
-          <a:pathLst>
-            <a:path>
-              <a:moveTo>
-                <a:pt x="193185" y="0"/>
-              </a:moveTo>
-              <a:lnTo>
-                <a:pt x="193185" y="631126"/>
-              </a:lnTo>
-              <a:lnTo>
-                <a:pt x="0" y="631126"/>
-              </a:lnTo>
-            </a:path>
-          </a:pathLst>
-        </a:custGeom>
-        <a:noFill/>
-        <a:ln w="12700" cap="flat" cmpd="sng" algn="ctr">
-          <a:solidFill>
-            <a:schemeClr val="accent1">
-              <a:shade val="60000"/>
-              <a:hueOff val="0"/>
-              <a:satOff val="0"/>
-              <a:lumOff val="0"/>
-              <a:alphaOff val="0"/>
-            </a:schemeClr>
-          </a:solidFill>
-          <a:prstDash val="solid"/>
-          <a:miter lim="800000"/>
-        </a:ln>
-        <a:effectLst/>
-      </dsp:spPr>
-      <dsp:style>
-        <a:lnRef idx="2">
-          <a:scrgbClr r="0" g="0" b="0"/>
-        </a:lnRef>
-        <a:fillRef idx="0">
-          <a:scrgbClr r="0" g="0" b="0"/>
-        </a:fillRef>
-        <a:effectRef idx="0">
-          <a:scrgbClr r="0" g="0" b="0"/>
-        </a:effectRef>
-        <a:fontRef idx="minor"/>
-      </dsp:style>
-    </dsp:sp>
-    <dsp:sp modelId="{F3830243-C9A1-4DF7-8669-B314549186C1}">
-      <dsp:nvSpPr>
-        <dsp:cNvPr id="0" name=""/>
-        <dsp:cNvSpPr/>
-      </dsp:nvSpPr>
-      <dsp:spPr>
-        <a:xfrm>
-          <a:off x="5201249" y="588091"/>
-          <a:ext cx="1517371" cy="3110089"/>
-        </a:xfrm>
-        <a:custGeom>
-          <a:avLst/>
-          <a:gdLst/>
-          <a:ahLst/>
-          <a:cxnLst/>
-          <a:rect l="0" t="0" r="0" b="0"/>
-          <a:pathLst>
-            <a:path>
-              <a:moveTo>
-                <a:pt x="0" y="0"/>
-              </a:moveTo>
-              <a:lnTo>
-                <a:pt x="0" y="2973453"/>
-              </a:lnTo>
-              <a:lnTo>
-                <a:pt x="1517371" y="2973453"/>
-              </a:lnTo>
-              <a:lnTo>
-                <a:pt x="1517371" y="3110089"/>
-              </a:lnTo>
-            </a:path>
-          </a:pathLst>
-        </a:custGeom>
-        <a:noFill/>
-        <a:ln w="12700" cap="flat" cmpd="sng" algn="ctr">
-          <a:solidFill>
-            <a:schemeClr val="accent1">
-              <a:shade val="60000"/>
-              <a:hueOff val="0"/>
-              <a:satOff val="0"/>
-              <a:lumOff val="0"/>
-              <a:alphaOff val="0"/>
-            </a:schemeClr>
-          </a:solidFill>
-          <a:prstDash val="solid"/>
-          <a:miter lim="800000"/>
-        </a:ln>
-        <a:effectLst/>
-      </dsp:spPr>
-      <dsp:style>
-        <a:lnRef idx="2">
-          <a:scrgbClr r="0" g="0" b="0"/>
-        </a:lnRef>
-        <a:fillRef idx="0">
-          <a:scrgbClr r="0" g="0" b="0"/>
-        </a:fillRef>
-        <a:effectRef idx="0">
-          <a:scrgbClr r="0" g="0" b="0"/>
-        </a:effectRef>
-        <a:fontRef idx="minor"/>
-      </dsp:style>
-    </dsp:sp>
-    <dsp:sp modelId="{B9DF72DF-4A7C-4757-B5C6-CE8BD368E8DF}">
-      <dsp:nvSpPr>
-        <dsp:cNvPr id="0" name=""/>
-        <dsp:cNvSpPr/>
-      </dsp:nvSpPr>
-      <dsp:spPr>
-        <a:xfrm>
-          <a:off x="5155529" y="588091"/>
-          <a:ext cx="91440" cy="3110089"/>
-        </a:xfrm>
-        <a:custGeom>
-          <a:avLst/>
-          <a:gdLst/>
-          <a:ahLst/>
-          <a:cxnLst/>
-          <a:rect l="0" t="0" r="0" b="0"/>
-          <a:pathLst>
-            <a:path>
-              <a:moveTo>
-                <a:pt x="45720" y="0"/>
-              </a:moveTo>
-              <a:lnTo>
-                <a:pt x="45720" y="3110089"/>
-              </a:lnTo>
-            </a:path>
-          </a:pathLst>
-        </a:custGeom>
-        <a:noFill/>
-        <a:ln w="12700" cap="flat" cmpd="sng" algn="ctr">
-          <a:solidFill>
-            <a:schemeClr val="accent1">
-              <a:shade val="60000"/>
-              <a:hueOff val="0"/>
-              <a:satOff val="0"/>
-              <a:lumOff val="0"/>
-              <a:alphaOff val="0"/>
-            </a:schemeClr>
-          </a:solidFill>
-          <a:prstDash val="solid"/>
-          <a:miter lim="800000"/>
-        </a:ln>
-        <a:effectLst/>
-      </dsp:spPr>
-      <dsp:style>
-        <a:lnRef idx="2">
-          <a:scrgbClr r="0" g="0" b="0"/>
-        </a:lnRef>
-        <a:fillRef idx="0">
-          <a:scrgbClr r="0" g="0" b="0"/>
-        </a:fillRef>
-        <a:effectRef idx="0">
-          <a:scrgbClr r="0" g="0" b="0"/>
-        </a:effectRef>
-        <a:fontRef idx="minor"/>
-      </dsp:style>
-    </dsp:sp>
-    <dsp:sp modelId="{E1454AD8-92A9-4D75-B1F9-D25FFF23CF55}">
-      <dsp:nvSpPr>
-        <dsp:cNvPr id="0" name=""/>
-        <dsp:cNvSpPr/>
-      </dsp:nvSpPr>
-      <dsp:spPr>
-        <a:xfrm>
-          <a:off x="3683878" y="588091"/>
-          <a:ext cx="1517371" cy="3110089"/>
-        </a:xfrm>
-        <a:custGeom>
-          <a:avLst/>
-          <a:gdLst/>
-          <a:ahLst/>
-          <a:cxnLst/>
-          <a:rect l="0" t="0" r="0" b="0"/>
-          <a:pathLst>
-            <a:path>
-              <a:moveTo>
-                <a:pt x="1517371" y="0"/>
-              </a:moveTo>
-              <a:lnTo>
-                <a:pt x="1517371" y="2973453"/>
-              </a:lnTo>
-              <a:lnTo>
-                <a:pt x="0" y="2973453"/>
-              </a:lnTo>
-              <a:lnTo>
-                <a:pt x="0" y="3110089"/>
-              </a:lnTo>
-            </a:path>
-          </a:pathLst>
-        </a:custGeom>
-        <a:noFill/>
-        <a:ln w="12700" cap="flat" cmpd="sng" algn="ctr">
-          <a:solidFill>
-            <a:schemeClr val="accent1">
-              <a:shade val="60000"/>
-              <a:hueOff val="0"/>
-              <a:satOff val="0"/>
-              <a:lumOff val="0"/>
-              <a:alphaOff val="0"/>
-            </a:schemeClr>
-          </a:solidFill>
-          <a:prstDash val="solid"/>
-          <a:miter lim="800000"/>
-        </a:ln>
-        <a:effectLst/>
-      </dsp:spPr>
-      <dsp:style>
-        <a:lnRef idx="2">
-          <a:scrgbClr r="0" g="0" b="0"/>
-        </a:lnRef>
-        <a:fillRef idx="0">
-          <a:scrgbClr r="0" g="0" b="0"/>
-        </a:fillRef>
-        <a:effectRef idx="0">
-          <a:scrgbClr r="0" g="0" b="0"/>
-        </a:effectRef>
-        <a:fontRef idx="minor"/>
-      </dsp:style>
-    </dsp:sp>
-    <dsp:sp modelId="{0E2F0851-4C4D-4530-93D1-F0F47B358084}">
-      <dsp:nvSpPr>
-        <dsp:cNvPr id="0" name=""/>
-        <dsp:cNvSpPr/>
-      </dsp:nvSpPr>
-      <dsp:spPr>
-        <a:xfrm>
-          <a:off x="4635749" y="2510"/>
-          <a:ext cx="1131000" cy="585581"/>
-        </a:xfrm>
-        <a:prstGeom prst="rect">
-          <a:avLst/>
+        <a:prstGeom prst="roundRect">
+          <a:avLst>
+            <a:gd name="adj" fmla="val 10000"/>
+          </a:avLst>
         </a:prstGeom>
         <a:solidFill>
           <a:schemeClr val="accent1">
@@ -2281,12 +1738,12 @@
         </a:fontRef>
       </dsp:style>
       <dsp:txBody>
-        <a:bodyPr spcFirstLastPara="0" vert="horz" wrap="square" lIns="10795" tIns="10795" rIns="10795" bIns="82632" numCol="1" spcCol="1270" anchor="ctr" anchorCtr="0">
+        <a:bodyPr spcFirstLastPara="0" vert="horz" wrap="square" lIns="83820" tIns="83820" rIns="83820" bIns="83820" numCol="1" spcCol="1270" anchor="ctr" anchorCtr="0">
           <a:noAutofit/>
         </a:bodyPr>
         <a:lstStyle/>
         <a:p>
-          <a:pPr marL="0" lvl="0" indent="0" algn="ctr" defTabSz="755650">
+          <a:pPr marL="0" lvl="0" indent="0" algn="ctr" defTabSz="977900">
             <a:lnSpc>
               <a:spcPct val="90000"/>
             </a:lnSpc>
@@ -2299,41 +1756,54 @@
             <a:buNone/>
           </a:pPr>
           <a:r>
-            <a:rPr lang="en-US" sz="1700" kern="1200" dirty="0"/>
+            <a:rPr lang="en-US" sz="2200" kern="1200" dirty="0"/>
             <a:t>Home</a:t>
           </a:r>
         </a:p>
       </dsp:txBody>
       <dsp:txXfrm>
-        <a:off x="4635749" y="2510"/>
-        <a:ext cx="1131000" cy="585581"/>
+        <a:off x="4878348" y="142532"/>
+        <a:ext cx="1573963" cy="1027987"/>
       </dsp:txXfrm>
     </dsp:sp>
-    <dsp:sp modelId="{45F2E63E-3EB4-4AA6-9262-2D4E07AB612D}">
+    <dsp:sp modelId="{AFA13D1E-B68F-4E1C-A8A5-C8CBFB686937}">
       <dsp:nvSpPr>
         <dsp:cNvPr id="0" name=""/>
         <dsp:cNvSpPr/>
       </dsp:nvSpPr>
       <dsp:spPr>
         <a:xfrm>
-          <a:off x="4861949" y="457962"/>
-          <a:ext cx="1017900" cy="195193"/>
+          <a:off x="4600677" y="1202501"/>
+          <a:ext cx="1064653" cy="436780"/>
         </a:xfrm>
-        <a:prstGeom prst="rect">
+        <a:custGeom>
           <a:avLst/>
-        </a:prstGeom>
-        <a:solidFill>
-          <a:schemeClr val="lt1">
-            <a:alpha val="90000"/>
-            <a:hueOff val="0"/>
-            <a:satOff val="0"/>
-            <a:lumOff val="0"/>
-            <a:alphaOff val="0"/>
-          </a:schemeClr>
-        </a:solidFill>
+          <a:gdLst/>
+          <a:ahLst/>
+          <a:cxnLst/>
+          <a:rect l="0" t="0" r="0" b="0"/>
+          <a:pathLst>
+            <a:path>
+              <a:moveTo>
+                <a:pt x="1064653" y="0"/>
+              </a:moveTo>
+              <a:lnTo>
+                <a:pt x="1064653" y="218390"/>
+              </a:lnTo>
+              <a:lnTo>
+                <a:pt x="0" y="218390"/>
+              </a:lnTo>
+              <a:lnTo>
+                <a:pt x="0" y="436780"/>
+              </a:lnTo>
+            </a:path>
+          </a:pathLst>
+        </a:custGeom>
+        <a:noFill/>
         <a:ln w="12700" cap="flat" cmpd="sng" algn="ctr">
           <a:solidFill>
             <a:schemeClr val="accent1">
+              <a:shade val="60000"/>
               <a:hueOff val="0"/>
               <a:satOff val="0"/>
               <a:lumOff val="0"/>
@@ -2349,7 +1819,7 @@
         <a:lnRef idx="2">
           <a:scrgbClr r="0" g="0" b="0"/>
         </a:lnRef>
-        <a:fillRef idx="1">
+        <a:fillRef idx="0">
           <a:scrgbClr r="0" g="0" b="0"/>
         </a:fillRef>
         <a:effectRef idx="0">
@@ -2357,44 +1827,21 @@
         </a:effectRef>
         <a:fontRef idx="minor"/>
       </dsp:style>
-      <dsp:txBody>
-        <a:bodyPr spcFirstLastPara="0" vert="horz" wrap="square" lIns="30480" tIns="7620" rIns="30480" bIns="7620" numCol="1" spcCol="1270" anchor="ctr" anchorCtr="0">
-          <a:noAutofit/>
-        </a:bodyPr>
-        <a:lstStyle/>
-        <a:p>
-          <a:pPr marL="0" lvl="0" indent="0" algn="r" defTabSz="533400">
-            <a:lnSpc>
-              <a:spcPct val="90000"/>
-            </a:lnSpc>
-            <a:spcBef>
-              <a:spcPct val="0"/>
-            </a:spcBef>
-            <a:spcAft>
-              <a:spcPct val="35000"/>
-            </a:spcAft>
-            <a:buNone/>
-          </a:pPr>
-          <a:endParaRPr lang="en-US" sz="1200" kern="1200"/>
-        </a:p>
-      </dsp:txBody>
-      <dsp:txXfrm>
-        <a:off x="4861949" y="457962"/>
-        <a:ext cx="1017900" cy="195193"/>
-      </dsp:txXfrm>
     </dsp:sp>
-    <dsp:sp modelId="{CA178424-5890-4242-A103-23C325743DDD}">
+    <dsp:sp modelId="{21353F14-EF15-4F1A-AD9C-52082FDC1EDE}">
       <dsp:nvSpPr>
         <dsp:cNvPr id="0" name=""/>
         <dsp:cNvSpPr/>
       </dsp:nvSpPr>
       <dsp:spPr>
         <a:xfrm>
-          <a:off x="3118378" y="3698181"/>
-          <a:ext cx="1131000" cy="585581"/>
+          <a:off x="3781713" y="1639282"/>
+          <a:ext cx="1637927" cy="1091951"/>
         </a:xfrm>
-        <a:prstGeom prst="rect">
-          <a:avLst/>
+        <a:prstGeom prst="roundRect">
+          <a:avLst>
+            <a:gd name="adj" fmla="val 10000"/>
+          </a:avLst>
         </a:prstGeom>
         <a:solidFill>
           <a:schemeClr val="accent1">
@@ -2433,12 +1880,12 @@
         </a:fontRef>
       </dsp:style>
       <dsp:txBody>
-        <a:bodyPr spcFirstLastPara="0" vert="horz" wrap="square" lIns="10795" tIns="10795" rIns="10795" bIns="82632" numCol="1" spcCol="1270" anchor="ctr" anchorCtr="0">
+        <a:bodyPr spcFirstLastPara="0" vert="horz" wrap="square" lIns="83820" tIns="83820" rIns="83820" bIns="83820" numCol="1" spcCol="1270" anchor="ctr" anchorCtr="0">
           <a:noAutofit/>
         </a:bodyPr>
         <a:lstStyle/>
         <a:p>
-          <a:pPr marL="0" lvl="0" indent="0" algn="ctr" defTabSz="755650">
+          <a:pPr marL="0" lvl="0" indent="0" algn="ctr" defTabSz="977900">
             <a:lnSpc>
               <a:spcPct val="90000"/>
             </a:lnSpc>
@@ -2450,39 +1897,55 @@
             </a:spcAft>
             <a:buNone/>
           </a:pPr>
-          <a:endParaRPr lang="en-US" sz="1700" kern="1200" dirty="0"/>
+          <a:r>
+            <a:rPr lang="en-US" sz="2200" kern="1200" dirty="0"/>
+            <a:t>Registration</a:t>
+          </a:r>
         </a:p>
       </dsp:txBody>
       <dsp:txXfrm>
-        <a:off x="3118378" y="3698181"/>
-        <a:ext cx="1131000" cy="585581"/>
+        <a:off x="3813695" y="1671264"/>
+        <a:ext cx="1573963" cy="1027987"/>
       </dsp:txXfrm>
     </dsp:sp>
-    <dsp:sp modelId="{D1C69FA8-DF74-4F4B-9D7C-F958FB699CDF}">
+    <dsp:sp modelId="{4B4C13B4-BD1C-43B8-96A8-3016EDC34C57}">
       <dsp:nvSpPr>
         <dsp:cNvPr id="0" name=""/>
         <dsp:cNvSpPr/>
       </dsp:nvSpPr>
       <dsp:spPr>
         <a:xfrm>
-          <a:off x="3344578" y="4153633"/>
-          <a:ext cx="1017900" cy="195193"/>
+          <a:off x="5665330" y="1202501"/>
+          <a:ext cx="1064653" cy="436780"/>
         </a:xfrm>
-        <a:prstGeom prst="rect">
+        <a:custGeom>
           <a:avLst/>
-        </a:prstGeom>
-        <a:solidFill>
-          <a:schemeClr val="lt1">
-            <a:alpha val="90000"/>
-            <a:hueOff val="0"/>
-            <a:satOff val="0"/>
-            <a:lumOff val="0"/>
-            <a:alphaOff val="0"/>
-          </a:schemeClr>
-        </a:solidFill>
+          <a:gdLst/>
+          <a:ahLst/>
+          <a:cxnLst/>
+          <a:rect l="0" t="0" r="0" b="0"/>
+          <a:pathLst>
+            <a:path>
+              <a:moveTo>
+                <a:pt x="0" y="0"/>
+              </a:moveTo>
+              <a:lnTo>
+                <a:pt x="0" y="218390"/>
+              </a:lnTo>
+              <a:lnTo>
+                <a:pt x="1064653" y="218390"/>
+              </a:lnTo>
+              <a:lnTo>
+                <a:pt x="1064653" y="436780"/>
+              </a:lnTo>
+            </a:path>
+          </a:pathLst>
+        </a:custGeom>
+        <a:noFill/>
         <a:ln w="12700" cap="flat" cmpd="sng" algn="ctr">
           <a:solidFill>
             <a:schemeClr val="accent1">
+              <a:shade val="60000"/>
               <a:hueOff val="0"/>
               <a:satOff val="0"/>
               <a:lumOff val="0"/>
@@ -2498,7 +1961,7 @@
         <a:lnRef idx="2">
           <a:scrgbClr r="0" g="0" b="0"/>
         </a:lnRef>
-        <a:fillRef idx="1">
+        <a:fillRef idx="0">
           <a:scrgbClr r="0" g="0" b="0"/>
         </a:fillRef>
         <a:effectRef idx="0">
@@ -2506,44 +1969,21 @@
         </a:effectRef>
         <a:fontRef idx="minor"/>
       </dsp:style>
-      <dsp:txBody>
-        <a:bodyPr spcFirstLastPara="0" vert="horz" wrap="square" lIns="30480" tIns="7620" rIns="30480" bIns="7620" numCol="1" spcCol="1270" anchor="ctr" anchorCtr="0">
-          <a:noAutofit/>
-        </a:bodyPr>
-        <a:lstStyle/>
-        <a:p>
-          <a:pPr marL="0" lvl="0" indent="0" algn="r" defTabSz="533400">
-            <a:lnSpc>
-              <a:spcPct val="90000"/>
-            </a:lnSpc>
-            <a:spcBef>
-              <a:spcPct val="0"/>
-            </a:spcBef>
-            <a:spcAft>
-              <a:spcPct val="35000"/>
-            </a:spcAft>
-            <a:buNone/>
-          </a:pPr>
-          <a:endParaRPr lang="en-US" sz="1200" kern="1200"/>
-        </a:p>
-      </dsp:txBody>
-      <dsp:txXfrm>
-        <a:off x="3344578" y="4153633"/>
-        <a:ext cx="1017900" cy="195193"/>
-      </dsp:txXfrm>
     </dsp:sp>
-    <dsp:sp modelId="{4CB25805-913C-467F-83C6-B08F3AFCFA0F}">
+    <dsp:sp modelId="{8A4DBA3A-9F9F-428E-A158-D57E8800853A}">
       <dsp:nvSpPr>
         <dsp:cNvPr id="0" name=""/>
         <dsp:cNvSpPr/>
       </dsp:nvSpPr>
       <dsp:spPr>
         <a:xfrm>
-          <a:off x="4635749" y="3698181"/>
-          <a:ext cx="1131000" cy="585581"/>
+          <a:off x="5911020" y="1639282"/>
+          <a:ext cx="1637927" cy="1091951"/>
         </a:xfrm>
-        <a:prstGeom prst="rect">
-          <a:avLst/>
+        <a:prstGeom prst="roundRect">
+          <a:avLst>
+            <a:gd name="adj" fmla="val 10000"/>
+          </a:avLst>
         </a:prstGeom>
         <a:solidFill>
           <a:schemeClr val="accent1">
@@ -2582,12 +2022,12 @@
         </a:fontRef>
       </dsp:style>
       <dsp:txBody>
-        <a:bodyPr spcFirstLastPara="0" vert="horz" wrap="square" lIns="10795" tIns="10795" rIns="10795" bIns="82632" numCol="1" spcCol="1270" anchor="ctr" anchorCtr="0">
+        <a:bodyPr spcFirstLastPara="0" vert="horz" wrap="square" lIns="83820" tIns="83820" rIns="83820" bIns="83820" numCol="1" spcCol="1270" anchor="ctr" anchorCtr="0">
           <a:noAutofit/>
         </a:bodyPr>
         <a:lstStyle/>
         <a:p>
-          <a:pPr marL="0" lvl="0" indent="0" algn="ctr" defTabSz="755650">
+          <a:pPr marL="0" lvl="0" indent="0" algn="ctr" defTabSz="977900">
             <a:lnSpc>
               <a:spcPct val="90000"/>
             </a:lnSpc>
@@ -2599,39 +2039,55 @@
             </a:spcAft>
             <a:buNone/>
           </a:pPr>
-          <a:endParaRPr lang="en-US" sz="1700" kern="1200"/>
+          <a:r>
+            <a:rPr lang="en-US" sz="2200" kern="1200" dirty="0"/>
+            <a:t>Resources</a:t>
+          </a:r>
         </a:p>
       </dsp:txBody>
       <dsp:txXfrm>
-        <a:off x="4635749" y="3698181"/>
-        <a:ext cx="1131000" cy="585581"/>
+        <a:off x="5943002" y="1671264"/>
+        <a:ext cx="1573963" cy="1027987"/>
       </dsp:txXfrm>
     </dsp:sp>
-    <dsp:sp modelId="{261948D4-2FA7-4063-B7A1-EDC8AF65CE54}">
+    <dsp:sp modelId="{5532AA10-5880-4269-902B-3B7CF5C0D400}">
       <dsp:nvSpPr>
         <dsp:cNvPr id="0" name=""/>
         <dsp:cNvSpPr/>
       </dsp:nvSpPr>
       <dsp:spPr>
         <a:xfrm>
-          <a:off x="4861949" y="4153633"/>
-          <a:ext cx="1017900" cy="195193"/>
+          <a:off x="4600677" y="2731234"/>
+          <a:ext cx="2129306" cy="436780"/>
         </a:xfrm>
-        <a:prstGeom prst="rect">
+        <a:custGeom>
           <a:avLst/>
-        </a:prstGeom>
-        <a:solidFill>
-          <a:schemeClr val="lt1">
-            <a:alpha val="90000"/>
-            <a:hueOff val="0"/>
-            <a:satOff val="0"/>
-            <a:lumOff val="0"/>
-            <a:alphaOff val="0"/>
-          </a:schemeClr>
-        </a:solidFill>
+          <a:gdLst/>
+          <a:ahLst/>
+          <a:cxnLst/>
+          <a:rect l="0" t="0" r="0" b="0"/>
+          <a:pathLst>
+            <a:path>
+              <a:moveTo>
+                <a:pt x="2129306" y="0"/>
+              </a:moveTo>
+              <a:lnTo>
+                <a:pt x="2129306" y="218390"/>
+              </a:lnTo>
+              <a:lnTo>
+                <a:pt x="0" y="218390"/>
+              </a:lnTo>
+              <a:lnTo>
+                <a:pt x="0" y="436780"/>
+              </a:lnTo>
+            </a:path>
+          </a:pathLst>
+        </a:custGeom>
+        <a:noFill/>
         <a:ln w="12700" cap="flat" cmpd="sng" algn="ctr">
           <a:solidFill>
             <a:schemeClr val="accent1">
+              <a:shade val="80000"/>
               <a:hueOff val="0"/>
               <a:satOff val="0"/>
               <a:lumOff val="0"/>
@@ -2647,7 +2103,7 @@
         <a:lnRef idx="2">
           <a:scrgbClr r="0" g="0" b="0"/>
         </a:lnRef>
-        <a:fillRef idx="1">
+        <a:fillRef idx="0">
           <a:scrgbClr r="0" g="0" b="0"/>
         </a:fillRef>
         <a:effectRef idx="0">
@@ -2655,44 +2111,21 @@
         </a:effectRef>
         <a:fontRef idx="minor"/>
       </dsp:style>
-      <dsp:txBody>
-        <a:bodyPr spcFirstLastPara="0" vert="horz" wrap="square" lIns="30480" tIns="7620" rIns="30480" bIns="7620" numCol="1" spcCol="1270" anchor="ctr" anchorCtr="0">
-          <a:noAutofit/>
-        </a:bodyPr>
-        <a:lstStyle/>
-        <a:p>
-          <a:pPr marL="0" lvl="0" indent="0" algn="r" defTabSz="533400">
-            <a:lnSpc>
-              <a:spcPct val="90000"/>
-            </a:lnSpc>
-            <a:spcBef>
-              <a:spcPct val="0"/>
-            </a:spcBef>
-            <a:spcAft>
-              <a:spcPct val="35000"/>
-            </a:spcAft>
-            <a:buNone/>
-          </a:pPr>
-          <a:endParaRPr lang="en-US" sz="1200" kern="1200"/>
-        </a:p>
-      </dsp:txBody>
-      <dsp:txXfrm>
-        <a:off x="4861949" y="4153633"/>
-        <a:ext cx="1017900" cy="195193"/>
-      </dsp:txXfrm>
     </dsp:sp>
-    <dsp:sp modelId="{9B35FC8C-9186-49B8-A053-DD687917697F}">
+    <dsp:sp modelId="{2C1BBD02-149D-4AEF-8B7C-071D427D6796}">
       <dsp:nvSpPr>
         <dsp:cNvPr id="0" name=""/>
         <dsp:cNvSpPr/>
       </dsp:nvSpPr>
       <dsp:spPr>
         <a:xfrm>
-          <a:off x="6153121" y="3698181"/>
-          <a:ext cx="1131000" cy="585581"/>
+          <a:off x="3781713" y="3168015"/>
+          <a:ext cx="1637927" cy="1091951"/>
         </a:xfrm>
-        <a:prstGeom prst="rect">
-          <a:avLst/>
+        <a:prstGeom prst="roundRect">
+          <a:avLst>
+            <a:gd name="adj" fmla="val 10000"/>
+          </a:avLst>
         </a:prstGeom>
         <a:solidFill>
           <a:schemeClr val="accent1">
@@ -2731,12 +2164,12 @@
         </a:fontRef>
       </dsp:style>
       <dsp:txBody>
-        <a:bodyPr spcFirstLastPara="0" vert="horz" wrap="square" lIns="10795" tIns="10795" rIns="10795" bIns="82632" numCol="1" spcCol="1270" anchor="ctr" anchorCtr="0">
+        <a:bodyPr spcFirstLastPara="0" vert="horz" wrap="square" lIns="83820" tIns="83820" rIns="83820" bIns="83820" numCol="1" spcCol="1270" anchor="ctr" anchorCtr="0">
           <a:noAutofit/>
         </a:bodyPr>
         <a:lstStyle/>
         <a:p>
-          <a:pPr marL="0" lvl="0" indent="0" algn="ctr" defTabSz="755650">
+          <a:pPr marL="0" lvl="0" indent="0" algn="ctr" defTabSz="977900">
             <a:lnSpc>
               <a:spcPct val="90000"/>
             </a:lnSpc>
@@ -2748,39 +2181,49 @@
             </a:spcAft>
             <a:buNone/>
           </a:pPr>
-          <a:endParaRPr lang="en-US" sz="1700" kern="1200"/>
+          <a:r>
+            <a:rPr lang="en-US" sz="2200" kern="1200" dirty="0"/>
+            <a:t>View Members</a:t>
+          </a:r>
         </a:p>
       </dsp:txBody>
       <dsp:txXfrm>
-        <a:off x="6153121" y="3698181"/>
-        <a:ext cx="1131000" cy="585581"/>
+        <a:off x="3813695" y="3199997"/>
+        <a:ext cx="1573963" cy="1027987"/>
       </dsp:txXfrm>
     </dsp:sp>
-    <dsp:sp modelId="{79B36821-8B5C-4E25-9CAE-29F66DCC0474}">
+    <dsp:sp modelId="{75BA6FCF-B20C-4695-AD33-1AC04E6188EF}">
       <dsp:nvSpPr>
         <dsp:cNvPr id="0" name=""/>
         <dsp:cNvSpPr/>
       </dsp:nvSpPr>
       <dsp:spPr>
         <a:xfrm>
-          <a:off x="6379321" y="4153633"/>
-          <a:ext cx="1017900" cy="195193"/>
+          <a:off x="6684264" y="2731234"/>
+          <a:ext cx="91440" cy="436780"/>
         </a:xfrm>
-        <a:prstGeom prst="rect">
+        <a:custGeom>
           <a:avLst/>
-        </a:prstGeom>
-        <a:solidFill>
-          <a:schemeClr val="lt1">
-            <a:alpha val="90000"/>
-            <a:hueOff val="0"/>
-            <a:satOff val="0"/>
-            <a:lumOff val="0"/>
-            <a:alphaOff val="0"/>
-          </a:schemeClr>
-        </a:solidFill>
+          <a:gdLst/>
+          <a:ahLst/>
+          <a:cxnLst/>
+          <a:rect l="0" t="0" r="0" b="0"/>
+          <a:pathLst>
+            <a:path>
+              <a:moveTo>
+                <a:pt x="45720" y="0"/>
+              </a:moveTo>
+              <a:lnTo>
+                <a:pt x="45720" y="436780"/>
+              </a:lnTo>
+            </a:path>
+          </a:pathLst>
+        </a:custGeom>
+        <a:noFill/>
         <a:ln w="12700" cap="flat" cmpd="sng" algn="ctr">
           <a:solidFill>
             <a:schemeClr val="accent1">
+              <a:shade val="80000"/>
               <a:hueOff val="0"/>
               <a:satOff val="0"/>
               <a:lumOff val="0"/>
@@ -2796,7 +2239,7 @@
         <a:lnRef idx="2">
           <a:scrgbClr r="0" g="0" b="0"/>
         </a:lnRef>
-        <a:fillRef idx="1">
+        <a:fillRef idx="0">
           <a:scrgbClr r="0" g="0" b="0"/>
         </a:fillRef>
         <a:effectRef idx="0">
@@ -2804,44 +2247,21 @@
         </a:effectRef>
         <a:fontRef idx="minor"/>
       </dsp:style>
-      <dsp:txBody>
-        <a:bodyPr spcFirstLastPara="0" vert="horz" wrap="square" lIns="30480" tIns="7620" rIns="30480" bIns="7620" numCol="1" spcCol="1270" anchor="ctr" anchorCtr="0">
-          <a:noAutofit/>
-        </a:bodyPr>
-        <a:lstStyle/>
-        <a:p>
-          <a:pPr marL="0" lvl="0" indent="0" algn="r" defTabSz="533400">
-            <a:lnSpc>
-              <a:spcPct val="90000"/>
-            </a:lnSpc>
-            <a:spcBef>
-              <a:spcPct val="0"/>
-            </a:spcBef>
-            <a:spcAft>
-              <a:spcPct val="35000"/>
-            </a:spcAft>
-            <a:buNone/>
-          </a:pPr>
-          <a:endParaRPr lang="en-US" sz="1200" kern="1200"/>
-        </a:p>
-      </dsp:txBody>
-      <dsp:txXfrm>
-        <a:off x="6379321" y="4153633"/>
-        <a:ext cx="1017900" cy="195193"/>
-      </dsp:txXfrm>
     </dsp:sp>
-    <dsp:sp modelId="{6241BE42-6B83-43C5-9E4C-7A66D6D9EFA4}">
+    <dsp:sp modelId="{D8B091A3-A137-49C1-BBB3-FD15C0D8621B}">
       <dsp:nvSpPr>
         <dsp:cNvPr id="0" name=""/>
         <dsp:cNvSpPr/>
       </dsp:nvSpPr>
       <dsp:spPr>
         <a:xfrm>
-          <a:off x="3877064" y="926428"/>
-          <a:ext cx="1131000" cy="585581"/>
+          <a:off x="5911020" y="3168015"/>
+          <a:ext cx="1637927" cy="1091951"/>
         </a:xfrm>
-        <a:prstGeom prst="rect">
-          <a:avLst/>
+        <a:prstGeom prst="roundRect">
+          <a:avLst>
+            <a:gd name="adj" fmla="val 10000"/>
+          </a:avLst>
         </a:prstGeom>
         <a:solidFill>
           <a:schemeClr val="accent1">
@@ -2880,12 +2300,12 @@
         </a:fontRef>
       </dsp:style>
       <dsp:txBody>
-        <a:bodyPr spcFirstLastPara="0" vert="horz" wrap="square" lIns="10795" tIns="10795" rIns="10795" bIns="82632" numCol="1" spcCol="1270" anchor="ctr" anchorCtr="0">
+        <a:bodyPr spcFirstLastPara="0" vert="horz" wrap="square" lIns="83820" tIns="83820" rIns="83820" bIns="83820" numCol="1" spcCol="1270" anchor="ctr" anchorCtr="0">
           <a:noAutofit/>
         </a:bodyPr>
         <a:lstStyle/>
         <a:p>
-          <a:pPr marL="0" lvl="0" indent="0" algn="ctr" defTabSz="755650">
+          <a:pPr marL="0" lvl="0" indent="0" algn="ctr" defTabSz="977900">
             <a:lnSpc>
               <a:spcPct val="90000"/>
             </a:lnSpc>
@@ -2898,41 +2318,54 @@
             <a:buNone/>
           </a:pPr>
           <a:r>
-            <a:rPr lang="en-US" sz="1700" kern="1200" dirty="0"/>
-            <a:t>Events</a:t>
+            <a:rPr lang="en-US" sz="2200" kern="1200" dirty="0"/>
+            <a:t>Local Groups</a:t>
           </a:r>
         </a:p>
       </dsp:txBody>
       <dsp:txXfrm>
-        <a:off x="3877064" y="926428"/>
-        <a:ext cx="1131000" cy="585581"/>
+        <a:off x="5943002" y="3199997"/>
+        <a:ext cx="1573963" cy="1027987"/>
       </dsp:txXfrm>
     </dsp:sp>
-    <dsp:sp modelId="{093426B6-CB37-4BFB-A245-2C41D01495F2}">
+    <dsp:sp modelId="{20187EFF-9F54-440A-8907-93C3BB961C65}">
       <dsp:nvSpPr>
         <dsp:cNvPr id="0" name=""/>
         <dsp:cNvSpPr/>
       </dsp:nvSpPr>
       <dsp:spPr>
         <a:xfrm>
-          <a:off x="4103264" y="1381880"/>
-          <a:ext cx="1017900" cy="195193"/>
+          <a:off x="6729984" y="2731234"/>
+          <a:ext cx="2129306" cy="436780"/>
         </a:xfrm>
-        <a:prstGeom prst="rect">
+        <a:custGeom>
           <a:avLst/>
-        </a:prstGeom>
-        <a:solidFill>
-          <a:schemeClr val="lt1">
-            <a:alpha val="90000"/>
-            <a:hueOff val="0"/>
-            <a:satOff val="0"/>
-            <a:lumOff val="0"/>
-            <a:alphaOff val="0"/>
-          </a:schemeClr>
-        </a:solidFill>
+          <a:gdLst/>
+          <a:ahLst/>
+          <a:cxnLst/>
+          <a:rect l="0" t="0" r="0" b="0"/>
+          <a:pathLst>
+            <a:path>
+              <a:moveTo>
+                <a:pt x="0" y="0"/>
+              </a:moveTo>
+              <a:lnTo>
+                <a:pt x="0" y="218390"/>
+              </a:lnTo>
+              <a:lnTo>
+                <a:pt x="2129306" y="218390"/>
+              </a:lnTo>
+              <a:lnTo>
+                <a:pt x="2129306" y="436780"/>
+              </a:lnTo>
+            </a:path>
+          </a:pathLst>
+        </a:custGeom>
+        <a:noFill/>
         <a:ln w="12700" cap="flat" cmpd="sng" algn="ctr">
           <a:solidFill>
             <a:schemeClr val="accent1">
+              <a:shade val="80000"/>
               <a:hueOff val="0"/>
               <a:satOff val="0"/>
               <a:lumOff val="0"/>
@@ -2948,7 +2381,7 @@
         <a:lnRef idx="2">
           <a:scrgbClr r="0" g="0" b="0"/>
         </a:lnRef>
-        <a:fillRef idx="1">
+        <a:fillRef idx="0">
           <a:scrgbClr r="0" g="0" b="0"/>
         </a:fillRef>
         <a:effectRef idx="0">
@@ -2956,44 +2389,21 @@
         </a:effectRef>
         <a:fontRef idx="minor"/>
       </dsp:style>
-      <dsp:txBody>
-        <a:bodyPr spcFirstLastPara="0" vert="horz" wrap="square" lIns="30480" tIns="7620" rIns="30480" bIns="7620" numCol="1" spcCol="1270" anchor="ctr" anchorCtr="0">
-          <a:noAutofit/>
-        </a:bodyPr>
-        <a:lstStyle/>
-        <a:p>
-          <a:pPr marL="0" lvl="0" indent="0" algn="r" defTabSz="533400">
-            <a:lnSpc>
-              <a:spcPct val="90000"/>
-            </a:lnSpc>
-            <a:spcBef>
-              <a:spcPct val="0"/>
-            </a:spcBef>
-            <a:spcAft>
-              <a:spcPct val="35000"/>
-            </a:spcAft>
-            <a:buNone/>
-          </a:pPr>
-          <a:endParaRPr lang="en-US" sz="1200" kern="1200"/>
-        </a:p>
-      </dsp:txBody>
-      <dsp:txXfrm>
-        <a:off x="4103264" y="1381880"/>
-        <a:ext cx="1017900" cy="195193"/>
-      </dsp:txXfrm>
     </dsp:sp>
-    <dsp:sp modelId="{00B9D14D-0388-44E4-BC78-EBCAD0B6979C}">
+    <dsp:sp modelId="{4037397F-5207-48DC-BDDE-62634F8E7BCC}">
       <dsp:nvSpPr>
         <dsp:cNvPr id="0" name=""/>
         <dsp:cNvSpPr/>
       </dsp:nvSpPr>
       <dsp:spPr>
         <a:xfrm>
-          <a:off x="5394435" y="926428"/>
-          <a:ext cx="1131000" cy="585581"/>
+          <a:off x="8040326" y="3168015"/>
+          <a:ext cx="1637927" cy="1091951"/>
         </a:xfrm>
-        <a:prstGeom prst="rect">
-          <a:avLst/>
+        <a:prstGeom prst="roundRect">
+          <a:avLst>
+            <a:gd name="adj" fmla="val 10000"/>
+          </a:avLst>
         </a:prstGeom>
         <a:solidFill>
           <a:schemeClr val="accent1">
@@ -3032,12 +2442,12 @@
         </a:fontRef>
       </dsp:style>
       <dsp:txBody>
-        <a:bodyPr spcFirstLastPara="0" vert="horz" wrap="square" lIns="10795" tIns="10795" rIns="10795" bIns="82632" numCol="1" spcCol="1270" anchor="ctr" anchorCtr="0">
+        <a:bodyPr spcFirstLastPara="0" vert="horz" wrap="square" lIns="83820" tIns="83820" rIns="83820" bIns="83820" numCol="1" spcCol="1270" anchor="ctr" anchorCtr="0">
           <a:noAutofit/>
         </a:bodyPr>
         <a:lstStyle/>
         <a:p>
-          <a:pPr marL="0" lvl="0" indent="0" algn="ctr" defTabSz="755650">
+          <a:pPr marL="0" lvl="0" indent="0" algn="ctr" defTabSz="977900">
             <a:lnSpc>
               <a:spcPct val="90000"/>
             </a:lnSpc>
@@ -3050,545 +2460,14 @@
             <a:buNone/>
           </a:pPr>
           <a:r>
-            <a:rPr lang="en-US" sz="1700" kern="1200" dirty="0" err="1"/>
-            <a:t>MeetUps</a:t>
-          </a:r>
-          <a:endParaRPr lang="en-US" sz="1700" kern="1200" dirty="0"/>
-        </a:p>
-      </dsp:txBody>
-      <dsp:txXfrm>
-        <a:off x="5394435" y="926428"/>
-        <a:ext cx="1131000" cy="585581"/>
-      </dsp:txXfrm>
-    </dsp:sp>
-    <dsp:sp modelId="{CC557E83-DF62-40AD-8846-5E84F3421AB0}">
-      <dsp:nvSpPr>
-        <dsp:cNvPr id="0" name=""/>
-        <dsp:cNvSpPr/>
-      </dsp:nvSpPr>
-      <dsp:spPr>
-        <a:xfrm>
-          <a:off x="5620635" y="1381880"/>
-          <a:ext cx="1017900" cy="195193"/>
-        </a:xfrm>
-        <a:prstGeom prst="rect">
-          <a:avLst/>
-        </a:prstGeom>
-        <a:solidFill>
-          <a:schemeClr val="lt1">
-            <a:alpha val="90000"/>
-            <a:hueOff val="0"/>
-            <a:satOff val="0"/>
-            <a:lumOff val="0"/>
-            <a:alphaOff val="0"/>
-          </a:schemeClr>
-        </a:solidFill>
-        <a:ln w="12700" cap="flat" cmpd="sng" algn="ctr">
-          <a:solidFill>
-            <a:schemeClr val="accent1">
-              <a:hueOff val="0"/>
-              <a:satOff val="0"/>
-              <a:lumOff val="0"/>
-              <a:alphaOff val="0"/>
-            </a:schemeClr>
-          </a:solidFill>
-          <a:prstDash val="solid"/>
-          <a:miter lim="800000"/>
-        </a:ln>
-        <a:effectLst/>
-      </dsp:spPr>
-      <dsp:style>
-        <a:lnRef idx="2">
-          <a:scrgbClr r="0" g="0" b="0"/>
-        </a:lnRef>
-        <a:fillRef idx="1">
-          <a:scrgbClr r="0" g="0" b="0"/>
-        </a:fillRef>
-        <a:effectRef idx="0">
-          <a:scrgbClr r="0" g="0" b="0"/>
-        </a:effectRef>
-        <a:fontRef idx="minor"/>
-      </dsp:style>
-      <dsp:txBody>
-        <a:bodyPr spcFirstLastPara="0" vert="horz" wrap="square" lIns="30480" tIns="7620" rIns="30480" bIns="7620" numCol="1" spcCol="1270" anchor="ctr" anchorCtr="0">
-          <a:noAutofit/>
-        </a:bodyPr>
-        <a:lstStyle/>
-        <a:p>
-          <a:pPr marL="0" lvl="0" indent="0" algn="r" defTabSz="533400">
-            <a:lnSpc>
-              <a:spcPct val="90000"/>
-            </a:lnSpc>
-            <a:spcBef>
-              <a:spcPct val="0"/>
-            </a:spcBef>
-            <a:spcAft>
-              <a:spcPct val="35000"/>
-            </a:spcAft>
-            <a:buNone/>
-          </a:pPr>
-          <a:endParaRPr lang="en-US" sz="1200" kern="1200"/>
-        </a:p>
-      </dsp:txBody>
-      <dsp:txXfrm>
-        <a:off x="5620635" y="1381880"/>
-        <a:ext cx="1017900" cy="195193"/>
-      </dsp:txXfrm>
-    </dsp:sp>
-    <dsp:sp modelId="{101E76A2-4743-4286-A350-ED12787CB775}">
-      <dsp:nvSpPr>
-        <dsp:cNvPr id="0" name=""/>
-        <dsp:cNvSpPr/>
-      </dsp:nvSpPr>
-      <dsp:spPr>
-        <a:xfrm>
-          <a:off x="3877064" y="1850345"/>
-          <a:ext cx="1131000" cy="585581"/>
-        </a:xfrm>
-        <a:prstGeom prst="rect">
-          <a:avLst/>
-        </a:prstGeom>
-        <a:solidFill>
-          <a:schemeClr val="accent1">
-            <a:hueOff val="0"/>
-            <a:satOff val="0"/>
-            <a:lumOff val="0"/>
-            <a:alphaOff val="0"/>
-          </a:schemeClr>
-        </a:solidFill>
-        <a:ln w="12700" cap="flat" cmpd="sng" algn="ctr">
-          <a:solidFill>
-            <a:schemeClr val="lt1">
-              <a:hueOff val="0"/>
-              <a:satOff val="0"/>
-              <a:lumOff val="0"/>
-              <a:alphaOff val="0"/>
-            </a:schemeClr>
-          </a:solidFill>
-          <a:prstDash val="solid"/>
-          <a:miter lim="800000"/>
-        </a:ln>
-        <a:effectLst/>
-      </dsp:spPr>
-      <dsp:style>
-        <a:lnRef idx="2">
-          <a:scrgbClr r="0" g="0" b="0"/>
-        </a:lnRef>
-        <a:fillRef idx="1">
-          <a:scrgbClr r="0" g="0" b="0"/>
-        </a:fillRef>
-        <a:effectRef idx="0">
-          <a:scrgbClr r="0" g="0" b="0"/>
-        </a:effectRef>
-        <a:fontRef idx="minor">
-          <a:schemeClr val="lt1"/>
-        </a:fontRef>
-      </dsp:style>
-      <dsp:txBody>
-        <a:bodyPr spcFirstLastPara="0" vert="horz" wrap="square" lIns="10795" tIns="10795" rIns="10795" bIns="82632" numCol="1" spcCol="1270" anchor="ctr" anchorCtr="0">
-          <a:noAutofit/>
-        </a:bodyPr>
-        <a:lstStyle/>
-        <a:p>
-          <a:pPr marL="0" lvl="0" indent="0" algn="ctr" defTabSz="755650">
-            <a:lnSpc>
-              <a:spcPct val="90000"/>
-            </a:lnSpc>
-            <a:spcBef>
-              <a:spcPct val="0"/>
-            </a:spcBef>
-            <a:spcAft>
-              <a:spcPct val="35000"/>
-            </a:spcAft>
-            <a:buNone/>
-          </a:pPr>
-          <a:r>
-            <a:rPr lang="en-US" sz="1700" kern="1200" dirty="0"/>
-            <a:t>Registration</a:t>
+            <a:rPr lang="en-US" sz="2200" kern="1200" dirty="0"/>
+            <a:t>Top Rated Parks</a:t>
           </a:r>
         </a:p>
       </dsp:txBody>
       <dsp:txXfrm>
-        <a:off x="3877064" y="1850345"/>
-        <a:ext cx="1131000" cy="585581"/>
-      </dsp:txXfrm>
-    </dsp:sp>
-    <dsp:sp modelId="{AB3EC8CC-7AD0-4ADD-8E48-F1FFC2E107B9}">
-      <dsp:nvSpPr>
-        <dsp:cNvPr id="0" name=""/>
-        <dsp:cNvSpPr/>
-      </dsp:nvSpPr>
-      <dsp:spPr>
-        <a:xfrm>
-          <a:off x="4103264" y="2305798"/>
-          <a:ext cx="1017900" cy="195193"/>
-        </a:xfrm>
-        <a:prstGeom prst="rect">
-          <a:avLst/>
-        </a:prstGeom>
-        <a:solidFill>
-          <a:schemeClr val="lt1">
-            <a:alpha val="90000"/>
-            <a:hueOff val="0"/>
-            <a:satOff val="0"/>
-            <a:lumOff val="0"/>
-            <a:alphaOff val="0"/>
-          </a:schemeClr>
-        </a:solidFill>
-        <a:ln w="12700" cap="flat" cmpd="sng" algn="ctr">
-          <a:solidFill>
-            <a:schemeClr val="accent1">
-              <a:hueOff val="0"/>
-              <a:satOff val="0"/>
-              <a:lumOff val="0"/>
-              <a:alphaOff val="0"/>
-            </a:schemeClr>
-          </a:solidFill>
-          <a:prstDash val="solid"/>
-          <a:miter lim="800000"/>
-        </a:ln>
-        <a:effectLst/>
-      </dsp:spPr>
-      <dsp:style>
-        <a:lnRef idx="2">
-          <a:scrgbClr r="0" g="0" b="0"/>
-        </a:lnRef>
-        <a:fillRef idx="1">
-          <a:scrgbClr r="0" g="0" b="0"/>
-        </a:fillRef>
-        <a:effectRef idx="0">
-          <a:scrgbClr r="0" g="0" b="0"/>
-        </a:effectRef>
-        <a:fontRef idx="minor"/>
-      </dsp:style>
-      <dsp:txBody>
-        <a:bodyPr spcFirstLastPara="0" vert="horz" wrap="square" lIns="30480" tIns="7620" rIns="30480" bIns="7620" numCol="1" spcCol="1270" anchor="ctr" anchorCtr="0">
-          <a:noAutofit/>
-        </a:bodyPr>
-        <a:lstStyle/>
-        <a:p>
-          <a:pPr marL="0" lvl="0" indent="0" algn="r" defTabSz="533400">
-            <a:lnSpc>
-              <a:spcPct val="90000"/>
-            </a:lnSpc>
-            <a:spcBef>
-              <a:spcPct val="0"/>
-            </a:spcBef>
-            <a:spcAft>
-              <a:spcPct val="35000"/>
-            </a:spcAft>
-            <a:buNone/>
-          </a:pPr>
-          <a:endParaRPr lang="en-US" sz="1200" kern="1200"/>
-        </a:p>
-      </dsp:txBody>
-      <dsp:txXfrm>
-        <a:off x="4103264" y="2305798"/>
-        <a:ext cx="1017900" cy="195193"/>
-      </dsp:txXfrm>
-    </dsp:sp>
-    <dsp:sp modelId="{B3283E1E-2057-4690-A212-3D2DAFA652BD}">
-      <dsp:nvSpPr>
-        <dsp:cNvPr id="0" name=""/>
-        <dsp:cNvSpPr/>
-      </dsp:nvSpPr>
-      <dsp:spPr>
-        <a:xfrm>
-          <a:off x="5394435" y="1850345"/>
-          <a:ext cx="1131000" cy="585581"/>
-        </a:xfrm>
-        <a:prstGeom prst="rect">
-          <a:avLst/>
-        </a:prstGeom>
-        <a:solidFill>
-          <a:schemeClr val="accent1">
-            <a:hueOff val="0"/>
-            <a:satOff val="0"/>
-            <a:lumOff val="0"/>
-            <a:alphaOff val="0"/>
-          </a:schemeClr>
-        </a:solidFill>
-        <a:ln w="12700" cap="flat" cmpd="sng" algn="ctr">
-          <a:solidFill>
-            <a:schemeClr val="lt1">
-              <a:hueOff val="0"/>
-              <a:satOff val="0"/>
-              <a:lumOff val="0"/>
-              <a:alphaOff val="0"/>
-            </a:schemeClr>
-          </a:solidFill>
-          <a:prstDash val="solid"/>
-          <a:miter lim="800000"/>
-        </a:ln>
-        <a:effectLst/>
-      </dsp:spPr>
-      <dsp:style>
-        <a:lnRef idx="2">
-          <a:scrgbClr r="0" g="0" b="0"/>
-        </a:lnRef>
-        <a:fillRef idx="1">
-          <a:scrgbClr r="0" g="0" b="0"/>
-        </a:fillRef>
-        <a:effectRef idx="0">
-          <a:scrgbClr r="0" g="0" b="0"/>
-        </a:effectRef>
-        <a:fontRef idx="minor">
-          <a:schemeClr val="lt1"/>
-        </a:fontRef>
-      </dsp:style>
-      <dsp:txBody>
-        <a:bodyPr spcFirstLastPara="0" vert="horz" wrap="square" lIns="10795" tIns="10795" rIns="10795" bIns="82632" numCol="1" spcCol="1270" anchor="ctr" anchorCtr="0">
-          <a:noAutofit/>
-        </a:bodyPr>
-        <a:lstStyle/>
-        <a:p>
-          <a:pPr marL="0" lvl="0" indent="0" algn="ctr" defTabSz="755650">
-            <a:lnSpc>
-              <a:spcPct val="90000"/>
-            </a:lnSpc>
-            <a:spcBef>
-              <a:spcPct val="0"/>
-            </a:spcBef>
-            <a:spcAft>
-              <a:spcPct val="35000"/>
-            </a:spcAft>
-            <a:buNone/>
-          </a:pPr>
-          <a:r>
-            <a:rPr lang="en-US" sz="1700" kern="1200" dirty="0"/>
-            <a:t>Member Search</a:t>
-          </a:r>
-        </a:p>
-      </dsp:txBody>
-      <dsp:txXfrm>
-        <a:off x="5394435" y="1850345"/>
-        <a:ext cx="1131000" cy="585581"/>
-      </dsp:txXfrm>
-    </dsp:sp>
-    <dsp:sp modelId="{A0AD7242-ED6A-474D-B059-FB0D1C171505}">
-      <dsp:nvSpPr>
-        <dsp:cNvPr id="0" name=""/>
-        <dsp:cNvSpPr/>
-      </dsp:nvSpPr>
-      <dsp:spPr>
-        <a:xfrm>
-          <a:off x="5620635" y="2305798"/>
-          <a:ext cx="1017900" cy="195193"/>
-        </a:xfrm>
-        <a:prstGeom prst="rect">
-          <a:avLst/>
-        </a:prstGeom>
-        <a:solidFill>
-          <a:schemeClr val="lt1">
-            <a:alpha val="90000"/>
-            <a:hueOff val="0"/>
-            <a:satOff val="0"/>
-            <a:lumOff val="0"/>
-            <a:alphaOff val="0"/>
-          </a:schemeClr>
-        </a:solidFill>
-        <a:ln w="12700" cap="flat" cmpd="sng" algn="ctr">
-          <a:solidFill>
-            <a:schemeClr val="accent1">
-              <a:hueOff val="0"/>
-              <a:satOff val="0"/>
-              <a:lumOff val="0"/>
-              <a:alphaOff val="0"/>
-            </a:schemeClr>
-          </a:solidFill>
-          <a:prstDash val="solid"/>
-          <a:miter lim="800000"/>
-        </a:ln>
-        <a:effectLst/>
-      </dsp:spPr>
-      <dsp:style>
-        <a:lnRef idx="2">
-          <a:scrgbClr r="0" g="0" b="0"/>
-        </a:lnRef>
-        <a:fillRef idx="1">
-          <a:scrgbClr r="0" g="0" b="0"/>
-        </a:fillRef>
-        <a:effectRef idx="0">
-          <a:scrgbClr r="0" g="0" b="0"/>
-        </a:effectRef>
-        <a:fontRef idx="minor"/>
-      </dsp:style>
-      <dsp:txBody>
-        <a:bodyPr spcFirstLastPara="0" vert="horz" wrap="square" lIns="30480" tIns="7620" rIns="30480" bIns="7620" numCol="1" spcCol="1270" anchor="ctr" anchorCtr="0">
-          <a:noAutofit/>
-        </a:bodyPr>
-        <a:lstStyle/>
-        <a:p>
-          <a:pPr marL="0" lvl="0" indent="0" algn="r" defTabSz="533400">
-            <a:lnSpc>
-              <a:spcPct val="90000"/>
-            </a:lnSpc>
-            <a:spcBef>
-              <a:spcPct val="0"/>
-            </a:spcBef>
-            <a:spcAft>
-              <a:spcPct val="35000"/>
-            </a:spcAft>
-            <a:buNone/>
-          </a:pPr>
-          <a:endParaRPr lang="en-US" sz="1200" kern="1200"/>
-        </a:p>
-      </dsp:txBody>
-      <dsp:txXfrm>
-        <a:off x="5620635" y="2305798"/>
-        <a:ext cx="1017900" cy="195193"/>
-      </dsp:txXfrm>
-    </dsp:sp>
-    <dsp:sp modelId="{51DB92DD-B79E-4851-B428-2D6647EE4E80}">
-      <dsp:nvSpPr>
-        <dsp:cNvPr id="0" name=""/>
-        <dsp:cNvSpPr/>
-      </dsp:nvSpPr>
-      <dsp:spPr>
-        <a:xfrm>
-          <a:off x="3877064" y="2774263"/>
-          <a:ext cx="1131000" cy="585581"/>
-        </a:xfrm>
-        <a:prstGeom prst="rect">
-          <a:avLst/>
-        </a:prstGeom>
-        <a:solidFill>
-          <a:schemeClr val="accent1">
-            <a:hueOff val="0"/>
-            <a:satOff val="0"/>
-            <a:lumOff val="0"/>
-            <a:alphaOff val="0"/>
-          </a:schemeClr>
-        </a:solidFill>
-        <a:ln w="12700" cap="flat" cmpd="sng" algn="ctr">
-          <a:solidFill>
-            <a:schemeClr val="lt1">
-              <a:hueOff val="0"/>
-              <a:satOff val="0"/>
-              <a:lumOff val="0"/>
-              <a:alphaOff val="0"/>
-            </a:schemeClr>
-          </a:solidFill>
-          <a:prstDash val="solid"/>
-          <a:miter lim="800000"/>
-        </a:ln>
-        <a:effectLst/>
-      </dsp:spPr>
-      <dsp:style>
-        <a:lnRef idx="2">
-          <a:scrgbClr r="0" g="0" b="0"/>
-        </a:lnRef>
-        <a:fillRef idx="1">
-          <a:scrgbClr r="0" g="0" b="0"/>
-        </a:fillRef>
-        <a:effectRef idx="0">
-          <a:scrgbClr r="0" g="0" b="0"/>
-        </a:effectRef>
-        <a:fontRef idx="minor">
-          <a:schemeClr val="lt1"/>
-        </a:fontRef>
-      </dsp:style>
-      <dsp:txBody>
-        <a:bodyPr spcFirstLastPara="0" vert="horz" wrap="square" lIns="10795" tIns="10795" rIns="10795" bIns="82632" numCol="1" spcCol="1270" anchor="ctr" anchorCtr="0">
-          <a:noAutofit/>
-        </a:bodyPr>
-        <a:lstStyle/>
-        <a:p>
-          <a:pPr marL="0" lvl="0" indent="0" algn="ctr" defTabSz="755650">
-            <a:lnSpc>
-              <a:spcPct val="90000"/>
-            </a:lnSpc>
-            <a:spcBef>
-              <a:spcPct val="0"/>
-            </a:spcBef>
-            <a:spcAft>
-              <a:spcPct val="35000"/>
-            </a:spcAft>
-            <a:buNone/>
-          </a:pPr>
-          <a:r>
-            <a:rPr lang="en-US" sz="1700" kern="1200" dirty="0"/>
-            <a:t>Playground Locations</a:t>
-          </a:r>
-        </a:p>
-      </dsp:txBody>
-      <dsp:txXfrm>
-        <a:off x="3877064" y="2774263"/>
-        <a:ext cx="1131000" cy="585581"/>
-      </dsp:txXfrm>
-    </dsp:sp>
-    <dsp:sp modelId="{B07D686E-F7BD-47F3-8C9D-E3F4BF1B6336}">
-      <dsp:nvSpPr>
-        <dsp:cNvPr id="0" name=""/>
-        <dsp:cNvSpPr/>
-      </dsp:nvSpPr>
-      <dsp:spPr>
-        <a:xfrm>
-          <a:off x="4103264" y="3229716"/>
-          <a:ext cx="1017900" cy="195193"/>
-        </a:xfrm>
-        <a:prstGeom prst="rect">
-          <a:avLst/>
-        </a:prstGeom>
-        <a:solidFill>
-          <a:schemeClr val="lt1">
-            <a:alpha val="90000"/>
-            <a:hueOff val="0"/>
-            <a:satOff val="0"/>
-            <a:lumOff val="0"/>
-            <a:alphaOff val="0"/>
-          </a:schemeClr>
-        </a:solidFill>
-        <a:ln w="12700" cap="flat" cmpd="sng" algn="ctr">
-          <a:solidFill>
-            <a:schemeClr val="accent1">
-              <a:hueOff val="0"/>
-              <a:satOff val="0"/>
-              <a:lumOff val="0"/>
-              <a:alphaOff val="0"/>
-            </a:schemeClr>
-          </a:solidFill>
-          <a:prstDash val="solid"/>
-          <a:miter lim="800000"/>
-        </a:ln>
-        <a:effectLst/>
-      </dsp:spPr>
-      <dsp:style>
-        <a:lnRef idx="2">
-          <a:scrgbClr r="0" g="0" b="0"/>
-        </a:lnRef>
-        <a:fillRef idx="1">
-          <a:scrgbClr r="0" g="0" b="0"/>
-        </a:fillRef>
-        <a:effectRef idx="0">
-          <a:scrgbClr r="0" g="0" b="0"/>
-        </a:effectRef>
-        <a:fontRef idx="minor"/>
-      </dsp:style>
-      <dsp:txBody>
-        <a:bodyPr spcFirstLastPara="0" vert="horz" wrap="square" lIns="30480" tIns="7620" rIns="30480" bIns="7620" numCol="1" spcCol="1270" anchor="ctr" anchorCtr="0">
-          <a:noAutofit/>
-        </a:bodyPr>
-        <a:lstStyle/>
-        <a:p>
-          <a:pPr marL="0" lvl="0" indent="0" algn="r" defTabSz="533400">
-            <a:lnSpc>
-              <a:spcPct val="90000"/>
-            </a:lnSpc>
-            <a:spcBef>
-              <a:spcPct val="0"/>
-            </a:spcBef>
-            <a:spcAft>
-              <a:spcPct val="35000"/>
-            </a:spcAft>
-            <a:buNone/>
-          </a:pPr>
-          <a:endParaRPr lang="en-US" sz="1200" kern="1200"/>
-        </a:p>
-      </dsp:txBody>
-      <dsp:txXfrm>
-        <a:off x="4103264" y="3229716"/>
-        <a:ext cx="1017900" cy="195193"/>
+        <a:off x="8072308" y="3199997"/>
+        <a:ext cx="1573963" cy="1027987"/>
       </dsp:txXfrm>
     </dsp:sp>
   </dsp:spTree>
@@ -3596,11 +2475,11 @@
 </file>
 
 <file path=ppt/diagrams/layout1.xml><?xml version="1.0" encoding="utf-8"?>
-<dgm:layoutDef xmlns:dgm="http://schemas.openxmlformats.org/drawingml/2006/diagram" xmlns:a="http://schemas.openxmlformats.org/drawingml/2006/main" uniqueId="urn:microsoft.com/office/officeart/2008/layout/NameandTitleOrganizationalChart">
+<dgm:layoutDef xmlns:dgm="http://schemas.openxmlformats.org/drawingml/2006/diagram" xmlns:a="http://schemas.openxmlformats.org/drawingml/2006/main" uniqueId="urn:microsoft.com/office/officeart/2005/8/layout/hierarchy6">
   <dgm:title val=""/>
   <dgm:desc val=""/>
   <dgm:catLst>
-    <dgm:cat type="hierarchy" pri="1250"/>
+    <dgm:cat type="hierarchy" pri="3000"/>
   </dgm:catLst>
   <dgm:sampData>
     <dgm:dataModel>
@@ -3609,10 +2488,19 @@
         <dgm:pt modelId="1">
           <dgm:prSet phldr="1"/>
         </dgm:pt>
-        <dgm:pt modelId="2" type="asst">
+        <dgm:pt modelId="2">
+          <dgm:prSet phldr="1"/>
+        </dgm:pt>
+        <dgm:pt modelId="21">
+          <dgm:prSet phldr="1"/>
+        </dgm:pt>
+        <dgm:pt modelId="22">
           <dgm:prSet phldr="1"/>
         </dgm:pt>
         <dgm:pt modelId="3">
+          <dgm:prSet phldr="1"/>
+        </dgm:pt>
+        <dgm:pt modelId="31">
           <dgm:prSet phldr="1"/>
         </dgm:pt>
         <dgm:pt modelId="4">
@@ -3621,13 +2509,20 @@
         <dgm:pt modelId="5">
           <dgm:prSet phldr="1"/>
         </dgm:pt>
+        <dgm:pt modelId="6">
+          <dgm:prSet phldr="1"/>
+        </dgm:pt>
       </dgm:ptLst>
       <dgm:cxnLst>
-        <dgm:cxn modelId="5" srcId="0" destId="1" srcOrd="0" destOrd="0"/>
-        <dgm:cxn modelId="6" srcId="1" destId="2" srcOrd="0" destOrd="0"/>
-        <dgm:cxn modelId="7" srcId="1" destId="3" srcOrd="1" destOrd="0"/>
-        <dgm:cxn modelId="8" srcId="1" destId="4" srcOrd="2" destOrd="0"/>
-        <dgm:cxn modelId="9" srcId="1" destId="5" srcOrd="3" destOrd="0"/>
+        <dgm:cxn modelId="7" srcId="0" destId="1" srcOrd="0" destOrd="0"/>
+        <dgm:cxn modelId="8" srcId="1" destId="2" srcOrd="0" destOrd="0"/>
+        <dgm:cxn modelId="9" srcId="1" destId="3" srcOrd="1" destOrd="0"/>
+        <dgm:cxn modelId="23" srcId="2" destId="21" srcOrd="0" destOrd="0"/>
+        <dgm:cxn modelId="24" srcId="2" destId="22" srcOrd="1" destOrd="0"/>
+        <dgm:cxn modelId="33" srcId="3" destId="31" srcOrd="0" destOrd="0"/>
+        <dgm:cxn modelId="10" srcId="0" destId="4" srcOrd="1" destOrd="0"/>
+        <dgm:cxn modelId="11" srcId="0" destId="5" srcOrd="2" destOrd="0"/>
+        <dgm:cxn modelId="12" srcId="0" destId="6" srcOrd="3" destOrd="0"/>
       </dgm:cxnLst>
       <dgm:bg/>
       <dgm:whole/>
@@ -3638,13 +2533,17 @@
       <dgm:ptLst>
         <dgm:pt modelId="0" type="doc"/>
         <dgm:pt modelId="1"/>
+        <dgm:pt modelId="11"/>
         <dgm:pt modelId="12"/>
-        <dgm:pt modelId="13"/>
+        <dgm:pt modelId="2"/>
+        <dgm:pt modelId="3"/>
       </dgm:ptLst>
       <dgm:cxnLst>
-        <dgm:cxn modelId="2" srcId="0" destId="1" srcOrd="0" destOrd="0"/>
-        <dgm:cxn modelId="16" srcId="1" destId="12" srcOrd="1" destOrd="0"/>
-        <dgm:cxn modelId="17" srcId="1" destId="13" srcOrd="2" destOrd="0"/>
+        <dgm:cxn modelId="4" srcId="0" destId="1" srcOrd="0" destOrd="0"/>
+        <dgm:cxn modelId="13" srcId="1" destId="11" srcOrd="0" destOrd="0"/>
+        <dgm:cxn modelId="14" srcId="1" destId="12" srcOrd="1" destOrd="0"/>
+        <dgm:cxn modelId="5" srcId="0" destId="2" srcOrd="1" destOrd="0"/>
+        <dgm:cxn modelId="6" srcId="0" destId="3" srcOrd="2" destOrd="0"/>
       </dgm:cxnLst>
       <dgm:bg/>
       <dgm:whole/>
@@ -3655,1123 +2554,433 @@
       <dgm:ptLst>
         <dgm:pt modelId="0" type="doc"/>
         <dgm:pt modelId="1"/>
-        <dgm:pt modelId="11" type="asst"/>
-        <dgm:pt modelId="12"/>
-        <dgm:pt modelId="13"/>
-        <dgm:pt modelId="14"/>
+        <dgm:pt modelId="2"/>
+        <dgm:pt modelId="21"/>
+        <dgm:pt modelId="211"/>
+        <dgm:pt modelId="3"/>
+        <dgm:pt modelId="31"/>
+        <dgm:pt modelId="311"/>
+        <dgm:pt modelId="4"/>
+        <dgm:pt modelId="5"/>
+        <dgm:pt modelId="6"/>
+        <dgm:pt modelId="7"/>
       </dgm:ptLst>
       <dgm:cxnLst>
-        <dgm:cxn modelId="2" srcId="0" destId="1" srcOrd="0" destOrd="0"/>
-        <dgm:cxn modelId="15" srcId="1" destId="11" srcOrd="0" destOrd="0"/>
-        <dgm:cxn modelId="16" srcId="1" destId="12" srcOrd="1" destOrd="0"/>
-        <dgm:cxn modelId="17" srcId="1" destId="13" srcOrd="2" destOrd="0"/>
-        <dgm:cxn modelId="18" srcId="1" destId="14" srcOrd="2" destOrd="0"/>
+        <dgm:cxn modelId="8" srcId="0" destId="1" srcOrd="0" destOrd="0"/>
+        <dgm:cxn modelId="9" srcId="1" destId="2" srcOrd="0" destOrd="0"/>
+        <dgm:cxn modelId="10" srcId="1" destId="3" srcOrd="1" destOrd="0"/>
+        <dgm:cxn modelId="23" srcId="2" destId="21" srcOrd="0" destOrd="0"/>
+        <dgm:cxn modelId="24" srcId="21" destId="211" srcOrd="0" destOrd="0"/>
+        <dgm:cxn modelId="33" srcId="3" destId="31" srcOrd="0" destOrd="0"/>
+        <dgm:cxn modelId="34" srcId="31" destId="311" srcOrd="0" destOrd="0"/>
+        <dgm:cxn modelId="11" srcId="0" destId="4" srcOrd="1" destOrd="0"/>
+        <dgm:cxn modelId="12" srcId="0" destId="5" srcOrd="2" destOrd="0"/>
+        <dgm:cxn modelId="13" srcId="0" destId="6" srcOrd="3" destOrd="0"/>
+        <dgm:cxn modelId="14" srcId="0" destId="7" srcOrd="4" destOrd="0"/>
       </dgm:cxnLst>
       <dgm:bg/>
       <dgm:whole/>
     </dgm:dataModel>
   </dgm:clrData>
-  <dgm:layoutNode name="hierChild1">
+  <dgm:layoutNode name="mainComposite">
     <dgm:varLst>
-      <dgm:orgChart val="1"/>
       <dgm:chPref val="1"/>
       <dgm:dir/>
       <dgm:animOne val="branch"/>
       <dgm:animLvl val="lvl"/>
-      <dgm:resizeHandles/>
+      <dgm:resizeHandles val="exact"/>
     </dgm:varLst>
-    <dgm:choose name="Name0">
-      <dgm:if name="Name1" func="var" arg="dir" op="equ" val="norm">
-        <dgm:alg type="hierChild">
-          <dgm:param type="linDir" val="fromL"/>
-        </dgm:alg>
-      </dgm:if>
-      <dgm:else name="Name2">
-        <dgm:alg type="hierChild">
-          <dgm:param type="linDir" val="fromR"/>
-        </dgm:alg>
-      </dgm:else>
-    </dgm:choose>
+    <dgm:alg type="composite">
+      <dgm:param type="vertAlign" val="mid"/>
+      <dgm:param type="horzAlign" val="ctr"/>
+    </dgm:alg>
     <dgm:shape xmlns:r="http://schemas.openxmlformats.org/officeDocument/2006/relationships" r:blip="">
       <dgm:adjLst/>
     </dgm:shape>
     <dgm:presOf/>
-    <dgm:constrLst>
-      <dgm:constr type="w" for="des" forName="rootComposite1" refType="w" fact="10"/>
-      <dgm:constr type="h" for="des" forName="rootComposite1" refType="w" refFor="des" refForName="rootComposite1" fact="0.5"/>
-      <dgm:constr type="w" for="des" forName="rootComposite" refType="w" fact="10"/>
-      <dgm:constr type="h" for="des" forName="rootComposite" refType="w" refFor="des" refForName="rootComposite1" fact="0.5"/>
-      <dgm:constr type="w" for="des" forName="rootComposite3" refType="w" fact="10"/>
-      <dgm:constr type="h" for="des" forName="rootComposite3" refType="w" refFor="des" refForName="rootComposite1" fact="0.5"/>
-      <dgm:constr type="primFontSz" for="des" ptType="node" op="equ"/>
-      <dgm:constr type="sp" for="des" op="equ"/>
-      <dgm:constr type="sp" for="des" forName="hierRoot1" refType="w" refFor="des" refForName="rootComposite1" fact="0.21"/>
-      <dgm:constr type="sp" for="des" forName="hierRoot2" refType="sp" refFor="des" refForName="hierRoot1"/>
-      <dgm:constr type="sp" for="des" forName="hierRoot3" refType="sp" refFor="des" refForName="hierRoot1"/>
-      <dgm:constr type="sibSp" refType="w" refFor="des" refForName="rootComposite1" fact="0.21"/>
-      <dgm:constr type="sibSp" for="des" forName="hierChild2" refType="sibSp"/>
-      <dgm:constr type="sibSp" for="des" forName="hierChild3" refType="sibSp"/>
-      <dgm:constr type="sibSp" for="des" forName="hierChild4" refType="sibSp"/>
-      <dgm:constr type="sibSp" for="des" forName="hierChild5" refType="sibSp"/>
-      <dgm:constr type="sibSp" for="des" forName="hierChild6" refType="sibSp"/>
-      <dgm:constr type="sibSp" for="des" forName="hierChild7" refType="sibSp"/>
-      <dgm:constr type="secSibSp" refType="w" refFor="des" refForName="rootComposite1" fact="0.21"/>
-      <dgm:constr type="secSibSp" for="des" forName="hierChild2" refType="secSibSp"/>
-      <dgm:constr type="secSibSp" for="des" forName="hierChild3" refType="secSibSp"/>
-      <dgm:constr type="secSibSp" for="des" forName="hierChild4" refType="secSibSp"/>
-      <dgm:constr type="secSibSp" for="des" forName="hierChild5" refType="secSibSp"/>
-      <dgm:constr type="secSibSp" for="des" forName="hierChild6" refType="secSibSp"/>
-      <dgm:constr type="secSibSp" for="des" forName="hierChild7" refType="secSibSp"/>
-    </dgm:constrLst>
+    <dgm:choose name="Name0">
+      <dgm:if name="Name1" axis="ch" ptType="node" func="cnt" op="gte" val="2">
+        <dgm:choose name="Name2">
+          <dgm:if name="Name3" func="var" arg="dir" op="equ" val="norm">
+            <dgm:constrLst>
+              <dgm:constr type="l" for="ch" forName="hierFlow" refType="w" fact="0.3"/>
+              <dgm:constr type="t" for="ch" forName="hierFlow"/>
+              <dgm:constr type="r" for="ch" forName="hierFlow" refType="w" fact="0.98"/>
+              <dgm:constr type="b" for="ch" forName="hierFlow" refType="h" fact="0.98"/>
+              <dgm:constr type="l" for="ch" forName="bgShapesFlow"/>
+              <dgm:constr type="t" for="ch" forName="bgShapesFlow"/>
+              <dgm:constr type="r" for="ch" forName="bgShapesFlow" refType="w"/>
+              <dgm:constr type="b" for="ch" forName="bgShapesFlow" refType="h"/>
+              <dgm:constr type="w" for="des" forName="level1Shape" refType="w"/>
+              <dgm:constr type="h" for="des" forName="level1Shape" refType="w" refFor="des" refForName="level1Shape" fact="0.66667"/>
+              <dgm:constr type="w" for="des" forName="level2Shape" refType="w" refFor="des" refForName="level1Shape" op="equ"/>
+              <dgm:constr type="h" for="des" forName="level2Shape" refType="h" refFor="des" refForName="level1Shape" op="equ"/>
+              <dgm:constr type="sp" for="des" refType="h" refFor="des" refForName="level1Shape" op="equ" fact="0.4"/>
+              <dgm:constr type="sibSp" for="des" forName="hierChild1" refType="w" refFor="des" refForName="level1Shape" op="equ" fact="0.3"/>
+              <dgm:constr type="sibSp" for="des" forName="hierChild2" refType="sibSp" refFor="des" refForName="hierChild1" op="equ"/>
+              <dgm:constr type="sibSp" for="des" forName="hierChild3" refType="sibSp" refFor="des" refForName="hierChild1" op="equ"/>
+              <dgm:constr type="userA" for="des" refType="h" refFor="des" refForName="level1Shape" op="equ"/>
+              <dgm:constr type="userB" for="des" refType="sp" refFor="des" op="equ"/>
+              <dgm:constr type="h" for="des" forName="firstBuf" refType="h" refFor="des" refForName="level1Shape" fact="0.1"/>
+            </dgm:constrLst>
+          </dgm:if>
+          <dgm:else name="Name4">
+            <dgm:constrLst>
+              <dgm:constr type="l" for="ch" forName="hierFlow" refType="w" fact="0.02"/>
+              <dgm:constr type="t" for="ch" forName="hierFlow"/>
+              <dgm:constr type="r" for="ch" forName="hierFlow" refType="w" fact="0.7"/>
+              <dgm:constr type="b" for="ch" forName="hierFlow" refType="h" fact="0.98"/>
+              <dgm:constr type="l" for="ch" forName="bgShapesFlow"/>
+              <dgm:constr type="t" for="ch" forName="bgShapesFlow"/>
+              <dgm:constr type="r" for="ch" forName="bgShapesFlow" refType="w"/>
+              <dgm:constr type="b" for="ch" forName="bgShapesFlow" refType="h"/>
+              <dgm:constr type="w" for="des" forName="level1Shape" refType="w"/>
+              <dgm:constr type="h" for="des" forName="level1Shape" refType="w" refFor="des" refForName="level1Shape" fact="0.66667"/>
+              <dgm:constr type="w" for="des" forName="level2Shape" refType="w" refFor="des" refForName="level1Shape" op="equ"/>
+              <dgm:constr type="h" for="des" forName="level2Shape" refType="h" refFor="des" refForName="level1Shape" op="equ"/>
+              <dgm:constr type="sp" for="des" refType="h" refFor="des" refForName="level1Shape" op="equ" fact="0.4"/>
+              <dgm:constr type="sibSp" for="des" forName="hierChild1" refType="w" refFor="des" refForName="level1Shape" op="equ" fact="0.3"/>
+              <dgm:constr type="sibSp" for="des" forName="hierChild2" refType="sibSp" refFor="des" refForName="hierChild1" op="equ"/>
+              <dgm:constr type="sibSp" for="des" forName="hierChild3" refType="sibSp" refFor="des" refForName="hierChild1" op="equ"/>
+              <dgm:constr type="userA" for="des" refType="h" refFor="des" refForName="level1Shape" op="equ"/>
+              <dgm:constr type="userB" for="des" refType="sp" refFor="des" op="equ"/>
+              <dgm:constr type="h" for="des" forName="firstBuf" refType="h" refFor="des" refForName="level1Shape" fact="0.1"/>
+            </dgm:constrLst>
+          </dgm:else>
+        </dgm:choose>
+      </dgm:if>
+      <dgm:else name="Name5">
+        <dgm:constrLst>
+          <dgm:constr type="l" for="ch" forName="hierFlow"/>
+          <dgm:constr type="t" for="ch" forName="hierFlow"/>
+          <dgm:constr type="r" for="ch" forName="hierFlow" refType="w"/>
+          <dgm:constr type="b" for="ch" forName="hierFlow" refType="h"/>
+          <dgm:constr type="l" for="ch" forName="bgShapesFlow"/>
+          <dgm:constr type="t" for="ch" forName="bgShapesFlow"/>
+          <dgm:constr type="r" for="ch" forName="bgShapesFlow" refType="w"/>
+          <dgm:constr type="b" for="ch" forName="bgShapesFlow" refType="h"/>
+          <dgm:constr type="w" for="des" forName="level1Shape" refType="w"/>
+          <dgm:constr type="h" for="des" forName="level1Shape" refType="w" refFor="des" refForName="level1Shape" fact="0.66667"/>
+          <dgm:constr type="w" for="des" forName="level2Shape" refType="w" refFor="des" refForName="level1Shape" op="equ"/>
+          <dgm:constr type="h" for="des" forName="level2Shape" refType="h" refFor="des" refForName="level1Shape" op="equ"/>
+          <dgm:constr type="sp" for="des" refType="h" refFor="des" refForName="level1Shape" op="equ" fact="0.4"/>
+          <dgm:constr type="sibSp" for="des" forName="hierChild1" refType="w" refFor="des" refForName="level1Shape" op="equ" fact="0.3"/>
+          <dgm:constr type="sibSp" for="des" forName="hierChild2" refType="sibSp" refFor="des" refForName="hierChild1" op="equ"/>
+          <dgm:constr type="sibSp" for="des" forName="hierChild3" refType="sibSp" refFor="des" refForName="hierChild1" op="equ"/>
+          <dgm:constr type="userA" for="des" refType="h" refFor="des" refForName="level1Shape" op="equ"/>
+          <dgm:constr type="userB" for="des" refType="sp" refFor="des" op="equ"/>
+          <dgm:constr type="h" for="des" forName="firstBuf" refType="h" refFor="des" refForName="level1Shape" fact="0.1"/>
+        </dgm:constrLst>
+      </dgm:else>
+    </dgm:choose>
     <dgm:ruleLst/>
-    <dgm:forEach name="Name3" axis="ch">
-      <dgm:forEach name="Name4" axis="self" ptType="node">
-        <dgm:layoutNode name="hierRoot1">
-          <dgm:varLst>
-            <dgm:hierBranch val="init"/>
-          </dgm:varLst>
-          <dgm:choose name="Name5">
-            <dgm:if name="Name6" func="var" arg="hierBranch" op="equ" val="l">
-              <dgm:choose name="Name7">
-                <dgm:if name="Name8" axis="ch" ptType="asst" func="cnt" op="gte" val="1">
-                  <dgm:alg type="hierRoot">
-                    <dgm:param type="hierAlign" val="tR"/>
-                  </dgm:alg>
-                  <dgm:constrLst>
-                    <dgm:constr type="alignOff" val="0.65"/>
-                  </dgm:constrLst>
-                </dgm:if>
-                <dgm:else name="Name9">
-                  <dgm:alg type="hierRoot">
-                    <dgm:param type="hierAlign" val="tR"/>
-                  </dgm:alg>
-                  <dgm:constrLst>
-                    <dgm:constr type="alignOff" val="0.25"/>
-                  </dgm:constrLst>
-                </dgm:else>
-              </dgm:choose>
-            </dgm:if>
-            <dgm:if name="Name10" func="var" arg="hierBranch" op="equ" val="r">
-              <dgm:choose name="Name11">
-                <dgm:if name="Name12" axis="ch" ptType="asst" func="cnt" op="gte" val="1">
-                  <dgm:alg type="hierRoot">
-                    <dgm:param type="hierAlign" val="tL"/>
-                  </dgm:alg>
-                  <dgm:constrLst>
-                    <dgm:constr type="alignOff" val="0.65"/>
-                  </dgm:constrLst>
-                </dgm:if>
-                <dgm:else name="Name13">
-                  <dgm:alg type="hierRoot">
-                    <dgm:param type="hierAlign" val="tL"/>
-                  </dgm:alg>
-                  <dgm:constrLst>
-                    <dgm:constr type="alignOff" val="0.25"/>
-                  </dgm:constrLst>
-                </dgm:else>
-              </dgm:choose>
-            </dgm:if>
-            <dgm:if name="Name14" func="var" arg="hierBranch" op="equ" val="hang">
-              <dgm:alg type="hierRoot"/>
-              <dgm:constrLst>
-                <dgm:constr type="alignOff" val="0.65"/>
-              </dgm:constrLst>
-            </dgm:if>
-            <dgm:else name="Name15">
-              <dgm:alg type="hierRoot"/>
-              <dgm:constrLst>
-                <dgm:constr type="alignOff"/>
-                <dgm:constr type="bendDist" for="des" ptType="parTrans" refType="sp" fact="0.5"/>
-              </dgm:constrLst>
-            </dgm:else>
-          </dgm:choose>
-          <dgm:shape xmlns:r="http://schemas.openxmlformats.org/officeDocument/2006/relationships" r:blip="">
-            <dgm:adjLst/>
-          </dgm:shape>
-          <dgm:presOf/>
-          <dgm:ruleLst/>
-          <dgm:layoutNode name="rootComposite1">
-            <dgm:alg type="composite"/>
-            <dgm:shape xmlns:r="http://schemas.openxmlformats.org/officeDocument/2006/relationships" r:blip="">
-              <dgm:adjLst/>
-            </dgm:shape>
-            <dgm:presOf axis="self" ptType="node" cnt="1"/>
-            <dgm:choose name="Name16">
-              <dgm:if name="Name17" func="var" arg="hierBranch" op="equ" val="init">
-                <dgm:constrLst>
-                  <dgm:constr type="l" for="ch" forName="rootText1"/>
-                  <dgm:constr type="t" for="ch" forName="rootText1"/>
-                  <dgm:constr type="w" for="ch" forName="rootText1" refType="w"/>
-                  <dgm:constr type="h" for="ch" forName="rootText1" refType="h" fact="0.9"/>
-                  <dgm:constr type="l" for="ch" forName="titleText1" refType="w" fact="0.2"/>
-                  <dgm:constr type="t" for="ch" forName="titleText1" refType="h" fact="0.7"/>
-                  <dgm:constr type="w" for="ch" forName="titleText1" refType="w" fact="0.9"/>
-                  <dgm:constr type="h" for="ch" forName="titleText1" refType="h" fact="0.3"/>
-                  <dgm:constr type="primFontSz" for="des" forName="titleText1" refType="primFontSz" refFor="des" refForName="rootText1" op="lte"/>
-                  <dgm:constr type="l" for="ch" forName="rootConnector1"/>
-                  <dgm:constr type="t" for="ch" forName="rootConnector1"/>
-                  <dgm:constr type="w" for="ch" forName="rootConnector1" refType="w" refFor="ch" refForName="rootText1" fact="0.2"/>
-                  <dgm:constr type="h" for="ch" forName="rootConnector1" refType="h" refFor="ch" refForName="rootText1"/>
-                </dgm:constrLst>
-              </dgm:if>
-              <dgm:if name="Name18" func="var" arg="hierBranch" op="equ" val="l">
-                <dgm:constrLst>
-                  <dgm:constr type="l" for="ch" forName="rootText1"/>
-                  <dgm:constr type="t" for="ch" forName="rootText1"/>
-                  <dgm:constr type="w" for="ch" forName="rootText1" refType="w"/>
-                  <dgm:constr type="h" for="ch" forName="rootText1" refType="h" fact="0.9"/>
-                  <dgm:constr type="l" for="ch" forName="titleText1" refType="w" fact="0.2"/>
-                  <dgm:constr type="t" for="ch" forName="titleText1" refType="h" fact="0.7"/>
-                  <dgm:constr type="w" for="ch" forName="titleText1" refType="w" fact="0.9"/>
-                  <dgm:constr type="h" for="ch" forName="titleText1" refType="h" fact="0.3"/>
-                  <dgm:constr type="primFontSz" for="des" forName="titleText1" refType="primFontSz" refFor="des" refForName="rootText1" op="lte"/>
-                  <dgm:constr type="r" for="ch" forName="rootConnector1" refType="w"/>
-                  <dgm:constr type="t" for="ch" forName="rootConnector1"/>
-                  <dgm:constr type="w" for="ch" forName="rootConnector1" refType="w" refFor="ch" refForName="rootText1" fact="0.2"/>
-                  <dgm:constr type="h" for="ch" forName="rootConnector1" refType="h" refFor="ch" refForName="rootText1"/>
-                </dgm:constrLst>
-              </dgm:if>
-              <dgm:if name="Name19" func="var" arg="hierBranch" op="equ" val="r">
-                <dgm:constrLst>
-                  <dgm:constr type="l" for="ch" forName="rootText1"/>
-                  <dgm:constr type="t" for="ch" forName="rootText1"/>
-                  <dgm:constr type="w" for="ch" forName="rootText1" refType="w"/>
-                  <dgm:constr type="h" for="ch" forName="rootText1" refType="h" fact="0.9"/>
-                  <dgm:constr type="l" for="ch" forName="titleText1" refType="w" fact="0.2"/>
-                  <dgm:constr type="t" for="ch" forName="titleText1" refType="h" fact="0.7"/>
-                  <dgm:constr type="w" for="ch" forName="titleText1" refType="w" fact="0.9"/>
-                  <dgm:constr type="h" for="ch" forName="titleText1" refType="h" fact="0.3"/>
-                  <dgm:constr type="primFontSz" for="des" forName="titleText1" refType="primFontSz" refFor="des" refForName="rootText1" op="lte"/>
-                  <dgm:constr type="l" for="ch" forName="rootConnector1"/>
-                  <dgm:constr type="t" for="ch" forName="rootConnector1"/>
-                  <dgm:constr type="w" for="ch" forName="rootConnector1" refType="w" refFor="ch" refForName="rootText1" fact="0.2"/>
-                  <dgm:constr type="h" for="ch" forName="rootConnector1" refType="h" refFor="ch" refForName="rootText1"/>
-                </dgm:constrLst>
-              </dgm:if>
-              <dgm:else name="Name20">
-                <dgm:constrLst>
-                  <dgm:constr type="l" for="ch" forName="rootText1"/>
-                  <dgm:constr type="t" for="ch" forName="rootText1"/>
-                  <dgm:constr type="w" for="ch" forName="rootText1" refType="w"/>
-                  <dgm:constr type="h" for="ch" forName="rootText1" refType="h" fact="0.9"/>
-                  <dgm:constr type="l" for="ch" forName="titleText1" refType="w" fact="0.2"/>
-                  <dgm:constr type="t" for="ch" forName="titleText1" refType="h" fact="0.7"/>
-                  <dgm:constr type="w" for="ch" forName="titleText1" refType="w" fact="0.9"/>
-                  <dgm:constr type="h" for="ch" forName="titleText1" refType="h" fact="0.3"/>
-                  <dgm:constr type="primFontSz" for="des" forName="titleText1" refType="primFontSz" refFor="des" refForName="rootText1" op="lte"/>
-                  <dgm:constr type="r" for="ch" forName="rootConnector1" refType="w"/>
-                  <dgm:constr type="t" for="ch" forName="rootConnector1"/>
-                  <dgm:constr type="w" for="ch" forName="rootConnector1" refType="w" refFor="ch" refForName="rootText1" fact="0.2"/>
-                  <dgm:constr type="h" for="ch" forName="rootConnector1" refType="h" refFor="ch" refForName="rootText1"/>
-                </dgm:constrLst>
-              </dgm:else>
-            </dgm:choose>
-            <dgm:ruleLst/>
-            <dgm:layoutNode name="rootText1" styleLbl="node0">
-              <dgm:varLst>
-                <dgm:chMax/>
-                <dgm:chPref val="3"/>
-              </dgm:varLst>
-              <dgm:alg type="tx"/>
-              <dgm:shape xmlns:r="http://schemas.openxmlformats.org/officeDocument/2006/relationships" type="rect" r:blip="">
-                <dgm:adjLst/>
-              </dgm:shape>
-              <dgm:presOf axis="self" ptType="node" cnt="1"/>
-              <dgm:constrLst>
-                <dgm:constr type="primFontSz" val="65"/>
-                <dgm:constr type="lMarg" refType="primFontSz" fact="0.05"/>
-                <dgm:constr type="rMarg" refType="primFontSz" fact="0.05"/>
-                <dgm:constr type="tMarg" refType="primFontSz" fact="0.05"/>
-                <dgm:constr type="bMarg" refType="h" fact="0.4"/>
-              </dgm:constrLst>
-              <dgm:ruleLst>
-                <dgm:rule type="primFontSz" val="5" fact="NaN" max="NaN"/>
-              </dgm:ruleLst>
-            </dgm:layoutNode>
-            <dgm:layoutNode name="titleText1" styleLbl="fgAcc0">
-              <dgm:varLst>
-                <dgm:chMax val="0"/>
-                <dgm:chPref val="0"/>
-              </dgm:varLst>
-              <dgm:alg type="tx">
-                <dgm:param type="parTxLTRAlign" val="r"/>
-              </dgm:alg>
-              <dgm:shape xmlns:r="http://schemas.openxmlformats.org/officeDocument/2006/relationships" type="rect" r:blip="">
-                <dgm:adjLst/>
-              </dgm:shape>
-              <dgm:presOf axis="followSib" ptType="sibTrans" hideLastTrans="0" cnt="1"/>
-              <dgm:constrLst>
-                <dgm:constr type="primFontSz" val="65"/>
-                <dgm:constr type="lMarg" refType="primFontSz" fact="0.2"/>
-                <dgm:constr type="rMarg" refType="primFontSz" fact="0.2"/>
-                <dgm:constr type="tMarg" refType="primFontSz" fact="0.05"/>
-                <dgm:constr type="bMarg" refType="primFontSz" fact="0.05"/>
-              </dgm:constrLst>
-              <dgm:ruleLst>
-                <dgm:rule type="primFontSz" val="5" fact="NaN" max="NaN"/>
-              </dgm:ruleLst>
-            </dgm:layoutNode>
-            <dgm:layoutNode name="rootConnector1" moveWith="rootText1">
-              <dgm:alg type="sp"/>
-              <dgm:shape xmlns:r="http://schemas.openxmlformats.org/officeDocument/2006/relationships" type="rect" r:blip="" hideGeom="1">
-                <dgm:adjLst/>
-              </dgm:shape>
-              <dgm:presOf axis="self" ptType="node" cnt="1"/>
-              <dgm:constrLst/>
-              <dgm:ruleLst/>
-            </dgm:layoutNode>
-          </dgm:layoutNode>
-          <dgm:layoutNode name="hierChild2">
-            <dgm:choose name="Name21">
-              <dgm:if name="Name22" func="var" arg="hierBranch" op="equ" val="l">
-                <dgm:alg type="hierChild">
-                  <dgm:param type="chAlign" val="r"/>
-                  <dgm:param type="linDir" val="fromT"/>
-                </dgm:alg>
-              </dgm:if>
-              <dgm:if name="Name23" func="var" arg="hierBranch" op="equ" val="r">
-                <dgm:alg type="hierChild">
-                  <dgm:param type="chAlign" val="l"/>
-                  <dgm:param type="linDir" val="fromT"/>
-                </dgm:alg>
-              </dgm:if>
-              <dgm:if name="Name24" func="var" arg="hierBranch" op="equ" val="hang">
-                <dgm:choose name="Name25">
-                  <dgm:if name="Name26" func="var" arg="dir" op="equ" val="norm">
-                    <dgm:alg type="hierChild">
-                      <dgm:param type="chAlign" val="l"/>
-                      <dgm:param type="linDir" val="fromL"/>
-                      <dgm:param type="secChAlign" val="t"/>
-                      <dgm:param type="secLinDir" val="fromT"/>
-                    </dgm:alg>
-                  </dgm:if>
-                  <dgm:else name="Name27">
-                    <dgm:alg type="hierChild">
-                      <dgm:param type="chAlign" val="l"/>
-                      <dgm:param type="linDir" val="fromR"/>
-                      <dgm:param type="secChAlign" val="t"/>
-                      <dgm:param type="secLinDir" val="fromT"/>
-                    </dgm:alg>
-                  </dgm:else>
-                </dgm:choose>
-              </dgm:if>
-              <dgm:else name="Name28">
-                <dgm:choose name="Name29">
-                  <dgm:if name="Name30" func="var" arg="dir" op="equ" val="norm">
-                    <dgm:alg type="hierChild"/>
-                  </dgm:if>
-                  <dgm:else name="Name31">
-                    <dgm:alg type="hierChild">
-                      <dgm:param type="linDir" val="fromR"/>
-                    </dgm:alg>
-                  </dgm:else>
-                </dgm:choose>
-              </dgm:else>
-            </dgm:choose>
+    <dgm:layoutNode name="hierFlow">
+      <dgm:alg type="lin">
+        <dgm:param type="linDir" val="fromT"/>
+        <dgm:param type="nodeVertAlign" val="t"/>
+        <dgm:param type="vertAlign" val="t"/>
+        <dgm:param type="nodeHorzAlign" val="ctr"/>
+        <dgm:param type="fallback" val="2D"/>
+      </dgm:alg>
+      <dgm:shape xmlns:r="http://schemas.openxmlformats.org/officeDocument/2006/relationships" r:blip="">
+        <dgm:adjLst/>
+      </dgm:shape>
+      <dgm:presOf/>
+      <dgm:constrLst/>
+      <dgm:ruleLst/>
+      <dgm:choose name="Name6">
+        <dgm:if name="Name7" axis="ch" ptType="node" func="cnt" op="gte" val="2">
+          <dgm:layoutNode name="firstBuf">
+            <dgm:alg type="sp"/>
             <dgm:shape xmlns:r="http://schemas.openxmlformats.org/officeDocument/2006/relationships" r:blip="">
               <dgm:adjLst/>
             </dgm:shape>
             <dgm:presOf/>
             <dgm:constrLst/>
             <dgm:ruleLst/>
-            <dgm:forEach name="rep2a" axis="ch" ptType="nonAsst">
-              <dgm:forEach name="Name32" axis="precedSib" ptType="parTrans" st="-1" cnt="1">
-                <dgm:choose name="Name33">
-                  <dgm:if name="Name34" func="var" arg="hierBranch" op="equ" val="std">
-                    <dgm:layoutNode name="Name35">
+          </dgm:layoutNode>
+        </dgm:if>
+        <dgm:else name="Name8"/>
+      </dgm:choose>
+      <dgm:layoutNode name="hierChild1">
+        <dgm:varLst>
+          <dgm:chPref val="1"/>
+          <dgm:animOne val="branch"/>
+          <dgm:animLvl val="lvl"/>
+        </dgm:varLst>
+        <dgm:choose name="Name9">
+          <dgm:if name="Name10" func="var" arg="dir" op="equ" val="norm">
+            <dgm:alg type="hierChild">
+              <dgm:param type="linDir" val="fromL"/>
+              <dgm:param type="vertAlign" val="t"/>
+            </dgm:alg>
+          </dgm:if>
+          <dgm:else name="Name11">
+            <dgm:alg type="hierChild">
+              <dgm:param type="linDir" val="fromR"/>
+              <dgm:param type="vertAlign" val="t"/>
+            </dgm:alg>
+          </dgm:else>
+        </dgm:choose>
+        <dgm:shape xmlns:r="http://schemas.openxmlformats.org/officeDocument/2006/relationships" r:blip="">
+          <dgm:adjLst/>
+        </dgm:shape>
+        <dgm:presOf/>
+        <dgm:constrLst>
+          <dgm:constr type="primFontSz" for="des" ptType="node" op="equ"/>
+        </dgm:constrLst>
+        <dgm:ruleLst/>
+        <dgm:forEach name="Name12" axis="ch" cnt="3">
+          <dgm:forEach name="Name13" axis="self" ptType="node">
+            <dgm:layoutNode name="Name14">
+              <dgm:alg type="hierRoot"/>
+              <dgm:shape xmlns:r="http://schemas.openxmlformats.org/officeDocument/2006/relationships" r:blip="">
+                <dgm:adjLst/>
+              </dgm:shape>
+              <dgm:presOf/>
+              <dgm:constrLst/>
+              <dgm:ruleLst/>
+              <dgm:layoutNode name="level1Shape" styleLbl="node0">
+                <dgm:varLst>
+                  <dgm:chPref val="3"/>
+                </dgm:varLst>
+                <dgm:alg type="tx"/>
+                <dgm:shape xmlns:r="http://schemas.openxmlformats.org/officeDocument/2006/relationships" type="roundRect" r:blip="">
+                  <dgm:adjLst>
+                    <dgm:adj idx="1" val="0.1"/>
+                  </dgm:adjLst>
+                </dgm:shape>
+                <dgm:presOf axis="self"/>
+                <dgm:constrLst>
+                  <dgm:constr type="primFontSz" val="65"/>
+                  <dgm:constr type="tMarg" refType="primFontSz" fact="0.3"/>
+                  <dgm:constr type="bMarg" refType="primFontSz" fact="0.3"/>
+                  <dgm:constr type="lMarg" refType="primFontSz" fact="0.3"/>
+                  <dgm:constr type="rMarg" refType="primFontSz" fact="0.3"/>
+                </dgm:constrLst>
+                <dgm:ruleLst>
+                  <dgm:rule type="primFontSz" val="5" fact="NaN" max="NaN"/>
+                </dgm:ruleLst>
+              </dgm:layoutNode>
+              <dgm:layoutNode name="hierChild2">
+                <dgm:choose name="Name15">
+                  <dgm:if name="Name16" func="var" arg="dir" op="equ" val="norm">
+                    <dgm:alg type="hierChild">
+                      <dgm:param type="linDir" val="fromL"/>
+                    </dgm:alg>
+                  </dgm:if>
+                  <dgm:else name="Name17">
+                    <dgm:alg type="hierChild">
+                      <dgm:param type="linDir" val="fromR"/>
+                    </dgm:alg>
+                  </dgm:else>
+                </dgm:choose>
+                <dgm:shape xmlns:r="http://schemas.openxmlformats.org/officeDocument/2006/relationships" r:blip="">
+                  <dgm:adjLst/>
+                </dgm:shape>
+                <dgm:presOf/>
+                <dgm:constrLst/>
+                <dgm:ruleLst/>
+                <dgm:forEach name="repeat" axis="ch">
+                  <dgm:forEach name="Name18" axis="self" ptType="parTrans" cnt="1">
+                    <dgm:layoutNode name="Name19">
                       <dgm:alg type="conn">
-                        <dgm:param type="connRout" val="bend"/>
                         <dgm:param type="dim" val="1D"/>
                         <dgm:param type="endSty" val="noArr"/>
+                        <dgm:param type="connRout" val="bend"/>
                         <dgm:param type="begPts" val="bCtr"/>
                         <dgm:param type="endPts" val="tCtr"/>
-                        <dgm:param type="bendPt" val="end"/>
                       </dgm:alg>
-                      <dgm:shape xmlns:r="http://schemas.openxmlformats.org/officeDocument/2006/relationships" type="conn" r:blip="" zOrderOff="-99999">
+                      <dgm:shape xmlns:r="http://schemas.openxmlformats.org/officeDocument/2006/relationships" type="conn" r:blip="">
                         <dgm:adjLst/>
                       </dgm:shape>
                       <dgm:presOf axis="self"/>
                       <dgm:constrLst>
+                        <dgm:constr type="w" val="1"/>
+                        <dgm:constr type="h" val="1"/>
                         <dgm:constr type="begPad"/>
                         <dgm:constr type="endPad"/>
                       </dgm:constrLst>
                       <dgm:ruleLst/>
                     </dgm:layoutNode>
-                  </dgm:if>
-                  <dgm:if name="Name36" func="var" arg="hierBranch" op="equ" val="init">
-                    <dgm:layoutNode name="Name37">
-                      <dgm:choose name="Name38">
-                        <dgm:if name="Name39" axis="self" func="depth" op="lte" val="2">
-                          <dgm:alg type="conn">
-                            <dgm:param type="connRout" val="bend"/>
-                            <dgm:param type="dim" val="1D"/>
-                            <dgm:param type="endSty" val="noArr"/>
-                            <dgm:param type="begPts" val="bCtr"/>
-                            <dgm:param type="endPts" val="tCtr"/>
-                            <dgm:param type="bendPt" val="end"/>
-                          </dgm:alg>
-                        </dgm:if>
-                        <dgm:else name="Name40">
-                          <dgm:alg type="conn">
-                            <dgm:param type="connRout" val="bend"/>
-                            <dgm:param type="dim" val="1D"/>
-                            <dgm:param type="endSty" val="noArr"/>
-                            <dgm:param type="begPts" val="bCtr"/>
-                            <dgm:param type="endPts" val="tCtr"/>
-                            <dgm:param type="bendPt" val="end"/>
-                          </dgm:alg>
-                        </dgm:else>
-                      </dgm:choose>
-                      <dgm:shape xmlns:r="http://schemas.openxmlformats.org/officeDocument/2006/relationships" type="conn" r:blip="" zOrderOff="-99999">
+                  </dgm:forEach>
+                  <dgm:forEach name="Name20" axis="self" ptType="node">
+                    <dgm:layoutNode name="Name21">
+                      <dgm:alg type="hierRoot"/>
+                      <dgm:shape xmlns:r="http://schemas.openxmlformats.org/officeDocument/2006/relationships" r:blip="">
                         <dgm:adjLst/>
                       </dgm:shape>
-                      <dgm:presOf axis="self"/>
-                      <dgm:constrLst>
-                        <dgm:constr type="begPad"/>
-                        <dgm:constr type="endPad"/>
-                      </dgm:constrLst>
+                      <dgm:presOf/>
+                      <dgm:constrLst/>
                       <dgm:ruleLst/>
-                    </dgm:layoutNode>
-                  </dgm:if>
-                  <dgm:if name="Name41" func="var" arg="hierBranch" op="equ" val="hang">
-                    <dgm:layoutNode name="Name42">
-                      <dgm:alg type="conn">
-                        <dgm:param type="connRout" val="bend"/>
-                        <dgm:param type="dim" val="1D"/>
-                        <dgm:param type="endSty" val="noArr"/>
-                        <dgm:param type="begPts" val="bCtr"/>
-                        <dgm:param type="endPts" val="midL midR"/>
-                      </dgm:alg>
-                      <dgm:shape xmlns:r="http://schemas.openxmlformats.org/officeDocument/2006/relationships" type="conn" r:blip="" zOrderOff="-99999">
-                        <dgm:adjLst/>
-                      </dgm:shape>
-                      <dgm:presOf axis="self"/>
-                      <dgm:constrLst>
-                        <dgm:constr type="begPad"/>
-                        <dgm:constr type="endPad"/>
-                      </dgm:constrLst>
-                      <dgm:ruleLst/>
-                    </dgm:layoutNode>
-                  </dgm:if>
-                  <dgm:else name="Name43">
-                    <dgm:layoutNode name="Name44">
-                      <dgm:choose name="Name45">
-                        <dgm:if name="Name46" axis="self" func="depth" op="lte" val="2">
-                          <dgm:choose name="Name47">
-                            <dgm:if name="Name48" axis="par ch" ptType="node asst" func="cnt" op="gte" val="1">
-                              <dgm:alg type="conn">
-                                <dgm:param type="connRout" val="bend"/>
-                                <dgm:param type="dim" val="1D"/>
-                                <dgm:param type="endSty" val="noArr"/>
-                                <dgm:param type="begPts" val="bCtr"/>
-                                <dgm:param type="endPts" val="midL midR"/>
-                              </dgm:alg>
-                            </dgm:if>
-                            <dgm:else name="Name49">
-                              <dgm:alg type="conn">
-                                <dgm:param type="connRout" val="bend"/>
-                                <dgm:param type="dim" val="1D"/>
-                                <dgm:param type="endSty" val="noArr"/>
-                                <dgm:param type="begPts" val="bCtr"/>
-                                <dgm:param type="endPts" val="midL midR"/>
-                                <dgm:param type="srcNode" val="rootConnector1"/>
-                              </dgm:alg>
-                            </dgm:else>
-                          </dgm:choose>
-                        </dgm:if>
-                        <dgm:else name="Name50">
-                          <dgm:choose name="Name51">
-                            <dgm:if name="Name52" axis="par ch" ptType="node asst" func="cnt" op="gte" val="1">
-                              <dgm:alg type="conn">
-                                <dgm:param type="connRout" val="bend"/>
-                                <dgm:param type="dim" val="1D"/>
-                                <dgm:param type="endSty" val="noArr"/>
-                                <dgm:param type="begPts" val="bCtr"/>
-                                <dgm:param type="endPts" val="midL midR"/>
-                              </dgm:alg>
-                            </dgm:if>
-                            <dgm:else name="Name53">
-                              <dgm:alg type="conn">
-                                <dgm:param type="connRout" val="bend"/>
-                                <dgm:param type="dim" val="1D"/>
-                                <dgm:param type="endSty" val="noArr"/>
-                                <dgm:param type="begPts" val="bCtr"/>
-                                <dgm:param type="endPts" val="midL midR"/>
-                                <dgm:param type="srcNode" val="rootConnector"/>
-                              </dgm:alg>
-                            </dgm:else>
-                          </dgm:choose>
-                        </dgm:else>
-                      </dgm:choose>
-                      <dgm:shape xmlns:r="http://schemas.openxmlformats.org/officeDocument/2006/relationships" type="conn" r:blip="" zOrderOff="-99999">
-                        <dgm:adjLst/>
-                      </dgm:shape>
-                      <dgm:presOf axis="self"/>
-                      <dgm:constrLst>
-                        <dgm:constr type="begPad"/>
-                        <dgm:constr type="endPad"/>
-                      </dgm:constrLst>
-                      <dgm:ruleLst/>
-                    </dgm:layoutNode>
-                  </dgm:else>
-                </dgm:choose>
-              </dgm:forEach>
-              <dgm:layoutNode name="hierRoot2">
-                <dgm:varLst>
-                  <dgm:hierBranch val="init"/>
-                </dgm:varLst>
-                <dgm:choose name="Name54">
-                  <dgm:if name="Name55" func="var" arg="hierBranch" op="equ" val="l">
-                    <dgm:choose name="Name56">
-                      <dgm:if name="Name57" axis="ch" ptType="asst" func="cnt" op="gte" val="1">
-                        <dgm:alg type="hierRoot">
-                          <dgm:param type="hierAlign" val="tR"/>
-                        </dgm:alg>
+                      <dgm:layoutNode name="level2Shape">
+                        <dgm:alg type="tx"/>
+                        <dgm:shape xmlns:r="http://schemas.openxmlformats.org/officeDocument/2006/relationships" type="roundRect" r:blip="">
+                          <dgm:adjLst>
+                            <dgm:adj idx="1" val="0.1"/>
+                          </dgm:adjLst>
+                        </dgm:shape>
+                        <dgm:presOf axis="self"/>
+                        <dgm:constrLst>
+                          <dgm:constr type="primFontSz" val="65"/>
+                          <dgm:constr type="tMarg" refType="primFontSz" fact="0.3"/>
+                          <dgm:constr type="bMarg" refType="primFontSz" fact="0.3"/>
+                          <dgm:constr type="lMarg" refType="primFontSz" fact="0.3"/>
+                          <dgm:constr type="rMarg" refType="primFontSz" fact="0.3"/>
+                        </dgm:constrLst>
+                        <dgm:ruleLst>
+                          <dgm:rule type="primFontSz" val="5" fact="NaN" max="NaN"/>
+                        </dgm:ruleLst>
+                      </dgm:layoutNode>
+                      <dgm:layoutNode name="hierChild3">
+                        <dgm:choose name="Name22">
+                          <dgm:if name="Name23" func="var" arg="dir" op="equ" val="norm">
+                            <dgm:alg type="hierChild">
+                              <dgm:param type="linDir" val="fromL"/>
+                            </dgm:alg>
+                          </dgm:if>
+                          <dgm:else name="Name24">
+                            <dgm:alg type="hierChild">
+                              <dgm:param type="linDir" val="fromR"/>
+                            </dgm:alg>
+                          </dgm:else>
+                        </dgm:choose>
                         <dgm:shape xmlns:r="http://schemas.openxmlformats.org/officeDocument/2006/relationships" r:blip="">
                           <dgm:adjLst/>
                         </dgm:shape>
                         <dgm:presOf/>
-                        <dgm:constrLst>
-                          <dgm:constr type="alignOff" val="0.65"/>
-                        </dgm:constrLst>
-                      </dgm:if>
-                      <dgm:else name="Name58">
-                        <dgm:alg type="hierRoot">
-                          <dgm:param type="hierAlign" val="tR"/>
-                        </dgm:alg>
-                        <dgm:shape xmlns:r="http://schemas.openxmlformats.org/officeDocument/2006/relationships" r:blip="">
-                          <dgm:adjLst/>
-                        </dgm:shape>
-                        <dgm:presOf/>
-                        <dgm:constrLst>
-                          <dgm:constr type="alignOff" val="0.25"/>
-                        </dgm:constrLst>
-                      </dgm:else>
-                    </dgm:choose>
-                  </dgm:if>
-                  <dgm:if name="Name59" func="var" arg="hierBranch" op="equ" val="r">
-                    <dgm:choose name="Name60">
-                      <dgm:if name="Name61" axis="ch" ptType="asst" func="cnt" op="gte" val="1">
-                        <dgm:alg type="hierRoot">
-                          <dgm:param type="hierAlign" val="tL"/>
-                        </dgm:alg>
-                        <dgm:shape xmlns:r="http://schemas.openxmlformats.org/officeDocument/2006/relationships" r:blip="">
-                          <dgm:adjLst/>
-                        </dgm:shape>
-                        <dgm:presOf/>
-                        <dgm:constrLst>
-                          <dgm:constr type="alignOff" val="0.65"/>
-                        </dgm:constrLst>
-                      </dgm:if>
-                      <dgm:else name="Name62">
-                        <dgm:alg type="hierRoot">
-                          <dgm:param type="hierAlign" val="tL"/>
-                        </dgm:alg>
-                        <dgm:shape xmlns:r="http://schemas.openxmlformats.org/officeDocument/2006/relationships" r:blip="">
-                          <dgm:adjLst/>
-                        </dgm:shape>
-                        <dgm:presOf/>
-                        <dgm:constrLst>
-                          <dgm:constr type="alignOff" val="0.25"/>
-                        </dgm:constrLst>
-                      </dgm:else>
-                    </dgm:choose>
-                  </dgm:if>
-                  <dgm:if name="Name63" func="var" arg="hierBranch" op="equ" val="std">
-                    <dgm:alg type="hierRoot"/>
-                    <dgm:shape xmlns:r="http://schemas.openxmlformats.org/officeDocument/2006/relationships" r:blip="">
-                      <dgm:adjLst/>
-                    </dgm:shape>
-                    <dgm:presOf/>
-                    <dgm:constrLst>
-                      <dgm:constr type="alignOff"/>
-                      <dgm:constr type="bendDist" for="des" ptType="parTrans" refType="sp" fact="0.5"/>
-                    </dgm:constrLst>
-                  </dgm:if>
-                  <dgm:if name="Name64" func="var" arg="hierBranch" op="equ" val="init">
-                    <dgm:alg type="hierRoot"/>
-                    <dgm:shape xmlns:r="http://schemas.openxmlformats.org/officeDocument/2006/relationships" r:blip="">
-                      <dgm:adjLst/>
-                    </dgm:shape>
-                    <dgm:presOf/>
-                    <dgm:constrLst>
-                      <dgm:constr type="alignOff"/>
-                      <dgm:constr type="bendDist" for="des" ptType="parTrans" refType="sp" fact="0.5"/>
-                    </dgm:constrLst>
-                  </dgm:if>
-                  <dgm:else name="Name65">
-                    <dgm:alg type="hierRoot"/>
-                    <dgm:shape xmlns:r="http://schemas.openxmlformats.org/officeDocument/2006/relationships" r:blip="">
-                      <dgm:adjLst/>
-                    </dgm:shape>
-                    <dgm:presOf/>
-                    <dgm:constrLst>
-                      <dgm:constr type="alignOff" val="0.65"/>
-                    </dgm:constrLst>
-                  </dgm:else>
-                </dgm:choose>
-                <dgm:ruleLst/>
-                <dgm:layoutNode name="rootComposite">
-                  <dgm:alg type="composite"/>
-                  <dgm:shape xmlns:r="http://schemas.openxmlformats.org/officeDocument/2006/relationships" r:blip="">
-                    <dgm:adjLst/>
-                  </dgm:shape>
-                  <dgm:presOf axis="self" ptType="node" cnt="1"/>
-                  <dgm:choose name="Name66">
-                    <dgm:if name="Name67" func="var" arg="hierBranch" op="equ" val="init">
-                      <dgm:constrLst>
-                        <dgm:constr type="l" for="ch" forName="rootText"/>
-                        <dgm:constr type="t" for="ch" forName="rootText"/>
-                        <dgm:constr type="w" for="ch" forName="rootText" refType="w"/>
-                        <dgm:constr type="h" for="ch" forName="rootText" refType="h" fact="0.9"/>
-                        <dgm:constr type="l" for="ch" forName="titleText2" refType="w" fact="0.2"/>
-                        <dgm:constr type="t" for="ch" forName="titleText2" refType="h" fact="0.7"/>
-                        <dgm:constr type="w" for="ch" forName="titleText2" refType="w" fact="0.9"/>
-                        <dgm:constr type="h" for="ch" forName="titleText2" refType="h" fact="0.3"/>
-                        <dgm:constr type="primFontSz" for="des" forName="titleText2" refType="primFontSz" refFor="des" refForName="rootText1" op="lte"/>
-                        <dgm:constr type="l" for="ch" forName="rootConnector"/>
-                        <dgm:constr type="t" for="ch" forName="rootConnector"/>
-                        <dgm:constr type="w" for="ch" forName="rootConnector" refType="w" refFor="ch" refForName="rootText" fact="0.2"/>
-                        <dgm:constr type="h" for="ch" forName="rootConnector" refType="h" refFor="ch" refForName="rootText"/>
-                      </dgm:constrLst>
-                    </dgm:if>
-                    <dgm:if name="Name68" func="var" arg="hierBranch" op="equ" val="l">
-                      <dgm:constrLst>
-                        <dgm:constr type="l" for="ch" forName="rootText"/>
-                        <dgm:constr type="t" for="ch" forName="rootText"/>
-                        <dgm:constr type="w" for="ch" forName="rootText" refType="w"/>
-                        <dgm:constr type="h" for="ch" forName="rootText" refType="h" fact="0.9"/>
-                        <dgm:constr type="l" for="ch" forName="titleText2" refType="w" fact="0.2"/>
-                        <dgm:constr type="t" for="ch" forName="titleText2" refType="h" fact="0.7"/>
-                        <dgm:constr type="w" for="ch" forName="titleText2" refType="w" fact="0.9"/>
-                        <dgm:constr type="h" for="ch" forName="titleText2" refType="h" fact="0.3"/>
-                        <dgm:constr type="primFontSz" for="des" forName="titleText2" refType="primFontSz" refFor="des" refForName="rootText1" op="lte"/>
-                        <dgm:constr type="r" for="ch" forName="rootConnector" refType="w"/>
-                        <dgm:constr type="t" for="ch" forName="rootConnector"/>
-                        <dgm:constr type="w" for="ch" forName="rootConnector" refType="w" refFor="ch" refForName="rootText" fact="0.2"/>
-                        <dgm:constr type="h" for="ch" forName="rootConnector" refType="h" refFor="ch" refForName="rootText"/>
-                      </dgm:constrLst>
-                    </dgm:if>
-                    <dgm:if name="Name69" func="var" arg="hierBranch" op="equ" val="r">
-                      <dgm:constrLst>
-                        <dgm:constr type="l" for="ch" forName="rootText"/>
-                        <dgm:constr type="t" for="ch" forName="rootText"/>
-                        <dgm:constr type="w" for="ch" forName="rootText" refType="w"/>
-                        <dgm:constr type="h" for="ch" forName="rootText" refType="h" fact="0.9"/>
-                        <dgm:constr type="l" for="ch" forName="titleText2" refType="w" fact="0.2"/>
-                        <dgm:constr type="t" for="ch" forName="titleText2" refType="h" fact="0.7"/>
-                        <dgm:constr type="w" for="ch" forName="titleText2" refType="w" fact="0.9"/>
-                        <dgm:constr type="h" for="ch" forName="titleText2" refType="h" fact="0.3"/>
-                        <dgm:constr type="primFontSz" for="des" forName="titleText2" refType="primFontSz" refFor="des" refForName="rootText1" op="lte"/>
-                        <dgm:constr type="l" for="ch" forName="rootConnector"/>
-                        <dgm:constr type="t" for="ch" forName="rootConnector"/>
-                        <dgm:constr type="w" for="ch" forName="rootConnector" refType="w" refFor="ch" refForName="rootText" fact="0.2"/>
-                        <dgm:constr type="h" for="ch" forName="rootConnector" refType="h" refFor="ch" refForName="rootText"/>
-                      </dgm:constrLst>
-                    </dgm:if>
-                    <dgm:else name="Name70">
-                      <dgm:constrLst>
-                        <dgm:constr type="l" for="ch" forName="rootText"/>
-                        <dgm:constr type="t" for="ch" forName="rootText"/>
-                        <dgm:constr type="w" for="ch" forName="rootText" refType="w"/>
-                        <dgm:constr type="h" for="ch" forName="rootText" refType="h" fact="0.9"/>
-                        <dgm:constr type="l" for="ch" forName="titleText2" refType="w" fact="0.2"/>
-                        <dgm:constr type="t" for="ch" forName="titleText2" refType="h" fact="0.7"/>
-                        <dgm:constr type="w" for="ch" forName="titleText2" refType="w" fact="0.9"/>
-                        <dgm:constr type="h" for="ch" forName="titleText2" refType="h" fact="0.3"/>
-                        <dgm:constr type="primFontSz" for="des" forName="titleText2" refType="primFontSz" refFor="des" refForName="rootText1" op="lte"/>
-                        <dgm:constr type="r" for="ch" forName="rootConnector" refType="w"/>
-                        <dgm:constr type="t" for="ch" forName="rootConnector"/>
-                        <dgm:constr type="w" for="ch" forName="rootConnector" refType="w" refFor="ch" refForName="rootText" fact="0.2"/>
-                        <dgm:constr type="h" for="ch" forName="rootConnector" refType="h" refFor="ch" refForName="rootText"/>
-                      </dgm:constrLst>
-                    </dgm:else>
-                  </dgm:choose>
-                  <dgm:ruleLst/>
-                  <dgm:layoutNode name="rootText" styleLbl="node1">
-                    <dgm:varLst>
-                      <dgm:chMax/>
-                      <dgm:chPref val="3"/>
-                    </dgm:varLst>
-                    <dgm:alg type="tx"/>
-                    <dgm:shape xmlns:r="http://schemas.openxmlformats.org/officeDocument/2006/relationships" type="rect" r:blip="">
-                      <dgm:adjLst/>
-                    </dgm:shape>
-                    <dgm:presOf axis="self" ptType="node" cnt="1"/>
-                    <dgm:constrLst>
-                      <dgm:constr type="primFontSz" val="65"/>
-                      <dgm:constr type="lMarg" refType="primFontSz" fact="0.05"/>
-                      <dgm:constr type="rMarg" refType="primFontSz" fact="0.05"/>
-                      <dgm:constr type="tMarg" refType="primFontSz" fact="0.05"/>
-                      <dgm:constr type="bMarg" refType="h" fact="0.4"/>
-                    </dgm:constrLst>
-                    <dgm:ruleLst>
-                      <dgm:rule type="primFontSz" val="5" fact="NaN" max="NaN"/>
-                    </dgm:ruleLst>
-                  </dgm:layoutNode>
-                  <dgm:layoutNode name="titleText2" styleLbl="fgAcc1">
-                    <dgm:varLst>
-                      <dgm:chMax val="0"/>
-                      <dgm:chPref val="0"/>
-                    </dgm:varLst>
-                    <dgm:alg type="tx">
-                      <dgm:param type="parTxLTRAlign" val="r"/>
-                    </dgm:alg>
-                    <dgm:shape xmlns:r="http://schemas.openxmlformats.org/officeDocument/2006/relationships" type="rect" r:blip="">
-                      <dgm:adjLst/>
-                    </dgm:shape>
-                    <dgm:presOf axis="followSib" ptType="sibTrans" hideLastTrans="0" cnt="1"/>
-                    <dgm:constrLst>
-                      <dgm:constr type="primFontSz" val="65"/>
-                      <dgm:constr type="lMarg" refType="primFontSz" fact="0.2"/>
-                      <dgm:constr type="rMarg" refType="primFontSz" fact="0.2"/>
-                      <dgm:constr type="tMarg" refType="primFontSz" fact="0.05"/>
-                      <dgm:constr type="bMarg" refType="primFontSz" fact="0.05"/>
-                    </dgm:constrLst>
-                    <dgm:ruleLst>
-                      <dgm:rule type="primFontSz" val="5" fact="NaN" max="NaN"/>
-                    </dgm:ruleLst>
-                  </dgm:layoutNode>
-                  <dgm:layoutNode name="rootConnector" moveWith="rootText">
-                    <dgm:alg type="sp"/>
-                    <dgm:shape xmlns:r="http://schemas.openxmlformats.org/officeDocument/2006/relationships" type="rect" r:blip="" hideGeom="1">
-                      <dgm:adjLst/>
-                    </dgm:shape>
-                    <dgm:presOf axis="self" ptType="node" cnt="1"/>
-                    <dgm:constrLst/>
-                    <dgm:ruleLst/>
-                  </dgm:layoutNode>
-                </dgm:layoutNode>
-                <dgm:layoutNode name="hierChild4">
-                  <dgm:choose name="Name71">
-                    <dgm:if name="Name72" func="var" arg="hierBranch" op="equ" val="l">
-                      <dgm:alg type="hierChild">
-                        <dgm:param type="chAlign" val="r"/>
-                        <dgm:param type="linDir" val="fromT"/>
-                      </dgm:alg>
-                    </dgm:if>
-                    <dgm:if name="Name73" func="var" arg="hierBranch" op="equ" val="r">
-                      <dgm:alg type="hierChild">
-                        <dgm:param type="chAlign" val="l"/>
-                        <dgm:param type="linDir" val="fromT"/>
-                      </dgm:alg>
-                    </dgm:if>
-                    <dgm:if name="Name74" func="var" arg="hierBranch" op="equ" val="hang">
-                      <dgm:choose name="Name75">
-                        <dgm:if name="Name76" func="var" arg="dir" op="equ" val="norm">
-                          <dgm:alg type="hierChild">
-                            <dgm:param type="chAlign" val="l"/>
-                            <dgm:param type="linDir" val="fromL"/>
-                            <dgm:param type="secChAlign" val="t"/>
-                            <dgm:param type="secLinDir" val="fromT"/>
-                          </dgm:alg>
-                        </dgm:if>
-                        <dgm:else name="Name77">
-                          <dgm:alg type="hierChild">
-                            <dgm:param type="chAlign" val="l"/>
-                            <dgm:param type="linDir" val="fromR"/>
-                            <dgm:param type="secChAlign" val="t"/>
-                            <dgm:param type="secLinDir" val="fromT"/>
-                          </dgm:alg>
-                        </dgm:else>
-                      </dgm:choose>
-                    </dgm:if>
-                    <dgm:if name="Name78" func="var" arg="hierBranch" op="equ" val="std">
-                      <dgm:choose name="Name79">
-                        <dgm:if name="Name80" func="var" arg="dir" op="equ" val="norm">
-                          <dgm:alg type="hierChild"/>
-                        </dgm:if>
-                        <dgm:else name="Name81">
-                          <dgm:alg type="hierChild">
-                            <dgm:param type="linDir" val="fromR"/>
-                          </dgm:alg>
-                        </dgm:else>
-                      </dgm:choose>
-                    </dgm:if>
-                    <dgm:if name="Name82" func="var" arg="hierBranch" op="equ" val="init">
-                      <dgm:choose name="Name83">
-                        <dgm:if name="Name84" func="var" arg="dir" op="equ" val="norm">
-                          <dgm:alg type="hierChild"/>
-                        </dgm:if>
-                        <dgm:else name="Name85">
-                          <dgm:alg type="hierChild">
-                            <dgm:param type="linDir" val="fromR"/>
-                          </dgm:alg>
-                        </dgm:else>
-                      </dgm:choose>
-                    </dgm:if>
-                    <dgm:else name="Name86"/>
-                  </dgm:choose>
-                  <dgm:shape xmlns:r="http://schemas.openxmlformats.org/officeDocument/2006/relationships" r:blip="">
-                    <dgm:adjLst/>
-                  </dgm:shape>
-                  <dgm:presOf/>
-                  <dgm:constrLst/>
-                  <dgm:ruleLst/>
-                  <dgm:forEach name="Name87" ref="rep2a"/>
-                </dgm:layoutNode>
-                <dgm:layoutNode name="hierChild5">
-                  <dgm:choose name="Name88">
-                    <dgm:if name="Name89" func="var" arg="dir" op="equ" val="norm">
-                      <dgm:alg type="hierChild">
-                        <dgm:param type="chAlign" val="l"/>
-                        <dgm:param type="linDir" val="fromL"/>
-                        <dgm:param type="secChAlign" val="t"/>
-                        <dgm:param type="secLinDir" val="fromT"/>
-                      </dgm:alg>
-                    </dgm:if>
-                    <dgm:else name="Name90">
-                      <dgm:alg type="hierChild">
-                        <dgm:param type="chAlign" val="l"/>
-                        <dgm:param type="linDir" val="fromR"/>
-                        <dgm:param type="secChAlign" val="t"/>
-                        <dgm:param type="secLinDir" val="fromT"/>
-                      </dgm:alg>
-                    </dgm:else>
-                  </dgm:choose>
-                  <dgm:shape xmlns:r="http://schemas.openxmlformats.org/officeDocument/2006/relationships" r:blip="">
-                    <dgm:adjLst/>
-                  </dgm:shape>
-                  <dgm:presOf/>
-                  <dgm:constrLst/>
-                  <dgm:ruleLst/>
-                  <dgm:forEach name="Name91" ref="rep2b"/>
-                </dgm:layoutNode>
+                        <dgm:constrLst/>
+                        <dgm:ruleLst/>
+                        <dgm:forEach name="Name25" ref="repeat"/>
+                      </dgm:layoutNode>
+                    </dgm:layoutNode>
+                  </dgm:forEach>
+                </dgm:forEach>
               </dgm:layoutNode>
-            </dgm:forEach>
+            </dgm:layoutNode>
+          </dgm:forEach>
+        </dgm:forEach>
+      </dgm:layoutNode>
+    </dgm:layoutNode>
+    <dgm:layoutNode name="bgShapesFlow">
+      <dgm:alg type="lin">
+        <dgm:param type="linDir" val="fromT"/>
+        <dgm:param type="nodeVertAlign" val="t"/>
+        <dgm:param type="vertAlign" val="t"/>
+        <dgm:param type="nodeHorzAlign" val="ctr"/>
+      </dgm:alg>
+      <dgm:shape xmlns:r="http://schemas.openxmlformats.org/officeDocument/2006/relationships" r:blip="">
+        <dgm:adjLst/>
+      </dgm:shape>
+      <dgm:presOf/>
+      <dgm:constrLst>
+        <dgm:constr type="userB"/>
+        <dgm:constr type="w" for="ch" forName="rectComp" refType="w"/>
+        <dgm:constr type="h" for="ch" forName="rectComp" refType="h"/>
+        <dgm:constr type="w" for="des" forName="bgRect" refType="w"/>
+        <dgm:constr type="primFontSz" for="des" forName="bgRectTx" op="equ"/>
+      </dgm:constrLst>
+      <dgm:ruleLst/>
+      <dgm:forEach name="Name26" axis="ch" ptType="node" st="2">
+        <dgm:layoutNode name="rectComp">
+          <dgm:alg type="composite">
+            <dgm:param type="vertAlign" val="t"/>
+            <dgm:param type="horzAlign" val="ctr"/>
+          </dgm:alg>
+          <dgm:shape xmlns:r="http://schemas.openxmlformats.org/officeDocument/2006/relationships" r:blip="">
+            <dgm:adjLst/>
+          </dgm:shape>
+          <dgm:presOf/>
+          <dgm:choose name="Name27">
+            <dgm:if name="Name28" func="var" arg="dir" op="equ" val="norm">
+              <dgm:constrLst>
+                <dgm:constr type="userA"/>
+                <dgm:constr type="l" for="ch" forName="bgRect"/>
+                <dgm:constr type="t" for="ch" forName="bgRect"/>
+                <dgm:constr type="h" for="ch" forName="bgRect" refType="userA" fact="1.2"/>
+                <dgm:constr type="l" for="ch" forName="bgRectTx"/>
+                <dgm:constr type="t" for="ch" forName="bgRectTx"/>
+                <dgm:constr type="w" for="ch" forName="bgRectTx" refType="w" refFor="ch" refForName="bgRect" fact="0.3"/>
+                <dgm:constr type="h" for="ch" forName="bgRectTx" refType="h" refFor="ch" refForName="bgRect" op="equ"/>
+              </dgm:constrLst>
+            </dgm:if>
+            <dgm:else name="Name29">
+              <dgm:constrLst>
+                <dgm:constr type="userA"/>
+                <dgm:constr type="l" for="ch" forName="bgRect"/>
+                <dgm:constr type="t" for="ch" forName="bgRect"/>
+                <dgm:constr type="h" for="ch" forName="bgRect" refType="userA" fact="1.2"/>
+                <dgm:constr type="r" for="ch" forName="bgRectTx" refType="w"/>
+                <dgm:constr type="t" for="ch" forName="bgRectTx"/>
+                <dgm:constr type="w" for="ch" forName="bgRectTx" refType="w" refFor="ch" refForName="bgRect" fact="0.3"/>
+                <dgm:constr type="h" for="ch" forName="bgRectTx" refType="h" refFor="ch" refForName="bgRect" op="equ"/>
+              </dgm:constrLst>
+            </dgm:else>
+          </dgm:choose>
+          <dgm:ruleLst/>
+          <dgm:layoutNode name="bgRect" styleLbl="bgShp">
+            <dgm:alg type="sp"/>
+            <dgm:shape xmlns:r="http://schemas.openxmlformats.org/officeDocument/2006/relationships" type="roundRect" r:blip="" zOrderOff="-999">
+              <dgm:adjLst>
+                <dgm:adj idx="1" val="0.1"/>
+              </dgm:adjLst>
+            </dgm:shape>
+            <dgm:presOf axis="desOrSelf" ptType="node"/>
+            <dgm:constrLst/>
+            <dgm:ruleLst/>
           </dgm:layoutNode>
-          <dgm:layoutNode name="hierChild3">
-            <dgm:choose name="Name92">
-              <dgm:if name="Name93" func="var" arg="dir" op="equ" val="norm">
-                <dgm:alg type="hierChild">
-                  <dgm:param type="chAlign" val="l"/>
-                  <dgm:param type="linDir" val="fromL"/>
-                  <dgm:param type="secChAlign" val="t"/>
-                  <dgm:param type="secLinDir" val="fromT"/>
-                </dgm:alg>
-              </dgm:if>
-              <dgm:else name="Name94">
-                <dgm:alg type="hierChild">
-                  <dgm:param type="chAlign" val="l"/>
-                  <dgm:param type="linDir" val="fromR"/>
-                  <dgm:param type="secChAlign" val="t"/>
-                  <dgm:param type="secLinDir" val="fromT"/>
-                </dgm:alg>
-              </dgm:else>
-            </dgm:choose>
-            <dgm:shape xmlns:r="http://schemas.openxmlformats.org/officeDocument/2006/relationships" r:blip="">
+          <dgm:layoutNode name="bgRectTx" styleLbl="bgShp">
+            <dgm:varLst>
+              <dgm:bulletEnabled val="1"/>
+            </dgm:varLst>
+            <dgm:alg type="tx"/>
+            <dgm:presOf axis="desOrSelf" ptType="node"/>
+            <dgm:shape xmlns:r="http://schemas.openxmlformats.org/officeDocument/2006/relationships" type="rect" r:blip="" zOrderOff="-999" hideGeom="1">
               <dgm:adjLst/>
             </dgm:shape>
-            <dgm:presOf/>
-            <dgm:constrLst/>
-            <dgm:ruleLst/>
-            <dgm:forEach name="rep2b" axis="ch" ptType="asst">
-              <dgm:forEach name="Name95" axis="precedSib" ptType="parTrans" st="-1" cnt="1">
-                <dgm:layoutNode name="Name96">
-                  <dgm:alg type="conn">
-                    <dgm:param type="connRout" val="bend"/>
-                    <dgm:param type="dim" val="1D"/>
-                    <dgm:param type="endSty" val="noArr"/>
-                    <dgm:param type="begPts" val="bCtr"/>
-                    <dgm:param type="endPts" val="midL midR"/>
-                  </dgm:alg>
-                  <dgm:shape xmlns:r="http://schemas.openxmlformats.org/officeDocument/2006/relationships" type="conn" r:blip="" zOrderOff="-99999">
-                    <dgm:adjLst/>
-                  </dgm:shape>
-                  <dgm:presOf axis="self"/>
-                  <dgm:constrLst>
-                    <dgm:constr type="begPad"/>
-                    <dgm:constr type="endPad"/>
-                  </dgm:constrLst>
-                  <dgm:ruleLst/>
-                </dgm:layoutNode>
-              </dgm:forEach>
-              <dgm:layoutNode name="hierRoot3">
-                <dgm:varLst>
-                  <dgm:hierBranch val="init"/>
-                </dgm:varLst>
-                <dgm:choose name="Name97">
-                  <dgm:if name="Name98" func="var" arg="hierBranch" op="equ" val="l">
-                    <dgm:alg type="hierRoot">
-                      <dgm:param type="hierAlign" val="tR"/>
-                    </dgm:alg>
-                    <dgm:shape xmlns:r="http://schemas.openxmlformats.org/officeDocument/2006/relationships" r:blip="">
-                      <dgm:adjLst/>
-                    </dgm:shape>
-                    <dgm:presOf/>
-                    <dgm:constrLst>
-                      <dgm:constr type="alignOff" val="0.65"/>
-                    </dgm:constrLst>
-                  </dgm:if>
-                  <dgm:if name="Name99" func="var" arg="hierBranch" op="equ" val="r">
-                    <dgm:alg type="hierRoot">
-                      <dgm:param type="hierAlign" val="tL"/>
-                    </dgm:alg>
-                    <dgm:shape xmlns:r="http://schemas.openxmlformats.org/officeDocument/2006/relationships" r:blip="">
-                      <dgm:adjLst/>
-                    </dgm:shape>
-                    <dgm:presOf/>
-                    <dgm:constrLst>
-                      <dgm:constr type="alignOff" val="0.65"/>
-                    </dgm:constrLst>
-                  </dgm:if>
-                  <dgm:if name="Name100" func="var" arg="hierBranch" op="equ" val="hang">
-                    <dgm:alg type="hierRoot"/>
-                    <dgm:shape xmlns:r="http://schemas.openxmlformats.org/officeDocument/2006/relationships" r:blip="">
-                      <dgm:adjLst/>
-                    </dgm:shape>
-                    <dgm:presOf/>
-                    <dgm:constrLst>
-                      <dgm:constr type="alignOff" val="0.65"/>
-                    </dgm:constrLst>
-                  </dgm:if>
-                  <dgm:if name="Name101" func="var" arg="hierBranch" op="equ" val="std">
-                    <dgm:alg type="hierRoot"/>
-                    <dgm:shape xmlns:r="http://schemas.openxmlformats.org/officeDocument/2006/relationships" r:blip="">
-                      <dgm:adjLst/>
-                    </dgm:shape>
-                    <dgm:presOf/>
-                    <dgm:constrLst>
-                      <dgm:constr type="alignOff"/>
-                      <dgm:constr type="bendDist" for="des" ptType="parTrans" refType="sp" fact="0.5"/>
-                    </dgm:constrLst>
-                  </dgm:if>
-                  <dgm:if name="Name102" func="var" arg="hierBranch" op="equ" val="init">
-                    <dgm:alg type="hierRoot"/>
-                    <dgm:shape xmlns:r="http://schemas.openxmlformats.org/officeDocument/2006/relationships" r:blip="">
-                      <dgm:adjLst/>
-                    </dgm:shape>
-                    <dgm:presOf/>
-                    <dgm:constrLst>
-                      <dgm:constr type="alignOff"/>
-                      <dgm:constr type="bendDist" for="des" ptType="parTrans" refType="sp" fact="0.5"/>
-                    </dgm:constrLst>
-                  </dgm:if>
-                  <dgm:else name="Name103"/>
-                </dgm:choose>
-                <dgm:ruleLst/>
-                <dgm:layoutNode name="rootComposite3">
-                  <dgm:alg type="composite"/>
-                  <dgm:shape xmlns:r="http://schemas.openxmlformats.org/officeDocument/2006/relationships" r:blip="">
-                    <dgm:adjLst/>
-                  </dgm:shape>
-                  <dgm:presOf axis="self" ptType="node" cnt="1"/>
-                  <dgm:choose name="Name104">
-                    <dgm:if name="Name105" func="var" arg="hierBranch" op="equ" val="init">
-                      <dgm:constrLst>
-                        <dgm:constr type="l" for="ch" forName="rootText3"/>
-                        <dgm:constr type="t" for="ch" forName="rootText3"/>
-                        <dgm:constr type="w" for="ch" forName="rootText3" refType="w"/>
-                        <dgm:constr type="h" for="ch" forName="rootText3" refType="h" fact="0.9"/>
-                        <dgm:constr type="l" for="ch" forName="titleText3" refType="w" fact="0.2"/>
-                        <dgm:constr type="t" for="ch" forName="titleText3" refType="h" fact="0.7"/>
-                        <dgm:constr type="w" for="ch" forName="titleText3" refType="w" fact="0.9"/>
-                        <dgm:constr type="h" for="ch" forName="titleText3" refType="h" fact="0.3"/>
-                        <dgm:constr type="primFontSz" for="des" forName="titleText3" refType="primFontSz" refFor="des" refForName="rootText3" op="lte"/>
-                        <dgm:constr type="l" for="ch" forName="rootConnector3"/>
-                        <dgm:constr type="t" for="ch" forName="rootConnector3"/>
-                        <dgm:constr type="w" for="ch" forName="rootConnector3" refType="w" refFor="ch" refForName="rootText3" fact="0.2"/>
-                        <dgm:constr type="h" for="ch" forName="rootConnector3" refType="h" refFor="ch" refForName="rootText3"/>
-                      </dgm:constrLst>
-                    </dgm:if>
-                    <dgm:if name="Name106" func="var" arg="hierBranch" op="equ" val="l">
-                      <dgm:constrLst>
-                        <dgm:constr type="l" for="ch" forName="rootText3"/>
-                        <dgm:constr type="t" for="ch" forName="rootText3"/>
-                        <dgm:constr type="w" for="ch" forName="rootText3" refType="w"/>
-                        <dgm:constr type="h" for="ch" forName="rootText3" refType="h" fact="0.9"/>
-                        <dgm:constr type="l" for="ch" forName="titleText3" refType="w" fact="0.2"/>
-                        <dgm:constr type="t" for="ch" forName="titleText3" refType="h" fact="0.7"/>
-                        <dgm:constr type="w" for="ch" forName="titleText3" refType="w" fact="0.9"/>
-                        <dgm:constr type="h" for="ch" forName="titleText3" refType="h" fact="0.3"/>
-                        <dgm:constr type="primFontSz" for="des" forName="titleText3" refType="primFontSz" refFor="des" refForName="rootText3" op="lte"/>
-                        <dgm:constr type="r" for="ch" forName="rootConnector3" refType="w"/>
-                        <dgm:constr type="t" for="ch" forName="rootConnector3"/>
-                        <dgm:constr type="w" for="ch" forName="rootConnector3" refType="w" refFor="ch" refForName="rootText3" fact="0.2"/>
-                        <dgm:constr type="h" for="ch" forName="rootConnector3" refType="h" refFor="ch" refForName="rootText3"/>
-                      </dgm:constrLst>
-                    </dgm:if>
-                    <dgm:if name="Name107" func="var" arg="hierBranch" op="equ" val="r">
-                      <dgm:constrLst>
-                        <dgm:constr type="l" for="ch" forName="rootText3"/>
-                        <dgm:constr type="t" for="ch" forName="rootText3"/>
-                        <dgm:constr type="w" for="ch" forName="rootText3" refType="w"/>
-                        <dgm:constr type="h" for="ch" forName="rootText3" refType="h" fact="0.9"/>
-                        <dgm:constr type="l" for="ch" forName="titleText3" refType="w" fact="0.2"/>
-                        <dgm:constr type="t" for="ch" forName="titleText3" refType="h" fact="0.7"/>
-                        <dgm:constr type="w" for="ch" forName="titleText3" refType="w" fact="0.9"/>
-                        <dgm:constr type="h" for="ch" forName="titleText3" refType="h" fact="0.3"/>
-                        <dgm:constr type="primFontSz" for="des" forName="titleText3" refType="primFontSz" refFor="des" refForName="rootText3" op="lte"/>
-                        <dgm:constr type="l" for="ch" forName="rootConnector3"/>
-                        <dgm:constr type="t" for="ch" forName="rootConnector3"/>
-                        <dgm:constr type="w" for="ch" forName="rootConnector3" refType="w" refFor="ch" refForName="rootText3" fact="0.2"/>
-                        <dgm:constr type="h" for="ch" forName="rootConnector3" refType="h" refFor="ch" refForName="rootText3"/>
-                      </dgm:constrLst>
-                    </dgm:if>
-                    <dgm:else name="Name108">
-                      <dgm:constrLst>
-                        <dgm:constr type="l" for="ch" forName="rootText3"/>
-                        <dgm:constr type="t" for="ch" forName="rootText3"/>
-                        <dgm:constr type="w" for="ch" forName="rootText3" refType="w"/>
-                        <dgm:constr type="h" for="ch" forName="rootText3" refType="h" fact="0.9"/>
-                        <dgm:constr type="l" for="ch" forName="titleText3" refType="w" fact="0.2"/>
-                        <dgm:constr type="t" for="ch" forName="titleText3" refType="h" fact="0.7"/>
-                        <dgm:constr type="w" for="ch" forName="titleText3" refType="w" fact="0.9"/>
-                        <dgm:constr type="h" for="ch" forName="titleText3" refType="h" fact="0.3"/>
-                        <dgm:constr type="primFontSz" for="des" forName="titleText3" refType="primFontSz" refFor="des" refForName="rootText3" op="lte"/>
-                        <dgm:constr type="r" for="ch" forName="rootConnector3" refType="w"/>
-                        <dgm:constr type="t" for="ch" forName="rootConnector3"/>
-                        <dgm:constr type="w" for="ch" forName="rootConnector3" refType="w" refFor="ch" refForName="rootText3" fact="0.2"/>
-                        <dgm:constr type="h" for="ch" forName="rootConnector3" refType="h" refFor="ch" refForName="rootText3"/>
-                      </dgm:constrLst>
-                    </dgm:else>
-                  </dgm:choose>
-                  <dgm:ruleLst/>
-                  <dgm:layoutNode name="rootText3" styleLbl="asst1">
-                    <dgm:varLst>
-                      <dgm:chPref val="3"/>
-                    </dgm:varLst>
-                    <dgm:alg type="tx"/>
-                    <dgm:shape xmlns:r="http://schemas.openxmlformats.org/officeDocument/2006/relationships" type="rect" r:blip="">
-                      <dgm:adjLst/>
-                    </dgm:shape>
-                    <dgm:presOf axis="self" ptType="node" cnt="1"/>
-                    <dgm:constrLst>
-                      <dgm:constr type="primFontSz" val="65"/>
-                      <dgm:constr type="lMarg" refType="primFontSz" fact="0.05"/>
-                      <dgm:constr type="rMarg" refType="primFontSz" fact="0.05"/>
-                      <dgm:constr type="tMarg" refType="primFontSz" fact="0.05"/>
-                      <dgm:constr type="bMarg" refType="h" fact="0.4"/>
-                    </dgm:constrLst>
-                    <dgm:ruleLst>
-                      <dgm:rule type="primFontSz" val="5" fact="NaN" max="NaN"/>
-                    </dgm:ruleLst>
-                  </dgm:layoutNode>
-                  <dgm:layoutNode name="titleText3" styleLbl="fgAcc2">
-                    <dgm:varLst>
-                      <dgm:chMax val="0"/>
-                      <dgm:chPref val="0"/>
-                    </dgm:varLst>
-                    <dgm:alg type="tx">
-                      <dgm:param type="parTxLTRAlign" val="r"/>
-                    </dgm:alg>
-                    <dgm:shape xmlns:r="http://schemas.openxmlformats.org/officeDocument/2006/relationships" type="rect" r:blip="">
-                      <dgm:adjLst/>
-                    </dgm:shape>
-                    <dgm:presOf axis="followSib" ptType="sibTrans" hideLastTrans="0" cnt="1"/>
-                    <dgm:constrLst>
-                      <dgm:constr type="primFontSz" val="65"/>
-                      <dgm:constr type="lMarg" refType="primFontSz" fact="0.2"/>
-                      <dgm:constr type="rMarg" refType="primFontSz" fact="0.2"/>
-                      <dgm:constr type="tMarg" refType="primFontSz" fact="0.05"/>
-                      <dgm:constr type="bMarg" refType="primFontSz" fact="0.05"/>
-                    </dgm:constrLst>
-                    <dgm:ruleLst>
-                      <dgm:rule type="primFontSz" val="5" fact="NaN" max="NaN"/>
-                    </dgm:ruleLst>
-                  </dgm:layoutNode>
-                  <dgm:layoutNode name="rootConnector3" moveWith="rootText1">
-                    <dgm:alg type="sp"/>
-                    <dgm:shape xmlns:r="http://schemas.openxmlformats.org/officeDocument/2006/relationships" type="rect" r:blip="" hideGeom="1">
-                      <dgm:adjLst/>
-                    </dgm:shape>
-                    <dgm:presOf axis="self" ptType="node" cnt="1"/>
-                    <dgm:constrLst/>
-                    <dgm:ruleLst/>
-                  </dgm:layoutNode>
-                </dgm:layoutNode>
-                <dgm:layoutNode name="hierChild6">
-                  <dgm:choose name="Name109">
-                    <dgm:if name="Name110" func="var" arg="hierBranch" op="equ" val="l">
-                      <dgm:alg type="hierChild">
-                        <dgm:param type="chAlign" val="r"/>
-                        <dgm:param type="linDir" val="fromT"/>
-                      </dgm:alg>
-                    </dgm:if>
-                    <dgm:if name="Name111" func="var" arg="hierBranch" op="equ" val="r">
-                      <dgm:alg type="hierChild">
-                        <dgm:param type="chAlign" val="l"/>
-                        <dgm:param type="linDir" val="fromT"/>
-                      </dgm:alg>
-                    </dgm:if>
-                    <dgm:if name="Name112" func="var" arg="hierBranch" op="equ" val="hang">
-                      <dgm:choose name="Name113">
-                        <dgm:if name="Name114" func="var" arg="dir" op="equ" val="norm">
-                          <dgm:alg type="hierChild">
-                            <dgm:param type="chAlign" val="l"/>
-                            <dgm:param type="linDir" val="fromL"/>
-                            <dgm:param type="secChAlign" val="t"/>
-                            <dgm:param type="secLinDir" val="fromT"/>
-                          </dgm:alg>
-                        </dgm:if>
-                        <dgm:else name="Name115">
-                          <dgm:alg type="hierChild">
-                            <dgm:param type="chAlign" val="l"/>
-                            <dgm:param type="linDir" val="fromR"/>
-                            <dgm:param type="secChAlign" val="t"/>
-                            <dgm:param type="secLinDir" val="fromT"/>
-                          </dgm:alg>
-                        </dgm:else>
-                      </dgm:choose>
-                    </dgm:if>
-                    <dgm:if name="Name116" func="var" arg="hierBranch" op="equ" val="std">
-                      <dgm:choose name="Name117">
-                        <dgm:if name="Name118" func="var" arg="dir" op="equ" val="norm">
-                          <dgm:alg type="hierChild"/>
-                        </dgm:if>
-                        <dgm:else name="Name119">
-                          <dgm:alg type="hierChild">
-                            <dgm:param type="linDir" val="fromR"/>
-                          </dgm:alg>
-                        </dgm:else>
-                      </dgm:choose>
-                    </dgm:if>
-                    <dgm:if name="Name120" func="var" arg="hierBranch" op="equ" val="init">
-                      <dgm:alg type="hierChild"/>
-                    </dgm:if>
-                    <dgm:else name="Name121"/>
-                  </dgm:choose>
-                  <dgm:shape xmlns:r="http://schemas.openxmlformats.org/officeDocument/2006/relationships" r:blip="">
-                    <dgm:adjLst/>
-                  </dgm:shape>
-                  <dgm:presOf/>
-                  <dgm:constrLst/>
-                  <dgm:ruleLst/>
-                  <dgm:forEach name="Name122" ref="rep2a"/>
-                </dgm:layoutNode>
-                <dgm:layoutNode name="hierChild7">
-                  <dgm:choose name="Name123">
-                    <dgm:if name="Name124" func="var" arg="dir" op="equ" val="norm">
-                      <dgm:alg type="hierChild">
-                        <dgm:param type="chAlign" val="l"/>
-                        <dgm:param type="linDir" val="fromL"/>
-                        <dgm:param type="secChAlign" val="t"/>
-                        <dgm:param type="secLinDir" val="fromT"/>
-                      </dgm:alg>
-                    </dgm:if>
-                    <dgm:else name="Name125">
-                      <dgm:alg type="hierChild">
-                        <dgm:param type="chAlign" val="l"/>
-                        <dgm:param type="linDir" val="fromR"/>
-                        <dgm:param type="secChAlign" val="t"/>
-                        <dgm:param type="secLinDir" val="fromT"/>
-                      </dgm:alg>
-                    </dgm:else>
-                  </dgm:choose>
-                  <dgm:shape xmlns:r="http://schemas.openxmlformats.org/officeDocument/2006/relationships" r:blip="">
-                    <dgm:adjLst/>
-                  </dgm:shape>
-                  <dgm:presOf/>
-                  <dgm:constrLst/>
-                  <dgm:ruleLst/>
-                  <dgm:forEach name="Name126" ref="rep2b"/>
-                </dgm:layoutNode>
-              </dgm:layoutNode>
-            </dgm:forEach>
+            <dgm:constrLst>
+              <dgm:constr type="primFontSz" val="65"/>
+            </dgm:constrLst>
+            <dgm:ruleLst>
+              <dgm:rule type="primFontSz" val="5" fact="NaN" max="NaN"/>
+            </dgm:ruleLst>
           </dgm:layoutNode>
         </dgm:layoutNode>
+        <dgm:choose name="Name30">
+          <dgm:if name="Name31" axis="self" ptType="node" func="revPos" op="gte" val="2">
+            <dgm:layoutNode name="spComp">
+              <dgm:alg type="composite">
+                <dgm:param type="vertAlign" val="t"/>
+                <dgm:param type="horzAlign" val="ctr"/>
+              </dgm:alg>
+              <dgm:shape xmlns:r="http://schemas.openxmlformats.org/officeDocument/2006/relationships" r:blip="">
+                <dgm:adjLst/>
+              </dgm:shape>
+              <dgm:presOf/>
+              <dgm:constrLst>
+                <dgm:constr type="userA"/>
+                <dgm:constr type="userB"/>
+                <dgm:constr type="l" for="ch" forName="vSp"/>
+                <dgm:constr type="t" for="ch" forName="vSp"/>
+                <dgm:constr type="h" for="ch" forName="vSp" refType="userB"/>
+                <dgm:constr type="hOff" for="ch" forName="vSp" refType="userA" fact="-0.2"/>
+              </dgm:constrLst>
+              <dgm:ruleLst/>
+              <dgm:layoutNode name="vSp">
+                <dgm:alg type="sp"/>
+                <dgm:shape xmlns:r="http://schemas.openxmlformats.org/officeDocument/2006/relationships" r:blip="">
+                  <dgm:adjLst/>
+                </dgm:shape>
+                <dgm:presOf/>
+                <dgm:constrLst/>
+                <dgm:ruleLst/>
+              </dgm:layoutNode>
+            </dgm:layoutNode>
+          </dgm:if>
+          <dgm:else name="Name32"/>
+        </dgm:choose>
       </dgm:forEach>
-    </dgm:forEach>
+    </dgm:layoutNode>
   </dgm:layoutNode>
 </dgm:layoutDef>
 </file>
@@ -5892,7 +4101,7 @@
           <a:p>
             <a:fld id="{C2847E39-3363-4701-A48C-E1ED25F21718}" type="datetimeFigureOut">
               <a:rPr lang="en-US" smtClean="0"/>
-              <a:t>7/2/2017</a:t>
+              <a:t>7/5/2017</a:t>
             </a:fld>
             <a:endParaRPr lang="en-US"/>
           </a:p>
@@ -6423,7 +4632,7 @@
           <a:p>
             <a:fld id="{58DD293B-D8D0-431A-BBD3-F7FF1DD91784}" type="datetimeFigureOut">
               <a:rPr lang="en-US" smtClean="0"/>
-              <a:t>7/2/2017</a:t>
+              <a:t>7/5/2017</a:t>
             </a:fld>
             <a:endParaRPr lang="en-US"/>
           </a:p>
@@ -6621,7 +4830,7 @@
           <a:p>
             <a:fld id="{58DD293B-D8D0-431A-BBD3-F7FF1DD91784}" type="datetimeFigureOut">
               <a:rPr lang="en-US" smtClean="0"/>
-              <a:t>7/2/2017</a:t>
+              <a:t>7/5/2017</a:t>
             </a:fld>
             <a:endParaRPr lang="en-US"/>
           </a:p>
@@ -6829,7 +5038,7 @@
           <a:p>
             <a:fld id="{58DD293B-D8D0-431A-BBD3-F7FF1DD91784}" type="datetimeFigureOut">
               <a:rPr lang="en-US" smtClean="0"/>
-              <a:t>7/2/2017</a:t>
+              <a:t>7/5/2017</a:t>
             </a:fld>
             <a:endParaRPr lang="en-US"/>
           </a:p>
@@ -7027,7 +5236,7 @@
           <a:p>
             <a:fld id="{58DD293B-D8D0-431A-BBD3-F7FF1DD91784}" type="datetimeFigureOut">
               <a:rPr lang="en-US" smtClean="0"/>
-              <a:t>7/2/2017</a:t>
+              <a:t>7/5/2017</a:t>
             </a:fld>
             <a:endParaRPr lang="en-US"/>
           </a:p>
@@ -7302,7 +5511,7 @@
           <a:p>
             <a:fld id="{58DD293B-D8D0-431A-BBD3-F7FF1DD91784}" type="datetimeFigureOut">
               <a:rPr lang="en-US" smtClean="0"/>
-              <a:t>7/2/2017</a:t>
+              <a:t>7/5/2017</a:t>
             </a:fld>
             <a:endParaRPr lang="en-US"/>
           </a:p>
@@ -7567,7 +5776,7 @@
           <a:p>
             <a:fld id="{58DD293B-D8D0-431A-BBD3-F7FF1DD91784}" type="datetimeFigureOut">
               <a:rPr lang="en-US" smtClean="0"/>
-              <a:t>7/2/2017</a:t>
+              <a:t>7/5/2017</a:t>
             </a:fld>
             <a:endParaRPr lang="en-US"/>
           </a:p>
@@ -7979,7 +6188,7 @@
           <a:p>
             <a:fld id="{58DD293B-D8D0-431A-BBD3-F7FF1DD91784}" type="datetimeFigureOut">
               <a:rPr lang="en-US" smtClean="0"/>
-              <a:t>7/2/2017</a:t>
+              <a:t>7/5/2017</a:t>
             </a:fld>
             <a:endParaRPr lang="en-US"/>
           </a:p>
@@ -8120,7 +6329,7 @@
           <a:p>
             <a:fld id="{58DD293B-D8D0-431A-BBD3-F7FF1DD91784}" type="datetimeFigureOut">
               <a:rPr lang="en-US" smtClean="0"/>
-              <a:t>7/2/2017</a:t>
+              <a:t>7/5/2017</a:t>
             </a:fld>
             <a:endParaRPr lang="en-US"/>
           </a:p>
@@ -8233,7 +6442,7 @@
           <a:p>
             <a:fld id="{58DD293B-D8D0-431A-BBD3-F7FF1DD91784}" type="datetimeFigureOut">
               <a:rPr lang="en-US" smtClean="0"/>
-              <a:t>7/2/2017</a:t>
+              <a:t>7/5/2017</a:t>
             </a:fld>
             <a:endParaRPr lang="en-US"/>
           </a:p>
@@ -8544,7 +6753,7 @@
           <a:p>
             <a:fld id="{58DD293B-D8D0-431A-BBD3-F7FF1DD91784}" type="datetimeFigureOut">
               <a:rPr lang="en-US" smtClean="0"/>
-              <a:t>7/2/2017</a:t>
+              <a:t>7/5/2017</a:t>
             </a:fld>
             <a:endParaRPr lang="en-US"/>
           </a:p>
@@ -8832,7 +7041,7 @@
           <a:p>
             <a:fld id="{58DD293B-D8D0-431A-BBD3-F7FF1DD91784}" type="datetimeFigureOut">
               <a:rPr lang="en-US" smtClean="0"/>
-              <a:t>7/2/2017</a:t>
+              <a:t>7/5/2017</a:t>
             </a:fld>
             <a:endParaRPr lang="en-US"/>
           </a:p>
@@ -9073,7 +7282,7 @@
           <a:p>
             <a:fld id="{58DD293B-D8D0-431A-BBD3-F7FF1DD91784}" type="datetimeFigureOut">
               <a:rPr lang="en-US" smtClean="0"/>
-              <a:t>7/2/2017</a:t>
+              <a:t>7/5/2017</a:t>
             </a:fld>
             <a:endParaRPr lang="en-US"/>
           </a:p>
@@ -9995,7 +8204,7 @@
         <p:spPr/>
         <p:txBody>
           <a:bodyPr>
-            <a:normAutofit fontScale="92500" lnSpcReduction="10000"/>
+            <a:normAutofit fontScale="92500" lnSpcReduction="20000"/>
           </a:bodyPr>
           <a:lstStyle/>
           <a:p>
@@ -10034,15 +8243,7 @@
             <a:pPr lvl="1"/>
             <a:r>
               <a:rPr lang="en-US" dirty="0"/>
-              <a:t>Pulls Mom’s connect members from </a:t>
-            </a:r>
-            <a:r>
-              <a:rPr lang="en-US" dirty="0" err="1"/>
-              <a:t>Fiebase</a:t>
-            </a:r>
-            <a:r>
-              <a:rPr lang="en-US" dirty="0"/>
-              <a:t> for review</a:t>
+              <a:t>Pulls Mom’s connect members from Firebase for review</a:t>
             </a:r>
           </a:p>
           <a:p>
@@ -10056,6 +8257,13 @@
             <a:r>
               <a:rPr lang="en-US" dirty="0"/>
               <a:t>Pulls park information from Firebase</a:t>
+            </a:r>
+          </a:p>
+          <a:p>
+            <a:pPr lvl="1"/>
+            <a:r>
+              <a:rPr lang="en-US" dirty="0"/>
+              <a:t>Add new park feature</a:t>
             </a:r>
           </a:p>
           <a:p>
@@ -10133,7 +8341,7 @@
           <a:p>
             <a:r>
               <a:rPr lang="en-US" dirty="0"/>
-              <a:t>Moms Connect Navigation</a:t>
+              <a:t>Mom’s Connect Navigation</a:t>
             </a:r>
           </a:p>
         </p:txBody>
@@ -10154,7 +8362,7 @@
             <p:ph idx="1"/>
             <p:extLst>
               <p:ext uri="{D42A27DB-BD31-4B8C-83A1-F6EECF244321}">
-                <p14:modId xmlns:p14="http://schemas.microsoft.com/office/powerpoint/2010/main" val="3673399842"/>
+                <p14:modId xmlns:p14="http://schemas.microsoft.com/office/powerpoint/2010/main" val="1782644466"/>
               </p:ext>
             </p:extLst>
           </p:nvPr>

</xml_diff>